<commit_message>
Update no_3 for AA1
</commit_message>
<xml_diff>
--- a/George_UwagbaleAA1.pptx
+++ b/George_UwagbaleAA1.pptx
@@ -3935,8 +3935,8 @@
         </p:nvSpPr>
         <p:spPr>
           <a:xfrm>
-            <a:off x="3919449" y="5632323"/>
-            <a:ext cx="1936866" cy="336215"/>
+            <a:off x="3919449" y="5632324"/>
+            <a:ext cx="1936866" cy="255392"/>
           </a:xfrm>
           <a:prstGeom prst="flowChartInputOutput">
             <a:avLst/>
@@ -3994,7 +3994,7 @@
         <p:spPr>
           <a:xfrm flipH="1">
             <a:off x="4887882" y="5447140"/>
-            <a:ext cx="1" cy="185183"/>
+            <a:ext cx="1" cy="185184"/>
           </a:xfrm>
           <a:prstGeom prst="straightConnector1">
             <a:avLst/>
@@ -4026,8 +4026,8 @@
         </p:nvSpPr>
         <p:spPr>
           <a:xfrm>
-            <a:off x="3919449" y="6162204"/>
-            <a:ext cx="1936866" cy="336215"/>
+            <a:off x="3919449" y="6162205"/>
+            <a:ext cx="1936866" cy="241754"/>
           </a:xfrm>
           <a:prstGeom prst="flowChartInputOutput">
             <a:avLst/>
@@ -4058,7 +4058,7 @@
           <a:p>
             <a:pPr algn="ctr"/>
             <a:r>
-              <a:rPr lang="en-GB" sz="1200" smtClean="0">
+              <a:rPr lang="en-GB" sz="1200" dirty="0" smtClean="0">
                 <a:solidFill>
                   <a:schemeClr val="tx1"/>
                 </a:solidFill>
@@ -4084,8 +4084,99 @@
         </p:nvCxnSpPr>
         <p:spPr>
           <a:xfrm>
-            <a:off x="4887882" y="5968538"/>
-            <a:ext cx="0" cy="193666"/>
+            <a:off x="4887882" y="5887716"/>
+            <a:ext cx="0" cy="274489"/>
+          </a:xfrm>
+          <a:prstGeom prst="straightConnector1">
+            <a:avLst/>
+          </a:prstGeom>
+          <a:ln>
+            <a:tailEnd type="triangle"/>
+          </a:ln>
+        </p:spPr>
+        <p:style>
+          <a:lnRef idx="1">
+            <a:schemeClr val="accent1"/>
+          </a:lnRef>
+          <a:fillRef idx="0">
+            <a:schemeClr val="accent1"/>
+          </a:fillRef>
+          <a:effectRef idx="0">
+            <a:schemeClr val="accent1"/>
+          </a:effectRef>
+          <a:fontRef idx="minor">
+            <a:schemeClr val="tx1"/>
+          </a:fontRef>
+        </p:style>
+      </p:cxnSp>
+      <p:sp>
+        <p:nvSpPr>
+          <p:cNvPr id="26" name="Oval 25"/>
+          <p:cNvSpPr/>
+          <p:nvPr/>
+        </p:nvSpPr>
+        <p:spPr>
+          <a:xfrm>
+            <a:off x="4243645" y="6616931"/>
+            <a:ext cx="1288473" cy="241069"/>
+          </a:xfrm>
+          <a:prstGeom prst="ellipse">
+            <a:avLst/>
+          </a:prstGeom>
+          <a:solidFill>
+            <a:schemeClr val="bg1"/>
+          </a:solidFill>
+        </p:spPr>
+        <p:style>
+          <a:lnRef idx="2">
+            <a:schemeClr val="accent1">
+              <a:shade val="50000"/>
+            </a:schemeClr>
+          </a:lnRef>
+          <a:fillRef idx="1">
+            <a:schemeClr val="accent1"/>
+          </a:fillRef>
+          <a:effectRef idx="0">
+            <a:schemeClr val="accent1"/>
+          </a:effectRef>
+          <a:fontRef idx="minor">
+            <a:schemeClr val="lt1"/>
+          </a:fontRef>
+        </p:style>
+        <p:txBody>
+          <a:bodyPr rtlCol="0" anchor="ctr"/>
+          <a:lstStyle/>
+          <a:p>
+            <a:pPr algn="ctr"/>
+            <a:r>
+              <a:rPr lang="en-GB" sz="1200" dirty="0" smtClean="0">
+                <a:solidFill>
+                  <a:schemeClr val="tx1"/>
+                </a:solidFill>
+              </a:rPr>
+              <a:t>End</a:t>
+            </a:r>
+            <a:endParaRPr lang="en-GB" sz="1200" dirty="0">
+              <a:solidFill>
+                <a:schemeClr val="tx1"/>
+              </a:solidFill>
+            </a:endParaRPr>
+          </a:p>
+        </p:txBody>
+      </p:sp>
+      <p:cxnSp>
+        <p:nvCxnSpPr>
+          <p:cNvPr id="27" name="Straight Arrow Connector 26"/>
+          <p:cNvCxnSpPr>
+            <a:stCxn id="72" idx="4"/>
+            <a:endCxn id="26" idx="0"/>
+          </p:cNvCxnSpPr>
+          <p:nvPr/>
+        </p:nvCxnSpPr>
+        <p:spPr>
+          <a:xfrm>
+            <a:off x="4887882" y="6403959"/>
+            <a:ext cx="0" cy="212972"/>
           </a:xfrm>
           <a:prstGeom prst="straightConnector1">
             <a:avLst/>
@@ -4357,6 +4448,1547 @@
           </a:p>
         </p:txBody>
       </p:sp>
+      <p:sp>
+        <p:nvSpPr>
+          <p:cNvPr id="4" name="Oval 3"/>
+          <p:cNvSpPr/>
+          <p:nvPr/>
+        </p:nvSpPr>
+        <p:spPr>
+          <a:xfrm>
+            <a:off x="4959178" y="148281"/>
+            <a:ext cx="889687" cy="225509"/>
+          </a:xfrm>
+          <a:prstGeom prst="ellipse">
+            <a:avLst/>
+          </a:prstGeom>
+          <a:solidFill>
+            <a:schemeClr val="bg1"/>
+          </a:solidFill>
+        </p:spPr>
+        <p:style>
+          <a:lnRef idx="2">
+            <a:schemeClr val="accent1">
+              <a:shade val="50000"/>
+            </a:schemeClr>
+          </a:lnRef>
+          <a:fillRef idx="1">
+            <a:schemeClr val="accent1"/>
+          </a:fillRef>
+          <a:effectRef idx="0">
+            <a:schemeClr val="accent1"/>
+          </a:effectRef>
+          <a:fontRef idx="minor">
+            <a:schemeClr val="lt1"/>
+          </a:fontRef>
+        </p:style>
+        <p:txBody>
+          <a:bodyPr rtlCol="0" anchor="ctr"/>
+          <a:lstStyle/>
+          <a:p>
+            <a:pPr algn="ctr"/>
+            <a:r>
+              <a:rPr lang="en-US" sz="1000" dirty="0" smtClean="0">
+                <a:solidFill>
+                  <a:schemeClr val="tx1"/>
+                </a:solidFill>
+              </a:rPr>
+              <a:t>Start</a:t>
+            </a:r>
+            <a:endParaRPr lang="en-US" sz="1000" dirty="0">
+              <a:solidFill>
+                <a:schemeClr val="tx1"/>
+              </a:solidFill>
+            </a:endParaRPr>
+          </a:p>
+        </p:txBody>
+      </p:sp>
+      <p:sp>
+        <p:nvSpPr>
+          <p:cNvPr id="5" name="Flowchart: Data 4"/>
+          <p:cNvSpPr/>
+          <p:nvPr/>
+        </p:nvSpPr>
+        <p:spPr>
+          <a:xfrm>
+            <a:off x="4477264" y="550903"/>
+            <a:ext cx="1853514" cy="280087"/>
+          </a:xfrm>
+          <a:prstGeom prst="flowChartInputOutput">
+            <a:avLst/>
+          </a:prstGeom>
+          <a:solidFill>
+            <a:schemeClr val="bg1"/>
+          </a:solidFill>
+        </p:spPr>
+        <p:style>
+          <a:lnRef idx="2">
+            <a:schemeClr val="accent1">
+              <a:shade val="50000"/>
+            </a:schemeClr>
+          </a:lnRef>
+          <a:fillRef idx="1">
+            <a:schemeClr val="accent1"/>
+          </a:fillRef>
+          <a:effectRef idx="0">
+            <a:schemeClr val="accent1"/>
+          </a:effectRef>
+          <a:fontRef idx="minor">
+            <a:schemeClr val="lt1"/>
+          </a:fontRef>
+        </p:style>
+        <p:txBody>
+          <a:bodyPr rtlCol="0" anchor="ctr"/>
+          <a:lstStyle/>
+          <a:p>
+            <a:pPr algn="ctr"/>
+            <a:r>
+              <a:rPr lang="en-US" sz="1000" dirty="0" smtClean="0">
+                <a:solidFill>
+                  <a:schemeClr val="tx1"/>
+                </a:solidFill>
+              </a:rPr>
+              <a:t>Output “Enter the value for a”</a:t>
+            </a:r>
+            <a:endParaRPr lang="en-US" sz="1000" dirty="0">
+              <a:solidFill>
+                <a:schemeClr val="tx1"/>
+              </a:solidFill>
+            </a:endParaRPr>
+          </a:p>
+        </p:txBody>
+      </p:sp>
+      <p:cxnSp>
+        <p:nvCxnSpPr>
+          <p:cNvPr id="7" name="Straight Arrow Connector 6"/>
+          <p:cNvCxnSpPr>
+            <a:stCxn id="4" idx="4"/>
+            <a:endCxn id="5" idx="1"/>
+          </p:cNvCxnSpPr>
+          <p:nvPr/>
+        </p:nvCxnSpPr>
+        <p:spPr>
+          <a:xfrm flipH="1">
+            <a:off x="5404021" y="373790"/>
+            <a:ext cx="1" cy="177113"/>
+          </a:xfrm>
+          <a:prstGeom prst="straightConnector1">
+            <a:avLst/>
+          </a:prstGeom>
+          <a:ln>
+            <a:tailEnd type="triangle"/>
+          </a:ln>
+        </p:spPr>
+        <p:style>
+          <a:lnRef idx="1">
+            <a:schemeClr val="accent1"/>
+          </a:lnRef>
+          <a:fillRef idx="0">
+            <a:schemeClr val="accent1"/>
+          </a:fillRef>
+          <a:effectRef idx="0">
+            <a:schemeClr val="accent1"/>
+          </a:effectRef>
+          <a:fontRef idx="minor">
+            <a:schemeClr val="tx1"/>
+          </a:fontRef>
+        </p:style>
+      </p:cxnSp>
+      <p:sp>
+        <p:nvSpPr>
+          <p:cNvPr id="8" name="Flowchart: Data 7"/>
+          <p:cNvSpPr/>
+          <p:nvPr/>
+        </p:nvSpPr>
+        <p:spPr>
+          <a:xfrm>
+            <a:off x="4291913" y="1008103"/>
+            <a:ext cx="1853514" cy="227572"/>
+          </a:xfrm>
+          <a:prstGeom prst="flowChartInputOutput">
+            <a:avLst/>
+          </a:prstGeom>
+          <a:solidFill>
+            <a:schemeClr val="bg1"/>
+          </a:solidFill>
+        </p:spPr>
+        <p:style>
+          <a:lnRef idx="2">
+            <a:schemeClr val="accent1">
+              <a:shade val="50000"/>
+            </a:schemeClr>
+          </a:lnRef>
+          <a:fillRef idx="1">
+            <a:schemeClr val="accent1"/>
+          </a:fillRef>
+          <a:effectRef idx="0">
+            <a:schemeClr val="accent1"/>
+          </a:effectRef>
+          <a:fontRef idx="minor">
+            <a:schemeClr val="lt1"/>
+          </a:fontRef>
+        </p:style>
+        <p:txBody>
+          <a:bodyPr rtlCol="0" anchor="ctr"/>
+          <a:lstStyle/>
+          <a:p>
+            <a:pPr algn="ctr"/>
+            <a:r>
+              <a:rPr lang="en-US" sz="1000" dirty="0" smtClean="0">
+                <a:solidFill>
+                  <a:schemeClr val="tx1"/>
+                </a:solidFill>
+              </a:rPr>
+              <a:t>Input a</a:t>
+            </a:r>
+            <a:endParaRPr lang="en-US" sz="1000" dirty="0">
+              <a:solidFill>
+                <a:schemeClr val="tx1"/>
+              </a:solidFill>
+            </a:endParaRPr>
+          </a:p>
+        </p:txBody>
+      </p:sp>
+      <p:cxnSp>
+        <p:nvCxnSpPr>
+          <p:cNvPr id="9" name="Straight Arrow Connector 8"/>
+          <p:cNvCxnSpPr>
+            <a:stCxn id="5" idx="4"/>
+            <a:endCxn id="8" idx="0"/>
+          </p:cNvCxnSpPr>
+          <p:nvPr/>
+        </p:nvCxnSpPr>
+        <p:spPr>
+          <a:xfrm>
+            <a:off x="5404021" y="830990"/>
+            <a:ext cx="0" cy="177113"/>
+          </a:xfrm>
+          <a:prstGeom prst="straightConnector1">
+            <a:avLst/>
+          </a:prstGeom>
+          <a:ln>
+            <a:tailEnd type="triangle"/>
+          </a:ln>
+        </p:spPr>
+        <p:style>
+          <a:lnRef idx="1">
+            <a:schemeClr val="accent1"/>
+          </a:lnRef>
+          <a:fillRef idx="0">
+            <a:schemeClr val="accent1"/>
+          </a:fillRef>
+          <a:effectRef idx="0">
+            <a:schemeClr val="accent1"/>
+          </a:effectRef>
+          <a:fontRef idx="minor">
+            <a:schemeClr val="tx1"/>
+          </a:fontRef>
+        </p:style>
+      </p:cxnSp>
+      <p:sp>
+        <p:nvSpPr>
+          <p:cNvPr id="27" name="Flowchart: Data 26"/>
+          <p:cNvSpPr/>
+          <p:nvPr/>
+        </p:nvSpPr>
+        <p:spPr>
+          <a:xfrm>
+            <a:off x="4291913" y="1412788"/>
+            <a:ext cx="1853514" cy="280087"/>
+          </a:xfrm>
+          <a:prstGeom prst="flowChartInputOutput">
+            <a:avLst/>
+          </a:prstGeom>
+          <a:solidFill>
+            <a:schemeClr val="bg1"/>
+          </a:solidFill>
+        </p:spPr>
+        <p:style>
+          <a:lnRef idx="2">
+            <a:schemeClr val="accent1">
+              <a:shade val="50000"/>
+            </a:schemeClr>
+          </a:lnRef>
+          <a:fillRef idx="1">
+            <a:schemeClr val="accent1"/>
+          </a:fillRef>
+          <a:effectRef idx="0">
+            <a:schemeClr val="accent1"/>
+          </a:effectRef>
+          <a:fontRef idx="minor">
+            <a:schemeClr val="lt1"/>
+          </a:fontRef>
+        </p:style>
+        <p:txBody>
+          <a:bodyPr rtlCol="0" anchor="ctr"/>
+          <a:lstStyle/>
+          <a:p>
+            <a:pPr algn="ctr"/>
+            <a:r>
+              <a:rPr lang="en-US" sz="1000" dirty="0" smtClean="0">
+                <a:solidFill>
+                  <a:schemeClr val="tx1"/>
+                </a:solidFill>
+              </a:rPr>
+              <a:t>Output “Enter the value for b”</a:t>
+            </a:r>
+            <a:endParaRPr lang="en-US" sz="1000" dirty="0">
+              <a:solidFill>
+                <a:schemeClr val="tx1"/>
+              </a:solidFill>
+            </a:endParaRPr>
+          </a:p>
+        </p:txBody>
+      </p:sp>
+      <p:cxnSp>
+        <p:nvCxnSpPr>
+          <p:cNvPr id="28" name="Straight Arrow Connector 27"/>
+          <p:cNvCxnSpPr>
+            <a:stCxn id="8" idx="4"/>
+            <a:endCxn id="27" idx="1"/>
+          </p:cNvCxnSpPr>
+          <p:nvPr/>
+        </p:nvCxnSpPr>
+        <p:spPr>
+          <a:xfrm>
+            <a:off x="5218670" y="1235675"/>
+            <a:ext cx="0" cy="177113"/>
+          </a:xfrm>
+          <a:prstGeom prst="straightConnector1">
+            <a:avLst/>
+          </a:prstGeom>
+          <a:ln>
+            <a:tailEnd type="triangle"/>
+          </a:ln>
+        </p:spPr>
+        <p:style>
+          <a:lnRef idx="1">
+            <a:schemeClr val="accent1"/>
+          </a:lnRef>
+          <a:fillRef idx="0">
+            <a:schemeClr val="accent1"/>
+          </a:fillRef>
+          <a:effectRef idx="0">
+            <a:schemeClr val="accent1"/>
+          </a:effectRef>
+          <a:fontRef idx="minor">
+            <a:schemeClr val="tx1"/>
+          </a:fontRef>
+        </p:style>
+      </p:cxnSp>
+      <p:sp>
+        <p:nvSpPr>
+          <p:cNvPr id="36" name="Flowchart: Data 35"/>
+          <p:cNvSpPr/>
+          <p:nvPr/>
+        </p:nvSpPr>
+        <p:spPr>
+          <a:xfrm>
+            <a:off x="4291913" y="1869988"/>
+            <a:ext cx="1853514" cy="227572"/>
+          </a:xfrm>
+          <a:prstGeom prst="flowChartInputOutput">
+            <a:avLst/>
+          </a:prstGeom>
+          <a:solidFill>
+            <a:schemeClr val="bg1"/>
+          </a:solidFill>
+        </p:spPr>
+        <p:style>
+          <a:lnRef idx="2">
+            <a:schemeClr val="accent1">
+              <a:shade val="50000"/>
+            </a:schemeClr>
+          </a:lnRef>
+          <a:fillRef idx="1">
+            <a:schemeClr val="accent1"/>
+          </a:fillRef>
+          <a:effectRef idx="0">
+            <a:schemeClr val="accent1"/>
+          </a:effectRef>
+          <a:fontRef idx="minor">
+            <a:schemeClr val="lt1"/>
+          </a:fontRef>
+        </p:style>
+        <p:txBody>
+          <a:bodyPr rtlCol="0" anchor="ctr"/>
+          <a:lstStyle/>
+          <a:p>
+            <a:pPr algn="ctr"/>
+            <a:r>
+              <a:rPr lang="en-US" sz="1000" dirty="0" smtClean="0">
+                <a:solidFill>
+                  <a:schemeClr val="tx1"/>
+                </a:solidFill>
+              </a:rPr>
+              <a:t>Input b</a:t>
+            </a:r>
+            <a:endParaRPr lang="en-US" sz="1000" dirty="0">
+              <a:solidFill>
+                <a:schemeClr val="tx1"/>
+              </a:solidFill>
+            </a:endParaRPr>
+          </a:p>
+        </p:txBody>
+      </p:sp>
+      <p:cxnSp>
+        <p:nvCxnSpPr>
+          <p:cNvPr id="37" name="Straight Arrow Connector 36"/>
+          <p:cNvCxnSpPr>
+            <a:stCxn id="27" idx="4"/>
+            <a:endCxn id="36" idx="1"/>
+          </p:cNvCxnSpPr>
+          <p:nvPr/>
+        </p:nvCxnSpPr>
+        <p:spPr>
+          <a:xfrm>
+            <a:off x="5218670" y="1692875"/>
+            <a:ext cx="0" cy="177113"/>
+          </a:xfrm>
+          <a:prstGeom prst="straightConnector1">
+            <a:avLst/>
+          </a:prstGeom>
+          <a:ln>
+            <a:tailEnd type="triangle"/>
+          </a:ln>
+        </p:spPr>
+        <p:style>
+          <a:lnRef idx="1">
+            <a:schemeClr val="accent1"/>
+          </a:lnRef>
+          <a:fillRef idx="0">
+            <a:schemeClr val="accent1"/>
+          </a:fillRef>
+          <a:effectRef idx="0">
+            <a:schemeClr val="accent1"/>
+          </a:effectRef>
+          <a:fontRef idx="minor">
+            <a:schemeClr val="tx1"/>
+          </a:fontRef>
+        </p:style>
+      </p:cxnSp>
+      <p:sp>
+        <p:nvSpPr>
+          <p:cNvPr id="42" name="Flowchart: Data 41"/>
+          <p:cNvSpPr/>
+          <p:nvPr/>
+        </p:nvSpPr>
+        <p:spPr>
+          <a:xfrm>
+            <a:off x="4291913" y="2274673"/>
+            <a:ext cx="1853514" cy="280087"/>
+          </a:xfrm>
+          <a:prstGeom prst="flowChartInputOutput">
+            <a:avLst/>
+          </a:prstGeom>
+          <a:solidFill>
+            <a:schemeClr val="bg1"/>
+          </a:solidFill>
+        </p:spPr>
+        <p:style>
+          <a:lnRef idx="2">
+            <a:schemeClr val="accent1">
+              <a:shade val="50000"/>
+            </a:schemeClr>
+          </a:lnRef>
+          <a:fillRef idx="1">
+            <a:schemeClr val="accent1"/>
+          </a:fillRef>
+          <a:effectRef idx="0">
+            <a:schemeClr val="accent1"/>
+          </a:effectRef>
+          <a:fontRef idx="minor">
+            <a:schemeClr val="lt1"/>
+          </a:fontRef>
+        </p:style>
+        <p:txBody>
+          <a:bodyPr rtlCol="0" anchor="ctr"/>
+          <a:lstStyle/>
+          <a:p>
+            <a:pPr algn="ctr"/>
+            <a:r>
+              <a:rPr lang="en-US" sz="1000" dirty="0" smtClean="0">
+                <a:solidFill>
+                  <a:schemeClr val="tx1"/>
+                </a:solidFill>
+              </a:rPr>
+              <a:t>Output “Enter the value for c”</a:t>
+            </a:r>
+            <a:endParaRPr lang="en-US" sz="1000" dirty="0">
+              <a:solidFill>
+                <a:schemeClr val="tx1"/>
+              </a:solidFill>
+            </a:endParaRPr>
+          </a:p>
+        </p:txBody>
+      </p:sp>
+      <p:cxnSp>
+        <p:nvCxnSpPr>
+          <p:cNvPr id="43" name="Straight Arrow Connector 42"/>
+          <p:cNvCxnSpPr>
+            <a:stCxn id="36" idx="4"/>
+            <a:endCxn id="42" idx="1"/>
+          </p:cNvCxnSpPr>
+          <p:nvPr/>
+        </p:nvCxnSpPr>
+        <p:spPr>
+          <a:xfrm>
+            <a:off x="5218670" y="2097560"/>
+            <a:ext cx="0" cy="177113"/>
+          </a:xfrm>
+          <a:prstGeom prst="straightConnector1">
+            <a:avLst/>
+          </a:prstGeom>
+          <a:ln>
+            <a:tailEnd type="triangle"/>
+          </a:ln>
+        </p:spPr>
+        <p:style>
+          <a:lnRef idx="1">
+            <a:schemeClr val="accent1"/>
+          </a:lnRef>
+          <a:fillRef idx="0">
+            <a:schemeClr val="accent1"/>
+          </a:fillRef>
+          <a:effectRef idx="0">
+            <a:schemeClr val="accent1"/>
+          </a:effectRef>
+          <a:fontRef idx="minor">
+            <a:schemeClr val="tx1"/>
+          </a:fontRef>
+        </p:style>
+      </p:cxnSp>
+      <p:sp>
+        <p:nvSpPr>
+          <p:cNvPr id="46" name="Flowchart: Data 45"/>
+          <p:cNvSpPr/>
+          <p:nvPr/>
+        </p:nvSpPr>
+        <p:spPr>
+          <a:xfrm>
+            <a:off x="4291913" y="2731873"/>
+            <a:ext cx="1853514" cy="227572"/>
+          </a:xfrm>
+          <a:prstGeom prst="flowChartInputOutput">
+            <a:avLst/>
+          </a:prstGeom>
+          <a:solidFill>
+            <a:schemeClr val="bg1"/>
+          </a:solidFill>
+        </p:spPr>
+        <p:style>
+          <a:lnRef idx="2">
+            <a:schemeClr val="accent1">
+              <a:shade val="50000"/>
+            </a:schemeClr>
+          </a:lnRef>
+          <a:fillRef idx="1">
+            <a:schemeClr val="accent1"/>
+          </a:fillRef>
+          <a:effectRef idx="0">
+            <a:schemeClr val="accent1"/>
+          </a:effectRef>
+          <a:fontRef idx="minor">
+            <a:schemeClr val="lt1"/>
+          </a:fontRef>
+        </p:style>
+        <p:txBody>
+          <a:bodyPr rtlCol="0" anchor="ctr"/>
+          <a:lstStyle/>
+          <a:p>
+            <a:pPr algn="ctr"/>
+            <a:r>
+              <a:rPr lang="en-US" sz="1000" dirty="0" smtClean="0">
+                <a:solidFill>
+                  <a:schemeClr val="tx1"/>
+                </a:solidFill>
+              </a:rPr>
+              <a:t>Input c</a:t>
+            </a:r>
+            <a:endParaRPr lang="en-US" sz="1000" dirty="0">
+              <a:solidFill>
+                <a:schemeClr val="tx1"/>
+              </a:solidFill>
+            </a:endParaRPr>
+          </a:p>
+        </p:txBody>
+      </p:sp>
+      <p:cxnSp>
+        <p:nvCxnSpPr>
+          <p:cNvPr id="47" name="Straight Arrow Connector 46"/>
+          <p:cNvCxnSpPr>
+            <a:stCxn id="42" idx="4"/>
+            <a:endCxn id="46" idx="1"/>
+          </p:cNvCxnSpPr>
+          <p:nvPr/>
+        </p:nvCxnSpPr>
+        <p:spPr>
+          <a:xfrm>
+            <a:off x="5218670" y="2554760"/>
+            <a:ext cx="0" cy="177113"/>
+          </a:xfrm>
+          <a:prstGeom prst="straightConnector1">
+            <a:avLst/>
+          </a:prstGeom>
+          <a:ln>
+            <a:tailEnd type="triangle"/>
+          </a:ln>
+        </p:spPr>
+        <p:style>
+          <a:lnRef idx="1">
+            <a:schemeClr val="accent1"/>
+          </a:lnRef>
+          <a:fillRef idx="0">
+            <a:schemeClr val="accent1"/>
+          </a:fillRef>
+          <a:effectRef idx="0">
+            <a:schemeClr val="accent1"/>
+          </a:effectRef>
+          <a:fontRef idx="minor">
+            <a:schemeClr val="tx1"/>
+          </a:fontRef>
+        </p:style>
+      </p:cxnSp>
+      <p:sp>
+        <p:nvSpPr>
+          <p:cNvPr id="51" name="Flowchart: Decision 50"/>
+          <p:cNvSpPr/>
+          <p:nvPr/>
+        </p:nvSpPr>
+        <p:spPr>
+          <a:xfrm>
+            <a:off x="4662616" y="3136558"/>
+            <a:ext cx="1112108" cy="749643"/>
+          </a:xfrm>
+          <a:prstGeom prst="flowChartDecision">
+            <a:avLst/>
+          </a:prstGeom>
+          <a:solidFill>
+            <a:schemeClr val="bg1"/>
+          </a:solidFill>
+        </p:spPr>
+        <p:style>
+          <a:lnRef idx="2">
+            <a:schemeClr val="accent1">
+              <a:shade val="50000"/>
+            </a:schemeClr>
+          </a:lnRef>
+          <a:fillRef idx="1">
+            <a:schemeClr val="accent1"/>
+          </a:fillRef>
+          <a:effectRef idx="0">
+            <a:schemeClr val="accent1"/>
+          </a:effectRef>
+          <a:fontRef idx="minor">
+            <a:schemeClr val="lt1"/>
+          </a:fontRef>
+        </p:style>
+        <p:txBody>
+          <a:bodyPr rtlCol="0" anchor="ctr"/>
+          <a:lstStyle/>
+          <a:p>
+            <a:pPr algn="ctr"/>
+            <a:r>
+              <a:rPr lang="en-US" sz="1000" dirty="0" smtClean="0">
+                <a:solidFill>
+                  <a:schemeClr val="tx1"/>
+                </a:solidFill>
+              </a:rPr>
+              <a:t>If a&gt;b and a&gt;c</a:t>
+            </a:r>
+            <a:endParaRPr lang="en-US" sz="1000" dirty="0">
+              <a:solidFill>
+                <a:schemeClr val="tx1"/>
+              </a:solidFill>
+            </a:endParaRPr>
+          </a:p>
+        </p:txBody>
+      </p:sp>
+      <p:cxnSp>
+        <p:nvCxnSpPr>
+          <p:cNvPr id="52" name="Straight Arrow Connector 51"/>
+          <p:cNvCxnSpPr>
+            <a:stCxn id="46" idx="4"/>
+            <a:endCxn id="51" idx="0"/>
+          </p:cNvCxnSpPr>
+          <p:nvPr/>
+        </p:nvCxnSpPr>
+        <p:spPr>
+          <a:xfrm>
+            <a:off x="5218670" y="2959445"/>
+            <a:ext cx="0" cy="177113"/>
+          </a:xfrm>
+          <a:prstGeom prst="straightConnector1">
+            <a:avLst/>
+          </a:prstGeom>
+          <a:ln>
+            <a:tailEnd type="triangle"/>
+          </a:ln>
+        </p:spPr>
+        <p:style>
+          <a:lnRef idx="1">
+            <a:schemeClr val="accent1"/>
+          </a:lnRef>
+          <a:fillRef idx="0">
+            <a:schemeClr val="accent1"/>
+          </a:fillRef>
+          <a:effectRef idx="0">
+            <a:schemeClr val="accent1"/>
+          </a:effectRef>
+          <a:fontRef idx="minor">
+            <a:schemeClr val="tx1"/>
+          </a:fontRef>
+        </p:style>
+      </p:cxnSp>
+      <p:cxnSp>
+        <p:nvCxnSpPr>
+          <p:cNvPr id="56" name="Straight Arrow Connector 55"/>
+          <p:cNvCxnSpPr>
+            <a:stCxn id="51" idx="3"/>
+            <a:endCxn id="59" idx="2"/>
+          </p:cNvCxnSpPr>
+          <p:nvPr/>
+        </p:nvCxnSpPr>
+        <p:spPr>
+          <a:xfrm flipV="1">
+            <a:off x="5774724" y="3511379"/>
+            <a:ext cx="229012" cy="1"/>
+          </a:xfrm>
+          <a:prstGeom prst="straightConnector1">
+            <a:avLst/>
+          </a:prstGeom>
+          <a:ln>
+            <a:tailEnd type="triangle"/>
+          </a:ln>
+        </p:spPr>
+        <p:style>
+          <a:lnRef idx="1">
+            <a:schemeClr val="accent1"/>
+          </a:lnRef>
+          <a:fillRef idx="0">
+            <a:schemeClr val="accent1"/>
+          </a:fillRef>
+          <a:effectRef idx="0">
+            <a:schemeClr val="accent1"/>
+          </a:effectRef>
+          <a:fontRef idx="minor">
+            <a:schemeClr val="tx1"/>
+          </a:fontRef>
+        </p:style>
+      </p:cxnSp>
+      <p:sp>
+        <p:nvSpPr>
+          <p:cNvPr id="59" name="Flowchart: Data 58"/>
+          <p:cNvSpPr/>
+          <p:nvPr/>
+        </p:nvSpPr>
+        <p:spPr>
+          <a:xfrm>
+            <a:off x="5848865" y="3371335"/>
+            <a:ext cx="1548713" cy="280087"/>
+          </a:xfrm>
+          <a:prstGeom prst="flowChartInputOutput">
+            <a:avLst/>
+          </a:prstGeom>
+          <a:solidFill>
+            <a:schemeClr val="bg1"/>
+          </a:solidFill>
+        </p:spPr>
+        <p:style>
+          <a:lnRef idx="2">
+            <a:schemeClr val="accent1">
+              <a:shade val="50000"/>
+            </a:schemeClr>
+          </a:lnRef>
+          <a:fillRef idx="1">
+            <a:schemeClr val="accent1"/>
+          </a:fillRef>
+          <a:effectRef idx="0">
+            <a:schemeClr val="accent1"/>
+          </a:effectRef>
+          <a:fontRef idx="minor">
+            <a:schemeClr val="lt1"/>
+          </a:fontRef>
+        </p:style>
+        <p:txBody>
+          <a:bodyPr rtlCol="0" anchor="ctr"/>
+          <a:lstStyle/>
+          <a:p>
+            <a:pPr algn="ctr"/>
+            <a:r>
+              <a:rPr lang="en-US" sz="1000" dirty="0" smtClean="0">
+                <a:solidFill>
+                  <a:schemeClr val="tx1"/>
+                </a:solidFill>
+              </a:rPr>
+              <a:t>Output “a is the largest”</a:t>
+            </a:r>
+            <a:endParaRPr lang="en-US" sz="1000" dirty="0">
+              <a:solidFill>
+                <a:schemeClr val="tx1"/>
+              </a:solidFill>
+            </a:endParaRPr>
+          </a:p>
+        </p:txBody>
+      </p:sp>
+      <p:sp>
+        <p:nvSpPr>
+          <p:cNvPr id="64" name="Oval 63"/>
+          <p:cNvSpPr/>
+          <p:nvPr/>
+        </p:nvSpPr>
+        <p:spPr>
+          <a:xfrm>
+            <a:off x="7574691" y="3398623"/>
+            <a:ext cx="889687" cy="225509"/>
+          </a:xfrm>
+          <a:prstGeom prst="ellipse">
+            <a:avLst/>
+          </a:prstGeom>
+          <a:solidFill>
+            <a:schemeClr val="bg1"/>
+          </a:solidFill>
+        </p:spPr>
+        <p:style>
+          <a:lnRef idx="2">
+            <a:schemeClr val="accent1">
+              <a:shade val="50000"/>
+            </a:schemeClr>
+          </a:lnRef>
+          <a:fillRef idx="1">
+            <a:schemeClr val="accent1"/>
+          </a:fillRef>
+          <a:effectRef idx="0">
+            <a:schemeClr val="accent1"/>
+          </a:effectRef>
+          <a:fontRef idx="minor">
+            <a:schemeClr val="lt1"/>
+          </a:fontRef>
+        </p:style>
+        <p:txBody>
+          <a:bodyPr rtlCol="0" anchor="ctr"/>
+          <a:lstStyle/>
+          <a:p>
+            <a:pPr algn="ctr"/>
+            <a:r>
+              <a:rPr lang="en-US" sz="1000" dirty="0" smtClean="0">
+                <a:solidFill>
+                  <a:schemeClr val="tx1"/>
+                </a:solidFill>
+              </a:rPr>
+              <a:t>End</a:t>
+            </a:r>
+            <a:endParaRPr lang="en-US" sz="1000" dirty="0">
+              <a:solidFill>
+                <a:schemeClr val="tx1"/>
+              </a:solidFill>
+            </a:endParaRPr>
+          </a:p>
+        </p:txBody>
+      </p:sp>
+      <p:cxnSp>
+        <p:nvCxnSpPr>
+          <p:cNvPr id="65" name="Straight Arrow Connector 64"/>
+          <p:cNvCxnSpPr>
+            <a:stCxn id="59" idx="5"/>
+            <a:endCxn id="64" idx="2"/>
+          </p:cNvCxnSpPr>
+          <p:nvPr/>
+        </p:nvCxnSpPr>
+        <p:spPr>
+          <a:xfrm flipV="1">
+            <a:off x="7242707" y="3511378"/>
+            <a:ext cx="331984" cy="1"/>
+          </a:xfrm>
+          <a:prstGeom prst="straightConnector1">
+            <a:avLst/>
+          </a:prstGeom>
+          <a:ln>
+            <a:tailEnd type="triangle"/>
+          </a:ln>
+        </p:spPr>
+        <p:style>
+          <a:lnRef idx="1">
+            <a:schemeClr val="accent1"/>
+          </a:lnRef>
+          <a:fillRef idx="0">
+            <a:schemeClr val="accent1"/>
+          </a:fillRef>
+          <a:effectRef idx="0">
+            <a:schemeClr val="accent1"/>
+          </a:effectRef>
+          <a:fontRef idx="minor">
+            <a:schemeClr val="tx1"/>
+          </a:fontRef>
+        </p:style>
+      </p:cxnSp>
+      <p:sp>
+        <p:nvSpPr>
+          <p:cNvPr id="70" name="TextBox 69"/>
+          <p:cNvSpPr txBox="1"/>
+          <p:nvPr/>
+        </p:nvSpPr>
+        <p:spPr>
+          <a:xfrm>
+            <a:off x="5634681" y="3275512"/>
+            <a:ext cx="428367" cy="246221"/>
+          </a:xfrm>
+          <a:prstGeom prst="rect">
+            <a:avLst/>
+          </a:prstGeom>
+          <a:noFill/>
+        </p:spPr>
+        <p:txBody>
+          <a:bodyPr wrap="square" rtlCol="0">
+            <a:spAutoFit/>
+          </a:bodyPr>
+          <a:lstStyle/>
+          <a:p>
+            <a:r>
+              <a:rPr lang="en-US" sz="1000" dirty="0" smtClean="0"/>
+              <a:t>True</a:t>
+            </a:r>
+            <a:endParaRPr lang="en-US" sz="1000" dirty="0"/>
+          </a:p>
+        </p:txBody>
+      </p:sp>
+      <p:cxnSp>
+        <p:nvCxnSpPr>
+          <p:cNvPr id="71" name="Straight Arrow Connector 70"/>
+          <p:cNvCxnSpPr>
+            <a:stCxn id="51" idx="2"/>
+            <a:endCxn id="74" idx="0"/>
+          </p:cNvCxnSpPr>
+          <p:nvPr/>
+        </p:nvCxnSpPr>
+        <p:spPr>
+          <a:xfrm>
+            <a:off x="5218670" y="3886201"/>
+            <a:ext cx="0" cy="177113"/>
+          </a:xfrm>
+          <a:prstGeom prst="straightConnector1">
+            <a:avLst/>
+          </a:prstGeom>
+          <a:ln>
+            <a:tailEnd type="triangle"/>
+          </a:ln>
+        </p:spPr>
+        <p:style>
+          <a:lnRef idx="1">
+            <a:schemeClr val="accent1"/>
+          </a:lnRef>
+          <a:fillRef idx="0">
+            <a:schemeClr val="accent1"/>
+          </a:fillRef>
+          <a:effectRef idx="0">
+            <a:schemeClr val="accent1"/>
+          </a:effectRef>
+          <a:fontRef idx="minor">
+            <a:schemeClr val="tx1"/>
+          </a:fontRef>
+        </p:style>
+      </p:cxnSp>
+      <p:sp>
+        <p:nvSpPr>
+          <p:cNvPr id="74" name="Flowchart: Decision 73"/>
+          <p:cNvSpPr/>
+          <p:nvPr/>
+        </p:nvSpPr>
+        <p:spPr>
+          <a:xfrm>
+            <a:off x="4662616" y="4063314"/>
+            <a:ext cx="1112108" cy="749643"/>
+          </a:xfrm>
+          <a:prstGeom prst="flowChartDecision">
+            <a:avLst/>
+          </a:prstGeom>
+          <a:solidFill>
+            <a:schemeClr val="bg1"/>
+          </a:solidFill>
+        </p:spPr>
+        <p:style>
+          <a:lnRef idx="2">
+            <a:schemeClr val="accent1">
+              <a:shade val="50000"/>
+            </a:schemeClr>
+          </a:lnRef>
+          <a:fillRef idx="1">
+            <a:schemeClr val="accent1"/>
+          </a:fillRef>
+          <a:effectRef idx="0">
+            <a:schemeClr val="accent1"/>
+          </a:effectRef>
+          <a:fontRef idx="minor">
+            <a:schemeClr val="lt1"/>
+          </a:fontRef>
+        </p:style>
+        <p:txBody>
+          <a:bodyPr rtlCol="0" anchor="ctr"/>
+          <a:lstStyle/>
+          <a:p>
+            <a:pPr algn="ctr"/>
+            <a:r>
+              <a:rPr lang="en-US" sz="1000" dirty="0" smtClean="0">
+                <a:solidFill>
+                  <a:schemeClr val="tx1"/>
+                </a:solidFill>
+              </a:rPr>
+              <a:t>If b&gt;b and b&gt;c</a:t>
+            </a:r>
+            <a:endParaRPr lang="en-US" sz="1000" dirty="0">
+              <a:solidFill>
+                <a:schemeClr val="tx1"/>
+              </a:solidFill>
+            </a:endParaRPr>
+          </a:p>
+        </p:txBody>
+      </p:sp>
+      <p:cxnSp>
+        <p:nvCxnSpPr>
+          <p:cNvPr id="76" name="Straight Arrow Connector 75"/>
+          <p:cNvCxnSpPr>
+            <a:stCxn id="74" idx="3"/>
+            <a:endCxn id="78" idx="2"/>
+          </p:cNvCxnSpPr>
+          <p:nvPr/>
+        </p:nvCxnSpPr>
+        <p:spPr>
+          <a:xfrm flipV="1">
+            <a:off x="5774724" y="4438135"/>
+            <a:ext cx="229011" cy="1"/>
+          </a:xfrm>
+          <a:prstGeom prst="straightConnector1">
+            <a:avLst/>
+          </a:prstGeom>
+          <a:ln>
+            <a:tailEnd type="triangle"/>
+          </a:ln>
+        </p:spPr>
+        <p:style>
+          <a:lnRef idx="1">
+            <a:schemeClr val="accent1"/>
+          </a:lnRef>
+          <a:fillRef idx="0">
+            <a:schemeClr val="accent1"/>
+          </a:fillRef>
+          <a:effectRef idx="0">
+            <a:schemeClr val="accent1"/>
+          </a:effectRef>
+          <a:fontRef idx="minor">
+            <a:schemeClr val="tx1"/>
+          </a:fontRef>
+        </p:style>
+      </p:cxnSp>
+      <p:sp>
+        <p:nvSpPr>
+          <p:cNvPr id="78" name="Flowchart: Data 77"/>
+          <p:cNvSpPr/>
+          <p:nvPr/>
+        </p:nvSpPr>
+        <p:spPr>
+          <a:xfrm>
+            <a:off x="5848864" y="4298091"/>
+            <a:ext cx="1548713" cy="280087"/>
+          </a:xfrm>
+          <a:prstGeom prst="flowChartInputOutput">
+            <a:avLst/>
+          </a:prstGeom>
+          <a:solidFill>
+            <a:schemeClr val="bg1"/>
+          </a:solidFill>
+        </p:spPr>
+        <p:style>
+          <a:lnRef idx="2">
+            <a:schemeClr val="accent1">
+              <a:shade val="50000"/>
+            </a:schemeClr>
+          </a:lnRef>
+          <a:fillRef idx="1">
+            <a:schemeClr val="accent1"/>
+          </a:fillRef>
+          <a:effectRef idx="0">
+            <a:schemeClr val="accent1"/>
+          </a:effectRef>
+          <a:fontRef idx="minor">
+            <a:schemeClr val="lt1"/>
+          </a:fontRef>
+        </p:style>
+        <p:txBody>
+          <a:bodyPr rtlCol="0" anchor="ctr"/>
+          <a:lstStyle/>
+          <a:p>
+            <a:pPr algn="ctr"/>
+            <a:r>
+              <a:rPr lang="en-US" sz="1000" dirty="0" smtClean="0">
+                <a:solidFill>
+                  <a:schemeClr val="tx1"/>
+                </a:solidFill>
+              </a:rPr>
+              <a:t>Output “b is the largest”</a:t>
+            </a:r>
+            <a:endParaRPr lang="en-US" sz="1000" dirty="0">
+              <a:solidFill>
+                <a:schemeClr val="tx1"/>
+              </a:solidFill>
+            </a:endParaRPr>
+          </a:p>
+        </p:txBody>
+      </p:sp>
+      <p:cxnSp>
+        <p:nvCxnSpPr>
+          <p:cNvPr id="81" name="Straight Arrow Connector 80"/>
+          <p:cNvCxnSpPr>
+            <a:stCxn id="78" idx="5"/>
+            <a:endCxn id="84" idx="2"/>
+          </p:cNvCxnSpPr>
+          <p:nvPr/>
+        </p:nvCxnSpPr>
+        <p:spPr>
+          <a:xfrm flipV="1">
+            <a:off x="7242706" y="4438134"/>
+            <a:ext cx="331984" cy="1"/>
+          </a:xfrm>
+          <a:prstGeom prst="straightConnector1">
+            <a:avLst/>
+          </a:prstGeom>
+          <a:ln>
+            <a:tailEnd type="triangle"/>
+          </a:ln>
+        </p:spPr>
+        <p:style>
+          <a:lnRef idx="1">
+            <a:schemeClr val="accent1"/>
+          </a:lnRef>
+          <a:fillRef idx="0">
+            <a:schemeClr val="accent1"/>
+          </a:fillRef>
+          <a:effectRef idx="0">
+            <a:schemeClr val="accent1"/>
+          </a:effectRef>
+          <a:fontRef idx="minor">
+            <a:schemeClr val="tx1"/>
+          </a:fontRef>
+        </p:style>
+      </p:cxnSp>
+      <p:sp>
+        <p:nvSpPr>
+          <p:cNvPr id="84" name="Oval 83"/>
+          <p:cNvSpPr/>
+          <p:nvPr/>
+        </p:nvSpPr>
+        <p:spPr>
+          <a:xfrm>
+            <a:off x="7574690" y="4325379"/>
+            <a:ext cx="889687" cy="225509"/>
+          </a:xfrm>
+          <a:prstGeom prst="ellipse">
+            <a:avLst/>
+          </a:prstGeom>
+          <a:solidFill>
+            <a:schemeClr val="bg1"/>
+          </a:solidFill>
+        </p:spPr>
+        <p:style>
+          <a:lnRef idx="2">
+            <a:schemeClr val="accent1">
+              <a:shade val="50000"/>
+            </a:schemeClr>
+          </a:lnRef>
+          <a:fillRef idx="1">
+            <a:schemeClr val="accent1"/>
+          </a:fillRef>
+          <a:effectRef idx="0">
+            <a:schemeClr val="accent1"/>
+          </a:effectRef>
+          <a:fontRef idx="minor">
+            <a:schemeClr val="lt1"/>
+          </a:fontRef>
+        </p:style>
+        <p:txBody>
+          <a:bodyPr rtlCol="0" anchor="ctr"/>
+          <a:lstStyle/>
+          <a:p>
+            <a:pPr algn="ctr"/>
+            <a:r>
+              <a:rPr lang="en-US" sz="1000" dirty="0" smtClean="0">
+                <a:solidFill>
+                  <a:schemeClr val="tx1"/>
+                </a:solidFill>
+              </a:rPr>
+              <a:t>End</a:t>
+            </a:r>
+            <a:endParaRPr lang="en-US" sz="1000" dirty="0">
+              <a:solidFill>
+                <a:schemeClr val="tx1"/>
+              </a:solidFill>
+            </a:endParaRPr>
+          </a:p>
+        </p:txBody>
+      </p:sp>
+      <p:cxnSp>
+        <p:nvCxnSpPr>
+          <p:cNvPr id="89" name="Straight Arrow Connector 88"/>
+          <p:cNvCxnSpPr>
+            <a:stCxn id="74" idx="2"/>
+            <a:endCxn id="91" idx="0"/>
+          </p:cNvCxnSpPr>
+          <p:nvPr/>
+        </p:nvCxnSpPr>
+        <p:spPr>
+          <a:xfrm>
+            <a:off x="5218670" y="4812957"/>
+            <a:ext cx="0" cy="177113"/>
+          </a:xfrm>
+          <a:prstGeom prst="straightConnector1">
+            <a:avLst/>
+          </a:prstGeom>
+          <a:ln>
+            <a:tailEnd type="triangle"/>
+          </a:ln>
+        </p:spPr>
+        <p:style>
+          <a:lnRef idx="1">
+            <a:schemeClr val="accent1"/>
+          </a:lnRef>
+          <a:fillRef idx="0">
+            <a:schemeClr val="accent1"/>
+          </a:fillRef>
+          <a:effectRef idx="0">
+            <a:schemeClr val="accent1"/>
+          </a:effectRef>
+          <a:fontRef idx="minor">
+            <a:schemeClr val="tx1"/>
+          </a:fontRef>
+        </p:style>
+      </p:cxnSp>
+      <p:sp>
+        <p:nvSpPr>
+          <p:cNvPr id="91" name="Flowchart: Decision 90"/>
+          <p:cNvSpPr/>
+          <p:nvPr/>
+        </p:nvSpPr>
+        <p:spPr>
+          <a:xfrm>
+            <a:off x="4662616" y="4990070"/>
+            <a:ext cx="1112108" cy="749643"/>
+          </a:xfrm>
+          <a:prstGeom prst="flowChartDecision">
+            <a:avLst/>
+          </a:prstGeom>
+          <a:solidFill>
+            <a:schemeClr val="bg1"/>
+          </a:solidFill>
+        </p:spPr>
+        <p:style>
+          <a:lnRef idx="2">
+            <a:schemeClr val="accent1">
+              <a:shade val="50000"/>
+            </a:schemeClr>
+          </a:lnRef>
+          <a:fillRef idx="1">
+            <a:schemeClr val="accent1"/>
+          </a:fillRef>
+          <a:effectRef idx="0">
+            <a:schemeClr val="accent1"/>
+          </a:effectRef>
+          <a:fontRef idx="minor">
+            <a:schemeClr val="lt1"/>
+          </a:fontRef>
+        </p:style>
+        <p:txBody>
+          <a:bodyPr rtlCol="0" anchor="ctr"/>
+          <a:lstStyle/>
+          <a:p>
+            <a:pPr algn="ctr"/>
+            <a:r>
+              <a:rPr lang="en-US" sz="1000" dirty="0" smtClean="0">
+                <a:solidFill>
+                  <a:schemeClr val="tx1"/>
+                </a:solidFill>
+              </a:rPr>
+              <a:t>If c&gt;b and c&gt;a</a:t>
+            </a:r>
+            <a:endParaRPr lang="en-US" sz="1000" dirty="0">
+              <a:solidFill>
+                <a:schemeClr val="tx1"/>
+              </a:solidFill>
+            </a:endParaRPr>
+          </a:p>
+        </p:txBody>
+      </p:sp>
+      <p:cxnSp>
+        <p:nvCxnSpPr>
+          <p:cNvPr id="94" name="Straight Arrow Connector 93"/>
+          <p:cNvCxnSpPr>
+            <a:stCxn id="91" idx="3"/>
+            <a:endCxn id="96" idx="2"/>
+          </p:cNvCxnSpPr>
+          <p:nvPr/>
+        </p:nvCxnSpPr>
+        <p:spPr>
+          <a:xfrm flipV="1">
+            <a:off x="5774724" y="5364891"/>
+            <a:ext cx="269376" cy="1"/>
+          </a:xfrm>
+          <a:prstGeom prst="straightConnector1">
+            <a:avLst/>
+          </a:prstGeom>
+          <a:ln>
+            <a:tailEnd type="triangle"/>
+          </a:ln>
+        </p:spPr>
+        <p:style>
+          <a:lnRef idx="1">
+            <a:schemeClr val="accent1"/>
+          </a:lnRef>
+          <a:fillRef idx="0">
+            <a:schemeClr val="accent1"/>
+          </a:fillRef>
+          <a:effectRef idx="0">
+            <a:schemeClr val="accent1"/>
+          </a:effectRef>
+          <a:fontRef idx="minor">
+            <a:schemeClr val="tx1"/>
+          </a:fontRef>
+        </p:style>
+      </p:cxnSp>
+      <p:sp>
+        <p:nvSpPr>
+          <p:cNvPr id="96" name="Flowchart: Data 95"/>
+          <p:cNvSpPr/>
+          <p:nvPr/>
+        </p:nvSpPr>
+        <p:spPr>
+          <a:xfrm>
+            <a:off x="5889229" y="5224847"/>
+            <a:ext cx="1548713" cy="280087"/>
+          </a:xfrm>
+          <a:prstGeom prst="flowChartInputOutput">
+            <a:avLst/>
+          </a:prstGeom>
+          <a:solidFill>
+            <a:schemeClr val="bg1"/>
+          </a:solidFill>
+        </p:spPr>
+        <p:style>
+          <a:lnRef idx="2">
+            <a:schemeClr val="accent1">
+              <a:shade val="50000"/>
+            </a:schemeClr>
+          </a:lnRef>
+          <a:fillRef idx="1">
+            <a:schemeClr val="accent1"/>
+          </a:fillRef>
+          <a:effectRef idx="0">
+            <a:schemeClr val="accent1"/>
+          </a:effectRef>
+          <a:fontRef idx="minor">
+            <a:schemeClr val="lt1"/>
+          </a:fontRef>
+        </p:style>
+        <p:txBody>
+          <a:bodyPr rtlCol="0" anchor="ctr"/>
+          <a:lstStyle/>
+          <a:p>
+            <a:pPr algn="ctr"/>
+            <a:r>
+              <a:rPr lang="en-US" sz="1000" dirty="0" smtClean="0">
+                <a:solidFill>
+                  <a:schemeClr val="tx1"/>
+                </a:solidFill>
+              </a:rPr>
+              <a:t>Output “c is the largest”</a:t>
+            </a:r>
+            <a:endParaRPr lang="en-US" sz="1000" dirty="0">
+              <a:solidFill>
+                <a:schemeClr val="tx1"/>
+              </a:solidFill>
+            </a:endParaRPr>
+          </a:p>
+        </p:txBody>
+      </p:sp>
+      <p:sp>
+        <p:nvSpPr>
+          <p:cNvPr id="99" name="Oval 98"/>
+          <p:cNvSpPr/>
+          <p:nvPr/>
+        </p:nvSpPr>
+        <p:spPr>
+          <a:xfrm>
+            <a:off x="7574690" y="5252135"/>
+            <a:ext cx="889687" cy="225509"/>
+          </a:xfrm>
+          <a:prstGeom prst="ellipse">
+            <a:avLst/>
+          </a:prstGeom>
+          <a:solidFill>
+            <a:schemeClr val="bg1"/>
+          </a:solidFill>
+        </p:spPr>
+        <p:style>
+          <a:lnRef idx="2">
+            <a:schemeClr val="accent1">
+              <a:shade val="50000"/>
+            </a:schemeClr>
+          </a:lnRef>
+          <a:fillRef idx="1">
+            <a:schemeClr val="accent1"/>
+          </a:fillRef>
+          <a:effectRef idx="0">
+            <a:schemeClr val="accent1"/>
+          </a:effectRef>
+          <a:fontRef idx="minor">
+            <a:schemeClr val="lt1"/>
+          </a:fontRef>
+        </p:style>
+        <p:txBody>
+          <a:bodyPr rtlCol="0" anchor="ctr"/>
+          <a:lstStyle/>
+          <a:p>
+            <a:pPr algn="ctr"/>
+            <a:r>
+              <a:rPr lang="en-US" sz="1000" dirty="0" smtClean="0">
+                <a:solidFill>
+                  <a:schemeClr val="tx1"/>
+                </a:solidFill>
+              </a:rPr>
+              <a:t>End</a:t>
+            </a:r>
+            <a:endParaRPr lang="en-US" sz="1000" dirty="0">
+              <a:solidFill>
+                <a:schemeClr val="tx1"/>
+              </a:solidFill>
+            </a:endParaRPr>
+          </a:p>
+        </p:txBody>
+      </p:sp>
+      <p:cxnSp>
+        <p:nvCxnSpPr>
+          <p:cNvPr id="100" name="Straight Arrow Connector 99"/>
+          <p:cNvCxnSpPr>
+            <a:stCxn id="96" idx="5"/>
+            <a:endCxn id="99" idx="2"/>
+          </p:cNvCxnSpPr>
+          <p:nvPr/>
+        </p:nvCxnSpPr>
+        <p:spPr>
+          <a:xfrm flipV="1">
+            <a:off x="7283071" y="5364890"/>
+            <a:ext cx="291619" cy="1"/>
+          </a:xfrm>
+          <a:prstGeom prst="straightConnector1">
+            <a:avLst/>
+          </a:prstGeom>
+          <a:ln>
+            <a:tailEnd type="triangle"/>
+          </a:ln>
+        </p:spPr>
+        <p:style>
+          <a:lnRef idx="1">
+            <a:schemeClr val="accent1"/>
+          </a:lnRef>
+          <a:fillRef idx="0">
+            <a:schemeClr val="accent1"/>
+          </a:fillRef>
+          <a:effectRef idx="0">
+            <a:schemeClr val="accent1"/>
+          </a:effectRef>
+          <a:fontRef idx="minor">
+            <a:schemeClr val="tx1"/>
+          </a:fontRef>
+        </p:style>
+      </p:cxnSp>
+      <p:sp>
+        <p:nvSpPr>
+          <p:cNvPr id="104" name="Oval 103"/>
+          <p:cNvSpPr/>
+          <p:nvPr/>
+        </p:nvSpPr>
+        <p:spPr>
+          <a:xfrm>
+            <a:off x="4773826" y="5908071"/>
+            <a:ext cx="889687" cy="225509"/>
+          </a:xfrm>
+          <a:prstGeom prst="ellipse">
+            <a:avLst/>
+          </a:prstGeom>
+          <a:solidFill>
+            <a:schemeClr val="bg1"/>
+          </a:solidFill>
+        </p:spPr>
+        <p:style>
+          <a:lnRef idx="2">
+            <a:schemeClr val="accent1">
+              <a:shade val="50000"/>
+            </a:schemeClr>
+          </a:lnRef>
+          <a:fillRef idx="1">
+            <a:schemeClr val="accent1"/>
+          </a:fillRef>
+          <a:effectRef idx="0">
+            <a:schemeClr val="accent1"/>
+          </a:effectRef>
+          <a:fontRef idx="minor">
+            <a:schemeClr val="lt1"/>
+          </a:fontRef>
+        </p:style>
+        <p:txBody>
+          <a:bodyPr rtlCol="0" anchor="ctr"/>
+          <a:lstStyle/>
+          <a:p>
+            <a:pPr algn="ctr"/>
+            <a:r>
+              <a:rPr lang="en-US" sz="1000" dirty="0" smtClean="0">
+                <a:solidFill>
+                  <a:schemeClr val="tx1"/>
+                </a:solidFill>
+              </a:rPr>
+              <a:t>End</a:t>
+            </a:r>
+            <a:endParaRPr lang="en-US" sz="1000" dirty="0">
+              <a:solidFill>
+                <a:schemeClr val="tx1"/>
+              </a:solidFill>
+            </a:endParaRPr>
+          </a:p>
+        </p:txBody>
+      </p:sp>
+      <p:cxnSp>
+        <p:nvCxnSpPr>
+          <p:cNvPr id="105" name="Straight Arrow Connector 104"/>
+          <p:cNvCxnSpPr>
+            <a:stCxn id="91" idx="2"/>
+            <a:endCxn id="104" idx="0"/>
+          </p:cNvCxnSpPr>
+          <p:nvPr/>
+        </p:nvCxnSpPr>
+        <p:spPr>
+          <a:xfrm>
+            <a:off x="5218670" y="5739713"/>
+            <a:ext cx="0" cy="168358"/>
+          </a:xfrm>
+          <a:prstGeom prst="straightConnector1">
+            <a:avLst/>
+          </a:prstGeom>
+          <a:ln>
+            <a:tailEnd type="triangle"/>
+          </a:ln>
+        </p:spPr>
+        <p:style>
+          <a:lnRef idx="1">
+            <a:schemeClr val="accent1"/>
+          </a:lnRef>
+          <a:fillRef idx="0">
+            <a:schemeClr val="accent1"/>
+          </a:fillRef>
+          <a:effectRef idx="0">
+            <a:schemeClr val="accent1"/>
+          </a:effectRef>
+          <a:fontRef idx="minor">
+            <a:schemeClr val="tx1"/>
+          </a:fontRef>
+        </p:style>
+      </p:cxnSp>
     </p:spTree>
     <p:extLst>
       <p:ext uri="{BB962C8B-B14F-4D97-AF65-F5344CB8AC3E}">

</xml_diff>

<commit_message>
Update no_5 for AA1
</commit_message>
<xml_diff>
--- a/George_UwagbaleAA1.pptx
+++ b/George_UwagbaleAA1.pptx
@@ -6058,8 +6058,8 @@
         </p:nvSpPr>
         <p:spPr>
           <a:xfrm>
-            <a:off x="403654" y="700216"/>
-            <a:ext cx="2916195" cy="3170099"/>
+            <a:off x="-65922" y="475293"/>
+            <a:ext cx="2615516" cy="6247864"/>
           </a:xfrm>
           <a:prstGeom prst="rect">
             <a:avLst/>
@@ -6119,12 +6119,192 @@
           </a:p>
           <a:p>
             <a:r>
+              <a:rPr lang="en-US" sz="1000" dirty="0" smtClean="0"/>
+              <a:t>    DECLARE d : INTEGER</a:t>
+            </a:r>
+          </a:p>
+          <a:p>
+            <a:r>
+              <a:rPr lang="en-US" sz="1000" dirty="0" smtClean="0"/>
+              <a:t>    IF a &gt; b THEN</a:t>
+            </a:r>
+          </a:p>
+          <a:p>
+            <a:r>
+              <a:rPr lang="en-US" sz="1000" dirty="0" smtClean="0"/>
+              <a:t>        d = a – b</a:t>
+            </a:r>
+          </a:p>
+          <a:p>
+            <a:r>
+              <a:rPr lang="en-US" sz="1000" dirty="0" smtClean="0"/>
+              <a:t>        </a:t>
+            </a:r>
+            <a:r>
+              <a:rPr lang="en-US" sz="1000" dirty="0"/>
+              <a:t> IF (a mod d) and (b mod d) = 0 THEN</a:t>
+            </a:r>
+          </a:p>
+          <a:p>
+            <a:r>
+              <a:rPr lang="en-US" sz="1000" dirty="0"/>
+              <a:t>        </a:t>
+            </a:r>
+            <a:r>
+              <a:rPr lang="en-US" sz="1000" dirty="0" smtClean="0"/>
+              <a:t>    DISPLAY </a:t>
+            </a:r>
+            <a:r>
+              <a:rPr lang="en-US" sz="1000" dirty="0"/>
+              <a:t>“d is the HCF”</a:t>
+            </a:r>
+          </a:p>
+          <a:p>
+            <a:r>
+              <a:rPr lang="en-US" sz="1000" dirty="0"/>
+              <a:t>    </a:t>
+            </a:r>
+            <a:r>
+              <a:rPr lang="en-US" sz="1000" dirty="0" smtClean="0"/>
+              <a:t>     ELSE</a:t>
+            </a:r>
+            <a:endParaRPr lang="en-US" sz="1000" dirty="0"/>
+          </a:p>
+          <a:p>
+            <a:r>
+              <a:rPr lang="en-US" sz="1000" dirty="0"/>
+              <a:t>        </a:t>
+            </a:r>
+            <a:r>
+              <a:rPr lang="en-US" sz="1000" dirty="0" smtClean="0"/>
+              <a:t>    c </a:t>
+            </a:r>
+            <a:r>
+              <a:rPr lang="en-US" sz="1000" dirty="0"/>
+              <a:t>= d</a:t>
+            </a:r>
+          </a:p>
+          <a:p>
+            <a:r>
+              <a:rPr lang="en-US" sz="1000" dirty="0"/>
+              <a:t>        </a:t>
+            </a:r>
+            <a:r>
+              <a:rPr lang="en-US" sz="1000" dirty="0" smtClean="0"/>
+              <a:t>    WHILE </a:t>
+            </a:r>
+            <a:r>
+              <a:rPr lang="en-US" sz="1000" dirty="0"/>
+              <a:t>c !=0</a:t>
+            </a:r>
+          </a:p>
+          <a:p>
+            <a:r>
+              <a:rPr lang="en-US" sz="1000" dirty="0"/>
+              <a:t>            </a:t>
+            </a:r>
+            <a:r>
+              <a:rPr lang="en-US" sz="1000" dirty="0" smtClean="0"/>
+              <a:t>    IF </a:t>
+            </a:r>
+            <a:r>
+              <a:rPr lang="en-US" sz="1000" dirty="0"/>
+              <a:t>(a mod c) and (b mod c) = 0 THEN </a:t>
+            </a:r>
+          </a:p>
+          <a:p>
+            <a:r>
+              <a:rPr lang="en-US" sz="1000" dirty="0"/>
+              <a:t>                </a:t>
+            </a:r>
+            <a:r>
+              <a:rPr lang="en-US" sz="1000" dirty="0" smtClean="0"/>
+              <a:t>    DISPLAY </a:t>
+            </a:r>
+            <a:r>
+              <a:rPr lang="en-US" sz="1000" dirty="0"/>
+              <a:t>“c is the HCF”</a:t>
+            </a:r>
+          </a:p>
+          <a:p>
+            <a:r>
+              <a:rPr lang="en-US" sz="1000" dirty="0"/>
+              <a:t>                </a:t>
+            </a:r>
+            <a:r>
+              <a:rPr lang="en-US" sz="1000" dirty="0" smtClean="0"/>
+              <a:t>    END</a:t>
+            </a:r>
+            <a:endParaRPr lang="en-US" sz="1000" dirty="0"/>
+          </a:p>
+          <a:p>
+            <a:r>
+              <a:rPr lang="en-US" sz="1000" dirty="0"/>
+              <a:t>            </a:t>
+            </a:r>
+            <a:r>
+              <a:rPr lang="en-US" sz="1000" dirty="0" smtClean="0"/>
+              <a:t>    ELSE</a:t>
+            </a:r>
+            <a:endParaRPr lang="en-US" sz="1000" dirty="0"/>
+          </a:p>
+          <a:p>
+            <a:r>
+              <a:rPr lang="en-US" sz="1000" dirty="0"/>
+              <a:t>                </a:t>
+            </a:r>
+            <a:r>
+              <a:rPr lang="en-US" sz="1000" dirty="0" smtClean="0"/>
+              <a:t>    DECREMENT </a:t>
+            </a:r>
+            <a:r>
+              <a:rPr lang="en-US" sz="1000" dirty="0"/>
+              <a:t>c by 1</a:t>
+            </a:r>
+          </a:p>
+          <a:p>
+            <a:r>
+              <a:rPr lang="en-US" sz="1000" dirty="0"/>
+              <a:t>           </a:t>
+            </a:r>
+            <a:r>
+              <a:rPr lang="en-US" sz="1000" dirty="0" smtClean="0"/>
+              <a:t>     ENDIF</a:t>
+            </a:r>
+            <a:endParaRPr lang="en-US" sz="1000" dirty="0"/>
+          </a:p>
+          <a:p>
+            <a:r>
+              <a:rPr lang="en-US" sz="1000" dirty="0"/>
+              <a:t>        </a:t>
+            </a:r>
+            <a:r>
+              <a:rPr lang="en-US" sz="1000" dirty="0" smtClean="0"/>
+              <a:t>    ENDWHILE</a:t>
+            </a:r>
+            <a:endParaRPr lang="en-US" sz="1000" dirty="0"/>
+          </a:p>
+          <a:p>
+            <a:r>
+              <a:rPr lang="en-US" sz="1000" dirty="0"/>
+              <a:t>    </a:t>
+            </a:r>
+            <a:r>
+              <a:rPr lang="en-US" sz="1000" dirty="0" smtClean="0"/>
+              <a:t>    ENDIF</a:t>
+            </a:r>
+          </a:p>
+          <a:p>
+            <a:endParaRPr lang="en-US" sz="1000" dirty="0" smtClean="0"/>
+          </a:p>
+          <a:p>
+            <a:r>
               <a:rPr lang="en-US" sz="1000" dirty="0"/>
               <a:t> </a:t>
             </a:r>
             <a:r>
               <a:rPr lang="en-US" sz="1000" dirty="0" smtClean="0"/>
-              <a:t>   d = b – a</a:t>
+              <a:t>   ELSE</a:t>
             </a:r>
           </a:p>
           <a:p>
@@ -6134,7 +6314,7 @@
             </a:r>
             <a:r>
               <a:rPr lang="en-US" sz="1000" dirty="0" smtClean="0"/>
-              <a:t>   IF (a mod d) and (b mod d) = 0 THEN</a:t>
+              <a:t>       d = b – a</a:t>
             </a:r>
           </a:p>
           <a:p>
@@ -6144,114 +6324,104 @@
             </a:r>
             <a:r>
               <a:rPr lang="en-US" sz="1000" dirty="0" smtClean="0"/>
-              <a:t>       DISPLAY “d is the HCF”</a:t>
-            </a:r>
-          </a:p>
-          <a:p>
+              <a:t>       </a:t>
+            </a:r>
             <a:r>
               <a:rPr lang="en-US" sz="1000" dirty="0"/>
-              <a:t> </a:t>
+              <a:t>IF (a mod d) and (b mod d) = 0 THEN</a:t>
+            </a:r>
+          </a:p>
+          <a:p>
+            <a:r>
+              <a:rPr lang="en-US" sz="1000" dirty="0"/>
+              <a:t>            DISPLAY “d is the HCF”</a:t>
+            </a:r>
+          </a:p>
+          <a:p>
+            <a:r>
+              <a:rPr lang="en-US" sz="1000" dirty="0"/>
+              <a:t>        </a:t>
             </a:r>
             <a:r>
               <a:rPr lang="en-US" sz="1000" dirty="0" smtClean="0"/>
-              <a:t>   ELSE</a:t>
+              <a:t>ELSE</a:t>
             </a:r>
             <a:endParaRPr lang="en-US" sz="1000" dirty="0"/>
           </a:p>
           <a:p>
             <a:r>
+              <a:rPr lang="en-US" sz="1000" dirty="0"/>
+              <a:t>            c = d</a:t>
+            </a:r>
+          </a:p>
+          <a:p>
+            <a:r>
+              <a:rPr lang="en-US" sz="1000" dirty="0"/>
+              <a:t>            WHILE c !=0</a:t>
+            </a:r>
+          </a:p>
+          <a:p>
+            <a:r>
+              <a:rPr lang="en-US" sz="1000" dirty="0"/>
+              <a:t>                IF (a mod c) and (b mod c) = 0 THEN </a:t>
+            </a:r>
+          </a:p>
+          <a:p>
+            <a:r>
+              <a:rPr lang="en-US" sz="1000" dirty="0"/>
+              <a:t>                    DISPLAY “c is the HCF”</a:t>
+            </a:r>
+          </a:p>
+          <a:p>
+            <a:r>
+              <a:rPr lang="en-US" sz="1000" dirty="0"/>
+              <a:t>                    END</a:t>
+            </a:r>
+          </a:p>
+          <a:p>
+            <a:r>
+              <a:rPr lang="en-US" sz="1000" dirty="0"/>
+              <a:t>                ELSE</a:t>
+            </a:r>
+          </a:p>
+          <a:p>
+            <a:r>
+              <a:rPr lang="en-US" sz="1000" dirty="0"/>
+              <a:t>                    DECREMENT c by 1</a:t>
+            </a:r>
+          </a:p>
+          <a:p>
+            <a:r>
+              <a:rPr lang="en-US" sz="1000" dirty="0"/>
+              <a:t>                ENDIF</a:t>
+            </a:r>
+          </a:p>
+          <a:p>
+            <a:r>
+              <a:rPr lang="en-US" sz="1000" dirty="0"/>
+              <a:t>            ENDWHILE</a:t>
+            </a:r>
+          </a:p>
+          <a:p>
+            <a:r>
+              <a:rPr lang="en-US" sz="1000" dirty="0"/>
+              <a:t>        </a:t>
+            </a:r>
+            <a:r>
               <a:rPr lang="en-US" sz="1000" dirty="0" smtClean="0"/>
-              <a:t>        c = d</a:t>
-            </a:r>
-          </a:p>
-          <a:p>
-            <a:r>
-              <a:rPr lang="en-US" sz="1000" dirty="0"/>
-              <a:t> </a:t>
-            </a:r>
+              <a:t>ENDIF</a:t>
+            </a:r>
+          </a:p>
+          <a:p>
             <a:r>
               <a:rPr lang="en-US" sz="1000" dirty="0" smtClean="0"/>
-              <a:t>       WHILE c !=0</a:t>
-            </a:r>
-          </a:p>
-          <a:p>
-            <a:r>
-              <a:rPr lang="en-US" sz="1000" dirty="0"/>
-              <a:t> </a:t>
-            </a:r>
+              <a:t>        </a:t>
+            </a:r>
+          </a:p>
+          <a:p>
             <a:r>
               <a:rPr lang="en-US" sz="1000" dirty="0" smtClean="0"/>
-              <a:t>           IF (a mod c) and (b mod c) = 0 THEN </a:t>
-            </a:r>
-          </a:p>
-          <a:p>
-            <a:r>
-              <a:rPr lang="en-US" sz="1000" dirty="0"/>
-              <a:t> </a:t>
-            </a:r>
-            <a:r>
-              <a:rPr lang="en-US" sz="1000" dirty="0" smtClean="0"/>
-              <a:t>               DISPLAY “c is the HCF”</a:t>
-            </a:r>
-          </a:p>
-          <a:p>
-            <a:r>
-              <a:rPr lang="en-US" sz="1000" dirty="0"/>
-              <a:t> </a:t>
-            </a:r>
-            <a:r>
-              <a:rPr lang="en-US" sz="1000" dirty="0" smtClean="0"/>
-              <a:t>               END</a:t>
-            </a:r>
-          </a:p>
-          <a:p>
-            <a:r>
-              <a:rPr lang="en-US" sz="1000" dirty="0"/>
-              <a:t> </a:t>
-            </a:r>
-            <a:r>
-              <a:rPr lang="en-US" sz="1000" dirty="0" smtClean="0"/>
-              <a:t>           ELSE</a:t>
-            </a:r>
-          </a:p>
-          <a:p>
-            <a:r>
-              <a:rPr lang="en-US" sz="1000" dirty="0"/>
-              <a:t> </a:t>
-            </a:r>
-            <a:r>
-              <a:rPr lang="en-US" sz="1000" dirty="0" smtClean="0"/>
-              <a:t>               DECREMENT c by 1</a:t>
-            </a:r>
-          </a:p>
-          <a:p>
-            <a:r>
-              <a:rPr lang="en-US" sz="1000" dirty="0"/>
-              <a:t> </a:t>
-            </a:r>
-            <a:r>
-              <a:rPr lang="en-US" sz="1000" dirty="0" smtClean="0"/>
-              <a:t>           ENDIF</a:t>
-            </a:r>
-          </a:p>
-          <a:p>
-            <a:r>
-              <a:rPr lang="en-US" sz="1000" dirty="0"/>
-              <a:t> </a:t>
-            </a:r>
-            <a:r>
-              <a:rPr lang="en-US" sz="1000" dirty="0" smtClean="0"/>
-              <a:t>       ENDWHILE</a:t>
-            </a:r>
-          </a:p>
-          <a:p>
-            <a:r>
-              <a:rPr lang="en-US" sz="1000" dirty="0"/>
-              <a:t> </a:t>
-            </a:r>
-            <a:r>
-              <a:rPr lang="en-US" sz="1000" dirty="0" smtClean="0"/>
-              <a:t>   ENDIF</a:t>
+              <a:t>    ENDIF</a:t>
             </a:r>
           </a:p>
           <a:p>
@@ -6270,7 +6440,7 @@
         </p:nvSpPr>
         <p:spPr>
           <a:xfrm>
-            <a:off x="5988908" y="147280"/>
+            <a:off x="6903308" y="147280"/>
             <a:ext cx="1021492" cy="222422"/>
           </a:xfrm>
           <a:prstGeom prst="ellipse">
@@ -6325,7 +6495,7 @@
         </p:nvSpPr>
         <p:spPr>
           <a:xfrm>
-            <a:off x="5675870" y="560173"/>
+            <a:off x="6590270" y="560173"/>
             <a:ext cx="1647567" cy="280086"/>
           </a:xfrm>
           <a:prstGeom prst="flowChartInputOutput">
@@ -6383,7 +6553,7 @@
         </p:nvCxnSpPr>
         <p:spPr>
           <a:xfrm>
-            <a:off x="6499654" y="369702"/>
+            <a:off x="7414054" y="369702"/>
             <a:ext cx="0" cy="190471"/>
           </a:xfrm>
           <a:prstGeom prst="straightConnector1">
@@ -6416,8 +6586,8 @@
         </p:nvSpPr>
         <p:spPr>
           <a:xfrm>
-            <a:off x="5605849" y="1030730"/>
-            <a:ext cx="1647567" cy="280086"/>
+            <a:off x="6590269" y="973064"/>
+            <a:ext cx="1647567" cy="159519"/>
           </a:xfrm>
           <a:prstGeom prst="flowChartInputOutput">
             <a:avLst/>
@@ -6453,7 +6623,7 @@
                   <a:schemeClr val="tx1"/>
                 </a:solidFill>
               </a:rPr>
-              <a:t>Display “Enter the value for a”</a:t>
+              <a:t>Input a</a:t>
             </a:r>
             <a:endParaRPr lang="en-US" sz="1000" dirty="0">
               <a:solidFill>
@@ -6463,6 +6633,2844 @@
           </a:p>
         </p:txBody>
       </p:sp>
+      <p:cxnSp>
+        <p:nvCxnSpPr>
+          <p:cNvPr id="10" name="Straight Arrow Connector 9"/>
+          <p:cNvCxnSpPr>
+            <a:stCxn id="5" idx="4"/>
+            <a:endCxn id="8" idx="1"/>
+          </p:cNvCxnSpPr>
+          <p:nvPr/>
+        </p:nvCxnSpPr>
+        <p:spPr>
+          <a:xfrm flipH="1">
+            <a:off x="7414053" y="840259"/>
+            <a:ext cx="1" cy="132805"/>
+          </a:xfrm>
+          <a:prstGeom prst="straightConnector1">
+            <a:avLst/>
+          </a:prstGeom>
+          <a:ln>
+            <a:tailEnd type="triangle"/>
+          </a:ln>
+        </p:spPr>
+        <p:style>
+          <a:lnRef idx="1">
+            <a:schemeClr val="accent1"/>
+          </a:lnRef>
+          <a:fillRef idx="0">
+            <a:schemeClr val="accent1"/>
+          </a:fillRef>
+          <a:effectRef idx="0">
+            <a:schemeClr val="accent1"/>
+          </a:effectRef>
+          <a:fontRef idx="minor">
+            <a:schemeClr val="tx1"/>
+          </a:fontRef>
+        </p:style>
+      </p:cxnSp>
+      <p:sp>
+        <p:nvSpPr>
+          <p:cNvPr id="16" name="Flowchart: Data 15"/>
+          <p:cNvSpPr/>
+          <p:nvPr/>
+        </p:nvSpPr>
+        <p:spPr>
+          <a:xfrm>
+            <a:off x="6590268" y="1280861"/>
+            <a:ext cx="1647567" cy="280086"/>
+          </a:xfrm>
+          <a:prstGeom prst="flowChartInputOutput">
+            <a:avLst/>
+          </a:prstGeom>
+          <a:solidFill>
+            <a:schemeClr val="bg1"/>
+          </a:solidFill>
+        </p:spPr>
+        <p:style>
+          <a:lnRef idx="2">
+            <a:schemeClr val="accent1">
+              <a:shade val="50000"/>
+            </a:schemeClr>
+          </a:lnRef>
+          <a:fillRef idx="1">
+            <a:schemeClr val="accent1"/>
+          </a:fillRef>
+          <a:effectRef idx="0">
+            <a:schemeClr val="accent1"/>
+          </a:effectRef>
+          <a:fontRef idx="minor">
+            <a:schemeClr val="lt1"/>
+          </a:fontRef>
+        </p:style>
+        <p:txBody>
+          <a:bodyPr rtlCol="0" anchor="ctr"/>
+          <a:lstStyle/>
+          <a:p>
+            <a:pPr algn="ctr"/>
+            <a:r>
+              <a:rPr lang="en-US" sz="1000" dirty="0" smtClean="0">
+                <a:solidFill>
+                  <a:schemeClr val="tx1"/>
+                </a:solidFill>
+              </a:rPr>
+              <a:t>Display “Enter the value for b”</a:t>
+            </a:r>
+            <a:endParaRPr lang="en-US" sz="1000" dirty="0">
+              <a:solidFill>
+                <a:schemeClr val="tx1"/>
+              </a:solidFill>
+            </a:endParaRPr>
+          </a:p>
+        </p:txBody>
+      </p:sp>
+      <p:cxnSp>
+        <p:nvCxnSpPr>
+          <p:cNvPr id="17" name="Straight Arrow Connector 16"/>
+          <p:cNvCxnSpPr>
+            <a:stCxn id="8" idx="4"/>
+            <a:endCxn id="16" idx="1"/>
+          </p:cNvCxnSpPr>
+          <p:nvPr/>
+        </p:nvCxnSpPr>
+        <p:spPr>
+          <a:xfrm flipH="1">
+            <a:off x="7414052" y="1132583"/>
+            <a:ext cx="1" cy="148278"/>
+          </a:xfrm>
+          <a:prstGeom prst="straightConnector1">
+            <a:avLst/>
+          </a:prstGeom>
+          <a:ln>
+            <a:tailEnd type="triangle"/>
+          </a:ln>
+        </p:spPr>
+        <p:style>
+          <a:lnRef idx="1">
+            <a:schemeClr val="accent1"/>
+          </a:lnRef>
+          <a:fillRef idx="0">
+            <a:schemeClr val="accent1"/>
+          </a:fillRef>
+          <a:effectRef idx="0">
+            <a:schemeClr val="accent1"/>
+          </a:effectRef>
+          <a:fontRef idx="minor">
+            <a:schemeClr val="tx1"/>
+          </a:fontRef>
+        </p:style>
+      </p:cxnSp>
+      <p:sp>
+        <p:nvSpPr>
+          <p:cNvPr id="21" name="Flowchart: Data 20"/>
+          <p:cNvSpPr/>
+          <p:nvPr/>
+        </p:nvSpPr>
+        <p:spPr>
+          <a:xfrm>
+            <a:off x="6590267" y="1716850"/>
+            <a:ext cx="1647567" cy="144663"/>
+          </a:xfrm>
+          <a:prstGeom prst="flowChartInputOutput">
+            <a:avLst/>
+          </a:prstGeom>
+          <a:solidFill>
+            <a:schemeClr val="bg1"/>
+          </a:solidFill>
+        </p:spPr>
+        <p:style>
+          <a:lnRef idx="2">
+            <a:schemeClr val="accent1">
+              <a:shade val="50000"/>
+            </a:schemeClr>
+          </a:lnRef>
+          <a:fillRef idx="1">
+            <a:schemeClr val="accent1"/>
+          </a:fillRef>
+          <a:effectRef idx="0">
+            <a:schemeClr val="accent1"/>
+          </a:effectRef>
+          <a:fontRef idx="minor">
+            <a:schemeClr val="lt1"/>
+          </a:fontRef>
+        </p:style>
+        <p:txBody>
+          <a:bodyPr rtlCol="0" anchor="ctr"/>
+          <a:lstStyle/>
+          <a:p>
+            <a:pPr algn="ctr"/>
+            <a:r>
+              <a:rPr lang="en-US" sz="1000" dirty="0" smtClean="0">
+                <a:solidFill>
+                  <a:schemeClr val="tx1"/>
+                </a:solidFill>
+              </a:rPr>
+              <a:t>Input b</a:t>
+            </a:r>
+            <a:endParaRPr lang="en-US" sz="1000" dirty="0">
+              <a:solidFill>
+                <a:schemeClr val="tx1"/>
+              </a:solidFill>
+            </a:endParaRPr>
+          </a:p>
+        </p:txBody>
+      </p:sp>
+      <p:cxnSp>
+        <p:nvCxnSpPr>
+          <p:cNvPr id="22" name="Straight Arrow Connector 21"/>
+          <p:cNvCxnSpPr>
+            <a:stCxn id="16" idx="4"/>
+            <a:endCxn id="21" idx="1"/>
+          </p:cNvCxnSpPr>
+          <p:nvPr/>
+        </p:nvCxnSpPr>
+        <p:spPr>
+          <a:xfrm flipH="1">
+            <a:off x="7414051" y="1560947"/>
+            <a:ext cx="1" cy="155903"/>
+          </a:xfrm>
+          <a:prstGeom prst="straightConnector1">
+            <a:avLst/>
+          </a:prstGeom>
+          <a:ln>
+            <a:tailEnd type="triangle"/>
+          </a:ln>
+        </p:spPr>
+        <p:style>
+          <a:lnRef idx="1">
+            <a:schemeClr val="accent1"/>
+          </a:lnRef>
+          <a:fillRef idx="0">
+            <a:schemeClr val="accent1"/>
+          </a:fillRef>
+          <a:effectRef idx="0">
+            <a:schemeClr val="accent1"/>
+          </a:effectRef>
+          <a:fontRef idx="minor">
+            <a:schemeClr val="tx1"/>
+          </a:fontRef>
+        </p:style>
+      </p:cxnSp>
+      <p:sp>
+        <p:nvSpPr>
+          <p:cNvPr id="29" name="Rectangle 28"/>
+          <p:cNvSpPr/>
+          <p:nvPr/>
+        </p:nvSpPr>
+        <p:spPr>
+          <a:xfrm>
+            <a:off x="6792093" y="2009174"/>
+            <a:ext cx="1243914" cy="274609"/>
+          </a:xfrm>
+          <a:prstGeom prst="rect">
+            <a:avLst/>
+          </a:prstGeom>
+          <a:solidFill>
+            <a:schemeClr val="bg1"/>
+          </a:solidFill>
+        </p:spPr>
+        <p:style>
+          <a:lnRef idx="2">
+            <a:schemeClr val="accent1">
+              <a:shade val="50000"/>
+            </a:schemeClr>
+          </a:lnRef>
+          <a:fillRef idx="1">
+            <a:schemeClr val="accent1"/>
+          </a:fillRef>
+          <a:effectRef idx="0">
+            <a:schemeClr val="accent1"/>
+          </a:effectRef>
+          <a:fontRef idx="minor">
+            <a:schemeClr val="lt1"/>
+          </a:fontRef>
+        </p:style>
+        <p:txBody>
+          <a:bodyPr rtlCol="0" anchor="ctr"/>
+          <a:lstStyle/>
+          <a:p>
+            <a:pPr algn="ctr"/>
+            <a:r>
+              <a:rPr lang="en-US" sz="1000" dirty="0" smtClean="0">
+                <a:solidFill>
+                  <a:schemeClr val="tx1"/>
+                </a:solidFill>
+              </a:rPr>
+              <a:t>Declare d: Integer </a:t>
+            </a:r>
+            <a:endParaRPr lang="en-US" sz="1000" dirty="0">
+              <a:solidFill>
+                <a:schemeClr val="tx1"/>
+              </a:solidFill>
+            </a:endParaRPr>
+          </a:p>
+        </p:txBody>
+      </p:sp>
+      <p:cxnSp>
+        <p:nvCxnSpPr>
+          <p:cNvPr id="30" name="Straight Arrow Connector 29"/>
+          <p:cNvCxnSpPr>
+            <a:stCxn id="21" idx="4"/>
+            <a:endCxn id="29" idx="0"/>
+          </p:cNvCxnSpPr>
+          <p:nvPr/>
+        </p:nvCxnSpPr>
+        <p:spPr>
+          <a:xfrm flipH="1">
+            <a:off x="7414050" y="1861513"/>
+            <a:ext cx="1" cy="147661"/>
+          </a:xfrm>
+          <a:prstGeom prst="straightConnector1">
+            <a:avLst/>
+          </a:prstGeom>
+          <a:ln>
+            <a:tailEnd type="triangle"/>
+          </a:ln>
+        </p:spPr>
+        <p:style>
+          <a:lnRef idx="1">
+            <a:schemeClr val="accent1"/>
+          </a:lnRef>
+          <a:fillRef idx="0">
+            <a:schemeClr val="accent1"/>
+          </a:fillRef>
+          <a:effectRef idx="0">
+            <a:schemeClr val="accent1"/>
+          </a:effectRef>
+          <a:fontRef idx="minor">
+            <a:schemeClr val="tx1"/>
+          </a:fontRef>
+        </p:style>
+      </p:cxnSp>
+      <p:sp>
+        <p:nvSpPr>
+          <p:cNvPr id="34" name="Flowchart: Decision 33"/>
+          <p:cNvSpPr/>
+          <p:nvPr/>
+        </p:nvSpPr>
+        <p:spPr>
+          <a:xfrm>
+            <a:off x="6893008" y="2431444"/>
+            <a:ext cx="1042083" cy="617838"/>
+          </a:xfrm>
+          <a:prstGeom prst="flowChartDecision">
+            <a:avLst/>
+          </a:prstGeom>
+          <a:solidFill>
+            <a:schemeClr val="bg1"/>
+          </a:solidFill>
+        </p:spPr>
+        <p:style>
+          <a:lnRef idx="2">
+            <a:schemeClr val="accent1">
+              <a:shade val="50000"/>
+            </a:schemeClr>
+          </a:lnRef>
+          <a:fillRef idx="1">
+            <a:schemeClr val="accent1"/>
+          </a:fillRef>
+          <a:effectRef idx="0">
+            <a:schemeClr val="accent1"/>
+          </a:effectRef>
+          <a:fontRef idx="minor">
+            <a:schemeClr val="lt1"/>
+          </a:fontRef>
+        </p:style>
+        <p:txBody>
+          <a:bodyPr rtlCol="0" anchor="ctr"/>
+          <a:lstStyle/>
+          <a:p>
+            <a:pPr algn="ctr"/>
+            <a:r>
+              <a:rPr lang="en-US" sz="1000" dirty="0" smtClean="0">
+                <a:solidFill>
+                  <a:schemeClr val="tx1"/>
+                </a:solidFill>
+              </a:rPr>
+              <a:t>If a&gt;b</a:t>
+            </a:r>
+            <a:endParaRPr lang="en-US" sz="1000" dirty="0">
+              <a:solidFill>
+                <a:schemeClr val="tx1"/>
+              </a:solidFill>
+            </a:endParaRPr>
+          </a:p>
+        </p:txBody>
+      </p:sp>
+      <p:cxnSp>
+        <p:nvCxnSpPr>
+          <p:cNvPr id="35" name="Straight Arrow Connector 34"/>
+          <p:cNvCxnSpPr>
+            <a:stCxn id="29" idx="2"/>
+            <a:endCxn id="34" idx="0"/>
+          </p:cNvCxnSpPr>
+          <p:nvPr/>
+        </p:nvCxnSpPr>
+        <p:spPr>
+          <a:xfrm>
+            <a:off x="7414050" y="2283783"/>
+            <a:ext cx="0" cy="147661"/>
+          </a:xfrm>
+          <a:prstGeom prst="straightConnector1">
+            <a:avLst/>
+          </a:prstGeom>
+          <a:ln>
+            <a:tailEnd type="triangle"/>
+          </a:ln>
+        </p:spPr>
+        <p:style>
+          <a:lnRef idx="1">
+            <a:schemeClr val="accent1"/>
+          </a:lnRef>
+          <a:fillRef idx="0">
+            <a:schemeClr val="accent1"/>
+          </a:fillRef>
+          <a:effectRef idx="0">
+            <a:schemeClr val="accent1"/>
+          </a:effectRef>
+          <a:fontRef idx="minor">
+            <a:schemeClr val="tx1"/>
+          </a:fontRef>
+        </p:style>
+      </p:cxnSp>
+      <p:cxnSp>
+        <p:nvCxnSpPr>
+          <p:cNvPr id="40" name="Straight Arrow Connector 39"/>
+          <p:cNvCxnSpPr>
+            <a:stCxn id="34" idx="1"/>
+            <a:endCxn id="44" idx="3"/>
+          </p:cNvCxnSpPr>
+          <p:nvPr/>
+        </p:nvCxnSpPr>
+        <p:spPr>
+          <a:xfrm flipH="1" flipV="1">
+            <a:off x="6590265" y="2738104"/>
+            <a:ext cx="302743" cy="2259"/>
+          </a:xfrm>
+          <a:prstGeom prst="straightConnector1">
+            <a:avLst/>
+          </a:prstGeom>
+          <a:ln>
+            <a:tailEnd type="triangle"/>
+          </a:ln>
+        </p:spPr>
+        <p:style>
+          <a:lnRef idx="1">
+            <a:schemeClr val="accent1"/>
+          </a:lnRef>
+          <a:fillRef idx="0">
+            <a:schemeClr val="accent1"/>
+          </a:fillRef>
+          <a:effectRef idx="0">
+            <a:schemeClr val="accent1"/>
+          </a:effectRef>
+          <a:fontRef idx="minor">
+            <a:schemeClr val="tx1"/>
+          </a:fontRef>
+        </p:style>
+      </p:cxnSp>
+      <p:cxnSp>
+        <p:nvCxnSpPr>
+          <p:cNvPr id="41" name="Straight Arrow Connector 40"/>
+          <p:cNvCxnSpPr>
+            <a:stCxn id="34" idx="3"/>
+            <a:endCxn id="118" idx="1"/>
+          </p:cNvCxnSpPr>
+          <p:nvPr/>
+        </p:nvCxnSpPr>
+        <p:spPr>
+          <a:xfrm flipV="1">
+            <a:off x="7935091" y="2738104"/>
+            <a:ext cx="302742" cy="2259"/>
+          </a:xfrm>
+          <a:prstGeom prst="straightConnector1">
+            <a:avLst/>
+          </a:prstGeom>
+          <a:ln>
+            <a:tailEnd type="triangle"/>
+          </a:ln>
+        </p:spPr>
+        <p:style>
+          <a:lnRef idx="1">
+            <a:schemeClr val="accent1"/>
+          </a:lnRef>
+          <a:fillRef idx="0">
+            <a:schemeClr val="accent1"/>
+          </a:fillRef>
+          <a:effectRef idx="0">
+            <a:schemeClr val="accent1"/>
+          </a:effectRef>
+          <a:fontRef idx="minor">
+            <a:schemeClr val="tx1"/>
+          </a:fontRef>
+        </p:style>
+      </p:cxnSp>
+      <p:sp>
+        <p:nvSpPr>
+          <p:cNvPr id="44" name="Rectangle 43"/>
+          <p:cNvSpPr/>
+          <p:nvPr/>
+        </p:nvSpPr>
+        <p:spPr>
+          <a:xfrm>
+            <a:off x="5346351" y="2600799"/>
+            <a:ext cx="1243914" cy="274609"/>
+          </a:xfrm>
+          <a:prstGeom prst="rect">
+            <a:avLst/>
+          </a:prstGeom>
+          <a:solidFill>
+            <a:schemeClr val="bg1"/>
+          </a:solidFill>
+        </p:spPr>
+        <p:style>
+          <a:lnRef idx="2">
+            <a:schemeClr val="accent1">
+              <a:shade val="50000"/>
+            </a:schemeClr>
+          </a:lnRef>
+          <a:fillRef idx="1">
+            <a:schemeClr val="accent1"/>
+          </a:fillRef>
+          <a:effectRef idx="0">
+            <a:schemeClr val="accent1"/>
+          </a:effectRef>
+          <a:fontRef idx="minor">
+            <a:schemeClr val="lt1"/>
+          </a:fontRef>
+        </p:style>
+        <p:txBody>
+          <a:bodyPr rtlCol="0" anchor="ctr"/>
+          <a:lstStyle/>
+          <a:p>
+            <a:pPr algn="ctr"/>
+            <a:r>
+              <a:rPr lang="en-US" sz="1000" dirty="0" smtClean="0">
+                <a:solidFill>
+                  <a:schemeClr val="tx1"/>
+                </a:solidFill>
+              </a:rPr>
+              <a:t>d = a -b</a:t>
+            </a:r>
+            <a:endParaRPr lang="en-US" sz="1000" dirty="0">
+              <a:solidFill>
+                <a:schemeClr val="tx1"/>
+              </a:solidFill>
+            </a:endParaRPr>
+          </a:p>
+        </p:txBody>
+      </p:sp>
+      <p:sp>
+        <p:nvSpPr>
+          <p:cNvPr id="46" name="TextBox 45"/>
+          <p:cNvSpPr txBox="1"/>
+          <p:nvPr/>
+        </p:nvSpPr>
+        <p:spPr>
+          <a:xfrm>
+            <a:off x="6555257" y="2546875"/>
+            <a:ext cx="473671" cy="246221"/>
+          </a:xfrm>
+          <a:prstGeom prst="rect">
+            <a:avLst/>
+          </a:prstGeom>
+          <a:noFill/>
+        </p:spPr>
+        <p:txBody>
+          <a:bodyPr wrap="square" rtlCol="0">
+            <a:spAutoFit/>
+          </a:bodyPr>
+          <a:lstStyle/>
+          <a:p>
+            <a:r>
+              <a:rPr lang="en-US" sz="1000" dirty="0" smtClean="0"/>
+              <a:t>True</a:t>
+            </a:r>
+            <a:endParaRPr lang="en-US" sz="1000" dirty="0"/>
+          </a:p>
+        </p:txBody>
+      </p:sp>
+      <p:sp>
+        <p:nvSpPr>
+          <p:cNvPr id="47" name="TextBox 46"/>
+          <p:cNvSpPr txBox="1"/>
+          <p:nvPr/>
+        </p:nvSpPr>
+        <p:spPr>
+          <a:xfrm>
+            <a:off x="7849627" y="2546874"/>
+            <a:ext cx="473671" cy="246221"/>
+          </a:xfrm>
+          <a:prstGeom prst="rect">
+            <a:avLst/>
+          </a:prstGeom>
+          <a:noFill/>
+        </p:spPr>
+        <p:txBody>
+          <a:bodyPr wrap="square" rtlCol="0">
+            <a:spAutoFit/>
+          </a:bodyPr>
+          <a:lstStyle/>
+          <a:p>
+            <a:r>
+              <a:rPr lang="en-US" sz="1000" dirty="0" smtClean="0"/>
+              <a:t>False</a:t>
+            </a:r>
+            <a:endParaRPr lang="en-US" sz="1000" dirty="0"/>
+          </a:p>
+        </p:txBody>
+      </p:sp>
+      <p:sp>
+        <p:nvSpPr>
+          <p:cNvPr id="48" name="Flowchart: Decision 47"/>
+          <p:cNvSpPr/>
+          <p:nvPr/>
+        </p:nvSpPr>
+        <p:spPr>
+          <a:xfrm>
+            <a:off x="5111573" y="3049282"/>
+            <a:ext cx="1713470" cy="641887"/>
+          </a:xfrm>
+          <a:prstGeom prst="flowChartDecision">
+            <a:avLst/>
+          </a:prstGeom>
+          <a:solidFill>
+            <a:schemeClr val="bg1"/>
+          </a:solidFill>
+        </p:spPr>
+        <p:style>
+          <a:lnRef idx="2">
+            <a:schemeClr val="accent1">
+              <a:shade val="50000"/>
+            </a:schemeClr>
+          </a:lnRef>
+          <a:fillRef idx="1">
+            <a:schemeClr val="accent1"/>
+          </a:fillRef>
+          <a:effectRef idx="0">
+            <a:schemeClr val="accent1"/>
+          </a:effectRef>
+          <a:fontRef idx="minor">
+            <a:schemeClr val="lt1"/>
+          </a:fontRef>
+        </p:style>
+        <p:txBody>
+          <a:bodyPr rtlCol="0" anchor="ctr"/>
+          <a:lstStyle/>
+          <a:p>
+            <a:pPr algn="ctr"/>
+            <a:r>
+              <a:rPr lang="en-US" sz="900" dirty="0" smtClean="0">
+                <a:solidFill>
+                  <a:schemeClr val="tx1"/>
+                </a:solidFill>
+              </a:rPr>
+              <a:t>If (a mod d) and (b mod d) = 0</a:t>
+            </a:r>
+            <a:endParaRPr lang="en-US" sz="900" dirty="0">
+              <a:solidFill>
+                <a:schemeClr val="tx1"/>
+              </a:solidFill>
+            </a:endParaRPr>
+          </a:p>
+        </p:txBody>
+      </p:sp>
+      <p:cxnSp>
+        <p:nvCxnSpPr>
+          <p:cNvPr id="49" name="Straight Arrow Connector 48"/>
+          <p:cNvCxnSpPr>
+            <a:stCxn id="44" idx="2"/>
+            <a:endCxn id="48" idx="0"/>
+          </p:cNvCxnSpPr>
+          <p:nvPr/>
+        </p:nvCxnSpPr>
+        <p:spPr>
+          <a:xfrm>
+            <a:off x="5968308" y="2875408"/>
+            <a:ext cx="0" cy="173874"/>
+          </a:xfrm>
+          <a:prstGeom prst="straightConnector1">
+            <a:avLst/>
+          </a:prstGeom>
+          <a:ln>
+            <a:tailEnd type="triangle"/>
+          </a:ln>
+        </p:spPr>
+        <p:style>
+          <a:lnRef idx="1">
+            <a:schemeClr val="accent1"/>
+          </a:lnRef>
+          <a:fillRef idx="0">
+            <a:schemeClr val="accent1"/>
+          </a:fillRef>
+          <a:effectRef idx="0">
+            <a:schemeClr val="accent1"/>
+          </a:effectRef>
+          <a:fontRef idx="minor">
+            <a:schemeClr val="tx1"/>
+          </a:fontRef>
+        </p:style>
+      </p:cxnSp>
+      <p:cxnSp>
+        <p:nvCxnSpPr>
+          <p:cNvPr id="54" name="Straight Arrow Connector 53"/>
+          <p:cNvCxnSpPr>
+            <a:stCxn id="48" idx="1"/>
+            <a:endCxn id="55" idx="5"/>
+          </p:cNvCxnSpPr>
+          <p:nvPr/>
+        </p:nvCxnSpPr>
+        <p:spPr>
+          <a:xfrm flipH="1" flipV="1">
+            <a:off x="4692678" y="3370225"/>
+            <a:ext cx="418895" cy="1"/>
+          </a:xfrm>
+          <a:prstGeom prst="straightConnector1">
+            <a:avLst/>
+          </a:prstGeom>
+          <a:ln>
+            <a:tailEnd type="triangle"/>
+          </a:ln>
+        </p:spPr>
+        <p:style>
+          <a:lnRef idx="1">
+            <a:schemeClr val="accent1"/>
+          </a:lnRef>
+          <a:fillRef idx="0">
+            <a:schemeClr val="accent1"/>
+          </a:fillRef>
+          <a:effectRef idx="0">
+            <a:schemeClr val="accent1"/>
+          </a:effectRef>
+          <a:fontRef idx="minor">
+            <a:schemeClr val="tx1"/>
+          </a:fontRef>
+        </p:style>
+      </p:cxnSp>
+      <p:sp>
+        <p:nvSpPr>
+          <p:cNvPr id="55" name="Flowchart: Data 54"/>
+          <p:cNvSpPr/>
+          <p:nvPr/>
+        </p:nvSpPr>
+        <p:spPr>
+          <a:xfrm>
+            <a:off x="3443396" y="3230182"/>
+            <a:ext cx="1388091" cy="280086"/>
+          </a:xfrm>
+          <a:prstGeom prst="flowChartInputOutput">
+            <a:avLst/>
+          </a:prstGeom>
+          <a:solidFill>
+            <a:schemeClr val="bg1"/>
+          </a:solidFill>
+        </p:spPr>
+        <p:style>
+          <a:lnRef idx="2">
+            <a:schemeClr val="accent1">
+              <a:shade val="50000"/>
+            </a:schemeClr>
+          </a:lnRef>
+          <a:fillRef idx="1">
+            <a:schemeClr val="accent1"/>
+          </a:fillRef>
+          <a:effectRef idx="0">
+            <a:schemeClr val="accent1"/>
+          </a:effectRef>
+          <a:fontRef idx="minor">
+            <a:schemeClr val="lt1"/>
+          </a:fontRef>
+        </p:style>
+        <p:txBody>
+          <a:bodyPr rtlCol="0" anchor="ctr"/>
+          <a:lstStyle/>
+          <a:p>
+            <a:pPr algn="ctr"/>
+            <a:r>
+              <a:rPr lang="en-US" sz="1000" dirty="0" smtClean="0">
+                <a:solidFill>
+                  <a:schemeClr val="tx1"/>
+                </a:solidFill>
+              </a:rPr>
+              <a:t>Display “d is the HCF”</a:t>
+            </a:r>
+            <a:endParaRPr lang="en-US" sz="1000" dirty="0">
+              <a:solidFill>
+                <a:schemeClr val="tx1"/>
+              </a:solidFill>
+            </a:endParaRPr>
+          </a:p>
+        </p:txBody>
+      </p:sp>
+      <p:sp>
+        <p:nvSpPr>
+          <p:cNvPr id="59" name="Oval 58"/>
+          <p:cNvSpPr/>
+          <p:nvPr/>
+        </p:nvSpPr>
+        <p:spPr>
+          <a:xfrm>
+            <a:off x="3826474" y="3663394"/>
+            <a:ext cx="626074" cy="222422"/>
+          </a:xfrm>
+          <a:prstGeom prst="ellipse">
+            <a:avLst/>
+          </a:prstGeom>
+          <a:solidFill>
+            <a:schemeClr val="bg1"/>
+          </a:solidFill>
+        </p:spPr>
+        <p:style>
+          <a:lnRef idx="2">
+            <a:schemeClr val="accent1">
+              <a:shade val="50000"/>
+            </a:schemeClr>
+          </a:lnRef>
+          <a:fillRef idx="1">
+            <a:schemeClr val="accent1"/>
+          </a:fillRef>
+          <a:effectRef idx="0">
+            <a:schemeClr val="accent1"/>
+          </a:effectRef>
+          <a:fontRef idx="minor">
+            <a:schemeClr val="lt1"/>
+          </a:fontRef>
+        </p:style>
+        <p:txBody>
+          <a:bodyPr rtlCol="0" anchor="ctr"/>
+          <a:lstStyle/>
+          <a:p>
+            <a:pPr algn="ctr"/>
+            <a:r>
+              <a:rPr lang="en-US" sz="1000" dirty="0" smtClean="0">
+                <a:solidFill>
+                  <a:schemeClr val="tx1"/>
+                </a:solidFill>
+              </a:rPr>
+              <a:t>End</a:t>
+            </a:r>
+            <a:endParaRPr lang="en-US" sz="1000" dirty="0">
+              <a:solidFill>
+                <a:schemeClr val="tx1"/>
+              </a:solidFill>
+            </a:endParaRPr>
+          </a:p>
+        </p:txBody>
+      </p:sp>
+      <p:cxnSp>
+        <p:nvCxnSpPr>
+          <p:cNvPr id="60" name="Straight Arrow Connector 59"/>
+          <p:cNvCxnSpPr>
+            <a:stCxn id="55" idx="4"/>
+            <a:endCxn id="59" idx="0"/>
+          </p:cNvCxnSpPr>
+          <p:nvPr/>
+        </p:nvCxnSpPr>
+        <p:spPr>
+          <a:xfrm>
+            <a:off x="4137442" y="3510268"/>
+            <a:ext cx="2069" cy="153126"/>
+          </a:xfrm>
+          <a:prstGeom prst="straightConnector1">
+            <a:avLst/>
+          </a:prstGeom>
+          <a:ln>
+            <a:tailEnd type="triangle"/>
+          </a:ln>
+        </p:spPr>
+        <p:style>
+          <a:lnRef idx="1">
+            <a:schemeClr val="accent1"/>
+          </a:lnRef>
+          <a:fillRef idx="0">
+            <a:schemeClr val="accent1"/>
+          </a:fillRef>
+          <a:effectRef idx="0">
+            <a:schemeClr val="accent1"/>
+          </a:effectRef>
+          <a:fontRef idx="minor">
+            <a:schemeClr val="tx1"/>
+          </a:fontRef>
+        </p:style>
+      </p:cxnSp>
+      <p:cxnSp>
+        <p:nvCxnSpPr>
+          <p:cNvPr id="65" name="Straight Arrow Connector 64"/>
+          <p:cNvCxnSpPr>
+            <a:stCxn id="48" idx="2"/>
+            <a:endCxn id="68" idx="0"/>
+          </p:cNvCxnSpPr>
+          <p:nvPr/>
+        </p:nvCxnSpPr>
+        <p:spPr>
+          <a:xfrm>
+            <a:off x="5968308" y="3691169"/>
+            <a:ext cx="0" cy="173875"/>
+          </a:xfrm>
+          <a:prstGeom prst="straightConnector1">
+            <a:avLst/>
+          </a:prstGeom>
+          <a:ln>
+            <a:tailEnd type="triangle"/>
+          </a:ln>
+        </p:spPr>
+        <p:style>
+          <a:lnRef idx="1">
+            <a:schemeClr val="accent1"/>
+          </a:lnRef>
+          <a:fillRef idx="0">
+            <a:schemeClr val="accent1"/>
+          </a:fillRef>
+          <a:effectRef idx="0">
+            <a:schemeClr val="accent1"/>
+          </a:effectRef>
+          <a:fontRef idx="minor">
+            <a:schemeClr val="tx1"/>
+          </a:fontRef>
+        </p:style>
+      </p:cxnSp>
+      <p:sp>
+        <p:nvSpPr>
+          <p:cNvPr id="68" name="Rectangle 67"/>
+          <p:cNvSpPr/>
+          <p:nvPr/>
+        </p:nvSpPr>
+        <p:spPr>
+          <a:xfrm>
+            <a:off x="5346351" y="3865044"/>
+            <a:ext cx="1243914" cy="171498"/>
+          </a:xfrm>
+          <a:prstGeom prst="rect">
+            <a:avLst/>
+          </a:prstGeom>
+          <a:solidFill>
+            <a:schemeClr val="bg1"/>
+          </a:solidFill>
+        </p:spPr>
+        <p:style>
+          <a:lnRef idx="2">
+            <a:schemeClr val="accent1">
+              <a:shade val="50000"/>
+            </a:schemeClr>
+          </a:lnRef>
+          <a:fillRef idx="1">
+            <a:schemeClr val="accent1"/>
+          </a:fillRef>
+          <a:effectRef idx="0">
+            <a:schemeClr val="accent1"/>
+          </a:effectRef>
+          <a:fontRef idx="minor">
+            <a:schemeClr val="lt1"/>
+          </a:fontRef>
+        </p:style>
+        <p:txBody>
+          <a:bodyPr rtlCol="0" anchor="ctr"/>
+          <a:lstStyle/>
+          <a:p>
+            <a:pPr algn="ctr"/>
+            <a:r>
+              <a:rPr lang="en-US" sz="1000" dirty="0" smtClean="0">
+                <a:solidFill>
+                  <a:schemeClr val="tx1"/>
+                </a:solidFill>
+              </a:rPr>
+              <a:t>c = d</a:t>
+            </a:r>
+            <a:endParaRPr lang="en-US" sz="1000" dirty="0">
+              <a:solidFill>
+                <a:schemeClr val="tx1"/>
+              </a:solidFill>
+            </a:endParaRPr>
+          </a:p>
+        </p:txBody>
+      </p:sp>
+      <p:sp>
+        <p:nvSpPr>
+          <p:cNvPr id="71" name="Flowchart: Decision 70"/>
+          <p:cNvSpPr/>
+          <p:nvPr/>
+        </p:nvSpPr>
+        <p:spPr>
+          <a:xfrm>
+            <a:off x="5447266" y="4233000"/>
+            <a:ext cx="1042083" cy="617838"/>
+          </a:xfrm>
+          <a:prstGeom prst="flowChartDecision">
+            <a:avLst/>
+          </a:prstGeom>
+          <a:solidFill>
+            <a:schemeClr val="bg1"/>
+          </a:solidFill>
+        </p:spPr>
+        <p:style>
+          <a:lnRef idx="2">
+            <a:schemeClr val="accent1">
+              <a:shade val="50000"/>
+            </a:schemeClr>
+          </a:lnRef>
+          <a:fillRef idx="1">
+            <a:schemeClr val="accent1"/>
+          </a:fillRef>
+          <a:effectRef idx="0">
+            <a:schemeClr val="accent1"/>
+          </a:effectRef>
+          <a:fontRef idx="minor">
+            <a:schemeClr val="lt1"/>
+          </a:fontRef>
+        </p:style>
+        <p:txBody>
+          <a:bodyPr rtlCol="0" anchor="ctr"/>
+          <a:lstStyle/>
+          <a:p>
+            <a:pPr algn="ctr"/>
+            <a:r>
+              <a:rPr lang="en-US" sz="1000" dirty="0" smtClean="0">
+                <a:solidFill>
+                  <a:schemeClr val="tx1"/>
+                </a:solidFill>
+              </a:rPr>
+              <a:t>While c !=0</a:t>
+            </a:r>
+            <a:endParaRPr lang="en-US" sz="1000" dirty="0">
+              <a:solidFill>
+                <a:schemeClr val="tx1"/>
+              </a:solidFill>
+            </a:endParaRPr>
+          </a:p>
+        </p:txBody>
+      </p:sp>
+      <p:cxnSp>
+        <p:nvCxnSpPr>
+          <p:cNvPr id="72" name="Straight Arrow Connector 71"/>
+          <p:cNvCxnSpPr>
+            <a:stCxn id="68" idx="2"/>
+            <a:endCxn id="71" idx="0"/>
+          </p:cNvCxnSpPr>
+          <p:nvPr/>
+        </p:nvCxnSpPr>
+        <p:spPr>
+          <a:xfrm>
+            <a:off x="5968308" y="4036542"/>
+            <a:ext cx="0" cy="196458"/>
+          </a:xfrm>
+          <a:prstGeom prst="straightConnector1">
+            <a:avLst/>
+          </a:prstGeom>
+          <a:ln>
+            <a:tailEnd type="triangle"/>
+          </a:ln>
+        </p:spPr>
+        <p:style>
+          <a:lnRef idx="1">
+            <a:schemeClr val="accent1"/>
+          </a:lnRef>
+          <a:fillRef idx="0">
+            <a:schemeClr val="accent1"/>
+          </a:fillRef>
+          <a:effectRef idx="0">
+            <a:schemeClr val="accent1"/>
+          </a:effectRef>
+          <a:fontRef idx="minor">
+            <a:schemeClr val="tx1"/>
+          </a:fontRef>
+        </p:style>
+      </p:cxnSp>
+      <p:sp>
+        <p:nvSpPr>
+          <p:cNvPr id="80" name="Flowchart: Decision 79"/>
+          <p:cNvSpPr/>
+          <p:nvPr/>
+        </p:nvSpPr>
+        <p:spPr>
+          <a:xfrm>
+            <a:off x="5111573" y="5059518"/>
+            <a:ext cx="1713470" cy="641887"/>
+          </a:xfrm>
+          <a:prstGeom prst="flowChartDecision">
+            <a:avLst/>
+          </a:prstGeom>
+          <a:solidFill>
+            <a:schemeClr val="bg1"/>
+          </a:solidFill>
+        </p:spPr>
+        <p:style>
+          <a:lnRef idx="2">
+            <a:schemeClr val="accent1">
+              <a:shade val="50000"/>
+            </a:schemeClr>
+          </a:lnRef>
+          <a:fillRef idx="1">
+            <a:schemeClr val="accent1"/>
+          </a:fillRef>
+          <a:effectRef idx="0">
+            <a:schemeClr val="accent1"/>
+          </a:effectRef>
+          <a:fontRef idx="minor">
+            <a:schemeClr val="lt1"/>
+          </a:fontRef>
+        </p:style>
+        <p:txBody>
+          <a:bodyPr rtlCol="0" anchor="ctr"/>
+          <a:lstStyle/>
+          <a:p>
+            <a:pPr algn="ctr"/>
+            <a:r>
+              <a:rPr lang="en-US" sz="900" dirty="0" smtClean="0">
+                <a:solidFill>
+                  <a:schemeClr val="tx1"/>
+                </a:solidFill>
+              </a:rPr>
+              <a:t>If (a mod d) and (b mod d) = 0</a:t>
+            </a:r>
+            <a:endParaRPr lang="en-US" sz="900" dirty="0">
+              <a:solidFill>
+                <a:schemeClr val="tx1"/>
+              </a:solidFill>
+            </a:endParaRPr>
+          </a:p>
+        </p:txBody>
+      </p:sp>
+      <p:sp>
+        <p:nvSpPr>
+          <p:cNvPr id="81" name="Flowchart: Data 80"/>
+          <p:cNvSpPr/>
+          <p:nvPr/>
+        </p:nvSpPr>
+        <p:spPr>
+          <a:xfrm>
+            <a:off x="3585502" y="5240418"/>
+            <a:ext cx="1266578" cy="280086"/>
+          </a:xfrm>
+          <a:prstGeom prst="flowChartInputOutput">
+            <a:avLst/>
+          </a:prstGeom>
+          <a:solidFill>
+            <a:schemeClr val="bg1"/>
+          </a:solidFill>
+        </p:spPr>
+        <p:style>
+          <a:lnRef idx="2">
+            <a:schemeClr val="accent1">
+              <a:shade val="50000"/>
+            </a:schemeClr>
+          </a:lnRef>
+          <a:fillRef idx="1">
+            <a:schemeClr val="accent1"/>
+          </a:fillRef>
+          <a:effectRef idx="0">
+            <a:schemeClr val="accent1"/>
+          </a:effectRef>
+          <a:fontRef idx="minor">
+            <a:schemeClr val="lt1"/>
+          </a:fontRef>
+        </p:style>
+        <p:txBody>
+          <a:bodyPr rtlCol="0" anchor="ctr"/>
+          <a:lstStyle/>
+          <a:p>
+            <a:pPr algn="ctr"/>
+            <a:r>
+              <a:rPr lang="en-US" sz="1000" dirty="0" smtClean="0">
+                <a:solidFill>
+                  <a:schemeClr val="tx1"/>
+                </a:solidFill>
+              </a:rPr>
+              <a:t>Display “d is the HCF”</a:t>
+            </a:r>
+            <a:endParaRPr lang="en-US" sz="1000" dirty="0">
+              <a:solidFill>
+                <a:schemeClr val="tx1"/>
+              </a:solidFill>
+            </a:endParaRPr>
+          </a:p>
+        </p:txBody>
+      </p:sp>
+      <p:cxnSp>
+        <p:nvCxnSpPr>
+          <p:cNvPr id="82" name="Straight Arrow Connector 81"/>
+          <p:cNvCxnSpPr>
+            <a:stCxn id="80" idx="1"/>
+            <a:endCxn id="81" idx="5"/>
+          </p:cNvCxnSpPr>
+          <p:nvPr/>
+        </p:nvCxnSpPr>
+        <p:spPr>
+          <a:xfrm flipH="1" flipV="1">
+            <a:off x="4725422" y="5380461"/>
+            <a:ext cx="386151" cy="1"/>
+          </a:xfrm>
+          <a:prstGeom prst="straightConnector1">
+            <a:avLst/>
+          </a:prstGeom>
+          <a:ln>
+            <a:tailEnd type="triangle"/>
+          </a:ln>
+        </p:spPr>
+        <p:style>
+          <a:lnRef idx="1">
+            <a:schemeClr val="accent1"/>
+          </a:lnRef>
+          <a:fillRef idx="0">
+            <a:schemeClr val="accent1"/>
+          </a:fillRef>
+          <a:effectRef idx="0">
+            <a:schemeClr val="accent1"/>
+          </a:effectRef>
+          <a:fontRef idx="minor">
+            <a:schemeClr val="tx1"/>
+          </a:fontRef>
+        </p:style>
+      </p:cxnSp>
+      <p:sp>
+        <p:nvSpPr>
+          <p:cNvPr id="86" name="Oval 85"/>
+          <p:cNvSpPr/>
+          <p:nvPr/>
+        </p:nvSpPr>
+        <p:spPr>
+          <a:xfrm>
+            <a:off x="2965620" y="5269250"/>
+            <a:ext cx="537514" cy="222422"/>
+          </a:xfrm>
+          <a:prstGeom prst="ellipse">
+            <a:avLst/>
+          </a:prstGeom>
+          <a:solidFill>
+            <a:schemeClr val="bg1"/>
+          </a:solidFill>
+        </p:spPr>
+        <p:style>
+          <a:lnRef idx="2">
+            <a:schemeClr val="accent1">
+              <a:shade val="50000"/>
+            </a:schemeClr>
+          </a:lnRef>
+          <a:fillRef idx="1">
+            <a:schemeClr val="accent1"/>
+          </a:fillRef>
+          <a:effectRef idx="0">
+            <a:schemeClr val="accent1"/>
+          </a:effectRef>
+          <a:fontRef idx="minor">
+            <a:schemeClr val="lt1"/>
+          </a:fontRef>
+        </p:style>
+        <p:txBody>
+          <a:bodyPr rtlCol="0" anchor="ctr"/>
+          <a:lstStyle/>
+          <a:p>
+            <a:pPr algn="ctr"/>
+            <a:r>
+              <a:rPr lang="en-US" sz="1000" dirty="0" smtClean="0">
+                <a:solidFill>
+                  <a:schemeClr val="tx1"/>
+                </a:solidFill>
+              </a:rPr>
+              <a:t>End</a:t>
+            </a:r>
+            <a:endParaRPr lang="en-US" sz="1000" dirty="0">
+              <a:solidFill>
+                <a:schemeClr val="tx1"/>
+              </a:solidFill>
+            </a:endParaRPr>
+          </a:p>
+        </p:txBody>
+      </p:sp>
+      <p:cxnSp>
+        <p:nvCxnSpPr>
+          <p:cNvPr id="87" name="Straight Arrow Connector 86"/>
+          <p:cNvCxnSpPr>
+            <a:stCxn id="81" idx="2"/>
+            <a:endCxn id="86" idx="6"/>
+          </p:cNvCxnSpPr>
+          <p:nvPr/>
+        </p:nvCxnSpPr>
+        <p:spPr>
+          <a:xfrm flipH="1">
+            <a:off x="3503134" y="5380461"/>
+            <a:ext cx="209026" cy="0"/>
+          </a:xfrm>
+          <a:prstGeom prst="straightConnector1">
+            <a:avLst/>
+          </a:prstGeom>
+          <a:ln>
+            <a:tailEnd type="triangle"/>
+          </a:ln>
+        </p:spPr>
+        <p:style>
+          <a:lnRef idx="1">
+            <a:schemeClr val="accent1"/>
+          </a:lnRef>
+          <a:fillRef idx="0">
+            <a:schemeClr val="accent1"/>
+          </a:fillRef>
+          <a:effectRef idx="0">
+            <a:schemeClr val="accent1"/>
+          </a:effectRef>
+          <a:fontRef idx="minor">
+            <a:schemeClr val="tx1"/>
+          </a:fontRef>
+        </p:style>
+      </p:cxnSp>
+      <p:cxnSp>
+        <p:nvCxnSpPr>
+          <p:cNvPr id="91" name="Straight Arrow Connector 90"/>
+          <p:cNvCxnSpPr>
+            <a:stCxn id="71" idx="2"/>
+            <a:endCxn id="80" idx="0"/>
+          </p:cNvCxnSpPr>
+          <p:nvPr/>
+        </p:nvCxnSpPr>
+        <p:spPr>
+          <a:xfrm>
+            <a:off x="5968308" y="4850838"/>
+            <a:ext cx="0" cy="208680"/>
+          </a:xfrm>
+          <a:prstGeom prst="straightConnector1">
+            <a:avLst/>
+          </a:prstGeom>
+          <a:ln>
+            <a:tailEnd type="triangle"/>
+          </a:ln>
+        </p:spPr>
+        <p:style>
+          <a:lnRef idx="1">
+            <a:schemeClr val="accent1"/>
+          </a:lnRef>
+          <a:fillRef idx="0">
+            <a:schemeClr val="accent1"/>
+          </a:fillRef>
+          <a:effectRef idx="0">
+            <a:schemeClr val="accent1"/>
+          </a:effectRef>
+          <a:fontRef idx="minor">
+            <a:schemeClr val="tx1"/>
+          </a:fontRef>
+        </p:style>
+      </p:cxnSp>
+      <p:cxnSp>
+        <p:nvCxnSpPr>
+          <p:cNvPr id="95" name="Straight Arrow Connector 94"/>
+          <p:cNvCxnSpPr>
+            <a:stCxn id="80" idx="2"/>
+            <a:endCxn id="100" idx="0"/>
+          </p:cNvCxnSpPr>
+          <p:nvPr/>
+        </p:nvCxnSpPr>
+        <p:spPr>
+          <a:xfrm flipH="1">
+            <a:off x="5968307" y="5701405"/>
+            <a:ext cx="1" cy="233394"/>
+          </a:xfrm>
+          <a:prstGeom prst="straightConnector1">
+            <a:avLst/>
+          </a:prstGeom>
+          <a:ln>
+            <a:tailEnd type="triangle"/>
+          </a:ln>
+        </p:spPr>
+        <p:style>
+          <a:lnRef idx="1">
+            <a:schemeClr val="accent1"/>
+          </a:lnRef>
+          <a:fillRef idx="0">
+            <a:schemeClr val="accent1"/>
+          </a:fillRef>
+          <a:effectRef idx="0">
+            <a:schemeClr val="accent1"/>
+          </a:effectRef>
+          <a:fontRef idx="minor">
+            <a:schemeClr val="tx1"/>
+          </a:fontRef>
+        </p:style>
+      </p:cxnSp>
+      <p:sp>
+        <p:nvSpPr>
+          <p:cNvPr id="100" name="Rectangle 99"/>
+          <p:cNvSpPr/>
+          <p:nvPr/>
+        </p:nvSpPr>
+        <p:spPr>
+          <a:xfrm>
+            <a:off x="5346350" y="5934799"/>
+            <a:ext cx="1243914" cy="171498"/>
+          </a:xfrm>
+          <a:prstGeom prst="rect">
+            <a:avLst/>
+          </a:prstGeom>
+          <a:solidFill>
+            <a:schemeClr val="bg1"/>
+          </a:solidFill>
+        </p:spPr>
+        <p:style>
+          <a:lnRef idx="2">
+            <a:schemeClr val="accent1">
+              <a:shade val="50000"/>
+            </a:schemeClr>
+          </a:lnRef>
+          <a:fillRef idx="1">
+            <a:schemeClr val="accent1"/>
+          </a:fillRef>
+          <a:effectRef idx="0">
+            <a:schemeClr val="accent1"/>
+          </a:effectRef>
+          <a:fontRef idx="minor">
+            <a:schemeClr val="lt1"/>
+          </a:fontRef>
+        </p:style>
+        <p:txBody>
+          <a:bodyPr rtlCol="0" anchor="ctr"/>
+          <a:lstStyle/>
+          <a:p>
+            <a:pPr algn="ctr"/>
+            <a:r>
+              <a:rPr lang="en-US" sz="1000" dirty="0" smtClean="0">
+                <a:solidFill>
+                  <a:schemeClr val="tx1"/>
+                </a:solidFill>
+              </a:rPr>
+              <a:t>Decrement c by 1</a:t>
+            </a:r>
+            <a:endParaRPr lang="en-US" sz="1000" dirty="0">
+              <a:solidFill>
+                <a:schemeClr val="tx1"/>
+              </a:solidFill>
+            </a:endParaRPr>
+          </a:p>
+        </p:txBody>
+      </p:sp>
+      <p:cxnSp>
+        <p:nvCxnSpPr>
+          <p:cNvPr id="103" name="Elbow Connector 102"/>
+          <p:cNvCxnSpPr>
+            <a:stCxn id="100" idx="3"/>
+            <a:endCxn id="71" idx="3"/>
+          </p:cNvCxnSpPr>
+          <p:nvPr/>
+        </p:nvCxnSpPr>
+        <p:spPr>
+          <a:xfrm flipH="1" flipV="1">
+            <a:off x="6489349" y="4541919"/>
+            <a:ext cx="100915" cy="1478629"/>
+          </a:xfrm>
+          <a:prstGeom prst="bentConnector3">
+            <a:avLst>
+              <a:gd name="adj1" fmla="val -504074"/>
+            </a:avLst>
+          </a:prstGeom>
+          <a:ln>
+            <a:tailEnd type="triangle"/>
+          </a:ln>
+        </p:spPr>
+        <p:style>
+          <a:lnRef idx="1">
+            <a:schemeClr val="accent1"/>
+          </a:lnRef>
+          <a:fillRef idx="0">
+            <a:schemeClr val="accent1"/>
+          </a:fillRef>
+          <a:effectRef idx="0">
+            <a:schemeClr val="accent1"/>
+          </a:effectRef>
+          <a:fontRef idx="minor">
+            <a:schemeClr val="tx1"/>
+          </a:fontRef>
+        </p:style>
+      </p:cxnSp>
+      <p:sp>
+        <p:nvSpPr>
+          <p:cNvPr id="105" name="TextBox 104"/>
+          <p:cNvSpPr txBox="1"/>
+          <p:nvPr/>
+        </p:nvSpPr>
+        <p:spPr>
+          <a:xfrm>
+            <a:off x="5920946" y="4820637"/>
+            <a:ext cx="473671" cy="246221"/>
+          </a:xfrm>
+          <a:prstGeom prst="rect">
+            <a:avLst/>
+          </a:prstGeom>
+          <a:noFill/>
+        </p:spPr>
+        <p:txBody>
+          <a:bodyPr wrap="square" rtlCol="0">
+            <a:spAutoFit/>
+          </a:bodyPr>
+          <a:lstStyle/>
+          <a:p>
+            <a:r>
+              <a:rPr lang="en-US" sz="1000" dirty="0" smtClean="0"/>
+              <a:t>True</a:t>
+            </a:r>
+            <a:endParaRPr lang="en-US" sz="1000" dirty="0"/>
+          </a:p>
+        </p:txBody>
+      </p:sp>
+      <p:sp>
+        <p:nvSpPr>
+          <p:cNvPr id="106" name="TextBox 105"/>
+          <p:cNvSpPr txBox="1"/>
+          <p:nvPr/>
+        </p:nvSpPr>
+        <p:spPr>
+          <a:xfrm>
+            <a:off x="4773820" y="3141695"/>
+            <a:ext cx="473671" cy="246221"/>
+          </a:xfrm>
+          <a:prstGeom prst="rect">
+            <a:avLst/>
+          </a:prstGeom>
+          <a:noFill/>
+        </p:spPr>
+        <p:txBody>
+          <a:bodyPr wrap="square" rtlCol="0">
+            <a:spAutoFit/>
+          </a:bodyPr>
+          <a:lstStyle/>
+          <a:p>
+            <a:r>
+              <a:rPr lang="en-US" sz="1000" dirty="0" smtClean="0"/>
+              <a:t>False</a:t>
+            </a:r>
+            <a:endParaRPr lang="en-US" sz="1000" dirty="0"/>
+          </a:p>
+        </p:txBody>
+      </p:sp>
+      <p:cxnSp>
+        <p:nvCxnSpPr>
+          <p:cNvPr id="108" name="Straight Arrow Connector 107"/>
+          <p:cNvCxnSpPr>
+            <a:stCxn id="71" idx="1"/>
+            <a:endCxn id="110" idx="6"/>
+          </p:cNvCxnSpPr>
+          <p:nvPr/>
+        </p:nvCxnSpPr>
+        <p:spPr>
+          <a:xfrm flipH="1">
+            <a:off x="5018898" y="4541919"/>
+            <a:ext cx="428368" cy="0"/>
+          </a:xfrm>
+          <a:prstGeom prst="straightConnector1">
+            <a:avLst/>
+          </a:prstGeom>
+          <a:ln>
+            <a:tailEnd type="triangle"/>
+          </a:ln>
+        </p:spPr>
+        <p:style>
+          <a:lnRef idx="1">
+            <a:schemeClr val="accent1"/>
+          </a:lnRef>
+          <a:fillRef idx="0">
+            <a:schemeClr val="accent1"/>
+          </a:fillRef>
+          <a:effectRef idx="0">
+            <a:schemeClr val="accent1"/>
+          </a:effectRef>
+          <a:fontRef idx="minor">
+            <a:schemeClr val="tx1"/>
+          </a:fontRef>
+        </p:style>
+      </p:cxnSp>
+      <p:sp>
+        <p:nvSpPr>
+          <p:cNvPr id="110" name="Oval 109"/>
+          <p:cNvSpPr/>
+          <p:nvPr/>
+        </p:nvSpPr>
+        <p:spPr>
+          <a:xfrm>
+            <a:off x="4452548" y="4430708"/>
+            <a:ext cx="566350" cy="222422"/>
+          </a:xfrm>
+          <a:prstGeom prst="ellipse">
+            <a:avLst/>
+          </a:prstGeom>
+          <a:solidFill>
+            <a:schemeClr val="bg1"/>
+          </a:solidFill>
+        </p:spPr>
+        <p:style>
+          <a:lnRef idx="2">
+            <a:schemeClr val="accent1">
+              <a:shade val="50000"/>
+            </a:schemeClr>
+          </a:lnRef>
+          <a:fillRef idx="1">
+            <a:schemeClr val="accent1"/>
+          </a:fillRef>
+          <a:effectRef idx="0">
+            <a:schemeClr val="accent1"/>
+          </a:effectRef>
+          <a:fontRef idx="minor">
+            <a:schemeClr val="lt1"/>
+          </a:fontRef>
+        </p:style>
+        <p:txBody>
+          <a:bodyPr rtlCol="0" anchor="ctr"/>
+          <a:lstStyle/>
+          <a:p>
+            <a:pPr algn="ctr"/>
+            <a:r>
+              <a:rPr lang="en-US" sz="1000" dirty="0" smtClean="0">
+                <a:solidFill>
+                  <a:schemeClr val="tx1"/>
+                </a:solidFill>
+              </a:rPr>
+              <a:t>End</a:t>
+            </a:r>
+            <a:endParaRPr lang="en-US" sz="1000" dirty="0">
+              <a:solidFill>
+                <a:schemeClr val="tx1"/>
+              </a:solidFill>
+            </a:endParaRPr>
+          </a:p>
+        </p:txBody>
+      </p:sp>
+      <p:sp>
+        <p:nvSpPr>
+          <p:cNvPr id="114" name="TextBox 113"/>
+          <p:cNvSpPr txBox="1"/>
+          <p:nvPr/>
+        </p:nvSpPr>
+        <p:spPr>
+          <a:xfrm>
+            <a:off x="5050821" y="4359964"/>
+            <a:ext cx="473671" cy="246221"/>
+          </a:xfrm>
+          <a:prstGeom prst="rect">
+            <a:avLst/>
+          </a:prstGeom>
+          <a:noFill/>
+        </p:spPr>
+        <p:txBody>
+          <a:bodyPr wrap="square" rtlCol="0">
+            <a:spAutoFit/>
+          </a:bodyPr>
+          <a:lstStyle/>
+          <a:p>
+            <a:r>
+              <a:rPr lang="en-US" sz="1000" dirty="0" smtClean="0"/>
+              <a:t>False</a:t>
+            </a:r>
+            <a:endParaRPr lang="en-US" sz="1000" dirty="0"/>
+          </a:p>
+        </p:txBody>
+      </p:sp>
+      <p:sp>
+        <p:nvSpPr>
+          <p:cNvPr id="115" name="TextBox 114"/>
+          <p:cNvSpPr txBox="1"/>
+          <p:nvPr/>
+        </p:nvSpPr>
+        <p:spPr>
+          <a:xfrm>
+            <a:off x="4800590" y="5187324"/>
+            <a:ext cx="473671" cy="246221"/>
+          </a:xfrm>
+          <a:prstGeom prst="rect">
+            <a:avLst/>
+          </a:prstGeom>
+          <a:noFill/>
+        </p:spPr>
+        <p:txBody>
+          <a:bodyPr wrap="square" rtlCol="0">
+            <a:spAutoFit/>
+          </a:bodyPr>
+          <a:lstStyle/>
+          <a:p>
+            <a:r>
+              <a:rPr lang="en-US" sz="1000" dirty="0" smtClean="0"/>
+              <a:t>True</a:t>
+            </a:r>
+            <a:endParaRPr lang="en-US" sz="1000" dirty="0"/>
+          </a:p>
+        </p:txBody>
+      </p:sp>
+      <p:sp>
+        <p:nvSpPr>
+          <p:cNvPr id="117" name="TextBox 116"/>
+          <p:cNvSpPr txBox="1"/>
+          <p:nvPr/>
+        </p:nvSpPr>
+        <p:spPr>
+          <a:xfrm>
+            <a:off x="5955955" y="5651217"/>
+            <a:ext cx="473671" cy="246221"/>
+          </a:xfrm>
+          <a:prstGeom prst="rect">
+            <a:avLst/>
+          </a:prstGeom>
+          <a:noFill/>
+        </p:spPr>
+        <p:txBody>
+          <a:bodyPr wrap="square" rtlCol="0">
+            <a:spAutoFit/>
+          </a:bodyPr>
+          <a:lstStyle/>
+          <a:p>
+            <a:r>
+              <a:rPr lang="en-US" sz="1000" dirty="0" smtClean="0"/>
+              <a:t>False</a:t>
+            </a:r>
+            <a:endParaRPr lang="en-US" sz="1000" dirty="0"/>
+          </a:p>
+        </p:txBody>
+      </p:sp>
+      <p:sp>
+        <p:nvSpPr>
+          <p:cNvPr id="118" name="Rectangle 117"/>
+          <p:cNvSpPr/>
+          <p:nvPr/>
+        </p:nvSpPr>
+        <p:spPr>
+          <a:xfrm>
+            <a:off x="8237833" y="2600799"/>
+            <a:ext cx="1243914" cy="274609"/>
+          </a:xfrm>
+          <a:prstGeom prst="rect">
+            <a:avLst/>
+          </a:prstGeom>
+          <a:solidFill>
+            <a:schemeClr val="bg1"/>
+          </a:solidFill>
+        </p:spPr>
+        <p:style>
+          <a:lnRef idx="2">
+            <a:schemeClr val="accent1">
+              <a:shade val="50000"/>
+            </a:schemeClr>
+          </a:lnRef>
+          <a:fillRef idx="1">
+            <a:schemeClr val="accent1"/>
+          </a:fillRef>
+          <a:effectRef idx="0">
+            <a:schemeClr val="accent1"/>
+          </a:effectRef>
+          <a:fontRef idx="minor">
+            <a:schemeClr val="lt1"/>
+          </a:fontRef>
+        </p:style>
+        <p:txBody>
+          <a:bodyPr rtlCol="0" anchor="ctr"/>
+          <a:lstStyle/>
+          <a:p>
+            <a:pPr algn="ctr"/>
+            <a:r>
+              <a:rPr lang="en-US" sz="1000" dirty="0" smtClean="0">
+                <a:solidFill>
+                  <a:schemeClr val="tx1"/>
+                </a:solidFill>
+              </a:rPr>
+              <a:t>d = b - a</a:t>
+            </a:r>
+            <a:endParaRPr lang="en-US" sz="1000" dirty="0">
+              <a:solidFill>
+                <a:schemeClr val="tx1"/>
+              </a:solidFill>
+            </a:endParaRPr>
+          </a:p>
+        </p:txBody>
+      </p:sp>
+      <p:sp>
+        <p:nvSpPr>
+          <p:cNvPr id="180" name="Flowchart: Decision 179"/>
+          <p:cNvSpPr/>
+          <p:nvPr/>
+        </p:nvSpPr>
+        <p:spPr>
+          <a:xfrm>
+            <a:off x="9728879" y="3028684"/>
+            <a:ext cx="1713470" cy="641887"/>
+          </a:xfrm>
+          <a:prstGeom prst="flowChartDecision">
+            <a:avLst/>
+          </a:prstGeom>
+          <a:solidFill>
+            <a:schemeClr val="bg1"/>
+          </a:solidFill>
+        </p:spPr>
+        <p:style>
+          <a:lnRef idx="2">
+            <a:schemeClr val="accent1">
+              <a:shade val="50000"/>
+            </a:schemeClr>
+          </a:lnRef>
+          <a:fillRef idx="1">
+            <a:schemeClr val="accent1"/>
+          </a:fillRef>
+          <a:effectRef idx="0">
+            <a:schemeClr val="accent1"/>
+          </a:effectRef>
+          <a:fontRef idx="minor">
+            <a:schemeClr val="lt1"/>
+          </a:fontRef>
+        </p:style>
+        <p:txBody>
+          <a:bodyPr rtlCol="0" anchor="ctr"/>
+          <a:lstStyle/>
+          <a:p>
+            <a:pPr algn="ctr"/>
+            <a:r>
+              <a:rPr lang="en-US" sz="900" dirty="0" smtClean="0">
+                <a:solidFill>
+                  <a:schemeClr val="tx1"/>
+                </a:solidFill>
+              </a:rPr>
+              <a:t>If (a mod d) and (b mod d) = 0</a:t>
+            </a:r>
+            <a:endParaRPr lang="en-US" sz="900" dirty="0">
+              <a:solidFill>
+                <a:schemeClr val="tx1"/>
+              </a:solidFill>
+            </a:endParaRPr>
+          </a:p>
+        </p:txBody>
+      </p:sp>
+      <p:cxnSp>
+        <p:nvCxnSpPr>
+          <p:cNvPr id="181" name="Straight Arrow Connector 180"/>
+          <p:cNvCxnSpPr>
+            <a:stCxn id="180" idx="1"/>
+            <a:endCxn id="182" idx="5"/>
+          </p:cNvCxnSpPr>
+          <p:nvPr/>
+        </p:nvCxnSpPr>
+        <p:spPr>
+          <a:xfrm flipH="1" flipV="1">
+            <a:off x="9309984" y="3349627"/>
+            <a:ext cx="418895" cy="1"/>
+          </a:xfrm>
+          <a:prstGeom prst="straightConnector1">
+            <a:avLst/>
+          </a:prstGeom>
+          <a:ln>
+            <a:tailEnd type="triangle"/>
+          </a:ln>
+        </p:spPr>
+        <p:style>
+          <a:lnRef idx="1">
+            <a:schemeClr val="accent1"/>
+          </a:lnRef>
+          <a:fillRef idx="0">
+            <a:schemeClr val="accent1"/>
+          </a:fillRef>
+          <a:effectRef idx="0">
+            <a:schemeClr val="accent1"/>
+          </a:effectRef>
+          <a:fontRef idx="minor">
+            <a:schemeClr val="tx1"/>
+          </a:fontRef>
+        </p:style>
+      </p:cxnSp>
+      <p:sp>
+        <p:nvSpPr>
+          <p:cNvPr id="182" name="Flowchart: Data 181"/>
+          <p:cNvSpPr/>
+          <p:nvPr/>
+        </p:nvSpPr>
+        <p:spPr>
+          <a:xfrm>
+            <a:off x="8060702" y="3209584"/>
+            <a:ext cx="1388091" cy="280086"/>
+          </a:xfrm>
+          <a:prstGeom prst="flowChartInputOutput">
+            <a:avLst/>
+          </a:prstGeom>
+          <a:solidFill>
+            <a:schemeClr val="bg1"/>
+          </a:solidFill>
+        </p:spPr>
+        <p:style>
+          <a:lnRef idx="2">
+            <a:schemeClr val="accent1">
+              <a:shade val="50000"/>
+            </a:schemeClr>
+          </a:lnRef>
+          <a:fillRef idx="1">
+            <a:schemeClr val="accent1"/>
+          </a:fillRef>
+          <a:effectRef idx="0">
+            <a:schemeClr val="accent1"/>
+          </a:effectRef>
+          <a:fontRef idx="minor">
+            <a:schemeClr val="lt1"/>
+          </a:fontRef>
+        </p:style>
+        <p:txBody>
+          <a:bodyPr rtlCol="0" anchor="ctr"/>
+          <a:lstStyle/>
+          <a:p>
+            <a:pPr algn="ctr"/>
+            <a:r>
+              <a:rPr lang="en-US" sz="1000" dirty="0" smtClean="0">
+                <a:solidFill>
+                  <a:schemeClr val="tx1"/>
+                </a:solidFill>
+              </a:rPr>
+              <a:t>Display “d is the HCF”</a:t>
+            </a:r>
+            <a:endParaRPr lang="en-US" sz="1000" dirty="0">
+              <a:solidFill>
+                <a:schemeClr val="tx1"/>
+              </a:solidFill>
+            </a:endParaRPr>
+          </a:p>
+        </p:txBody>
+      </p:sp>
+      <p:sp>
+        <p:nvSpPr>
+          <p:cNvPr id="183" name="Oval 182"/>
+          <p:cNvSpPr/>
+          <p:nvPr/>
+        </p:nvSpPr>
+        <p:spPr>
+          <a:xfrm>
+            <a:off x="8443780" y="3642796"/>
+            <a:ext cx="626074" cy="222422"/>
+          </a:xfrm>
+          <a:prstGeom prst="ellipse">
+            <a:avLst/>
+          </a:prstGeom>
+          <a:solidFill>
+            <a:schemeClr val="bg1"/>
+          </a:solidFill>
+        </p:spPr>
+        <p:style>
+          <a:lnRef idx="2">
+            <a:schemeClr val="accent1">
+              <a:shade val="50000"/>
+            </a:schemeClr>
+          </a:lnRef>
+          <a:fillRef idx="1">
+            <a:schemeClr val="accent1"/>
+          </a:fillRef>
+          <a:effectRef idx="0">
+            <a:schemeClr val="accent1"/>
+          </a:effectRef>
+          <a:fontRef idx="minor">
+            <a:schemeClr val="lt1"/>
+          </a:fontRef>
+        </p:style>
+        <p:txBody>
+          <a:bodyPr rtlCol="0" anchor="ctr"/>
+          <a:lstStyle/>
+          <a:p>
+            <a:pPr algn="ctr"/>
+            <a:r>
+              <a:rPr lang="en-US" sz="1000" dirty="0" smtClean="0">
+                <a:solidFill>
+                  <a:schemeClr val="tx1"/>
+                </a:solidFill>
+              </a:rPr>
+              <a:t>End</a:t>
+            </a:r>
+            <a:endParaRPr lang="en-US" sz="1000" dirty="0">
+              <a:solidFill>
+                <a:schemeClr val="tx1"/>
+              </a:solidFill>
+            </a:endParaRPr>
+          </a:p>
+        </p:txBody>
+      </p:sp>
+      <p:cxnSp>
+        <p:nvCxnSpPr>
+          <p:cNvPr id="184" name="Straight Arrow Connector 183"/>
+          <p:cNvCxnSpPr>
+            <a:stCxn id="182" idx="4"/>
+            <a:endCxn id="183" idx="0"/>
+          </p:cNvCxnSpPr>
+          <p:nvPr/>
+        </p:nvCxnSpPr>
+        <p:spPr>
+          <a:xfrm>
+            <a:off x="8754748" y="3489670"/>
+            <a:ext cx="2069" cy="153126"/>
+          </a:xfrm>
+          <a:prstGeom prst="straightConnector1">
+            <a:avLst/>
+          </a:prstGeom>
+          <a:ln>
+            <a:tailEnd type="triangle"/>
+          </a:ln>
+        </p:spPr>
+        <p:style>
+          <a:lnRef idx="1">
+            <a:schemeClr val="accent1"/>
+          </a:lnRef>
+          <a:fillRef idx="0">
+            <a:schemeClr val="accent1"/>
+          </a:fillRef>
+          <a:effectRef idx="0">
+            <a:schemeClr val="accent1"/>
+          </a:effectRef>
+          <a:fontRef idx="minor">
+            <a:schemeClr val="tx1"/>
+          </a:fontRef>
+        </p:style>
+      </p:cxnSp>
+      <p:cxnSp>
+        <p:nvCxnSpPr>
+          <p:cNvPr id="185" name="Straight Arrow Connector 184"/>
+          <p:cNvCxnSpPr>
+            <a:stCxn id="180" idx="2"/>
+            <a:endCxn id="186" idx="0"/>
+          </p:cNvCxnSpPr>
+          <p:nvPr/>
+        </p:nvCxnSpPr>
+        <p:spPr>
+          <a:xfrm>
+            <a:off x="10585614" y="3670571"/>
+            <a:ext cx="0" cy="173875"/>
+          </a:xfrm>
+          <a:prstGeom prst="straightConnector1">
+            <a:avLst/>
+          </a:prstGeom>
+          <a:ln>
+            <a:tailEnd type="triangle"/>
+          </a:ln>
+        </p:spPr>
+        <p:style>
+          <a:lnRef idx="1">
+            <a:schemeClr val="accent1"/>
+          </a:lnRef>
+          <a:fillRef idx="0">
+            <a:schemeClr val="accent1"/>
+          </a:fillRef>
+          <a:effectRef idx="0">
+            <a:schemeClr val="accent1"/>
+          </a:effectRef>
+          <a:fontRef idx="minor">
+            <a:schemeClr val="tx1"/>
+          </a:fontRef>
+        </p:style>
+      </p:cxnSp>
+      <p:sp>
+        <p:nvSpPr>
+          <p:cNvPr id="186" name="Rectangle 185"/>
+          <p:cNvSpPr/>
+          <p:nvPr/>
+        </p:nvSpPr>
+        <p:spPr>
+          <a:xfrm>
+            <a:off x="9963657" y="3844446"/>
+            <a:ext cx="1243914" cy="171498"/>
+          </a:xfrm>
+          <a:prstGeom prst="rect">
+            <a:avLst/>
+          </a:prstGeom>
+          <a:solidFill>
+            <a:schemeClr val="bg1"/>
+          </a:solidFill>
+        </p:spPr>
+        <p:style>
+          <a:lnRef idx="2">
+            <a:schemeClr val="accent1">
+              <a:shade val="50000"/>
+            </a:schemeClr>
+          </a:lnRef>
+          <a:fillRef idx="1">
+            <a:schemeClr val="accent1"/>
+          </a:fillRef>
+          <a:effectRef idx="0">
+            <a:schemeClr val="accent1"/>
+          </a:effectRef>
+          <a:fontRef idx="minor">
+            <a:schemeClr val="lt1"/>
+          </a:fontRef>
+        </p:style>
+        <p:txBody>
+          <a:bodyPr rtlCol="0" anchor="ctr"/>
+          <a:lstStyle/>
+          <a:p>
+            <a:pPr algn="ctr"/>
+            <a:r>
+              <a:rPr lang="en-US" sz="1000" dirty="0" smtClean="0">
+                <a:solidFill>
+                  <a:schemeClr val="tx1"/>
+                </a:solidFill>
+              </a:rPr>
+              <a:t>c = d</a:t>
+            </a:r>
+            <a:endParaRPr lang="en-US" sz="1000" dirty="0">
+              <a:solidFill>
+                <a:schemeClr val="tx1"/>
+              </a:solidFill>
+            </a:endParaRPr>
+          </a:p>
+        </p:txBody>
+      </p:sp>
+      <p:sp>
+        <p:nvSpPr>
+          <p:cNvPr id="187" name="Flowchart: Decision 186"/>
+          <p:cNvSpPr/>
+          <p:nvPr/>
+        </p:nvSpPr>
+        <p:spPr>
+          <a:xfrm>
+            <a:off x="10064572" y="4212402"/>
+            <a:ext cx="1042083" cy="617838"/>
+          </a:xfrm>
+          <a:prstGeom prst="flowChartDecision">
+            <a:avLst/>
+          </a:prstGeom>
+          <a:solidFill>
+            <a:schemeClr val="bg1"/>
+          </a:solidFill>
+        </p:spPr>
+        <p:style>
+          <a:lnRef idx="2">
+            <a:schemeClr val="accent1">
+              <a:shade val="50000"/>
+            </a:schemeClr>
+          </a:lnRef>
+          <a:fillRef idx="1">
+            <a:schemeClr val="accent1"/>
+          </a:fillRef>
+          <a:effectRef idx="0">
+            <a:schemeClr val="accent1"/>
+          </a:effectRef>
+          <a:fontRef idx="minor">
+            <a:schemeClr val="lt1"/>
+          </a:fontRef>
+        </p:style>
+        <p:txBody>
+          <a:bodyPr rtlCol="0" anchor="ctr"/>
+          <a:lstStyle/>
+          <a:p>
+            <a:pPr algn="ctr"/>
+            <a:r>
+              <a:rPr lang="en-US" sz="1000" dirty="0" smtClean="0">
+                <a:solidFill>
+                  <a:schemeClr val="tx1"/>
+                </a:solidFill>
+              </a:rPr>
+              <a:t>While c !=0</a:t>
+            </a:r>
+            <a:endParaRPr lang="en-US" sz="1000" dirty="0">
+              <a:solidFill>
+                <a:schemeClr val="tx1"/>
+              </a:solidFill>
+            </a:endParaRPr>
+          </a:p>
+        </p:txBody>
+      </p:sp>
+      <p:cxnSp>
+        <p:nvCxnSpPr>
+          <p:cNvPr id="188" name="Straight Arrow Connector 187"/>
+          <p:cNvCxnSpPr>
+            <a:stCxn id="186" idx="2"/>
+            <a:endCxn id="187" idx="0"/>
+          </p:cNvCxnSpPr>
+          <p:nvPr/>
+        </p:nvCxnSpPr>
+        <p:spPr>
+          <a:xfrm>
+            <a:off x="10585614" y="4015944"/>
+            <a:ext cx="0" cy="196458"/>
+          </a:xfrm>
+          <a:prstGeom prst="straightConnector1">
+            <a:avLst/>
+          </a:prstGeom>
+          <a:ln>
+            <a:tailEnd type="triangle"/>
+          </a:ln>
+        </p:spPr>
+        <p:style>
+          <a:lnRef idx="1">
+            <a:schemeClr val="accent1"/>
+          </a:lnRef>
+          <a:fillRef idx="0">
+            <a:schemeClr val="accent1"/>
+          </a:fillRef>
+          <a:effectRef idx="0">
+            <a:schemeClr val="accent1"/>
+          </a:effectRef>
+          <a:fontRef idx="minor">
+            <a:schemeClr val="tx1"/>
+          </a:fontRef>
+        </p:style>
+      </p:cxnSp>
+      <p:sp>
+        <p:nvSpPr>
+          <p:cNvPr id="189" name="Flowchart: Decision 188"/>
+          <p:cNvSpPr/>
+          <p:nvPr/>
+        </p:nvSpPr>
+        <p:spPr>
+          <a:xfrm>
+            <a:off x="9728879" y="5038920"/>
+            <a:ext cx="1713470" cy="641887"/>
+          </a:xfrm>
+          <a:prstGeom prst="flowChartDecision">
+            <a:avLst/>
+          </a:prstGeom>
+          <a:solidFill>
+            <a:schemeClr val="bg1"/>
+          </a:solidFill>
+        </p:spPr>
+        <p:style>
+          <a:lnRef idx="2">
+            <a:schemeClr val="accent1">
+              <a:shade val="50000"/>
+            </a:schemeClr>
+          </a:lnRef>
+          <a:fillRef idx="1">
+            <a:schemeClr val="accent1"/>
+          </a:fillRef>
+          <a:effectRef idx="0">
+            <a:schemeClr val="accent1"/>
+          </a:effectRef>
+          <a:fontRef idx="minor">
+            <a:schemeClr val="lt1"/>
+          </a:fontRef>
+        </p:style>
+        <p:txBody>
+          <a:bodyPr rtlCol="0" anchor="ctr"/>
+          <a:lstStyle/>
+          <a:p>
+            <a:pPr algn="ctr"/>
+            <a:r>
+              <a:rPr lang="en-US" sz="900" dirty="0" smtClean="0">
+                <a:solidFill>
+                  <a:schemeClr val="tx1"/>
+                </a:solidFill>
+              </a:rPr>
+              <a:t>If (a mod d) and (b mod d) = 0</a:t>
+            </a:r>
+            <a:endParaRPr lang="en-US" sz="900" dirty="0">
+              <a:solidFill>
+                <a:schemeClr val="tx1"/>
+              </a:solidFill>
+            </a:endParaRPr>
+          </a:p>
+        </p:txBody>
+      </p:sp>
+      <p:sp>
+        <p:nvSpPr>
+          <p:cNvPr id="190" name="Flowchart: Data 189"/>
+          <p:cNvSpPr/>
+          <p:nvPr/>
+        </p:nvSpPr>
+        <p:spPr>
+          <a:xfrm>
+            <a:off x="8202808" y="5219820"/>
+            <a:ext cx="1266578" cy="280086"/>
+          </a:xfrm>
+          <a:prstGeom prst="flowChartInputOutput">
+            <a:avLst/>
+          </a:prstGeom>
+          <a:solidFill>
+            <a:schemeClr val="bg1"/>
+          </a:solidFill>
+        </p:spPr>
+        <p:style>
+          <a:lnRef idx="2">
+            <a:schemeClr val="accent1">
+              <a:shade val="50000"/>
+            </a:schemeClr>
+          </a:lnRef>
+          <a:fillRef idx="1">
+            <a:schemeClr val="accent1"/>
+          </a:fillRef>
+          <a:effectRef idx="0">
+            <a:schemeClr val="accent1"/>
+          </a:effectRef>
+          <a:fontRef idx="minor">
+            <a:schemeClr val="lt1"/>
+          </a:fontRef>
+        </p:style>
+        <p:txBody>
+          <a:bodyPr rtlCol="0" anchor="ctr"/>
+          <a:lstStyle/>
+          <a:p>
+            <a:pPr algn="ctr"/>
+            <a:r>
+              <a:rPr lang="en-US" sz="1000" dirty="0" smtClean="0">
+                <a:solidFill>
+                  <a:schemeClr val="tx1"/>
+                </a:solidFill>
+              </a:rPr>
+              <a:t>Display “d is the HCF”</a:t>
+            </a:r>
+            <a:endParaRPr lang="en-US" sz="1000" dirty="0">
+              <a:solidFill>
+                <a:schemeClr val="tx1"/>
+              </a:solidFill>
+            </a:endParaRPr>
+          </a:p>
+        </p:txBody>
+      </p:sp>
+      <p:cxnSp>
+        <p:nvCxnSpPr>
+          <p:cNvPr id="191" name="Straight Arrow Connector 190"/>
+          <p:cNvCxnSpPr>
+            <a:stCxn id="189" idx="1"/>
+            <a:endCxn id="190" idx="5"/>
+          </p:cNvCxnSpPr>
+          <p:nvPr/>
+        </p:nvCxnSpPr>
+        <p:spPr>
+          <a:xfrm flipH="1" flipV="1">
+            <a:off x="9342728" y="5359863"/>
+            <a:ext cx="386151" cy="1"/>
+          </a:xfrm>
+          <a:prstGeom prst="straightConnector1">
+            <a:avLst/>
+          </a:prstGeom>
+          <a:ln>
+            <a:tailEnd type="triangle"/>
+          </a:ln>
+        </p:spPr>
+        <p:style>
+          <a:lnRef idx="1">
+            <a:schemeClr val="accent1"/>
+          </a:lnRef>
+          <a:fillRef idx="0">
+            <a:schemeClr val="accent1"/>
+          </a:fillRef>
+          <a:effectRef idx="0">
+            <a:schemeClr val="accent1"/>
+          </a:effectRef>
+          <a:fontRef idx="minor">
+            <a:schemeClr val="tx1"/>
+          </a:fontRef>
+        </p:style>
+      </p:cxnSp>
+      <p:sp>
+        <p:nvSpPr>
+          <p:cNvPr id="192" name="Oval 191"/>
+          <p:cNvSpPr/>
+          <p:nvPr/>
+        </p:nvSpPr>
+        <p:spPr>
+          <a:xfrm>
+            <a:off x="7582926" y="5248652"/>
+            <a:ext cx="537514" cy="222422"/>
+          </a:xfrm>
+          <a:prstGeom prst="ellipse">
+            <a:avLst/>
+          </a:prstGeom>
+          <a:solidFill>
+            <a:schemeClr val="bg1"/>
+          </a:solidFill>
+        </p:spPr>
+        <p:style>
+          <a:lnRef idx="2">
+            <a:schemeClr val="accent1">
+              <a:shade val="50000"/>
+            </a:schemeClr>
+          </a:lnRef>
+          <a:fillRef idx="1">
+            <a:schemeClr val="accent1"/>
+          </a:fillRef>
+          <a:effectRef idx="0">
+            <a:schemeClr val="accent1"/>
+          </a:effectRef>
+          <a:fontRef idx="minor">
+            <a:schemeClr val="lt1"/>
+          </a:fontRef>
+        </p:style>
+        <p:txBody>
+          <a:bodyPr rtlCol="0" anchor="ctr"/>
+          <a:lstStyle/>
+          <a:p>
+            <a:pPr algn="ctr"/>
+            <a:r>
+              <a:rPr lang="en-US" sz="1000" dirty="0" smtClean="0">
+                <a:solidFill>
+                  <a:schemeClr val="tx1"/>
+                </a:solidFill>
+              </a:rPr>
+              <a:t>End</a:t>
+            </a:r>
+            <a:endParaRPr lang="en-US" sz="1000" dirty="0">
+              <a:solidFill>
+                <a:schemeClr val="tx1"/>
+              </a:solidFill>
+            </a:endParaRPr>
+          </a:p>
+        </p:txBody>
+      </p:sp>
+      <p:cxnSp>
+        <p:nvCxnSpPr>
+          <p:cNvPr id="193" name="Straight Arrow Connector 192"/>
+          <p:cNvCxnSpPr>
+            <a:stCxn id="190" idx="2"/>
+            <a:endCxn id="192" idx="6"/>
+          </p:cNvCxnSpPr>
+          <p:nvPr/>
+        </p:nvCxnSpPr>
+        <p:spPr>
+          <a:xfrm flipH="1">
+            <a:off x="8120440" y="5359863"/>
+            <a:ext cx="209026" cy="0"/>
+          </a:xfrm>
+          <a:prstGeom prst="straightConnector1">
+            <a:avLst/>
+          </a:prstGeom>
+          <a:ln>
+            <a:tailEnd type="triangle"/>
+          </a:ln>
+        </p:spPr>
+        <p:style>
+          <a:lnRef idx="1">
+            <a:schemeClr val="accent1"/>
+          </a:lnRef>
+          <a:fillRef idx="0">
+            <a:schemeClr val="accent1"/>
+          </a:fillRef>
+          <a:effectRef idx="0">
+            <a:schemeClr val="accent1"/>
+          </a:effectRef>
+          <a:fontRef idx="minor">
+            <a:schemeClr val="tx1"/>
+          </a:fontRef>
+        </p:style>
+      </p:cxnSp>
+      <p:cxnSp>
+        <p:nvCxnSpPr>
+          <p:cNvPr id="194" name="Straight Arrow Connector 193"/>
+          <p:cNvCxnSpPr>
+            <a:stCxn id="187" idx="2"/>
+            <a:endCxn id="189" idx="0"/>
+          </p:cNvCxnSpPr>
+          <p:nvPr/>
+        </p:nvCxnSpPr>
+        <p:spPr>
+          <a:xfrm>
+            <a:off x="10585614" y="4830240"/>
+            <a:ext cx="0" cy="208680"/>
+          </a:xfrm>
+          <a:prstGeom prst="straightConnector1">
+            <a:avLst/>
+          </a:prstGeom>
+          <a:ln>
+            <a:tailEnd type="triangle"/>
+          </a:ln>
+        </p:spPr>
+        <p:style>
+          <a:lnRef idx="1">
+            <a:schemeClr val="accent1"/>
+          </a:lnRef>
+          <a:fillRef idx="0">
+            <a:schemeClr val="accent1"/>
+          </a:fillRef>
+          <a:effectRef idx="0">
+            <a:schemeClr val="accent1"/>
+          </a:effectRef>
+          <a:fontRef idx="minor">
+            <a:schemeClr val="tx1"/>
+          </a:fontRef>
+        </p:style>
+      </p:cxnSp>
+      <p:cxnSp>
+        <p:nvCxnSpPr>
+          <p:cNvPr id="195" name="Straight Arrow Connector 194"/>
+          <p:cNvCxnSpPr>
+            <a:stCxn id="189" idx="2"/>
+            <a:endCxn id="196" idx="0"/>
+          </p:cNvCxnSpPr>
+          <p:nvPr/>
+        </p:nvCxnSpPr>
+        <p:spPr>
+          <a:xfrm flipH="1">
+            <a:off x="10585613" y="5680807"/>
+            <a:ext cx="1" cy="233394"/>
+          </a:xfrm>
+          <a:prstGeom prst="straightConnector1">
+            <a:avLst/>
+          </a:prstGeom>
+          <a:ln>
+            <a:tailEnd type="triangle"/>
+          </a:ln>
+        </p:spPr>
+        <p:style>
+          <a:lnRef idx="1">
+            <a:schemeClr val="accent1"/>
+          </a:lnRef>
+          <a:fillRef idx="0">
+            <a:schemeClr val="accent1"/>
+          </a:fillRef>
+          <a:effectRef idx="0">
+            <a:schemeClr val="accent1"/>
+          </a:effectRef>
+          <a:fontRef idx="minor">
+            <a:schemeClr val="tx1"/>
+          </a:fontRef>
+        </p:style>
+      </p:cxnSp>
+      <p:sp>
+        <p:nvSpPr>
+          <p:cNvPr id="196" name="Rectangle 195"/>
+          <p:cNvSpPr/>
+          <p:nvPr/>
+        </p:nvSpPr>
+        <p:spPr>
+          <a:xfrm>
+            <a:off x="9963656" y="5914201"/>
+            <a:ext cx="1243914" cy="171498"/>
+          </a:xfrm>
+          <a:prstGeom prst="rect">
+            <a:avLst/>
+          </a:prstGeom>
+          <a:solidFill>
+            <a:schemeClr val="bg1"/>
+          </a:solidFill>
+        </p:spPr>
+        <p:style>
+          <a:lnRef idx="2">
+            <a:schemeClr val="accent1">
+              <a:shade val="50000"/>
+            </a:schemeClr>
+          </a:lnRef>
+          <a:fillRef idx="1">
+            <a:schemeClr val="accent1"/>
+          </a:fillRef>
+          <a:effectRef idx="0">
+            <a:schemeClr val="accent1"/>
+          </a:effectRef>
+          <a:fontRef idx="minor">
+            <a:schemeClr val="lt1"/>
+          </a:fontRef>
+        </p:style>
+        <p:txBody>
+          <a:bodyPr rtlCol="0" anchor="ctr"/>
+          <a:lstStyle/>
+          <a:p>
+            <a:pPr algn="ctr"/>
+            <a:r>
+              <a:rPr lang="en-US" sz="1000" dirty="0" smtClean="0">
+                <a:solidFill>
+                  <a:schemeClr val="tx1"/>
+                </a:solidFill>
+              </a:rPr>
+              <a:t>Decrement c by 1</a:t>
+            </a:r>
+            <a:endParaRPr lang="en-US" sz="1000" dirty="0">
+              <a:solidFill>
+                <a:schemeClr val="tx1"/>
+              </a:solidFill>
+            </a:endParaRPr>
+          </a:p>
+        </p:txBody>
+      </p:sp>
+      <p:cxnSp>
+        <p:nvCxnSpPr>
+          <p:cNvPr id="197" name="Elbow Connector 196"/>
+          <p:cNvCxnSpPr>
+            <a:stCxn id="196" idx="3"/>
+            <a:endCxn id="187" idx="3"/>
+          </p:cNvCxnSpPr>
+          <p:nvPr/>
+        </p:nvCxnSpPr>
+        <p:spPr>
+          <a:xfrm flipH="1" flipV="1">
+            <a:off x="11106655" y="4521321"/>
+            <a:ext cx="100915" cy="1478629"/>
+          </a:xfrm>
+          <a:prstGeom prst="bentConnector3">
+            <a:avLst>
+              <a:gd name="adj1" fmla="val -504074"/>
+            </a:avLst>
+          </a:prstGeom>
+          <a:ln>
+            <a:tailEnd type="triangle"/>
+          </a:ln>
+        </p:spPr>
+        <p:style>
+          <a:lnRef idx="1">
+            <a:schemeClr val="accent1"/>
+          </a:lnRef>
+          <a:fillRef idx="0">
+            <a:schemeClr val="accent1"/>
+          </a:fillRef>
+          <a:effectRef idx="0">
+            <a:schemeClr val="accent1"/>
+          </a:effectRef>
+          <a:fontRef idx="minor">
+            <a:schemeClr val="tx1"/>
+          </a:fontRef>
+        </p:style>
+      </p:cxnSp>
+      <p:sp>
+        <p:nvSpPr>
+          <p:cNvPr id="198" name="TextBox 197"/>
+          <p:cNvSpPr txBox="1"/>
+          <p:nvPr/>
+        </p:nvSpPr>
+        <p:spPr>
+          <a:xfrm>
+            <a:off x="10538252" y="4800039"/>
+            <a:ext cx="473671" cy="246221"/>
+          </a:xfrm>
+          <a:prstGeom prst="rect">
+            <a:avLst/>
+          </a:prstGeom>
+          <a:noFill/>
+        </p:spPr>
+        <p:txBody>
+          <a:bodyPr wrap="square" rtlCol="0">
+            <a:spAutoFit/>
+          </a:bodyPr>
+          <a:lstStyle/>
+          <a:p>
+            <a:r>
+              <a:rPr lang="en-US" sz="1000" dirty="0" smtClean="0"/>
+              <a:t>True</a:t>
+            </a:r>
+            <a:endParaRPr lang="en-US" sz="1000" dirty="0"/>
+          </a:p>
+        </p:txBody>
+      </p:sp>
+      <p:sp>
+        <p:nvSpPr>
+          <p:cNvPr id="199" name="TextBox 198"/>
+          <p:cNvSpPr txBox="1"/>
+          <p:nvPr/>
+        </p:nvSpPr>
+        <p:spPr>
+          <a:xfrm>
+            <a:off x="9391126" y="3121097"/>
+            <a:ext cx="473671" cy="246221"/>
+          </a:xfrm>
+          <a:prstGeom prst="rect">
+            <a:avLst/>
+          </a:prstGeom>
+          <a:noFill/>
+        </p:spPr>
+        <p:txBody>
+          <a:bodyPr wrap="square" rtlCol="0">
+            <a:spAutoFit/>
+          </a:bodyPr>
+          <a:lstStyle/>
+          <a:p>
+            <a:r>
+              <a:rPr lang="en-US" sz="1000" dirty="0" smtClean="0"/>
+              <a:t>False</a:t>
+            </a:r>
+            <a:endParaRPr lang="en-US" sz="1000" dirty="0"/>
+          </a:p>
+        </p:txBody>
+      </p:sp>
+      <p:cxnSp>
+        <p:nvCxnSpPr>
+          <p:cNvPr id="200" name="Straight Arrow Connector 199"/>
+          <p:cNvCxnSpPr>
+            <a:stCxn id="187" idx="1"/>
+            <a:endCxn id="201" idx="6"/>
+          </p:cNvCxnSpPr>
+          <p:nvPr/>
+        </p:nvCxnSpPr>
+        <p:spPr>
+          <a:xfrm flipH="1">
+            <a:off x="9636204" y="4521321"/>
+            <a:ext cx="428368" cy="0"/>
+          </a:xfrm>
+          <a:prstGeom prst="straightConnector1">
+            <a:avLst/>
+          </a:prstGeom>
+          <a:ln>
+            <a:tailEnd type="triangle"/>
+          </a:ln>
+        </p:spPr>
+        <p:style>
+          <a:lnRef idx="1">
+            <a:schemeClr val="accent1"/>
+          </a:lnRef>
+          <a:fillRef idx="0">
+            <a:schemeClr val="accent1"/>
+          </a:fillRef>
+          <a:effectRef idx="0">
+            <a:schemeClr val="accent1"/>
+          </a:effectRef>
+          <a:fontRef idx="minor">
+            <a:schemeClr val="tx1"/>
+          </a:fontRef>
+        </p:style>
+      </p:cxnSp>
+      <p:sp>
+        <p:nvSpPr>
+          <p:cNvPr id="201" name="Oval 200"/>
+          <p:cNvSpPr/>
+          <p:nvPr/>
+        </p:nvSpPr>
+        <p:spPr>
+          <a:xfrm>
+            <a:off x="9069854" y="4410110"/>
+            <a:ext cx="566350" cy="222422"/>
+          </a:xfrm>
+          <a:prstGeom prst="ellipse">
+            <a:avLst/>
+          </a:prstGeom>
+          <a:solidFill>
+            <a:schemeClr val="bg1"/>
+          </a:solidFill>
+        </p:spPr>
+        <p:style>
+          <a:lnRef idx="2">
+            <a:schemeClr val="accent1">
+              <a:shade val="50000"/>
+            </a:schemeClr>
+          </a:lnRef>
+          <a:fillRef idx="1">
+            <a:schemeClr val="accent1"/>
+          </a:fillRef>
+          <a:effectRef idx="0">
+            <a:schemeClr val="accent1"/>
+          </a:effectRef>
+          <a:fontRef idx="minor">
+            <a:schemeClr val="lt1"/>
+          </a:fontRef>
+        </p:style>
+        <p:txBody>
+          <a:bodyPr rtlCol="0" anchor="ctr"/>
+          <a:lstStyle/>
+          <a:p>
+            <a:pPr algn="ctr"/>
+            <a:r>
+              <a:rPr lang="en-US" sz="1000" dirty="0" smtClean="0">
+                <a:solidFill>
+                  <a:schemeClr val="tx1"/>
+                </a:solidFill>
+              </a:rPr>
+              <a:t>End</a:t>
+            </a:r>
+            <a:endParaRPr lang="en-US" sz="1000" dirty="0">
+              <a:solidFill>
+                <a:schemeClr val="tx1"/>
+              </a:solidFill>
+            </a:endParaRPr>
+          </a:p>
+        </p:txBody>
+      </p:sp>
+      <p:sp>
+        <p:nvSpPr>
+          <p:cNvPr id="202" name="TextBox 201"/>
+          <p:cNvSpPr txBox="1"/>
+          <p:nvPr/>
+        </p:nvSpPr>
+        <p:spPr>
+          <a:xfrm>
+            <a:off x="9668127" y="4339366"/>
+            <a:ext cx="473671" cy="246221"/>
+          </a:xfrm>
+          <a:prstGeom prst="rect">
+            <a:avLst/>
+          </a:prstGeom>
+          <a:noFill/>
+        </p:spPr>
+        <p:txBody>
+          <a:bodyPr wrap="square" rtlCol="0">
+            <a:spAutoFit/>
+          </a:bodyPr>
+          <a:lstStyle/>
+          <a:p>
+            <a:r>
+              <a:rPr lang="en-US" sz="1000" dirty="0" smtClean="0"/>
+              <a:t>False</a:t>
+            </a:r>
+            <a:endParaRPr lang="en-US" sz="1000" dirty="0"/>
+          </a:p>
+        </p:txBody>
+      </p:sp>
+      <p:sp>
+        <p:nvSpPr>
+          <p:cNvPr id="203" name="TextBox 202"/>
+          <p:cNvSpPr txBox="1"/>
+          <p:nvPr/>
+        </p:nvSpPr>
+        <p:spPr>
+          <a:xfrm>
+            <a:off x="9417896" y="5166726"/>
+            <a:ext cx="473671" cy="246221"/>
+          </a:xfrm>
+          <a:prstGeom prst="rect">
+            <a:avLst/>
+          </a:prstGeom>
+          <a:noFill/>
+        </p:spPr>
+        <p:txBody>
+          <a:bodyPr wrap="square" rtlCol="0">
+            <a:spAutoFit/>
+          </a:bodyPr>
+          <a:lstStyle/>
+          <a:p>
+            <a:r>
+              <a:rPr lang="en-US" sz="1000" dirty="0" smtClean="0"/>
+              <a:t>True</a:t>
+            </a:r>
+            <a:endParaRPr lang="en-US" sz="1000" dirty="0"/>
+          </a:p>
+        </p:txBody>
+      </p:sp>
+      <p:sp>
+        <p:nvSpPr>
+          <p:cNvPr id="204" name="TextBox 203"/>
+          <p:cNvSpPr txBox="1"/>
+          <p:nvPr/>
+        </p:nvSpPr>
+        <p:spPr>
+          <a:xfrm>
+            <a:off x="10573261" y="5630619"/>
+            <a:ext cx="473671" cy="246221"/>
+          </a:xfrm>
+          <a:prstGeom prst="rect">
+            <a:avLst/>
+          </a:prstGeom>
+          <a:noFill/>
+        </p:spPr>
+        <p:txBody>
+          <a:bodyPr wrap="square" rtlCol="0">
+            <a:spAutoFit/>
+          </a:bodyPr>
+          <a:lstStyle/>
+          <a:p>
+            <a:r>
+              <a:rPr lang="en-US" sz="1000" dirty="0" smtClean="0"/>
+              <a:t>False</a:t>
+            </a:r>
+            <a:endParaRPr lang="en-US" sz="1000" dirty="0"/>
+          </a:p>
+        </p:txBody>
+      </p:sp>
+      <p:cxnSp>
+        <p:nvCxnSpPr>
+          <p:cNvPr id="206" name="Elbow Connector 205"/>
+          <p:cNvCxnSpPr>
+            <a:stCxn id="118" idx="3"/>
+            <a:endCxn id="180" idx="0"/>
+          </p:cNvCxnSpPr>
+          <p:nvPr/>
+        </p:nvCxnSpPr>
+        <p:spPr>
+          <a:xfrm>
+            <a:off x="9481747" y="2738104"/>
+            <a:ext cx="1103867" cy="290580"/>
+          </a:xfrm>
+          <a:prstGeom prst="bentConnector2">
+            <a:avLst/>
+          </a:prstGeom>
+          <a:ln>
+            <a:tailEnd type="triangle"/>
+          </a:ln>
+        </p:spPr>
+        <p:style>
+          <a:lnRef idx="1">
+            <a:schemeClr val="accent1"/>
+          </a:lnRef>
+          <a:fillRef idx="0">
+            <a:schemeClr val="accent1"/>
+          </a:fillRef>
+          <a:effectRef idx="0">
+            <a:schemeClr val="accent1"/>
+          </a:effectRef>
+          <a:fontRef idx="minor">
+            <a:schemeClr val="tx1"/>
+          </a:fontRef>
+        </p:style>
+      </p:cxnSp>
     </p:spTree>
     <p:extLst>
       <p:ext uri="{BB962C8B-B14F-4D97-AF65-F5344CB8AC3E}">

</xml_diff>

<commit_message>
Update no_6 for AA1
</commit_message>
<xml_diff>
--- a/George_UwagbaleAA1.pptx
+++ b/George_UwagbaleAA1.pptx
@@ -9,6 +9,7 @@
     <p:sldId id="258" r:id="rId3"/>
     <p:sldId id="259" r:id="rId4"/>
     <p:sldId id="260" r:id="rId5"/>
+    <p:sldId id="261" r:id="rId6"/>
   </p:sldIdLst>
   <p:sldSz cx="12192000" cy="6858000"/>
   <p:notesSz cx="6858000" cy="9144000"/>
@@ -3015,7 +3016,7 @@
         <p:spPr>
           <a:xfrm>
             <a:off x="324196" y="648393"/>
-            <a:ext cx="2543696" cy="2308324"/>
+            <a:ext cx="2543696" cy="2492990"/>
           </a:xfrm>
           <a:prstGeom prst="rect">
             <a:avLst/>
@@ -3090,8 +3091,19 @@
           <a:p>
             <a:r>
               <a:rPr lang="en-GB" sz="1200" dirty="0" smtClean="0"/>
-              <a:t>    DISPLAY “Enter the value for c= “</a:t>
-            </a:r>
+              <a:t>    DISPLAY “Enter the value for c= </a:t>
+            </a:r>
+            <a:r>
+              <a:rPr lang="en-GB" sz="1200" dirty="0" smtClean="0"/>
+              <a:t>“</a:t>
+            </a:r>
+          </a:p>
+          <a:p>
+            <a:r>
+              <a:rPr lang="en-GB" sz="1200" dirty="0" smtClean="0"/>
+              <a:t>    INPUT c</a:t>
+            </a:r>
+            <a:endParaRPr lang="en-GB" sz="1200" dirty="0" smtClean="0"/>
           </a:p>
           <a:p>
             <a:r>
@@ -4231,6 +4243,860 @@
           <a:chExt cx="0" cy="0"/>
         </a:xfrm>
       </p:grpSpPr>
+      <mc:AlternateContent xmlns:mc="http://schemas.openxmlformats.org/markup-compatibility/2006">
+        <mc:Choice xmlns:a14="http://schemas.microsoft.com/office/drawing/2010/main" Requires="a14">
+          <p:sp>
+            <p:nvSpPr>
+              <p:cNvPr id="2" name="TextBox 1"/>
+              <p:cNvSpPr txBox="1"/>
+              <p:nvPr/>
+            </p:nvSpPr>
+            <p:spPr>
+              <a:xfrm>
+                <a:off x="324196" y="648393"/>
+                <a:ext cx="2543696" cy="4354077"/>
+              </a:xfrm>
+              <a:prstGeom prst="rect">
+                <a:avLst/>
+              </a:prstGeom>
+              <a:noFill/>
+            </p:spPr>
+            <p:txBody>
+              <a:bodyPr wrap="square" rtlCol="0">
+                <a:spAutoFit/>
+              </a:bodyPr>
+              <a:lstStyle/>
+              <a:p>
+                <a:r>
+                  <a:rPr lang="en-GB" sz="1000" dirty="0" smtClean="0"/>
+                  <a:t>BEGIN</a:t>
+                </a:r>
+              </a:p>
+              <a:p>
+                <a:r>
+                  <a:rPr lang="en-GB" sz="1000" dirty="0"/>
+                  <a:t> </a:t>
+                </a:r>
+                <a:r>
+                  <a:rPr lang="en-GB" sz="1000" dirty="0" smtClean="0"/>
+                  <a:t>   DECLARE </a:t>
+                </a:r>
+                <a:r>
+                  <a:rPr lang="en-GB" sz="1000" dirty="0" err="1" smtClean="0"/>
+                  <a:t>a,b,c</a:t>
+                </a:r>
+                <a:r>
+                  <a:rPr lang="en-GB" sz="1000" dirty="0" smtClean="0"/>
+                  <a:t>: INTEGER</a:t>
+                </a:r>
+              </a:p>
+              <a:p>
+                <a:r>
+                  <a:rPr lang="en-GB" sz="1000" dirty="0"/>
+                  <a:t> </a:t>
+                </a:r>
+                <a:r>
+                  <a:rPr lang="en-GB" sz="1000" dirty="0" smtClean="0"/>
+                  <a:t>   DISPLAY “Enter the value for </a:t>
+                </a:r>
+                <a:r>
+                  <a:rPr lang="en-GB" sz="1000" dirty="0" smtClean="0"/>
+                  <a:t>A= </a:t>
+                </a:r>
+                <a:r>
+                  <a:rPr lang="en-GB" sz="1000" dirty="0" smtClean="0"/>
+                  <a:t>“</a:t>
+                </a:r>
+              </a:p>
+              <a:p>
+                <a:r>
+                  <a:rPr lang="en-GB" sz="1000" dirty="0"/>
+                  <a:t> </a:t>
+                </a:r>
+                <a:r>
+                  <a:rPr lang="en-GB" sz="1000" dirty="0" smtClean="0"/>
+                  <a:t>   INPUT </a:t>
+                </a:r>
+                <a:r>
+                  <a:rPr lang="en-GB" sz="1000" dirty="0" smtClean="0"/>
+                  <a:t>A</a:t>
+                </a:r>
+                <a:endParaRPr lang="en-GB" sz="1000" dirty="0" smtClean="0"/>
+              </a:p>
+              <a:p>
+                <a:r>
+                  <a:rPr lang="en-GB" sz="1000" dirty="0"/>
+                  <a:t> </a:t>
+                </a:r>
+                <a:r>
+                  <a:rPr lang="en-GB" sz="1000" dirty="0" smtClean="0"/>
+                  <a:t>   DISPLAY “Enter the value for </a:t>
+                </a:r>
+                <a:r>
+                  <a:rPr lang="en-GB" sz="1000" dirty="0"/>
+                  <a:t>B</a:t>
+                </a:r>
+                <a:r>
+                  <a:rPr lang="en-GB" sz="1000" dirty="0" smtClean="0"/>
+                  <a:t>= </a:t>
+                </a:r>
+                <a:r>
+                  <a:rPr lang="en-GB" sz="1000" dirty="0" smtClean="0"/>
+                  <a:t>“</a:t>
+                </a:r>
+              </a:p>
+              <a:p>
+                <a:r>
+                  <a:rPr lang="en-GB" sz="1000" dirty="0" smtClean="0"/>
+                  <a:t>    INPUT </a:t>
+                </a:r>
+                <a:r>
+                  <a:rPr lang="en-GB" sz="1000" dirty="0" smtClean="0"/>
+                  <a:t>B</a:t>
+                </a:r>
+                <a:endParaRPr lang="en-GB" sz="1000" dirty="0" smtClean="0"/>
+              </a:p>
+              <a:p>
+                <a:r>
+                  <a:rPr lang="en-GB" sz="1000" dirty="0" smtClean="0"/>
+                  <a:t>    DISPLAY “Enter the value for </a:t>
+                </a:r>
+                <a:r>
+                  <a:rPr lang="en-GB" sz="1000" dirty="0" smtClean="0"/>
+                  <a:t>C= “</a:t>
+                </a:r>
+              </a:p>
+              <a:p>
+                <a:r>
+                  <a:rPr lang="en-GB" sz="1000" dirty="0"/>
+                  <a:t> </a:t>
+                </a:r>
+                <a:r>
+                  <a:rPr lang="en-GB" sz="1000" dirty="0" smtClean="0"/>
+                  <a:t>   INPUT C</a:t>
+                </a:r>
+              </a:p>
+              <a:p>
+                <a:r>
+                  <a:rPr lang="en-GB" sz="1000" dirty="0"/>
+                  <a:t> </a:t>
+                </a:r>
+                <a:r>
+                  <a:rPr lang="en-GB" sz="1000" dirty="0" smtClean="0"/>
+                  <a:t>   DISPLAY “Enter the value for D=“ </a:t>
+                </a:r>
+              </a:p>
+              <a:p>
+                <a:r>
+                  <a:rPr lang="en-GB" sz="1000" dirty="0"/>
+                  <a:t> </a:t>
+                </a:r>
+                <a:r>
+                  <a:rPr lang="en-GB" sz="1000" dirty="0" smtClean="0"/>
+                  <a:t>   INPUT D</a:t>
+                </a:r>
+              </a:p>
+              <a:p>
+                <a:r>
+                  <a:rPr lang="en-GB" sz="1000" dirty="0" smtClean="0"/>
+                  <a:t>    COMPUTE a1= B/A</a:t>
+                </a:r>
+                <a:br>
+                  <a:rPr lang="en-GB" sz="1000" dirty="0" smtClean="0"/>
+                </a:br>
+                <a:r>
+                  <a:rPr lang="en-GB" sz="1000" dirty="0" smtClean="0"/>
+                  <a:t>    COMPUTE a2=C/A</a:t>
+                </a:r>
+              </a:p>
+              <a:p>
+                <a:r>
+                  <a:rPr lang="en-GB" sz="1000" dirty="0"/>
+                  <a:t> </a:t>
+                </a:r>
+                <a:r>
+                  <a:rPr lang="en-GB" sz="1000" dirty="0" smtClean="0"/>
+                  <a:t>   COMPUTE a3=D/A</a:t>
+                </a:r>
+              </a:p>
+              <a:p>
+                <a:endParaRPr lang="en-GB" sz="1000" dirty="0"/>
+              </a:p>
+              <a:p>
+                <a:r>
+                  <a:rPr lang="en-GB" sz="1000" dirty="0" smtClean="0"/>
+                  <a:t>    COMPUTE Q =  </a:t>
+                </a:r>
+                <a14:m>
+                  <m:oMath xmlns:m="http://schemas.openxmlformats.org/officeDocument/2006/math">
+                    <m:f>
+                      <m:fPr>
+                        <m:ctrlPr>
+                          <a:rPr lang="en-GB" sz="1000" i="1" smtClean="0">
+                            <a:latin typeface="Cambria Math" panose="02040503050406030204" pitchFamily="18" charset="0"/>
+                          </a:rPr>
+                        </m:ctrlPr>
+                      </m:fPr>
+                      <m:num>
+                        <m:sSub>
+                          <m:sSubPr>
+                            <m:ctrlPr>
+                              <a:rPr lang="en-GB" sz="1000" i="1" smtClean="0">
+                                <a:latin typeface="Cambria Math" panose="02040503050406030204" pitchFamily="18" charset="0"/>
+                              </a:rPr>
+                            </m:ctrlPr>
+                          </m:sSubPr>
+                          <m:e>
+                            <m:r>
+                              <a:rPr lang="en-US" sz="1000" b="0" i="1" smtClean="0">
+                                <a:latin typeface="Cambria Math" panose="02040503050406030204" pitchFamily="18" charset="0"/>
+                              </a:rPr>
+                              <m:t>3</m:t>
+                            </m:r>
+                            <m:r>
+                              <a:rPr lang="en-US" sz="1000" b="0" i="1" smtClean="0">
+                                <a:latin typeface="Cambria Math" panose="02040503050406030204" pitchFamily="18" charset="0"/>
+                              </a:rPr>
+                              <m:t>𝑎</m:t>
+                            </m:r>
+                          </m:e>
+                          <m:sub>
+                            <m:r>
+                              <a:rPr lang="en-US" sz="1000" b="0" i="1" smtClean="0">
+                                <a:latin typeface="Cambria Math" panose="02040503050406030204" pitchFamily="18" charset="0"/>
+                              </a:rPr>
+                              <m:t>2</m:t>
+                            </m:r>
+                          </m:sub>
+                        </m:sSub>
+                        <m:r>
+                          <a:rPr lang="en-US" sz="1000" b="0" i="1" smtClean="0">
+                            <a:latin typeface="Cambria Math" panose="02040503050406030204" pitchFamily="18" charset="0"/>
+                          </a:rPr>
+                          <m:t> − </m:t>
+                        </m:r>
+                        <m:sSup>
+                          <m:sSupPr>
+                            <m:ctrlPr>
+                              <a:rPr lang="en-US" sz="1000" b="0" i="1" smtClean="0">
+                                <a:latin typeface="Cambria Math" panose="02040503050406030204" pitchFamily="18" charset="0"/>
+                              </a:rPr>
+                            </m:ctrlPr>
+                          </m:sSupPr>
+                          <m:e>
+                            <m:sSub>
+                              <m:sSubPr>
+                                <m:ctrlPr>
+                                  <a:rPr lang="en-US" sz="1000" b="0" i="1" smtClean="0">
+                                    <a:latin typeface="Cambria Math" panose="02040503050406030204" pitchFamily="18" charset="0"/>
+                                  </a:rPr>
+                                </m:ctrlPr>
+                              </m:sSubPr>
+                              <m:e>
+                                <m:r>
+                                  <a:rPr lang="en-US" sz="1000" b="0" i="1" smtClean="0">
+                                    <a:latin typeface="Cambria Math" panose="02040503050406030204" pitchFamily="18" charset="0"/>
+                                  </a:rPr>
+                                  <m:t>𝑎</m:t>
+                                </m:r>
+                              </m:e>
+                              <m:sub>
+                                <m:r>
+                                  <a:rPr lang="en-US" sz="1000" b="0" i="1" smtClean="0">
+                                    <a:latin typeface="Cambria Math" panose="02040503050406030204" pitchFamily="18" charset="0"/>
+                                  </a:rPr>
+                                  <m:t>1</m:t>
+                                </m:r>
+                              </m:sub>
+                            </m:sSub>
+                          </m:e>
+                          <m:sup>
+                            <m:r>
+                              <a:rPr lang="en-US" sz="1000" b="0" i="1" smtClean="0">
+                                <a:latin typeface="Cambria Math" panose="02040503050406030204" pitchFamily="18" charset="0"/>
+                              </a:rPr>
+                              <m:t>2</m:t>
+                            </m:r>
+                          </m:sup>
+                        </m:sSup>
+                        <m:r>
+                          <a:rPr lang="en-US" sz="1000" b="0" i="1" smtClean="0">
+                            <a:latin typeface="Cambria Math" panose="02040503050406030204" pitchFamily="18" charset="0"/>
+                          </a:rPr>
+                          <m:t> </m:t>
+                        </m:r>
+                      </m:num>
+                      <m:den>
+                        <m:r>
+                          <a:rPr lang="en-US" sz="1000" b="0" i="1" smtClean="0">
+                            <a:latin typeface="Cambria Math" panose="02040503050406030204" pitchFamily="18" charset="0"/>
+                          </a:rPr>
+                          <m:t>9</m:t>
+                        </m:r>
+                      </m:den>
+                    </m:f>
+                  </m:oMath>
+                </a14:m>
+                <a:endParaRPr lang="en-GB" sz="1000" dirty="0" smtClean="0"/>
+              </a:p>
+              <a:p>
+                <a:r>
+                  <a:rPr lang="en-GB" sz="1000" dirty="0" smtClean="0"/>
+                  <a:t>    COMPUTE R =</a:t>
+                </a:r>
+                <a14:m>
+                  <m:oMath xmlns:m="http://schemas.openxmlformats.org/officeDocument/2006/math">
+                    <m:f>
+                      <m:fPr>
+                        <m:ctrlPr>
+                          <a:rPr lang="en-GB" sz="1000" i="1" smtClean="0">
+                            <a:latin typeface="Cambria Math" panose="02040503050406030204" pitchFamily="18" charset="0"/>
+                          </a:rPr>
+                        </m:ctrlPr>
+                      </m:fPr>
+                      <m:num>
+                        <m:sSub>
+                          <m:sSubPr>
+                            <m:ctrlPr>
+                              <a:rPr lang="en-GB" sz="1000" i="1" smtClean="0">
+                                <a:latin typeface="Cambria Math" panose="02040503050406030204" pitchFamily="18" charset="0"/>
+                              </a:rPr>
+                            </m:ctrlPr>
+                          </m:sSubPr>
+                          <m:e>
+                            <m:r>
+                              <a:rPr lang="en-US" sz="1000" b="0" i="1" smtClean="0">
+                                <a:latin typeface="Cambria Math" panose="02040503050406030204" pitchFamily="18" charset="0"/>
+                              </a:rPr>
+                              <m:t>9</m:t>
+                            </m:r>
+                            <m:r>
+                              <a:rPr lang="en-US" sz="1000" b="0" i="1" smtClean="0">
+                                <a:latin typeface="Cambria Math" panose="02040503050406030204" pitchFamily="18" charset="0"/>
+                              </a:rPr>
+                              <m:t>𝑎</m:t>
+                            </m:r>
+                          </m:e>
+                          <m:sub>
+                            <m:r>
+                              <a:rPr lang="en-US" sz="1000" b="0" i="1" smtClean="0">
+                                <a:latin typeface="Cambria Math" panose="02040503050406030204" pitchFamily="18" charset="0"/>
+                              </a:rPr>
+                              <m:t>1</m:t>
+                            </m:r>
+                          </m:sub>
+                        </m:sSub>
+                        <m:sSub>
+                          <m:sSubPr>
+                            <m:ctrlPr>
+                              <a:rPr lang="en-US" sz="1000" b="0" i="1" smtClean="0">
+                                <a:latin typeface="Cambria Math" panose="02040503050406030204" pitchFamily="18" charset="0"/>
+                              </a:rPr>
+                            </m:ctrlPr>
+                          </m:sSubPr>
+                          <m:e>
+                            <m:r>
+                              <a:rPr lang="en-US" sz="1000" b="0" i="1" smtClean="0">
+                                <a:latin typeface="Cambria Math" panose="02040503050406030204" pitchFamily="18" charset="0"/>
+                              </a:rPr>
+                              <m:t>𝑎</m:t>
+                            </m:r>
+                          </m:e>
+                          <m:sub>
+                            <m:r>
+                              <a:rPr lang="en-US" sz="1000" b="0" i="1" smtClean="0">
+                                <a:latin typeface="Cambria Math" panose="02040503050406030204" pitchFamily="18" charset="0"/>
+                              </a:rPr>
+                              <m:t>2 </m:t>
+                            </m:r>
+                          </m:sub>
+                        </m:sSub>
+                        <m:r>
+                          <a:rPr lang="en-US" sz="1000" b="0" i="1" smtClean="0">
+                            <a:latin typeface="Cambria Math" panose="02040503050406030204" pitchFamily="18" charset="0"/>
+                          </a:rPr>
+                          <m:t>−27</m:t>
+                        </m:r>
+                        <m:sSub>
+                          <m:sSubPr>
+                            <m:ctrlPr>
+                              <a:rPr lang="en-US" sz="1000" b="0" i="1" smtClean="0">
+                                <a:latin typeface="Cambria Math" panose="02040503050406030204" pitchFamily="18" charset="0"/>
+                              </a:rPr>
+                            </m:ctrlPr>
+                          </m:sSubPr>
+                          <m:e>
+                            <m:r>
+                              <a:rPr lang="en-US" sz="1000" b="0" i="1" smtClean="0">
+                                <a:latin typeface="Cambria Math" panose="02040503050406030204" pitchFamily="18" charset="0"/>
+                              </a:rPr>
+                              <m:t>𝑎</m:t>
+                            </m:r>
+                          </m:e>
+                          <m:sub>
+                            <m:r>
+                              <a:rPr lang="en-US" sz="1000" b="0" i="1" smtClean="0">
+                                <a:latin typeface="Cambria Math" panose="02040503050406030204" pitchFamily="18" charset="0"/>
+                              </a:rPr>
+                              <m:t>3</m:t>
+                            </m:r>
+                          </m:sub>
+                        </m:sSub>
+                        <m:r>
+                          <a:rPr lang="en-US" sz="1000" b="0" i="1" smtClean="0">
+                            <a:latin typeface="Cambria Math" panose="02040503050406030204" pitchFamily="18" charset="0"/>
+                          </a:rPr>
+                          <m:t> −2</m:t>
+                        </m:r>
+                        <m:sSup>
+                          <m:sSupPr>
+                            <m:ctrlPr>
+                              <a:rPr lang="en-US" sz="1000" b="0" i="1" smtClean="0">
+                                <a:latin typeface="Cambria Math" panose="02040503050406030204" pitchFamily="18" charset="0"/>
+                              </a:rPr>
+                            </m:ctrlPr>
+                          </m:sSupPr>
+                          <m:e>
+                            <m:sSub>
+                              <m:sSubPr>
+                                <m:ctrlPr>
+                                  <a:rPr lang="en-US" sz="1000" b="0" i="1" smtClean="0">
+                                    <a:latin typeface="Cambria Math" panose="02040503050406030204" pitchFamily="18" charset="0"/>
+                                  </a:rPr>
+                                </m:ctrlPr>
+                              </m:sSubPr>
+                              <m:e>
+                                <m:r>
+                                  <a:rPr lang="en-US" sz="1000" b="0" i="1" smtClean="0">
+                                    <a:latin typeface="Cambria Math" panose="02040503050406030204" pitchFamily="18" charset="0"/>
+                                  </a:rPr>
+                                  <m:t>𝑎</m:t>
+                                </m:r>
+                              </m:e>
+                              <m:sub>
+                                <m:r>
+                                  <a:rPr lang="en-US" sz="1000" b="0" i="1" smtClean="0">
+                                    <a:latin typeface="Cambria Math" panose="02040503050406030204" pitchFamily="18" charset="0"/>
+                                  </a:rPr>
+                                  <m:t>1</m:t>
+                                </m:r>
+                              </m:sub>
+                            </m:sSub>
+                          </m:e>
+                          <m:sup>
+                            <m:r>
+                              <a:rPr lang="en-US" sz="1000" b="0" i="1" smtClean="0">
+                                <a:latin typeface="Cambria Math" panose="02040503050406030204" pitchFamily="18" charset="0"/>
+                              </a:rPr>
+                              <m:t>3</m:t>
+                            </m:r>
+                          </m:sup>
+                        </m:sSup>
+                      </m:num>
+                      <m:den>
+                        <m:r>
+                          <a:rPr lang="en-US" sz="1000" b="0" i="1" smtClean="0">
+                            <a:latin typeface="Cambria Math" panose="02040503050406030204" pitchFamily="18" charset="0"/>
+                          </a:rPr>
+                          <m:t>54</m:t>
+                        </m:r>
+                      </m:den>
+                    </m:f>
+                  </m:oMath>
+                </a14:m>
+                <a:endParaRPr lang="en-GB" sz="1000" dirty="0" smtClean="0"/>
+              </a:p>
+              <a:p>
+                <a:r>
+                  <a:rPr lang="en-GB" sz="1000" dirty="0"/>
+                  <a:t> </a:t>
+                </a:r>
+                <a:r>
+                  <a:rPr lang="en-GB" sz="1000" dirty="0" smtClean="0"/>
+                  <a:t>   COMPUTE S = </a:t>
+                </a:r>
+                <a14:m>
+                  <m:oMath xmlns:m="http://schemas.openxmlformats.org/officeDocument/2006/math">
+                    <m:rad>
+                      <m:radPr>
+                        <m:ctrlPr>
+                          <a:rPr lang="en-GB" sz="1000" i="1" smtClean="0">
+                            <a:latin typeface="Cambria Math" panose="02040503050406030204" pitchFamily="18" charset="0"/>
+                          </a:rPr>
+                        </m:ctrlPr>
+                      </m:radPr>
+                      <m:deg>
+                        <m:r>
+                          <m:rPr>
+                            <m:brk m:alnAt="7"/>
+                          </m:rPr>
+                          <a:rPr lang="en-US" sz="1000" b="0" i="1" smtClean="0">
+                            <a:latin typeface="Cambria Math" panose="02040503050406030204" pitchFamily="18" charset="0"/>
+                          </a:rPr>
+                          <m:t>3</m:t>
+                        </m:r>
+                      </m:deg>
+                      <m:e>
+                        <m:r>
+                          <a:rPr lang="en-US" sz="1000" b="0" i="1" smtClean="0">
+                            <a:latin typeface="Cambria Math" panose="02040503050406030204" pitchFamily="18" charset="0"/>
+                          </a:rPr>
+                          <m:t>𝑅</m:t>
+                        </m:r>
+                        <m:r>
+                          <a:rPr lang="en-US" sz="1000" b="0" i="1" smtClean="0">
+                            <a:latin typeface="Cambria Math" panose="02040503050406030204" pitchFamily="18" charset="0"/>
+                          </a:rPr>
+                          <m:t>+ </m:t>
+                        </m:r>
+                        <m:rad>
+                          <m:radPr>
+                            <m:degHide m:val="on"/>
+                            <m:ctrlPr>
+                              <a:rPr lang="en-US" sz="1000" b="0" i="1" smtClean="0">
+                                <a:latin typeface="Cambria Math" panose="02040503050406030204" pitchFamily="18" charset="0"/>
+                              </a:rPr>
+                            </m:ctrlPr>
+                          </m:radPr>
+                          <m:deg/>
+                          <m:e>
+                            <m:sSup>
+                              <m:sSupPr>
+                                <m:ctrlPr>
+                                  <a:rPr lang="en-US" sz="1000" b="0" i="1" smtClean="0">
+                                    <a:latin typeface="Cambria Math" panose="02040503050406030204" pitchFamily="18" charset="0"/>
+                                  </a:rPr>
+                                </m:ctrlPr>
+                              </m:sSupPr>
+                              <m:e>
+                                <m:r>
+                                  <a:rPr lang="en-US" sz="1000" b="0" i="1" smtClean="0">
+                                    <a:latin typeface="Cambria Math" panose="02040503050406030204" pitchFamily="18" charset="0"/>
+                                  </a:rPr>
+                                  <m:t>𝑄</m:t>
+                                </m:r>
+                              </m:e>
+                              <m:sup>
+                                <m:r>
+                                  <a:rPr lang="en-US" sz="1000" b="0" i="1" smtClean="0">
+                                    <a:latin typeface="Cambria Math" panose="02040503050406030204" pitchFamily="18" charset="0"/>
+                                  </a:rPr>
+                                  <m:t>3</m:t>
+                                </m:r>
+                              </m:sup>
+                            </m:sSup>
+                            <m:r>
+                              <a:rPr lang="en-US" sz="1000" b="0" i="1" smtClean="0">
+                                <a:latin typeface="Cambria Math" panose="02040503050406030204" pitchFamily="18" charset="0"/>
+                              </a:rPr>
+                              <m:t> − </m:t>
+                            </m:r>
+                            <m:sSup>
+                              <m:sSupPr>
+                                <m:ctrlPr>
+                                  <a:rPr lang="en-US" sz="1000" b="0" i="1" smtClean="0">
+                                    <a:latin typeface="Cambria Math" panose="02040503050406030204" pitchFamily="18" charset="0"/>
+                                  </a:rPr>
+                                </m:ctrlPr>
+                              </m:sSupPr>
+                              <m:e>
+                                <m:r>
+                                  <a:rPr lang="en-US" sz="1000" b="0" i="1" smtClean="0">
+                                    <a:latin typeface="Cambria Math" panose="02040503050406030204" pitchFamily="18" charset="0"/>
+                                  </a:rPr>
+                                  <m:t>𝑅</m:t>
+                                </m:r>
+                              </m:e>
+                              <m:sup>
+                                <m:r>
+                                  <a:rPr lang="en-US" sz="1000" b="0" i="1" smtClean="0">
+                                    <a:latin typeface="Cambria Math" panose="02040503050406030204" pitchFamily="18" charset="0"/>
+                                  </a:rPr>
+                                  <m:t>2</m:t>
+                                </m:r>
+                              </m:sup>
+                            </m:sSup>
+                          </m:e>
+                        </m:rad>
+                      </m:e>
+                    </m:rad>
+                  </m:oMath>
+                </a14:m>
+                <a:endParaRPr lang="en-US" sz="1000" dirty="0" smtClean="0"/>
+              </a:p>
+              <a:p>
+                <a:r>
+                  <a:rPr lang="en-GB" sz="1000" dirty="0"/>
+                  <a:t>    COMPUTE T = </a:t>
+                </a:r>
+                <a:r>
+                  <a:rPr lang="en-GB" sz="1000" dirty="0" smtClean="0"/>
+                  <a:t> </a:t>
+                </a:r>
+                <a14:m>
+                  <m:oMath xmlns:m="http://schemas.openxmlformats.org/officeDocument/2006/math">
+                    <m:rad>
+                      <m:radPr>
+                        <m:ctrlPr>
+                          <a:rPr lang="en-GB" sz="1000" i="1">
+                            <a:latin typeface="Cambria Math" panose="02040503050406030204" pitchFamily="18" charset="0"/>
+                          </a:rPr>
+                        </m:ctrlPr>
+                      </m:radPr>
+                      <m:deg>
+                        <m:r>
+                          <m:rPr>
+                            <m:brk m:alnAt="7"/>
+                          </m:rPr>
+                          <a:rPr lang="en-US" sz="1000" i="1">
+                            <a:latin typeface="Cambria Math" panose="02040503050406030204" pitchFamily="18" charset="0"/>
+                          </a:rPr>
+                          <m:t>3</m:t>
+                        </m:r>
+                      </m:deg>
+                      <m:e>
+                        <m:r>
+                          <a:rPr lang="en-US" sz="1000" i="1">
+                            <a:latin typeface="Cambria Math" panose="02040503050406030204" pitchFamily="18" charset="0"/>
+                          </a:rPr>
+                          <m:t>𝑅</m:t>
+                        </m:r>
+                        <m:r>
+                          <a:rPr lang="en-US" sz="1000" b="0" i="1" smtClean="0">
+                            <a:latin typeface="Cambria Math" panose="02040503050406030204" pitchFamily="18" charset="0"/>
+                          </a:rPr>
+                          <m:t>−</m:t>
+                        </m:r>
+                        <m:r>
+                          <a:rPr lang="en-US" sz="1000" i="1">
+                            <a:latin typeface="Cambria Math" panose="02040503050406030204" pitchFamily="18" charset="0"/>
+                          </a:rPr>
+                          <m:t> </m:t>
+                        </m:r>
+                        <m:rad>
+                          <m:radPr>
+                            <m:degHide m:val="on"/>
+                            <m:ctrlPr>
+                              <a:rPr lang="en-US" sz="1000" i="1">
+                                <a:latin typeface="Cambria Math" panose="02040503050406030204" pitchFamily="18" charset="0"/>
+                              </a:rPr>
+                            </m:ctrlPr>
+                          </m:radPr>
+                          <m:deg/>
+                          <m:e>
+                            <m:sSup>
+                              <m:sSupPr>
+                                <m:ctrlPr>
+                                  <a:rPr lang="en-US" sz="1000" i="1">
+                                    <a:latin typeface="Cambria Math" panose="02040503050406030204" pitchFamily="18" charset="0"/>
+                                  </a:rPr>
+                                </m:ctrlPr>
+                              </m:sSupPr>
+                              <m:e>
+                                <m:r>
+                                  <a:rPr lang="en-US" sz="1000" i="1">
+                                    <a:latin typeface="Cambria Math" panose="02040503050406030204" pitchFamily="18" charset="0"/>
+                                  </a:rPr>
+                                  <m:t>𝑄</m:t>
+                                </m:r>
+                              </m:e>
+                              <m:sup>
+                                <m:r>
+                                  <a:rPr lang="en-US" sz="1000" i="1">
+                                    <a:latin typeface="Cambria Math" panose="02040503050406030204" pitchFamily="18" charset="0"/>
+                                  </a:rPr>
+                                  <m:t>3</m:t>
+                                </m:r>
+                              </m:sup>
+                            </m:sSup>
+                            <m:r>
+                              <a:rPr lang="en-US" sz="1000" i="1">
+                                <a:latin typeface="Cambria Math" panose="02040503050406030204" pitchFamily="18" charset="0"/>
+                              </a:rPr>
+                              <m:t> − </m:t>
+                            </m:r>
+                            <m:sSup>
+                              <m:sSupPr>
+                                <m:ctrlPr>
+                                  <a:rPr lang="en-US" sz="1000" i="1">
+                                    <a:latin typeface="Cambria Math" panose="02040503050406030204" pitchFamily="18" charset="0"/>
+                                  </a:rPr>
+                                </m:ctrlPr>
+                              </m:sSupPr>
+                              <m:e>
+                                <m:r>
+                                  <a:rPr lang="en-US" sz="1000" i="1">
+                                    <a:latin typeface="Cambria Math" panose="02040503050406030204" pitchFamily="18" charset="0"/>
+                                  </a:rPr>
+                                  <m:t>𝑅</m:t>
+                                </m:r>
+                              </m:e>
+                              <m:sup>
+                                <m:r>
+                                  <a:rPr lang="en-US" sz="1000" i="1">
+                                    <a:latin typeface="Cambria Math" panose="02040503050406030204" pitchFamily="18" charset="0"/>
+                                  </a:rPr>
+                                  <m:t>2</m:t>
+                                </m:r>
+                              </m:sup>
+                            </m:sSup>
+                          </m:e>
+                        </m:rad>
+                      </m:e>
+                    </m:rad>
+                  </m:oMath>
+                </a14:m>
+                <a:endParaRPr lang="en-GB" sz="1000" dirty="0" smtClean="0"/>
+              </a:p>
+              <a:p>
+                <a:r>
+                  <a:rPr lang="en-GB" sz="1000" dirty="0"/>
+                  <a:t> </a:t>
+                </a:r>
+                <a:r>
+                  <a:rPr lang="en-GB" sz="1000" dirty="0" smtClean="0"/>
+                  <a:t>   COMPUTE x1 = S + T -</a:t>
+                </a:r>
+                <a14:m>
+                  <m:oMath xmlns:m="http://schemas.openxmlformats.org/officeDocument/2006/math">
+                    <m:f>
+                      <m:fPr>
+                        <m:ctrlPr>
+                          <a:rPr lang="en-GB" sz="1000" i="1" smtClean="0">
+                            <a:latin typeface="Cambria Math" panose="02040503050406030204" pitchFamily="18" charset="0"/>
+                          </a:rPr>
+                        </m:ctrlPr>
+                      </m:fPr>
+                      <m:num>
+                        <m:r>
+                          <a:rPr lang="en-US" sz="1000" b="0" i="1" smtClean="0">
+                            <a:latin typeface="Cambria Math" panose="02040503050406030204" pitchFamily="18" charset="0"/>
+                          </a:rPr>
+                          <m:t>1</m:t>
+                        </m:r>
+                      </m:num>
+                      <m:den>
+                        <m:r>
+                          <a:rPr lang="en-US" sz="1000" b="0" i="1" smtClean="0">
+                            <a:latin typeface="Cambria Math" panose="02040503050406030204" pitchFamily="18" charset="0"/>
+                          </a:rPr>
+                          <m:t>2</m:t>
+                        </m:r>
+                      </m:den>
+                    </m:f>
+                    <m:sSub>
+                      <m:sSubPr>
+                        <m:ctrlPr>
+                          <a:rPr lang="en-GB" sz="1000" i="1" smtClean="0">
+                            <a:latin typeface="Cambria Math" panose="02040503050406030204" pitchFamily="18" charset="0"/>
+                          </a:rPr>
+                        </m:ctrlPr>
+                      </m:sSubPr>
+                      <m:e>
+                        <m:r>
+                          <a:rPr lang="en-US" sz="1000" b="0" i="1" smtClean="0">
+                            <a:latin typeface="Cambria Math" panose="02040503050406030204" pitchFamily="18" charset="0"/>
+                          </a:rPr>
+                          <m:t>𝑎</m:t>
+                        </m:r>
+                      </m:e>
+                      <m:sub>
+                        <m:r>
+                          <a:rPr lang="en-US" sz="1000" b="0" i="1" smtClean="0">
+                            <a:latin typeface="Cambria Math" panose="02040503050406030204" pitchFamily="18" charset="0"/>
+                          </a:rPr>
+                          <m:t>1</m:t>
+                        </m:r>
+                      </m:sub>
+                    </m:sSub>
+                  </m:oMath>
+                </a14:m>
+                <a:endParaRPr lang="en-GB" sz="1000" dirty="0" smtClean="0"/>
+              </a:p>
+              <a:p>
+                <a:r>
+                  <a:rPr lang="en-GB" sz="1000" dirty="0"/>
+                  <a:t> </a:t>
+                </a:r>
+                <a:r>
+                  <a:rPr lang="en-GB" sz="1000" dirty="0" smtClean="0"/>
+                  <a:t>   x1 = (-b + (b^2 – 4ac)^1/2)/ 2a</a:t>
+                </a:r>
+              </a:p>
+              <a:p>
+                <a:r>
+                  <a:rPr lang="en-GB" sz="1000" dirty="0" smtClean="0"/>
+                  <a:t>    x2 =  (-b - (b^2 – 4ac)^1/2)/ 2a</a:t>
+                </a:r>
+              </a:p>
+              <a:p>
+                <a:r>
+                  <a:rPr lang="en-GB" sz="1000" dirty="0"/>
+                  <a:t> </a:t>
+                </a:r>
+                <a:r>
+                  <a:rPr lang="en-GB" sz="1000" dirty="0" smtClean="0"/>
+                  <a:t>   DISPLAY x1</a:t>
+                </a:r>
+              </a:p>
+              <a:p>
+                <a:r>
+                  <a:rPr lang="en-GB" sz="1000" dirty="0"/>
+                  <a:t> </a:t>
+                </a:r>
+                <a:r>
+                  <a:rPr lang="en-GB" sz="1000" dirty="0" smtClean="0"/>
+                  <a:t>   DISPLAY x2</a:t>
+                </a:r>
+              </a:p>
+              <a:p>
+                <a:r>
+                  <a:rPr lang="en-GB" sz="1000" dirty="0" smtClean="0"/>
+                  <a:t>END</a:t>
+                </a:r>
+              </a:p>
+            </p:txBody>
+          </p:sp>
+        </mc:Choice>
+        <mc:Fallback>
+          <p:sp>
+            <p:nvSpPr>
+              <p:cNvPr id="2" name="TextBox 1"/>
+              <p:cNvSpPr txBox="1">
+                <a:spLocks noRot="1" noChangeAspect="1" noMove="1" noResize="1" noEditPoints="1" noAdjustHandles="1" noChangeArrowheads="1" noChangeShapeType="1" noTextEdit="1"/>
+              </p:cNvSpPr>
+              <p:nvPr/>
+            </p:nvSpPr>
+            <p:spPr>
+              <a:xfrm>
+                <a:off x="324196" y="648393"/>
+                <a:ext cx="2543696" cy="4354077"/>
+              </a:xfrm>
+              <a:prstGeom prst="rect">
+                <a:avLst/>
+              </a:prstGeom>
+              <a:blipFill>
+                <a:blip r:embed="rId2"/>
+                <a:stretch>
+                  <a:fillRect/>
+                </a:stretch>
+              </a:blipFill>
+            </p:spPr>
+            <p:txBody>
+              <a:bodyPr/>
+              <a:lstStyle/>
+              <a:p>
+                <a:r>
+                  <a:rPr lang="en-US">
+                    <a:noFill/>
+                  </a:rPr>
+                  <a:t> </a:t>
+                </a:r>
+              </a:p>
+            </p:txBody>
+          </p:sp>
+        </mc:Fallback>
+      </mc:AlternateContent>
     </p:spTree>
     <p:extLst>
       <p:ext uri="{BB962C8B-B14F-4D97-AF65-F5344CB8AC3E}">
@@ -6028,8 +6894,8 @@
         </p:nvSpPr>
         <p:spPr>
           <a:xfrm>
-            <a:off x="214183" y="238897"/>
-            <a:ext cx="2660821" cy="261610"/>
+            <a:off x="214183" y="127686"/>
+            <a:ext cx="2660821" cy="430887"/>
           </a:xfrm>
           <a:prstGeom prst="rect">
             <a:avLst/>
@@ -6045,6 +6911,16 @@
             <a:r>
               <a:rPr lang="en-US" sz="1100" dirty="0" smtClean="0"/>
               <a:t>4. Find the GCD and LCM of two numbers.</a:t>
+            </a:r>
+          </a:p>
+          <a:p>
+            <a:r>
+              <a:rPr lang="en-US" sz="1100" dirty="0"/>
+              <a:t>	</a:t>
+            </a:r>
+            <a:r>
+              <a:rPr lang="en-US" sz="1100" dirty="0" smtClean="0"/>
+              <a:t>(GCD)</a:t>
             </a:r>
             <a:endParaRPr lang="en-US" sz="1100" dirty="0"/>
           </a:p>
@@ -9481,6 +10357,3980 @@
   <p:clrMapOvr>
     <a:masterClrMapping/>
   </p:clrMapOvr>
+</p:sld>
+</file>
+
+<file path=ppt/slides/slide5.xml><?xml version="1.0" encoding="utf-8"?>
+<p:sld xmlns:a="http://schemas.openxmlformats.org/drawingml/2006/main" xmlns:r="http://schemas.openxmlformats.org/officeDocument/2006/relationships" xmlns:p="http://schemas.openxmlformats.org/presentationml/2006/main">
+  <p:cSld>
+    <p:spTree>
+      <p:nvGrpSpPr>
+        <p:cNvPr id="1" name=""/>
+        <p:cNvGrpSpPr/>
+        <p:nvPr/>
+      </p:nvGrpSpPr>
+      <p:grpSpPr>
+        <a:xfrm>
+          <a:off x="0" y="0"/>
+          <a:ext cx="0" cy="0"/>
+          <a:chOff x="0" y="0"/>
+          <a:chExt cx="0" cy="0"/>
+        </a:xfrm>
+      </p:grpSpPr>
+      <p:sp>
+        <p:nvSpPr>
+          <p:cNvPr id="4" name="TextBox 3"/>
+          <p:cNvSpPr txBox="1"/>
+          <p:nvPr/>
+        </p:nvSpPr>
+        <p:spPr>
+          <a:xfrm>
+            <a:off x="-65922" y="475293"/>
+            <a:ext cx="2615516" cy="6863417"/>
+          </a:xfrm>
+          <a:prstGeom prst="rect">
+            <a:avLst/>
+          </a:prstGeom>
+          <a:noFill/>
+        </p:spPr>
+        <p:txBody>
+          <a:bodyPr wrap="square" rtlCol="0">
+            <a:spAutoFit/>
+          </a:bodyPr>
+          <a:lstStyle/>
+          <a:p>
+            <a:r>
+              <a:rPr lang="en-US" sz="1000" dirty="0" smtClean="0"/>
+              <a:t>BEGIN</a:t>
+            </a:r>
+          </a:p>
+          <a:p>
+            <a:r>
+              <a:rPr lang="en-US" sz="1000" dirty="0"/>
+              <a:t> </a:t>
+            </a:r>
+            <a:r>
+              <a:rPr lang="en-US" sz="1000" dirty="0" smtClean="0"/>
+              <a:t>   DISPLAY “Enter the value for a=“</a:t>
+            </a:r>
+          </a:p>
+          <a:p>
+            <a:r>
+              <a:rPr lang="en-US" sz="1000" dirty="0"/>
+              <a:t> </a:t>
+            </a:r>
+            <a:r>
+              <a:rPr lang="en-US" sz="1000" dirty="0" smtClean="0"/>
+              <a:t>   INPUT a</a:t>
+            </a:r>
+          </a:p>
+          <a:p>
+            <a:r>
+              <a:rPr lang="en-US" sz="1000" dirty="0"/>
+              <a:t> </a:t>
+            </a:r>
+            <a:r>
+              <a:rPr lang="en-US" sz="1000" dirty="0" smtClean="0"/>
+              <a:t>   DISPLAY “Enter the value for b=“ </a:t>
+            </a:r>
+          </a:p>
+          <a:p>
+            <a:r>
+              <a:rPr lang="en-US" sz="1000" dirty="0"/>
+              <a:t> </a:t>
+            </a:r>
+            <a:r>
+              <a:rPr lang="en-US" sz="1000" dirty="0" smtClean="0"/>
+              <a:t>   INPUT b</a:t>
+            </a:r>
+          </a:p>
+          <a:p>
+            <a:r>
+              <a:rPr lang="en-US" sz="1000" dirty="0" smtClean="0"/>
+              <a:t>    DECLARE d : INTEGER</a:t>
+            </a:r>
+          </a:p>
+          <a:p>
+            <a:r>
+              <a:rPr lang="en-US" sz="1000" dirty="0" smtClean="0"/>
+              <a:t>    IF a &gt; b THEN</a:t>
+            </a:r>
+          </a:p>
+          <a:p>
+            <a:r>
+              <a:rPr lang="en-US" sz="1000" dirty="0" smtClean="0"/>
+              <a:t>        d = a – b</a:t>
+            </a:r>
+          </a:p>
+          <a:p>
+            <a:r>
+              <a:rPr lang="en-US" sz="1000" dirty="0" smtClean="0"/>
+              <a:t>        </a:t>
+            </a:r>
+            <a:r>
+              <a:rPr lang="en-US" sz="1000" dirty="0"/>
+              <a:t> IF (a mod d) and (b mod d) = 0 </a:t>
+            </a:r>
+            <a:r>
+              <a:rPr lang="en-US" sz="1000" dirty="0" smtClean="0"/>
+              <a:t>THEN</a:t>
+            </a:r>
+          </a:p>
+          <a:p>
+            <a:r>
+              <a:rPr lang="en-US" sz="1000" dirty="0"/>
+              <a:t> </a:t>
+            </a:r>
+            <a:r>
+              <a:rPr lang="en-US" sz="1000" dirty="0" smtClean="0"/>
+              <a:t>           e = (a * b)/ c</a:t>
+            </a:r>
+            <a:endParaRPr lang="en-US" sz="1000" dirty="0"/>
+          </a:p>
+          <a:p>
+            <a:r>
+              <a:rPr lang="en-US" sz="1000" dirty="0"/>
+              <a:t>        </a:t>
+            </a:r>
+            <a:r>
+              <a:rPr lang="en-US" sz="1000" dirty="0" smtClean="0"/>
+              <a:t>    DISPLAY “e </a:t>
+            </a:r>
+            <a:r>
+              <a:rPr lang="en-US" sz="1000" dirty="0"/>
+              <a:t>is the </a:t>
+            </a:r>
+            <a:r>
+              <a:rPr lang="en-US" sz="1000" dirty="0" smtClean="0"/>
+              <a:t>LCM”</a:t>
+            </a:r>
+            <a:endParaRPr lang="en-US" sz="1000" dirty="0"/>
+          </a:p>
+          <a:p>
+            <a:r>
+              <a:rPr lang="en-US" sz="1000" dirty="0"/>
+              <a:t>    </a:t>
+            </a:r>
+            <a:r>
+              <a:rPr lang="en-US" sz="1000" dirty="0" smtClean="0"/>
+              <a:t>     ELSE</a:t>
+            </a:r>
+            <a:endParaRPr lang="en-US" sz="1000" dirty="0"/>
+          </a:p>
+          <a:p>
+            <a:r>
+              <a:rPr lang="en-US" sz="1000" dirty="0"/>
+              <a:t>        </a:t>
+            </a:r>
+            <a:r>
+              <a:rPr lang="en-US" sz="1000" dirty="0" smtClean="0"/>
+              <a:t>    c </a:t>
+            </a:r>
+            <a:r>
+              <a:rPr lang="en-US" sz="1000" dirty="0"/>
+              <a:t>= d</a:t>
+            </a:r>
+          </a:p>
+          <a:p>
+            <a:r>
+              <a:rPr lang="en-US" sz="1000" dirty="0"/>
+              <a:t>        </a:t>
+            </a:r>
+            <a:r>
+              <a:rPr lang="en-US" sz="1000" dirty="0" smtClean="0"/>
+              <a:t>    WHILE </a:t>
+            </a:r>
+            <a:r>
+              <a:rPr lang="en-US" sz="1000" dirty="0"/>
+              <a:t>c !=0</a:t>
+            </a:r>
+          </a:p>
+          <a:p>
+            <a:r>
+              <a:rPr lang="en-US" sz="1000" dirty="0"/>
+              <a:t>            </a:t>
+            </a:r>
+            <a:r>
+              <a:rPr lang="en-US" sz="1000" dirty="0" smtClean="0"/>
+              <a:t>    IF </a:t>
+            </a:r>
+            <a:r>
+              <a:rPr lang="en-US" sz="1000" dirty="0"/>
+              <a:t>(a mod c) and (b mod c) = 0 </a:t>
+            </a:r>
+            <a:r>
+              <a:rPr lang="en-US" sz="1000" dirty="0" smtClean="0"/>
+              <a:t>THEN</a:t>
+            </a:r>
+          </a:p>
+          <a:p>
+            <a:r>
+              <a:rPr lang="en-US" sz="1000" dirty="0"/>
+              <a:t> </a:t>
+            </a:r>
+            <a:r>
+              <a:rPr lang="en-US" sz="1000" dirty="0" smtClean="0"/>
+              <a:t>                   e = (a * b) /c </a:t>
+            </a:r>
+            <a:endParaRPr lang="en-US" sz="1000" dirty="0"/>
+          </a:p>
+          <a:p>
+            <a:r>
+              <a:rPr lang="en-US" sz="1000" dirty="0"/>
+              <a:t>                </a:t>
+            </a:r>
+            <a:r>
+              <a:rPr lang="en-US" sz="1000" dirty="0" smtClean="0"/>
+              <a:t>    DISPLAY “ e is </a:t>
+            </a:r>
+            <a:r>
+              <a:rPr lang="en-US" sz="1000" dirty="0"/>
+              <a:t>the </a:t>
+            </a:r>
+            <a:r>
+              <a:rPr lang="en-US" sz="1000" dirty="0" smtClean="0"/>
+              <a:t>LCM”</a:t>
+            </a:r>
+            <a:endParaRPr lang="en-US" sz="1000" dirty="0"/>
+          </a:p>
+          <a:p>
+            <a:r>
+              <a:rPr lang="en-US" sz="1000" dirty="0"/>
+              <a:t>                </a:t>
+            </a:r>
+            <a:r>
+              <a:rPr lang="en-US" sz="1000" dirty="0" smtClean="0"/>
+              <a:t>    END</a:t>
+            </a:r>
+            <a:endParaRPr lang="en-US" sz="1000" dirty="0"/>
+          </a:p>
+          <a:p>
+            <a:r>
+              <a:rPr lang="en-US" sz="1000" dirty="0"/>
+              <a:t>            </a:t>
+            </a:r>
+            <a:r>
+              <a:rPr lang="en-US" sz="1000" dirty="0" smtClean="0"/>
+              <a:t>    ELSE</a:t>
+            </a:r>
+            <a:endParaRPr lang="en-US" sz="1000" dirty="0"/>
+          </a:p>
+          <a:p>
+            <a:r>
+              <a:rPr lang="en-US" sz="1000" dirty="0"/>
+              <a:t>                </a:t>
+            </a:r>
+            <a:r>
+              <a:rPr lang="en-US" sz="1000" dirty="0" smtClean="0"/>
+              <a:t>    DECREMENT </a:t>
+            </a:r>
+            <a:r>
+              <a:rPr lang="en-US" sz="1000" dirty="0"/>
+              <a:t>c by 1</a:t>
+            </a:r>
+          </a:p>
+          <a:p>
+            <a:r>
+              <a:rPr lang="en-US" sz="1000" dirty="0"/>
+              <a:t>           </a:t>
+            </a:r>
+            <a:r>
+              <a:rPr lang="en-US" sz="1000" dirty="0" smtClean="0"/>
+              <a:t>     ENDIF</a:t>
+            </a:r>
+            <a:endParaRPr lang="en-US" sz="1000" dirty="0"/>
+          </a:p>
+          <a:p>
+            <a:r>
+              <a:rPr lang="en-US" sz="1000" dirty="0"/>
+              <a:t>        </a:t>
+            </a:r>
+            <a:r>
+              <a:rPr lang="en-US" sz="1000" dirty="0" smtClean="0"/>
+              <a:t>    ENDWHILE</a:t>
+            </a:r>
+            <a:endParaRPr lang="en-US" sz="1000" dirty="0"/>
+          </a:p>
+          <a:p>
+            <a:r>
+              <a:rPr lang="en-US" sz="1000" dirty="0"/>
+              <a:t>    </a:t>
+            </a:r>
+            <a:r>
+              <a:rPr lang="en-US" sz="1000" dirty="0" smtClean="0"/>
+              <a:t>    ENDIF</a:t>
+            </a:r>
+          </a:p>
+          <a:p>
+            <a:endParaRPr lang="en-US" sz="1000" dirty="0" smtClean="0"/>
+          </a:p>
+          <a:p>
+            <a:r>
+              <a:rPr lang="en-US" sz="1000" dirty="0"/>
+              <a:t> </a:t>
+            </a:r>
+            <a:r>
+              <a:rPr lang="en-US" sz="1000" dirty="0" smtClean="0"/>
+              <a:t>   ELSE</a:t>
+            </a:r>
+          </a:p>
+          <a:p>
+            <a:r>
+              <a:rPr lang="en-US" sz="1000" dirty="0"/>
+              <a:t> </a:t>
+            </a:r>
+            <a:r>
+              <a:rPr lang="en-US" sz="1000" dirty="0" smtClean="0"/>
+              <a:t>       d = b – a</a:t>
+            </a:r>
+          </a:p>
+          <a:p>
+            <a:r>
+              <a:rPr lang="en-US" sz="1000" dirty="0"/>
+              <a:t> </a:t>
+            </a:r>
+            <a:r>
+              <a:rPr lang="en-US" sz="1000" dirty="0" smtClean="0"/>
+              <a:t>       </a:t>
+            </a:r>
+            <a:r>
+              <a:rPr lang="en-US" sz="1000" dirty="0"/>
+              <a:t>IF (a mod d) and (b mod d) = 0 </a:t>
+            </a:r>
+            <a:r>
+              <a:rPr lang="en-US" sz="1000" dirty="0" smtClean="0"/>
+              <a:t>THEN</a:t>
+            </a:r>
+          </a:p>
+          <a:p>
+            <a:r>
+              <a:rPr lang="en-US" sz="1000" dirty="0"/>
+              <a:t> </a:t>
+            </a:r>
+            <a:r>
+              <a:rPr lang="en-US" sz="1000" dirty="0" smtClean="0"/>
+              <a:t>           e = (a * b)/c</a:t>
+            </a:r>
+            <a:endParaRPr lang="en-US" sz="1000" dirty="0"/>
+          </a:p>
+          <a:p>
+            <a:r>
+              <a:rPr lang="en-US" sz="1000" dirty="0" smtClean="0"/>
+              <a:t>            DISPLAY “e is the LCM”</a:t>
+            </a:r>
+          </a:p>
+          <a:p>
+            <a:r>
+              <a:rPr lang="en-US" sz="1000" dirty="0" smtClean="0"/>
+              <a:t>        ELSE</a:t>
+            </a:r>
+          </a:p>
+          <a:p>
+            <a:r>
+              <a:rPr lang="en-US" sz="1000" dirty="0" smtClean="0"/>
+              <a:t>            </a:t>
+            </a:r>
+            <a:r>
+              <a:rPr lang="en-US" sz="1000" dirty="0"/>
+              <a:t>c = d</a:t>
+            </a:r>
+          </a:p>
+          <a:p>
+            <a:r>
+              <a:rPr lang="en-US" sz="1000" dirty="0"/>
+              <a:t>            WHILE c !=0</a:t>
+            </a:r>
+          </a:p>
+          <a:p>
+            <a:r>
+              <a:rPr lang="en-US" sz="1000" dirty="0"/>
+              <a:t>                IF (a mod c) and (b mod c) = 0 </a:t>
+            </a:r>
+            <a:r>
+              <a:rPr lang="en-US" sz="1000" dirty="0" smtClean="0"/>
+              <a:t>THEN</a:t>
+            </a:r>
+          </a:p>
+          <a:p>
+            <a:r>
+              <a:rPr lang="en-US" sz="1000" dirty="0"/>
+              <a:t> </a:t>
+            </a:r>
+            <a:r>
+              <a:rPr lang="en-US" sz="1000" dirty="0" smtClean="0"/>
+              <a:t>                   e = (a * b)/c </a:t>
+            </a:r>
+            <a:endParaRPr lang="en-US" sz="1000" dirty="0"/>
+          </a:p>
+          <a:p>
+            <a:r>
+              <a:rPr lang="en-US" sz="1000" dirty="0"/>
+              <a:t>                    DISPLAY </a:t>
+            </a:r>
+            <a:r>
+              <a:rPr lang="en-US" sz="1000" dirty="0" smtClean="0"/>
+              <a:t>“e </a:t>
+            </a:r>
+            <a:r>
+              <a:rPr lang="en-US" sz="1000" dirty="0"/>
+              <a:t>is the </a:t>
+            </a:r>
+            <a:r>
+              <a:rPr lang="en-US" sz="1000" dirty="0" smtClean="0"/>
+              <a:t>LCM”</a:t>
+            </a:r>
+            <a:endParaRPr lang="en-US" sz="1000" dirty="0"/>
+          </a:p>
+          <a:p>
+            <a:r>
+              <a:rPr lang="en-US" sz="1000" dirty="0"/>
+              <a:t>                    END</a:t>
+            </a:r>
+          </a:p>
+          <a:p>
+            <a:r>
+              <a:rPr lang="en-US" sz="1000" dirty="0"/>
+              <a:t>                ELSE</a:t>
+            </a:r>
+          </a:p>
+          <a:p>
+            <a:r>
+              <a:rPr lang="en-US" sz="1000" dirty="0"/>
+              <a:t>                    DECREMENT c by 1</a:t>
+            </a:r>
+          </a:p>
+          <a:p>
+            <a:r>
+              <a:rPr lang="en-US" sz="1000" dirty="0"/>
+              <a:t>                ENDIF</a:t>
+            </a:r>
+          </a:p>
+          <a:p>
+            <a:r>
+              <a:rPr lang="en-US" sz="1000" dirty="0"/>
+              <a:t>            ENDWHILE</a:t>
+            </a:r>
+          </a:p>
+          <a:p>
+            <a:r>
+              <a:rPr lang="en-US" sz="1000" dirty="0"/>
+              <a:t>        </a:t>
+            </a:r>
+            <a:r>
+              <a:rPr lang="en-US" sz="1000" dirty="0" smtClean="0"/>
+              <a:t>ENDIF</a:t>
+            </a:r>
+          </a:p>
+          <a:p>
+            <a:r>
+              <a:rPr lang="en-US" sz="1000" dirty="0" smtClean="0"/>
+              <a:t>        </a:t>
+            </a:r>
+          </a:p>
+          <a:p>
+            <a:r>
+              <a:rPr lang="en-US" sz="1000" dirty="0" smtClean="0"/>
+              <a:t>    ENDIF</a:t>
+            </a:r>
+          </a:p>
+          <a:p>
+            <a:r>
+              <a:rPr lang="en-US" sz="1000" dirty="0" smtClean="0"/>
+              <a:t>END</a:t>
+            </a:r>
+          </a:p>
+        </p:txBody>
+      </p:sp>
+      <p:sp>
+        <p:nvSpPr>
+          <p:cNvPr id="5" name="TextBox 4"/>
+          <p:cNvSpPr txBox="1"/>
+          <p:nvPr/>
+        </p:nvSpPr>
+        <p:spPr>
+          <a:xfrm>
+            <a:off x="214183" y="127686"/>
+            <a:ext cx="2660821" cy="430887"/>
+          </a:xfrm>
+          <a:prstGeom prst="rect">
+            <a:avLst/>
+          </a:prstGeom>
+          <a:noFill/>
+        </p:spPr>
+        <p:txBody>
+          <a:bodyPr wrap="square" rtlCol="0">
+            <a:spAutoFit/>
+          </a:bodyPr>
+          <a:lstStyle/>
+          <a:p>
+            <a:r>
+              <a:rPr lang="en-US" sz="1100" dirty="0" smtClean="0"/>
+              <a:t>4. Find the GCD and LCM of two numbers.</a:t>
+            </a:r>
+          </a:p>
+          <a:p>
+            <a:r>
+              <a:rPr lang="en-US" sz="1100" dirty="0"/>
+              <a:t>	</a:t>
+            </a:r>
+            <a:r>
+              <a:rPr lang="en-US" sz="1100" dirty="0" smtClean="0"/>
+              <a:t>(LCM)</a:t>
+            </a:r>
+            <a:endParaRPr lang="en-US" sz="1100" dirty="0"/>
+          </a:p>
+        </p:txBody>
+      </p:sp>
+      <p:sp>
+        <p:nvSpPr>
+          <p:cNvPr id="6" name="Oval 5"/>
+          <p:cNvSpPr/>
+          <p:nvPr/>
+        </p:nvSpPr>
+        <p:spPr>
+          <a:xfrm>
+            <a:off x="6903308" y="147280"/>
+            <a:ext cx="1021492" cy="222422"/>
+          </a:xfrm>
+          <a:prstGeom prst="ellipse">
+            <a:avLst/>
+          </a:prstGeom>
+          <a:solidFill>
+            <a:schemeClr val="bg1"/>
+          </a:solidFill>
+        </p:spPr>
+        <p:style>
+          <a:lnRef idx="2">
+            <a:schemeClr val="accent1">
+              <a:shade val="50000"/>
+            </a:schemeClr>
+          </a:lnRef>
+          <a:fillRef idx="1">
+            <a:schemeClr val="accent1"/>
+          </a:fillRef>
+          <a:effectRef idx="0">
+            <a:schemeClr val="accent1"/>
+          </a:effectRef>
+          <a:fontRef idx="minor">
+            <a:schemeClr val="lt1"/>
+          </a:fontRef>
+        </p:style>
+        <p:txBody>
+          <a:bodyPr rtlCol="0" anchor="ctr"/>
+          <a:lstStyle/>
+          <a:p>
+            <a:pPr algn="ctr"/>
+            <a:r>
+              <a:rPr lang="en-US" sz="1000" dirty="0" smtClean="0">
+                <a:solidFill>
+                  <a:schemeClr val="tx1"/>
+                </a:solidFill>
+              </a:rPr>
+              <a:t>Start</a:t>
+            </a:r>
+            <a:endParaRPr lang="en-US" sz="1000" dirty="0">
+              <a:solidFill>
+                <a:schemeClr val="tx1"/>
+              </a:solidFill>
+            </a:endParaRPr>
+          </a:p>
+        </p:txBody>
+      </p:sp>
+      <p:sp>
+        <p:nvSpPr>
+          <p:cNvPr id="7" name="Flowchart: Data 6"/>
+          <p:cNvSpPr/>
+          <p:nvPr/>
+        </p:nvSpPr>
+        <p:spPr>
+          <a:xfrm>
+            <a:off x="6590270" y="560173"/>
+            <a:ext cx="1647567" cy="280086"/>
+          </a:xfrm>
+          <a:prstGeom prst="flowChartInputOutput">
+            <a:avLst/>
+          </a:prstGeom>
+          <a:solidFill>
+            <a:schemeClr val="bg1"/>
+          </a:solidFill>
+        </p:spPr>
+        <p:style>
+          <a:lnRef idx="2">
+            <a:schemeClr val="accent1">
+              <a:shade val="50000"/>
+            </a:schemeClr>
+          </a:lnRef>
+          <a:fillRef idx="1">
+            <a:schemeClr val="accent1"/>
+          </a:fillRef>
+          <a:effectRef idx="0">
+            <a:schemeClr val="accent1"/>
+          </a:effectRef>
+          <a:fontRef idx="minor">
+            <a:schemeClr val="lt1"/>
+          </a:fontRef>
+        </p:style>
+        <p:txBody>
+          <a:bodyPr rtlCol="0" anchor="ctr"/>
+          <a:lstStyle/>
+          <a:p>
+            <a:pPr algn="ctr"/>
+            <a:r>
+              <a:rPr lang="en-US" sz="1000" dirty="0" smtClean="0">
+                <a:solidFill>
+                  <a:schemeClr val="tx1"/>
+                </a:solidFill>
+              </a:rPr>
+              <a:t>Display “Enter the value for a”</a:t>
+            </a:r>
+            <a:endParaRPr lang="en-US" sz="1000" dirty="0">
+              <a:solidFill>
+                <a:schemeClr val="tx1"/>
+              </a:solidFill>
+            </a:endParaRPr>
+          </a:p>
+        </p:txBody>
+      </p:sp>
+      <p:cxnSp>
+        <p:nvCxnSpPr>
+          <p:cNvPr id="8" name="Straight Arrow Connector 7"/>
+          <p:cNvCxnSpPr>
+            <a:stCxn id="6" idx="4"/>
+            <a:endCxn id="7" idx="1"/>
+          </p:cNvCxnSpPr>
+          <p:nvPr/>
+        </p:nvCxnSpPr>
+        <p:spPr>
+          <a:xfrm>
+            <a:off x="7414054" y="369702"/>
+            <a:ext cx="0" cy="190471"/>
+          </a:xfrm>
+          <a:prstGeom prst="straightConnector1">
+            <a:avLst/>
+          </a:prstGeom>
+          <a:ln>
+            <a:tailEnd type="triangle"/>
+          </a:ln>
+        </p:spPr>
+        <p:style>
+          <a:lnRef idx="1">
+            <a:schemeClr val="accent1"/>
+          </a:lnRef>
+          <a:fillRef idx="0">
+            <a:schemeClr val="accent1"/>
+          </a:fillRef>
+          <a:effectRef idx="0">
+            <a:schemeClr val="accent1"/>
+          </a:effectRef>
+          <a:fontRef idx="minor">
+            <a:schemeClr val="tx1"/>
+          </a:fontRef>
+        </p:style>
+      </p:cxnSp>
+      <p:sp>
+        <p:nvSpPr>
+          <p:cNvPr id="9" name="Flowchart: Data 8"/>
+          <p:cNvSpPr/>
+          <p:nvPr/>
+        </p:nvSpPr>
+        <p:spPr>
+          <a:xfrm>
+            <a:off x="6590269" y="973064"/>
+            <a:ext cx="1647567" cy="159519"/>
+          </a:xfrm>
+          <a:prstGeom prst="flowChartInputOutput">
+            <a:avLst/>
+          </a:prstGeom>
+          <a:solidFill>
+            <a:schemeClr val="bg1"/>
+          </a:solidFill>
+        </p:spPr>
+        <p:style>
+          <a:lnRef idx="2">
+            <a:schemeClr val="accent1">
+              <a:shade val="50000"/>
+            </a:schemeClr>
+          </a:lnRef>
+          <a:fillRef idx="1">
+            <a:schemeClr val="accent1"/>
+          </a:fillRef>
+          <a:effectRef idx="0">
+            <a:schemeClr val="accent1"/>
+          </a:effectRef>
+          <a:fontRef idx="minor">
+            <a:schemeClr val="lt1"/>
+          </a:fontRef>
+        </p:style>
+        <p:txBody>
+          <a:bodyPr rtlCol="0" anchor="ctr"/>
+          <a:lstStyle/>
+          <a:p>
+            <a:pPr algn="ctr"/>
+            <a:r>
+              <a:rPr lang="en-US" sz="1000" dirty="0" smtClean="0">
+                <a:solidFill>
+                  <a:schemeClr val="tx1"/>
+                </a:solidFill>
+              </a:rPr>
+              <a:t>Input a</a:t>
+            </a:r>
+            <a:endParaRPr lang="en-US" sz="1000" dirty="0">
+              <a:solidFill>
+                <a:schemeClr val="tx1"/>
+              </a:solidFill>
+            </a:endParaRPr>
+          </a:p>
+        </p:txBody>
+      </p:sp>
+      <p:cxnSp>
+        <p:nvCxnSpPr>
+          <p:cNvPr id="10" name="Straight Arrow Connector 9"/>
+          <p:cNvCxnSpPr>
+            <a:stCxn id="7" idx="4"/>
+            <a:endCxn id="9" idx="1"/>
+          </p:cNvCxnSpPr>
+          <p:nvPr/>
+        </p:nvCxnSpPr>
+        <p:spPr>
+          <a:xfrm flipH="1">
+            <a:off x="7414053" y="840259"/>
+            <a:ext cx="1" cy="132805"/>
+          </a:xfrm>
+          <a:prstGeom prst="straightConnector1">
+            <a:avLst/>
+          </a:prstGeom>
+          <a:ln>
+            <a:tailEnd type="triangle"/>
+          </a:ln>
+        </p:spPr>
+        <p:style>
+          <a:lnRef idx="1">
+            <a:schemeClr val="accent1"/>
+          </a:lnRef>
+          <a:fillRef idx="0">
+            <a:schemeClr val="accent1"/>
+          </a:fillRef>
+          <a:effectRef idx="0">
+            <a:schemeClr val="accent1"/>
+          </a:effectRef>
+          <a:fontRef idx="minor">
+            <a:schemeClr val="tx1"/>
+          </a:fontRef>
+        </p:style>
+      </p:cxnSp>
+      <p:sp>
+        <p:nvSpPr>
+          <p:cNvPr id="11" name="Flowchart: Data 10"/>
+          <p:cNvSpPr/>
+          <p:nvPr/>
+        </p:nvSpPr>
+        <p:spPr>
+          <a:xfrm>
+            <a:off x="6590268" y="1280861"/>
+            <a:ext cx="1647567" cy="280086"/>
+          </a:xfrm>
+          <a:prstGeom prst="flowChartInputOutput">
+            <a:avLst/>
+          </a:prstGeom>
+          <a:solidFill>
+            <a:schemeClr val="bg1"/>
+          </a:solidFill>
+        </p:spPr>
+        <p:style>
+          <a:lnRef idx="2">
+            <a:schemeClr val="accent1">
+              <a:shade val="50000"/>
+            </a:schemeClr>
+          </a:lnRef>
+          <a:fillRef idx="1">
+            <a:schemeClr val="accent1"/>
+          </a:fillRef>
+          <a:effectRef idx="0">
+            <a:schemeClr val="accent1"/>
+          </a:effectRef>
+          <a:fontRef idx="minor">
+            <a:schemeClr val="lt1"/>
+          </a:fontRef>
+        </p:style>
+        <p:txBody>
+          <a:bodyPr rtlCol="0" anchor="ctr"/>
+          <a:lstStyle/>
+          <a:p>
+            <a:pPr algn="ctr"/>
+            <a:r>
+              <a:rPr lang="en-US" sz="1000" dirty="0" smtClean="0">
+                <a:solidFill>
+                  <a:schemeClr val="tx1"/>
+                </a:solidFill>
+              </a:rPr>
+              <a:t>Display “Enter the value for b”</a:t>
+            </a:r>
+            <a:endParaRPr lang="en-US" sz="1000" dirty="0">
+              <a:solidFill>
+                <a:schemeClr val="tx1"/>
+              </a:solidFill>
+            </a:endParaRPr>
+          </a:p>
+        </p:txBody>
+      </p:sp>
+      <p:cxnSp>
+        <p:nvCxnSpPr>
+          <p:cNvPr id="12" name="Straight Arrow Connector 11"/>
+          <p:cNvCxnSpPr>
+            <a:stCxn id="9" idx="4"/>
+            <a:endCxn id="11" idx="1"/>
+          </p:cNvCxnSpPr>
+          <p:nvPr/>
+        </p:nvCxnSpPr>
+        <p:spPr>
+          <a:xfrm flipH="1">
+            <a:off x="7414052" y="1132583"/>
+            <a:ext cx="1" cy="148278"/>
+          </a:xfrm>
+          <a:prstGeom prst="straightConnector1">
+            <a:avLst/>
+          </a:prstGeom>
+          <a:ln>
+            <a:tailEnd type="triangle"/>
+          </a:ln>
+        </p:spPr>
+        <p:style>
+          <a:lnRef idx="1">
+            <a:schemeClr val="accent1"/>
+          </a:lnRef>
+          <a:fillRef idx="0">
+            <a:schemeClr val="accent1"/>
+          </a:fillRef>
+          <a:effectRef idx="0">
+            <a:schemeClr val="accent1"/>
+          </a:effectRef>
+          <a:fontRef idx="minor">
+            <a:schemeClr val="tx1"/>
+          </a:fontRef>
+        </p:style>
+      </p:cxnSp>
+      <p:sp>
+        <p:nvSpPr>
+          <p:cNvPr id="13" name="Flowchart: Data 12"/>
+          <p:cNvSpPr/>
+          <p:nvPr/>
+        </p:nvSpPr>
+        <p:spPr>
+          <a:xfrm>
+            <a:off x="6590267" y="1716850"/>
+            <a:ext cx="1647567" cy="144663"/>
+          </a:xfrm>
+          <a:prstGeom prst="flowChartInputOutput">
+            <a:avLst/>
+          </a:prstGeom>
+          <a:solidFill>
+            <a:schemeClr val="bg1"/>
+          </a:solidFill>
+        </p:spPr>
+        <p:style>
+          <a:lnRef idx="2">
+            <a:schemeClr val="accent1">
+              <a:shade val="50000"/>
+            </a:schemeClr>
+          </a:lnRef>
+          <a:fillRef idx="1">
+            <a:schemeClr val="accent1"/>
+          </a:fillRef>
+          <a:effectRef idx="0">
+            <a:schemeClr val="accent1"/>
+          </a:effectRef>
+          <a:fontRef idx="minor">
+            <a:schemeClr val="lt1"/>
+          </a:fontRef>
+        </p:style>
+        <p:txBody>
+          <a:bodyPr rtlCol="0" anchor="ctr"/>
+          <a:lstStyle/>
+          <a:p>
+            <a:pPr algn="ctr"/>
+            <a:r>
+              <a:rPr lang="en-US" sz="1000" dirty="0" smtClean="0">
+                <a:solidFill>
+                  <a:schemeClr val="tx1"/>
+                </a:solidFill>
+              </a:rPr>
+              <a:t>Input b</a:t>
+            </a:r>
+            <a:endParaRPr lang="en-US" sz="1000" dirty="0">
+              <a:solidFill>
+                <a:schemeClr val="tx1"/>
+              </a:solidFill>
+            </a:endParaRPr>
+          </a:p>
+        </p:txBody>
+      </p:sp>
+      <p:cxnSp>
+        <p:nvCxnSpPr>
+          <p:cNvPr id="14" name="Straight Arrow Connector 13"/>
+          <p:cNvCxnSpPr>
+            <a:stCxn id="11" idx="4"/>
+            <a:endCxn id="13" idx="1"/>
+          </p:cNvCxnSpPr>
+          <p:nvPr/>
+        </p:nvCxnSpPr>
+        <p:spPr>
+          <a:xfrm flipH="1">
+            <a:off x="7414051" y="1560947"/>
+            <a:ext cx="1" cy="155903"/>
+          </a:xfrm>
+          <a:prstGeom prst="straightConnector1">
+            <a:avLst/>
+          </a:prstGeom>
+          <a:ln>
+            <a:tailEnd type="triangle"/>
+          </a:ln>
+        </p:spPr>
+        <p:style>
+          <a:lnRef idx="1">
+            <a:schemeClr val="accent1"/>
+          </a:lnRef>
+          <a:fillRef idx="0">
+            <a:schemeClr val="accent1"/>
+          </a:fillRef>
+          <a:effectRef idx="0">
+            <a:schemeClr val="accent1"/>
+          </a:effectRef>
+          <a:fontRef idx="minor">
+            <a:schemeClr val="tx1"/>
+          </a:fontRef>
+        </p:style>
+      </p:cxnSp>
+      <p:sp>
+        <p:nvSpPr>
+          <p:cNvPr id="15" name="Rectangle 14"/>
+          <p:cNvSpPr/>
+          <p:nvPr/>
+        </p:nvSpPr>
+        <p:spPr>
+          <a:xfrm>
+            <a:off x="6792093" y="2009174"/>
+            <a:ext cx="1243914" cy="274609"/>
+          </a:xfrm>
+          <a:prstGeom prst="rect">
+            <a:avLst/>
+          </a:prstGeom>
+          <a:solidFill>
+            <a:schemeClr val="bg1"/>
+          </a:solidFill>
+        </p:spPr>
+        <p:style>
+          <a:lnRef idx="2">
+            <a:schemeClr val="accent1">
+              <a:shade val="50000"/>
+            </a:schemeClr>
+          </a:lnRef>
+          <a:fillRef idx="1">
+            <a:schemeClr val="accent1"/>
+          </a:fillRef>
+          <a:effectRef idx="0">
+            <a:schemeClr val="accent1"/>
+          </a:effectRef>
+          <a:fontRef idx="minor">
+            <a:schemeClr val="lt1"/>
+          </a:fontRef>
+        </p:style>
+        <p:txBody>
+          <a:bodyPr rtlCol="0" anchor="ctr"/>
+          <a:lstStyle/>
+          <a:p>
+            <a:pPr algn="ctr"/>
+            <a:r>
+              <a:rPr lang="en-US" sz="1000" dirty="0" smtClean="0">
+                <a:solidFill>
+                  <a:schemeClr val="tx1"/>
+                </a:solidFill>
+              </a:rPr>
+              <a:t>Declare d: Integer </a:t>
+            </a:r>
+            <a:endParaRPr lang="en-US" sz="1000" dirty="0">
+              <a:solidFill>
+                <a:schemeClr val="tx1"/>
+              </a:solidFill>
+            </a:endParaRPr>
+          </a:p>
+        </p:txBody>
+      </p:sp>
+      <p:cxnSp>
+        <p:nvCxnSpPr>
+          <p:cNvPr id="16" name="Straight Arrow Connector 15"/>
+          <p:cNvCxnSpPr>
+            <a:stCxn id="13" idx="4"/>
+            <a:endCxn id="15" idx="0"/>
+          </p:cNvCxnSpPr>
+          <p:nvPr/>
+        </p:nvCxnSpPr>
+        <p:spPr>
+          <a:xfrm flipH="1">
+            <a:off x="7414050" y="1861513"/>
+            <a:ext cx="1" cy="147661"/>
+          </a:xfrm>
+          <a:prstGeom prst="straightConnector1">
+            <a:avLst/>
+          </a:prstGeom>
+          <a:ln>
+            <a:tailEnd type="triangle"/>
+          </a:ln>
+        </p:spPr>
+        <p:style>
+          <a:lnRef idx="1">
+            <a:schemeClr val="accent1"/>
+          </a:lnRef>
+          <a:fillRef idx="0">
+            <a:schemeClr val="accent1"/>
+          </a:fillRef>
+          <a:effectRef idx="0">
+            <a:schemeClr val="accent1"/>
+          </a:effectRef>
+          <a:fontRef idx="minor">
+            <a:schemeClr val="tx1"/>
+          </a:fontRef>
+        </p:style>
+      </p:cxnSp>
+      <p:sp>
+        <p:nvSpPr>
+          <p:cNvPr id="17" name="Flowchart: Decision 16"/>
+          <p:cNvSpPr/>
+          <p:nvPr/>
+        </p:nvSpPr>
+        <p:spPr>
+          <a:xfrm>
+            <a:off x="6893008" y="2431444"/>
+            <a:ext cx="1042083" cy="617838"/>
+          </a:xfrm>
+          <a:prstGeom prst="flowChartDecision">
+            <a:avLst/>
+          </a:prstGeom>
+          <a:solidFill>
+            <a:schemeClr val="bg1"/>
+          </a:solidFill>
+        </p:spPr>
+        <p:style>
+          <a:lnRef idx="2">
+            <a:schemeClr val="accent1">
+              <a:shade val="50000"/>
+            </a:schemeClr>
+          </a:lnRef>
+          <a:fillRef idx="1">
+            <a:schemeClr val="accent1"/>
+          </a:fillRef>
+          <a:effectRef idx="0">
+            <a:schemeClr val="accent1"/>
+          </a:effectRef>
+          <a:fontRef idx="minor">
+            <a:schemeClr val="lt1"/>
+          </a:fontRef>
+        </p:style>
+        <p:txBody>
+          <a:bodyPr rtlCol="0" anchor="ctr"/>
+          <a:lstStyle/>
+          <a:p>
+            <a:pPr algn="ctr"/>
+            <a:r>
+              <a:rPr lang="en-US" sz="1000" dirty="0" smtClean="0">
+                <a:solidFill>
+                  <a:schemeClr val="tx1"/>
+                </a:solidFill>
+              </a:rPr>
+              <a:t>If a&gt;b</a:t>
+            </a:r>
+            <a:endParaRPr lang="en-US" sz="1000" dirty="0">
+              <a:solidFill>
+                <a:schemeClr val="tx1"/>
+              </a:solidFill>
+            </a:endParaRPr>
+          </a:p>
+        </p:txBody>
+      </p:sp>
+      <p:cxnSp>
+        <p:nvCxnSpPr>
+          <p:cNvPr id="18" name="Straight Arrow Connector 17"/>
+          <p:cNvCxnSpPr>
+            <a:stCxn id="15" idx="2"/>
+            <a:endCxn id="17" idx="0"/>
+          </p:cNvCxnSpPr>
+          <p:nvPr/>
+        </p:nvCxnSpPr>
+        <p:spPr>
+          <a:xfrm>
+            <a:off x="7414050" y="2283783"/>
+            <a:ext cx="0" cy="147661"/>
+          </a:xfrm>
+          <a:prstGeom prst="straightConnector1">
+            <a:avLst/>
+          </a:prstGeom>
+          <a:ln>
+            <a:tailEnd type="triangle"/>
+          </a:ln>
+        </p:spPr>
+        <p:style>
+          <a:lnRef idx="1">
+            <a:schemeClr val="accent1"/>
+          </a:lnRef>
+          <a:fillRef idx="0">
+            <a:schemeClr val="accent1"/>
+          </a:fillRef>
+          <a:effectRef idx="0">
+            <a:schemeClr val="accent1"/>
+          </a:effectRef>
+          <a:fontRef idx="minor">
+            <a:schemeClr val="tx1"/>
+          </a:fontRef>
+        </p:style>
+      </p:cxnSp>
+      <p:cxnSp>
+        <p:nvCxnSpPr>
+          <p:cNvPr id="19" name="Straight Arrow Connector 18"/>
+          <p:cNvCxnSpPr>
+            <a:stCxn id="17" idx="1"/>
+            <a:endCxn id="21" idx="3"/>
+          </p:cNvCxnSpPr>
+          <p:nvPr/>
+        </p:nvCxnSpPr>
+        <p:spPr>
+          <a:xfrm flipH="1" flipV="1">
+            <a:off x="6590264" y="2738104"/>
+            <a:ext cx="302744" cy="2259"/>
+          </a:xfrm>
+          <a:prstGeom prst="straightConnector1">
+            <a:avLst/>
+          </a:prstGeom>
+          <a:ln>
+            <a:tailEnd type="triangle"/>
+          </a:ln>
+        </p:spPr>
+        <p:style>
+          <a:lnRef idx="1">
+            <a:schemeClr val="accent1"/>
+          </a:lnRef>
+          <a:fillRef idx="0">
+            <a:schemeClr val="accent1"/>
+          </a:fillRef>
+          <a:effectRef idx="0">
+            <a:schemeClr val="accent1"/>
+          </a:effectRef>
+          <a:fontRef idx="minor">
+            <a:schemeClr val="tx1"/>
+          </a:fontRef>
+        </p:style>
+      </p:cxnSp>
+      <p:cxnSp>
+        <p:nvCxnSpPr>
+          <p:cNvPr id="20" name="Straight Arrow Connector 19"/>
+          <p:cNvCxnSpPr>
+            <a:stCxn id="17" idx="3"/>
+            <a:endCxn id="50" idx="1"/>
+          </p:cNvCxnSpPr>
+          <p:nvPr/>
+        </p:nvCxnSpPr>
+        <p:spPr>
+          <a:xfrm flipV="1">
+            <a:off x="7935091" y="2738104"/>
+            <a:ext cx="302742" cy="2259"/>
+          </a:xfrm>
+          <a:prstGeom prst="straightConnector1">
+            <a:avLst/>
+          </a:prstGeom>
+          <a:ln>
+            <a:tailEnd type="triangle"/>
+          </a:ln>
+        </p:spPr>
+        <p:style>
+          <a:lnRef idx="1">
+            <a:schemeClr val="accent1"/>
+          </a:lnRef>
+          <a:fillRef idx="0">
+            <a:schemeClr val="accent1"/>
+          </a:fillRef>
+          <a:effectRef idx="0">
+            <a:schemeClr val="accent1"/>
+          </a:effectRef>
+          <a:fontRef idx="minor">
+            <a:schemeClr val="tx1"/>
+          </a:fontRef>
+        </p:style>
+      </p:cxnSp>
+      <p:sp>
+        <p:nvSpPr>
+          <p:cNvPr id="21" name="Rectangle 20"/>
+          <p:cNvSpPr/>
+          <p:nvPr/>
+        </p:nvSpPr>
+        <p:spPr>
+          <a:xfrm>
+            <a:off x="5857103" y="2600799"/>
+            <a:ext cx="733161" cy="274609"/>
+          </a:xfrm>
+          <a:prstGeom prst="rect">
+            <a:avLst/>
+          </a:prstGeom>
+          <a:solidFill>
+            <a:schemeClr val="bg1"/>
+          </a:solidFill>
+        </p:spPr>
+        <p:style>
+          <a:lnRef idx="2">
+            <a:schemeClr val="accent1">
+              <a:shade val="50000"/>
+            </a:schemeClr>
+          </a:lnRef>
+          <a:fillRef idx="1">
+            <a:schemeClr val="accent1"/>
+          </a:fillRef>
+          <a:effectRef idx="0">
+            <a:schemeClr val="accent1"/>
+          </a:effectRef>
+          <a:fontRef idx="minor">
+            <a:schemeClr val="lt1"/>
+          </a:fontRef>
+        </p:style>
+        <p:txBody>
+          <a:bodyPr rtlCol="0" anchor="ctr"/>
+          <a:lstStyle/>
+          <a:p>
+            <a:pPr algn="ctr"/>
+            <a:r>
+              <a:rPr lang="en-US" sz="1000" dirty="0" smtClean="0">
+                <a:solidFill>
+                  <a:schemeClr val="tx1"/>
+                </a:solidFill>
+              </a:rPr>
+              <a:t>d = a -b</a:t>
+            </a:r>
+            <a:endParaRPr lang="en-US" sz="1000" dirty="0">
+              <a:solidFill>
+                <a:schemeClr val="tx1"/>
+              </a:solidFill>
+            </a:endParaRPr>
+          </a:p>
+        </p:txBody>
+      </p:sp>
+      <p:sp>
+        <p:nvSpPr>
+          <p:cNvPr id="22" name="TextBox 21"/>
+          <p:cNvSpPr txBox="1"/>
+          <p:nvPr/>
+        </p:nvSpPr>
+        <p:spPr>
+          <a:xfrm>
+            <a:off x="6555257" y="2546875"/>
+            <a:ext cx="473671" cy="246221"/>
+          </a:xfrm>
+          <a:prstGeom prst="rect">
+            <a:avLst/>
+          </a:prstGeom>
+          <a:noFill/>
+        </p:spPr>
+        <p:txBody>
+          <a:bodyPr wrap="square" rtlCol="0">
+            <a:spAutoFit/>
+          </a:bodyPr>
+          <a:lstStyle/>
+          <a:p>
+            <a:r>
+              <a:rPr lang="en-US" sz="1000" dirty="0" smtClean="0"/>
+              <a:t>True</a:t>
+            </a:r>
+            <a:endParaRPr lang="en-US" sz="1000" dirty="0"/>
+          </a:p>
+        </p:txBody>
+      </p:sp>
+      <p:sp>
+        <p:nvSpPr>
+          <p:cNvPr id="23" name="TextBox 22"/>
+          <p:cNvSpPr txBox="1"/>
+          <p:nvPr/>
+        </p:nvSpPr>
+        <p:spPr>
+          <a:xfrm>
+            <a:off x="7849627" y="2546874"/>
+            <a:ext cx="473671" cy="246221"/>
+          </a:xfrm>
+          <a:prstGeom prst="rect">
+            <a:avLst/>
+          </a:prstGeom>
+          <a:noFill/>
+        </p:spPr>
+        <p:txBody>
+          <a:bodyPr wrap="square" rtlCol="0">
+            <a:spAutoFit/>
+          </a:bodyPr>
+          <a:lstStyle/>
+          <a:p>
+            <a:r>
+              <a:rPr lang="en-US" sz="1000" dirty="0" smtClean="0"/>
+              <a:t>False</a:t>
+            </a:r>
+            <a:endParaRPr lang="en-US" sz="1000" dirty="0"/>
+          </a:p>
+        </p:txBody>
+      </p:sp>
+      <p:sp>
+        <p:nvSpPr>
+          <p:cNvPr id="24" name="Flowchart: Decision 23"/>
+          <p:cNvSpPr/>
+          <p:nvPr/>
+        </p:nvSpPr>
+        <p:spPr>
+          <a:xfrm>
+            <a:off x="5366951" y="3049282"/>
+            <a:ext cx="1713470" cy="641887"/>
+          </a:xfrm>
+          <a:prstGeom prst="flowChartDecision">
+            <a:avLst/>
+          </a:prstGeom>
+          <a:solidFill>
+            <a:schemeClr val="bg1"/>
+          </a:solidFill>
+        </p:spPr>
+        <p:style>
+          <a:lnRef idx="2">
+            <a:schemeClr val="accent1">
+              <a:shade val="50000"/>
+            </a:schemeClr>
+          </a:lnRef>
+          <a:fillRef idx="1">
+            <a:schemeClr val="accent1"/>
+          </a:fillRef>
+          <a:effectRef idx="0">
+            <a:schemeClr val="accent1"/>
+          </a:effectRef>
+          <a:fontRef idx="minor">
+            <a:schemeClr val="lt1"/>
+          </a:fontRef>
+        </p:style>
+        <p:txBody>
+          <a:bodyPr rtlCol="0" anchor="ctr"/>
+          <a:lstStyle/>
+          <a:p>
+            <a:pPr algn="ctr"/>
+            <a:r>
+              <a:rPr lang="en-US" sz="900" dirty="0" smtClean="0">
+                <a:solidFill>
+                  <a:schemeClr val="tx1"/>
+                </a:solidFill>
+              </a:rPr>
+              <a:t>If (a mod d) and (b mod d) = 0</a:t>
+            </a:r>
+            <a:endParaRPr lang="en-US" sz="900" dirty="0">
+              <a:solidFill>
+                <a:schemeClr val="tx1"/>
+              </a:solidFill>
+            </a:endParaRPr>
+          </a:p>
+        </p:txBody>
+      </p:sp>
+      <p:cxnSp>
+        <p:nvCxnSpPr>
+          <p:cNvPr id="25" name="Straight Arrow Connector 24"/>
+          <p:cNvCxnSpPr>
+            <a:stCxn id="21" idx="2"/>
+            <a:endCxn id="24" idx="0"/>
+          </p:cNvCxnSpPr>
+          <p:nvPr/>
+        </p:nvCxnSpPr>
+        <p:spPr>
+          <a:xfrm>
+            <a:off x="6223684" y="2875408"/>
+            <a:ext cx="2" cy="173874"/>
+          </a:xfrm>
+          <a:prstGeom prst="straightConnector1">
+            <a:avLst/>
+          </a:prstGeom>
+          <a:ln>
+            <a:tailEnd type="triangle"/>
+          </a:ln>
+        </p:spPr>
+        <p:style>
+          <a:lnRef idx="1">
+            <a:schemeClr val="accent1"/>
+          </a:lnRef>
+          <a:fillRef idx="0">
+            <a:schemeClr val="accent1"/>
+          </a:fillRef>
+          <a:effectRef idx="0">
+            <a:schemeClr val="accent1"/>
+          </a:effectRef>
+          <a:fontRef idx="minor">
+            <a:schemeClr val="tx1"/>
+          </a:fontRef>
+        </p:style>
+      </p:cxnSp>
+      <p:cxnSp>
+        <p:nvCxnSpPr>
+          <p:cNvPr id="26" name="Straight Arrow Connector 25"/>
+          <p:cNvCxnSpPr>
+            <a:stCxn id="24" idx="1"/>
+            <a:endCxn id="80" idx="3"/>
+          </p:cNvCxnSpPr>
+          <p:nvPr/>
+        </p:nvCxnSpPr>
+        <p:spPr>
+          <a:xfrm flipH="1" flipV="1">
+            <a:off x="4798536" y="3364990"/>
+            <a:ext cx="568415" cy="5236"/>
+          </a:xfrm>
+          <a:prstGeom prst="straightConnector1">
+            <a:avLst/>
+          </a:prstGeom>
+          <a:ln>
+            <a:tailEnd type="triangle"/>
+          </a:ln>
+        </p:spPr>
+        <p:style>
+          <a:lnRef idx="1">
+            <a:schemeClr val="accent1"/>
+          </a:lnRef>
+          <a:fillRef idx="0">
+            <a:schemeClr val="accent1"/>
+          </a:fillRef>
+          <a:effectRef idx="0">
+            <a:schemeClr val="accent1"/>
+          </a:effectRef>
+          <a:fontRef idx="minor">
+            <a:schemeClr val="tx1"/>
+          </a:fontRef>
+        </p:style>
+      </p:cxnSp>
+      <p:sp>
+        <p:nvSpPr>
+          <p:cNvPr id="27" name="Flowchart: Data 26"/>
+          <p:cNvSpPr/>
+          <p:nvPr/>
+        </p:nvSpPr>
+        <p:spPr>
+          <a:xfrm>
+            <a:off x="2493989" y="3222887"/>
+            <a:ext cx="1388091" cy="280086"/>
+          </a:xfrm>
+          <a:prstGeom prst="flowChartInputOutput">
+            <a:avLst/>
+          </a:prstGeom>
+          <a:solidFill>
+            <a:schemeClr val="bg1"/>
+          </a:solidFill>
+        </p:spPr>
+        <p:style>
+          <a:lnRef idx="2">
+            <a:schemeClr val="accent1">
+              <a:shade val="50000"/>
+            </a:schemeClr>
+          </a:lnRef>
+          <a:fillRef idx="1">
+            <a:schemeClr val="accent1"/>
+          </a:fillRef>
+          <a:effectRef idx="0">
+            <a:schemeClr val="accent1"/>
+          </a:effectRef>
+          <a:fontRef idx="minor">
+            <a:schemeClr val="lt1"/>
+          </a:fontRef>
+        </p:style>
+        <p:txBody>
+          <a:bodyPr rtlCol="0" anchor="ctr"/>
+          <a:lstStyle/>
+          <a:p>
+            <a:pPr algn="ctr"/>
+            <a:r>
+              <a:rPr lang="en-US" sz="1000" dirty="0" smtClean="0">
+                <a:solidFill>
+                  <a:schemeClr val="tx1"/>
+                </a:solidFill>
+              </a:rPr>
+              <a:t>Display “e is the LCM”</a:t>
+            </a:r>
+            <a:endParaRPr lang="en-US" sz="1000" dirty="0">
+              <a:solidFill>
+                <a:schemeClr val="tx1"/>
+              </a:solidFill>
+            </a:endParaRPr>
+          </a:p>
+        </p:txBody>
+      </p:sp>
+      <p:sp>
+        <p:nvSpPr>
+          <p:cNvPr id="28" name="Oval 27"/>
+          <p:cNvSpPr/>
+          <p:nvPr/>
+        </p:nvSpPr>
+        <p:spPr>
+          <a:xfrm>
+            <a:off x="2870880" y="3644471"/>
+            <a:ext cx="626074" cy="222422"/>
+          </a:xfrm>
+          <a:prstGeom prst="ellipse">
+            <a:avLst/>
+          </a:prstGeom>
+          <a:solidFill>
+            <a:schemeClr val="bg1"/>
+          </a:solidFill>
+        </p:spPr>
+        <p:style>
+          <a:lnRef idx="2">
+            <a:schemeClr val="accent1">
+              <a:shade val="50000"/>
+            </a:schemeClr>
+          </a:lnRef>
+          <a:fillRef idx="1">
+            <a:schemeClr val="accent1"/>
+          </a:fillRef>
+          <a:effectRef idx="0">
+            <a:schemeClr val="accent1"/>
+          </a:effectRef>
+          <a:fontRef idx="minor">
+            <a:schemeClr val="lt1"/>
+          </a:fontRef>
+        </p:style>
+        <p:txBody>
+          <a:bodyPr rtlCol="0" anchor="ctr"/>
+          <a:lstStyle/>
+          <a:p>
+            <a:pPr algn="ctr"/>
+            <a:r>
+              <a:rPr lang="en-US" sz="1000" dirty="0" smtClean="0">
+                <a:solidFill>
+                  <a:schemeClr val="tx1"/>
+                </a:solidFill>
+              </a:rPr>
+              <a:t>End</a:t>
+            </a:r>
+            <a:endParaRPr lang="en-US" sz="1000" dirty="0">
+              <a:solidFill>
+                <a:schemeClr val="tx1"/>
+              </a:solidFill>
+            </a:endParaRPr>
+          </a:p>
+        </p:txBody>
+      </p:sp>
+      <p:cxnSp>
+        <p:nvCxnSpPr>
+          <p:cNvPr id="29" name="Straight Arrow Connector 28"/>
+          <p:cNvCxnSpPr>
+            <a:stCxn id="27" idx="4"/>
+            <a:endCxn id="28" idx="0"/>
+          </p:cNvCxnSpPr>
+          <p:nvPr/>
+        </p:nvCxnSpPr>
+        <p:spPr>
+          <a:xfrm flipH="1">
+            <a:off x="3183917" y="3502973"/>
+            <a:ext cx="4118" cy="141498"/>
+          </a:xfrm>
+          <a:prstGeom prst="straightConnector1">
+            <a:avLst/>
+          </a:prstGeom>
+          <a:ln>
+            <a:tailEnd type="triangle"/>
+          </a:ln>
+        </p:spPr>
+        <p:style>
+          <a:lnRef idx="1">
+            <a:schemeClr val="accent1"/>
+          </a:lnRef>
+          <a:fillRef idx="0">
+            <a:schemeClr val="accent1"/>
+          </a:fillRef>
+          <a:effectRef idx="0">
+            <a:schemeClr val="accent1"/>
+          </a:effectRef>
+          <a:fontRef idx="minor">
+            <a:schemeClr val="tx1"/>
+          </a:fontRef>
+        </p:style>
+      </p:cxnSp>
+      <p:cxnSp>
+        <p:nvCxnSpPr>
+          <p:cNvPr id="30" name="Straight Arrow Connector 29"/>
+          <p:cNvCxnSpPr>
+            <a:stCxn id="24" idx="2"/>
+            <a:endCxn id="31" idx="0"/>
+          </p:cNvCxnSpPr>
+          <p:nvPr/>
+        </p:nvCxnSpPr>
+        <p:spPr>
+          <a:xfrm flipH="1">
+            <a:off x="6222653" y="3691169"/>
+            <a:ext cx="1033" cy="173874"/>
+          </a:xfrm>
+          <a:prstGeom prst="straightConnector1">
+            <a:avLst/>
+          </a:prstGeom>
+          <a:ln>
+            <a:tailEnd type="triangle"/>
+          </a:ln>
+        </p:spPr>
+        <p:style>
+          <a:lnRef idx="1">
+            <a:schemeClr val="accent1"/>
+          </a:lnRef>
+          <a:fillRef idx="0">
+            <a:schemeClr val="accent1"/>
+          </a:fillRef>
+          <a:effectRef idx="0">
+            <a:schemeClr val="accent1"/>
+          </a:effectRef>
+          <a:fontRef idx="minor">
+            <a:schemeClr val="tx1"/>
+          </a:fontRef>
+        </p:style>
+      </p:cxnSp>
+      <p:sp>
+        <p:nvSpPr>
+          <p:cNvPr id="31" name="Rectangle 30"/>
+          <p:cNvSpPr/>
+          <p:nvPr/>
+        </p:nvSpPr>
+        <p:spPr>
+          <a:xfrm>
+            <a:off x="5813851" y="3865043"/>
+            <a:ext cx="817603" cy="196459"/>
+          </a:xfrm>
+          <a:prstGeom prst="rect">
+            <a:avLst/>
+          </a:prstGeom>
+          <a:solidFill>
+            <a:schemeClr val="bg1"/>
+          </a:solidFill>
+        </p:spPr>
+        <p:style>
+          <a:lnRef idx="2">
+            <a:schemeClr val="accent1">
+              <a:shade val="50000"/>
+            </a:schemeClr>
+          </a:lnRef>
+          <a:fillRef idx="1">
+            <a:schemeClr val="accent1"/>
+          </a:fillRef>
+          <a:effectRef idx="0">
+            <a:schemeClr val="accent1"/>
+          </a:effectRef>
+          <a:fontRef idx="minor">
+            <a:schemeClr val="lt1"/>
+          </a:fontRef>
+        </p:style>
+        <p:txBody>
+          <a:bodyPr rtlCol="0" anchor="ctr"/>
+          <a:lstStyle/>
+          <a:p>
+            <a:pPr algn="ctr"/>
+            <a:r>
+              <a:rPr lang="en-US" sz="1000" dirty="0" smtClean="0">
+                <a:solidFill>
+                  <a:schemeClr val="tx1"/>
+                </a:solidFill>
+              </a:rPr>
+              <a:t>c = d</a:t>
+            </a:r>
+            <a:endParaRPr lang="en-US" sz="1000" dirty="0">
+              <a:solidFill>
+                <a:schemeClr val="tx1"/>
+              </a:solidFill>
+            </a:endParaRPr>
+          </a:p>
+        </p:txBody>
+      </p:sp>
+      <p:sp>
+        <p:nvSpPr>
+          <p:cNvPr id="32" name="Flowchart: Decision 31"/>
+          <p:cNvSpPr/>
+          <p:nvPr/>
+        </p:nvSpPr>
+        <p:spPr>
+          <a:xfrm>
+            <a:off x="5702644" y="4233000"/>
+            <a:ext cx="1042083" cy="617838"/>
+          </a:xfrm>
+          <a:prstGeom prst="flowChartDecision">
+            <a:avLst/>
+          </a:prstGeom>
+          <a:solidFill>
+            <a:schemeClr val="bg1"/>
+          </a:solidFill>
+        </p:spPr>
+        <p:style>
+          <a:lnRef idx="2">
+            <a:schemeClr val="accent1">
+              <a:shade val="50000"/>
+            </a:schemeClr>
+          </a:lnRef>
+          <a:fillRef idx="1">
+            <a:schemeClr val="accent1"/>
+          </a:fillRef>
+          <a:effectRef idx="0">
+            <a:schemeClr val="accent1"/>
+          </a:effectRef>
+          <a:fontRef idx="minor">
+            <a:schemeClr val="lt1"/>
+          </a:fontRef>
+        </p:style>
+        <p:txBody>
+          <a:bodyPr rtlCol="0" anchor="ctr"/>
+          <a:lstStyle/>
+          <a:p>
+            <a:pPr algn="ctr"/>
+            <a:r>
+              <a:rPr lang="en-US" sz="1000" dirty="0" smtClean="0">
+                <a:solidFill>
+                  <a:schemeClr val="tx1"/>
+                </a:solidFill>
+              </a:rPr>
+              <a:t>While c !=0</a:t>
+            </a:r>
+            <a:endParaRPr lang="en-US" sz="1000" dirty="0">
+              <a:solidFill>
+                <a:schemeClr val="tx1"/>
+              </a:solidFill>
+            </a:endParaRPr>
+          </a:p>
+        </p:txBody>
+      </p:sp>
+      <p:cxnSp>
+        <p:nvCxnSpPr>
+          <p:cNvPr id="33" name="Straight Arrow Connector 32"/>
+          <p:cNvCxnSpPr>
+            <a:stCxn id="31" idx="2"/>
+            <a:endCxn id="32" idx="0"/>
+          </p:cNvCxnSpPr>
+          <p:nvPr/>
+        </p:nvCxnSpPr>
+        <p:spPr>
+          <a:xfrm>
+            <a:off x="6222653" y="4061502"/>
+            <a:ext cx="1033" cy="171498"/>
+          </a:xfrm>
+          <a:prstGeom prst="straightConnector1">
+            <a:avLst/>
+          </a:prstGeom>
+          <a:ln>
+            <a:tailEnd type="triangle"/>
+          </a:ln>
+        </p:spPr>
+        <p:style>
+          <a:lnRef idx="1">
+            <a:schemeClr val="accent1"/>
+          </a:lnRef>
+          <a:fillRef idx="0">
+            <a:schemeClr val="accent1"/>
+          </a:fillRef>
+          <a:effectRef idx="0">
+            <a:schemeClr val="accent1"/>
+          </a:effectRef>
+          <a:fontRef idx="minor">
+            <a:schemeClr val="tx1"/>
+          </a:fontRef>
+        </p:style>
+      </p:cxnSp>
+      <p:sp>
+        <p:nvSpPr>
+          <p:cNvPr id="34" name="Flowchart: Decision 33"/>
+          <p:cNvSpPr/>
+          <p:nvPr/>
+        </p:nvSpPr>
+        <p:spPr>
+          <a:xfrm>
+            <a:off x="5366948" y="5059518"/>
+            <a:ext cx="1713470" cy="641887"/>
+          </a:xfrm>
+          <a:prstGeom prst="flowChartDecision">
+            <a:avLst/>
+          </a:prstGeom>
+          <a:solidFill>
+            <a:schemeClr val="bg1"/>
+          </a:solidFill>
+        </p:spPr>
+        <p:style>
+          <a:lnRef idx="2">
+            <a:schemeClr val="accent1">
+              <a:shade val="50000"/>
+            </a:schemeClr>
+          </a:lnRef>
+          <a:fillRef idx="1">
+            <a:schemeClr val="accent1"/>
+          </a:fillRef>
+          <a:effectRef idx="0">
+            <a:schemeClr val="accent1"/>
+          </a:effectRef>
+          <a:fontRef idx="minor">
+            <a:schemeClr val="lt1"/>
+          </a:fontRef>
+        </p:style>
+        <p:txBody>
+          <a:bodyPr rtlCol="0" anchor="ctr"/>
+          <a:lstStyle/>
+          <a:p>
+            <a:pPr algn="ctr"/>
+            <a:r>
+              <a:rPr lang="en-US" sz="900" dirty="0" smtClean="0">
+                <a:solidFill>
+                  <a:schemeClr val="tx1"/>
+                </a:solidFill>
+              </a:rPr>
+              <a:t>If (a mod d) and (b mod d) = 0</a:t>
+            </a:r>
+            <a:endParaRPr lang="en-US" sz="900" dirty="0">
+              <a:solidFill>
+                <a:schemeClr val="tx1"/>
+              </a:solidFill>
+            </a:endParaRPr>
+          </a:p>
+        </p:txBody>
+      </p:sp>
+      <p:sp>
+        <p:nvSpPr>
+          <p:cNvPr id="35" name="Flowchart: Data 34"/>
+          <p:cNvSpPr/>
+          <p:nvPr/>
+        </p:nvSpPr>
+        <p:spPr>
+          <a:xfrm>
+            <a:off x="2839927" y="5239390"/>
+            <a:ext cx="1266578" cy="280086"/>
+          </a:xfrm>
+          <a:prstGeom prst="flowChartInputOutput">
+            <a:avLst/>
+          </a:prstGeom>
+          <a:solidFill>
+            <a:schemeClr val="bg1"/>
+          </a:solidFill>
+        </p:spPr>
+        <p:style>
+          <a:lnRef idx="2">
+            <a:schemeClr val="accent1">
+              <a:shade val="50000"/>
+            </a:schemeClr>
+          </a:lnRef>
+          <a:fillRef idx="1">
+            <a:schemeClr val="accent1"/>
+          </a:fillRef>
+          <a:effectRef idx="0">
+            <a:schemeClr val="accent1"/>
+          </a:effectRef>
+          <a:fontRef idx="minor">
+            <a:schemeClr val="lt1"/>
+          </a:fontRef>
+        </p:style>
+        <p:txBody>
+          <a:bodyPr rtlCol="0" anchor="ctr"/>
+          <a:lstStyle/>
+          <a:p>
+            <a:pPr algn="ctr"/>
+            <a:r>
+              <a:rPr lang="en-US" sz="1000" dirty="0" smtClean="0">
+                <a:solidFill>
+                  <a:schemeClr val="tx1"/>
+                </a:solidFill>
+              </a:rPr>
+              <a:t>Display “d is the HCF”</a:t>
+            </a:r>
+            <a:endParaRPr lang="en-US" sz="1000" dirty="0">
+              <a:solidFill>
+                <a:schemeClr val="tx1"/>
+              </a:solidFill>
+            </a:endParaRPr>
+          </a:p>
+        </p:txBody>
+      </p:sp>
+      <p:cxnSp>
+        <p:nvCxnSpPr>
+          <p:cNvPr id="36" name="Straight Arrow Connector 35"/>
+          <p:cNvCxnSpPr>
+            <a:stCxn id="34" idx="1"/>
+            <a:endCxn id="129" idx="3"/>
+          </p:cNvCxnSpPr>
+          <p:nvPr/>
+        </p:nvCxnSpPr>
+        <p:spPr>
+          <a:xfrm flipH="1">
+            <a:off x="5071380" y="5380462"/>
+            <a:ext cx="295568" cy="3927"/>
+          </a:xfrm>
+          <a:prstGeom prst="straightConnector1">
+            <a:avLst/>
+          </a:prstGeom>
+          <a:ln>
+            <a:tailEnd type="triangle"/>
+          </a:ln>
+        </p:spPr>
+        <p:style>
+          <a:lnRef idx="1">
+            <a:schemeClr val="accent1"/>
+          </a:lnRef>
+          <a:fillRef idx="0">
+            <a:schemeClr val="accent1"/>
+          </a:fillRef>
+          <a:effectRef idx="0">
+            <a:schemeClr val="accent1"/>
+          </a:effectRef>
+          <a:fontRef idx="minor">
+            <a:schemeClr val="tx1"/>
+          </a:fontRef>
+        </p:style>
+      </p:cxnSp>
+      <p:sp>
+        <p:nvSpPr>
+          <p:cNvPr id="37" name="Oval 36"/>
+          <p:cNvSpPr/>
+          <p:nvPr/>
+        </p:nvSpPr>
+        <p:spPr>
+          <a:xfrm>
+            <a:off x="3174593" y="5686293"/>
+            <a:ext cx="597245" cy="222422"/>
+          </a:xfrm>
+          <a:prstGeom prst="ellipse">
+            <a:avLst/>
+          </a:prstGeom>
+          <a:solidFill>
+            <a:schemeClr val="bg1"/>
+          </a:solidFill>
+        </p:spPr>
+        <p:style>
+          <a:lnRef idx="2">
+            <a:schemeClr val="accent1">
+              <a:shade val="50000"/>
+            </a:schemeClr>
+          </a:lnRef>
+          <a:fillRef idx="1">
+            <a:schemeClr val="accent1"/>
+          </a:fillRef>
+          <a:effectRef idx="0">
+            <a:schemeClr val="accent1"/>
+          </a:effectRef>
+          <a:fontRef idx="minor">
+            <a:schemeClr val="lt1"/>
+          </a:fontRef>
+        </p:style>
+        <p:txBody>
+          <a:bodyPr rtlCol="0" anchor="ctr"/>
+          <a:lstStyle/>
+          <a:p>
+            <a:pPr algn="ctr"/>
+            <a:r>
+              <a:rPr lang="en-US" sz="1000" dirty="0" smtClean="0">
+                <a:solidFill>
+                  <a:schemeClr val="tx1"/>
+                </a:solidFill>
+              </a:rPr>
+              <a:t>End</a:t>
+            </a:r>
+            <a:endParaRPr lang="en-US" sz="1000" dirty="0">
+              <a:solidFill>
+                <a:schemeClr val="tx1"/>
+              </a:solidFill>
+            </a:endParaRPr>
+          </a:p>
+        </p:txBody>
+      </p:sp>
+      <p:cxnSp>
+        <p:nvCxnSpPr>
+          <p:cNvPr id="38" name="Straight Arrow Connector 37"/>
+          <p:cNvCxnSpPr>
+            <a:stCxn id="35" idx="4"/>
+            <a:endCxn id="37" idx="0"/>
+          </p:cNvCxnSpPr>
+          <p:nvPr/>
+        </p:nvCxnSpPr>
+        <p:spPr>
+          <a:xfrm>
+            <a:off x="3473216" y="5519476"/>
+            <a:ext cx="0" cy="166817"/>
+          </a:xfrm>
+          <a:prstGeom prst="straightConnector1">
+            <a:avLst/>
+          </a:prstGeom>
+          <a:ln>
+            <a:tailEnd type="triangle"/>
+          </a:ln>
+        </p:spPr>
+        <p:style>
+          <a:lnRef idx="1">
+            <a:schemeClr val="accent1"/>
+          </a:lnRef>
+          <a:fillRef idx="0">
+            <a:schemeClr val="accent1"/>
+          </a:fillRef>
+          <a:effectRef idx="0">
+            <a:schemeClr val="accent1"/>
+          </a:effectRef>
+          <a:fontRef idx="minor">
+            <a:schemeClr val="tx1"/>
+          </a:fontRef>
+        </p:style>
+      </p:cxnSp>
+      <p:cxnSp>
+        <p:nvCxnSpPr>
+          <p:cNvPr id="39" name="Straight Arrow Connector 38"/>
+          <p:cNvCxnSpPr>
+            <a:stCxn id="32" idx="2"/>
+            <a:endCxn id="34" idx="0"/>
+          </p:cNvCxnSpPr>
+          <p:nvPr/>
+        </p:nvCxnSpPr>
+        <p:spPr>
+          <a:xfrm flipH="1">
+            <a:off x="6223683" y="4850838"/>
+            <a:ext cx="3" cy="208680"/>
+          </a:xfrm>
+          <a:prstGeom prst="straightConnector1">
+            <a:avLst/>
+          </a:prstGeom>
+          <a:ln>
+            <a:tailEnd type="triangle"/>
+          </a:ln>
+        </p:spPr>
+        <p:style>
+          <a:lnRef idx="1">
+            <a:schemeClr val="accent1"/>
+          </a:lnRef>
+          <a:fillRef idx="0">
+            <a:schemeClr val="accent1"/>
+          </a:fillRef>
+          <a:effectRef idx="0">
+            <a:schemeClr val="accent1"/>
+          </a:effectRef>
+          <a:fontRef idx="minor">
+            <a:schemeClr val="tx1"/>
+          </a:fontRef>
+        </p:style>
+      </p:cxnSp>
+      <p:cxnSp>
+        <p:nvCxnSpPr>
+          <p:cNvPr id="40" name="Straight Arrow Connector 39"/>
+          <p:cNvCxnSpPr>
+            <a:stCxn id="34" idx="2"/>
+            <a:endCxn id="41" idx="0"/>
+          </p:cNvCxnSpPr>
+          <p:nvPr/>
+        </p:nvCxnSpPr>
+        <p:spPr>
+          <a:xfrm flipH="1">
+            <a:off x="6223682" y="5701405"/>
+            <a:ext cx="1" cy="233394"/>
+          </a:xfrm>
+          <a:prstGeom prst="straightConnector1">
+            <a:avLst/>
+          </a:prstGeom>
+          <a:ln>
+            <a:tailEnd type="triangle"/>
+          </a:ln>
+        </p:spPr>
+        <p:style>
+          <a:lnRef idx="1">
+            <a:schemeClr val="accent1"/>
+          </a:lnRef>
+          <a:fillRef idx="0">
+            <a:schemeClr val="accent1"/>
+          </a:fillRef>
+          <a:effectRef idx="0">
+            <a:schemeClr val="accent1"/>
+          </a:effectRef>
+          <a:fontRef idx="minor">
+            <a:schemeClr val="tx1"/>
+          </a:fontRef>
+        </p:style>
+      </p:cxnSp>
+      <p:sp>
+        <p:nvSpPr>
+          <p:cNvPr id="41" name="Rectangle 40"/>
+          <p:cNvSpPr/>
+          <p:nvPr/>
+        </p:nvSpPr>
+        <p:spPr>
+          <a:xfrm>
+            <a:off x="5601725" y="5934799"/>
+            <a:ext cx="1243914" cy="171498"/>
+          </a:xfrm>
+          <a:prstGeom prst="rect">
+            <a:avLst/>
+          </a:prstGeom>
+          <a:solidFill>
+            <a:schemeClr val="bg1"/>
+          </a:solidFill>
+        </p:spPr>
+        <p:style>
+          <a:lnRef idx="2">
+            <a:schemeClr val="accent1">
+              <a:shade val="50000"/>
+            </a:schemeClr>
+          </a:lnRef>
+          <a:fillRef idx="1">
+            <a:schemeClr val="accent1"/>
+          </a:fillRef>
+          <a:effectRef idx="0">
+            <a:schemeClr val="accent1"/>
+          </a:effectRef>
+          <a:fontRef idx="minor">
+            <a:schemeClr val="lt1"/>
+          </a:fontRef>
+        </p:style>
+        <p:txBody>
+          <a:bodyPr rtlCol="0" anchor="ctr"/>
+          <a:lstStyle/>
+          <a:p>
+            <a:pPr algn="ctr"/>
+            <a:r>
+              <a:rPr lang="en-US" sz="1000" dirty="0" smtClean="0">
+                <a:solidFill>
+                  <a:schemeClr val="tx1"/>
+                </a:solidFill>
+              </a:rPr>
+              <a:t>Decrement c by 1</a:t>
+            </a:r>
+            <a:endParaRPr lang="en-US" sz="1000" dirty="0">
+              <a:solidFill>
+                <a:schemeClr val="tx1"/>
+              </a:solidFill>
+            </a:endParaRPr>
+          </a:p>
+        </p:txBody>
+      </p:sp>
+      <p:cxnSp>
+        <p:nvCxnSpPr>
+          <p:cNvPr id="42" name="Elbow Connector 41"/>
+          <p:cNvCxnSpPr>
+            <a:stCxn id="41" idx="3"/>
+            <a:endCxn id="32" idx="3"/>
+          </p:cNvCxnSpPr>
+          <p:nvPr/>
+        </p:nvCxnSpPr>
+        <p:spPr>
+          <a:xfrm flipH="1" flipV="1">
+            <a:off x="6744727" y="4541919"/>
+            <a:ext cx="100912" cy="1478629"/>
+          </a:xfrm>
+          <a:prstGeom prst="bentConnector3">
+            <a:avLst>
+              <a:gd name="adj1" fmla="val -324495"/>
+            </a:avLst>
+          </a:prstGeom>
+          <a:ln>
+            <a:tailEnd type="triangle"/>
+          </a:ln>
+        </p:spPr>
+        <p:style>
+          <a:lnRef idx="1">
+            <a:schemeClr val="accent1"/>
+          </a:lnRef>
+          <a:fillRef idx="0">
+            <a:schemeClr val="accent1"/>
+          </a:fillRef>
+          <a:effectRef idx="0">
+            <a:schemeClr val="accent1"/>
+          </a:effectRef>
+          <a:fontRef idx="minor">
+            <a:schemeClr val="tx1"/>
+          </a:fontRef>
+        </p:style>
+      </p:cxnSp>
+      <p:sp>
+        <p:nvSpPr>
+          <p:cNvPr id="43" name="TextBox 42"/>
+          <p:cNvSpPr txBox="1"/>
+          <p:nvPr/>
+        </p:nvSpPr>
+        <p:spPr>
+          <a:xfrm>
+            <a:off x="5855042" y="4820637"/>
+            <a:ext cx="473671" cy="246221"/>
+          </a:xfrm>
+          <a:prstGeom prst="rect">
+            <a:avLst/>
+          </a:prstGeom>
+          <a:noFill/>
+        </p:spPr>
+        <p:txBody>
+          <a:bodyPr wrap="square" rtlCol="0">
+            <a:spAutoFit/>
+          </a:bodyPr>
+          <a:lstStyle/>
+          <a:p>
+            <a:r>
+              <a:rPr lang="en-US" sz="1000" dirty="0" smtClean="0"/>
+              <a:t>True</a:t>
+            </a:r>
+            <a:endParaRPr lang="en-US" sz="1000" dirty="0"/>
+          </a:p>
+        </p:txBody>
+      </p:sp>
+      <p:sp>
+        <p:nvSpPr>
+          <p:cNvPr id="44" name="TextBox 43"/>
+          <p:cNvSpPr txBox="1"/>
+          <p:nvPr/>
+        </p:nvSpPr>
+        <p:spPr>
+          <a:xfrm>
+            <a:off x="4773820" y="3141695"/>
+            <a:ext cx="473671" cy="246221"/>
+          </a:xfrm>
+          <a:prstGeom prst="rect">
+            <a:avLst/>
+          </a:prstGeom>
+          <a:noFill/>
+        </p:spPr>
+        <p:txBody>
+          <a:bodyPr wrap="square" rtlCol="0">
+            <a:spAutoFit/>
+          </a:bodyPr>
+          <a:lstStyle/>
+          <a:p>
+            <a:r>
+              <a:rPr lang="en-US" sz="1000" dirty="0" smtClean="0"/>
+              <a:t>True</a:t>
+            </a:r>
+            <a:endParaRPr lang="en-US" sz="1000" dirty="0"/>
+          </a:p>
+        </p:txBody>
+      </p:sp>
+      <p:cxnSp>
+        <p:nvCxnSpPr>
+          <p:cNvPr id="45" name="Straight Arrow Connector 44"/>
+          <p:cNvCxnSpPr>
+            <a:stCxn id="32" idx="1"/>
+            <a:endCxn id="46" idx="6"/>
+          </p:cNvCxnSpPr>
+          <p:nvPr/>
+        </p:nvCxnSpPr>
+        <p:spPr>
+          <a:xfrm flipH="1">
+            <a:off x="5397840" y="4541919"/>
+            <a:ext cx="304804" cy="0"/>
+          </a:xfrm>
+          <a:prstGeom prst="straightConnector1">
+            <a:avLst/>
+          </a:prstGeom>
+          <a:ln>
+            <a:tailEnd type="triangle"/>
+          </a:ln>
+        </p:spPr>
+        <p:style>
+          <a:lnRef idx="1">
+            <a:schemeClr val="accent1"/>
+          </a:lnRef>
+          <a:fillRef idx="0">
+            <a:schemeClr val="accent1"/>
+          </a:fillRef>
+          <a:effectRef idx="0">
+            <a:schemeClr val="accent1"/>
+          </a:effectRef>
+          <a:fontRef idx="minor">
+            <a:schemeClr val="tx1"/>
+          </a:fontRef>
+        </p:style>
+      </p:cxnSp>
+      <p:sp>
+        <p:nvSpPr>
+          <p:cNvPr id="46" name="Oval 45"/>
+          <p:cNvSpPr/>
+          <p:nvPr/>
+        </p:nvSpPr>
+        <p:spPr>
+          <a:xfrm>
+            <a:off x="4831490" y="4430708"/>
+            <a:ext cx="566350" cy="222422"/>
+          </a:xfrm>
+          <a:prstGeom prst="ellipse">
+            <a:avLst/>
+          </a:prstGeom>
+          <a:solidFill>
+            <a:schemeClr val="bg1"/>
+          </a:solidFill>
+        </p:spPr>
+        <p:style>
+          <a:lnRef idx="2">
+            <a:schemeClr val="accent1">
+              <a:shade val="50000"/>
+            </a:schemeClr>
+          </a:lnRef>
+          <a:fillRef idx="1">
+            <a:schemeClr val="accent1"/>
+          </a:fillRef>
+          <a:effectRef idx="0">
+            <a:schemeClr val="accent1"/>
+          </a:effectRef>
+          <a:fontRef idx="minor">
+            <a:schemeClr val="lt1"/>
+          </a:fontRef>
+        </p:style>
+        <p:txBody>
+          <a:bodyPr rtlCol="0" anchor="ctr"/>
+          <a:lstStyle/>
+          <a:p>
+            <a:pPr algn="ctr"/>
+            <a:r>
+              <a:rPr lang="en-US" sz="1000" dirty="0" smtClean="0">
+                <a:solidFill>
+                  <a:schemeClr val="tx1"/>
+                </a:solidFill>
+              </a:rPr>
+              <a:t>End</a:t>
+            </a:r>
+            <a:endParaRPr lang="en-US" sz="1000" dirty="0">
+              <a:solidFill>
+                <a:schemeClr val="tx1"/>
+              </a:solidFill>
+            </a:endParaRPr>
+          </a:p>
+        </p:txBody>
+      </p:sp>
+      <p:sp>
+        <p:nvSpPr>
+          <p:cNvPr id="47" name="TextBox 46"/>
+          <p:cNvSpPr txBox="1"/>
+          <p:nvPr/>
+        </p:nvSpPr>
+        <p:spPr>
+          <a:xfrm>
+            <a:off x="5330913" y="4359964"/>
+            <a:ext cx="473671" cy="246221"/>
+          </a:xfrm>
+          <a:prstGeom prst="rect">
+            <a:avLst/>
+          </a:prstGeom>
+          <a:noFill/>
+        </p:spPr>
+        <p:txBody>
+          <a:bodyPr wrap="square" rtlCol="0">
+            <a:spAutoFit/>
+          </a:bodyPr>
+          <a:lstStyle/>
+          <a:p>
+            <a:r>
+              <a:rPr lang="en-US" sz="1000" dirty="0" smtClean="0"/>
+              <a:t>False</a:t>
+            </a:r>
+            <a:endParaRPr lang="en-US" sz="1000" dirty="0"/>
+          </a:p>
+        </p:txBody>
+      </p:sp>
+      <p:sp>
+        <p:nvSpPr>
+          <p:cNvPr id="48" name="TextBox 47"/>
+          <p:cNvSpPr txBox="1"/>
+          <p:nvPr/>
+        </p:nvSpPr>
+        <p:spPr>
+          <a:xfrm>
+            <a:off x="5039488" y="5030802"/>
+            <a:ext cx="473671" cy="246221"/>
+          </a:xfrm>
+          <a:prstGeom prst="rect">
+            <a:avLst/>
+          </a:prstGeom>
+          <a:noFill/>
+        </p:spPr>
+        <p:txBody>
+          <a:bodyPr wrap="square" rtlCol="0">
+            <a:spAutoFit/>
+          </a:bodyPr>
+          <a:lstStyle/>
+          <a:p>
+            <a:r>
+              <a:rPr lang="en-US" sz="1000" dirty="0" smtClean="0"/>
+              <a:t>True</a:t>
+            </a:r>
+            <a:endParaRPr lang="en-US" sz="1000" dirty="0"/>
+          </a:p>
+        </p:txBody>
+      </p:sp>
+      <p:sp>
+        <p:nvSpPr>
+          <p:cNvPr id="49" name="TextBox 48"/>
+          <p:cNvSpPr txBox="1"/>
+          <p:nvPr/>
+        </p:nvSpPr>
+        <p:spPr>
+          <a:xfrm>
+            <a:off x="5848861" y="5651217"/>
+            <a:ext cx="473671" cy="246221"/>
+          </a:xfrm>
+          <a:prstGeom prst="rect">
+            <a:avLst/>
+          </a:prstGeom>
+          <a:noFill/>
+        </p:spPr>
+        <p:txBody>
+          <a:bodyPr wrap="square" rtlCol="0">
+            <a:spAutoFit/>
+          </a:bodyPr>
+          <a:lstStyle/>
+          <a:p>
+            <a:r>
+              <a:rPr lang="en-US" sz="1000" dirty="0" smtClean="0"/>
+              <a:t>False</a:t>
+            </a:r>
+            <a:endParaRPr lang="en-US" sz="1000" dirty="0"/>
+          </a:p>
+        </p:txBody>
+      </p:sp>
+      <p:sp>
+        <p:nvSpPr>
+          <p:cNvPr id="50" name="Rectangle 49"/>
+          <p:cNvSpPr/>
+          <p:nvPr/>
+        </p:nvSpPr>
+        <p:spPr>
+          <a:xfrm>
+            <a:off x="8237833" y="2600799"/>
+            <a:ext cx="653877" cy="274609"/>
+          </a:xfrm>
+          <a:prstGeom prst="rect">
+            <a:avLst/>
+          </a:prstGeom>
+          <a:solidFill>
+            <a:schemeClr val="bg1"/>
+          </a:solidFill>
+        </p:spPr>
+        <p:style>
+          <a:lnRef idx="2">
+            <a:schemeClr val="accent1">
+              <a:shade val="50000"/>
+            </a:schemeClr>
+          </a:lnRef>
+          <a:fillRef idx="1">
+            <a:schemeClr val="accent1"/>
+          </a:fillRef>
+          <a:effectRef idx="0">
+            <a:schemeClr val="accent1"/>
+          </a:effectRef>
+          <a:fontRef idx="minor">
+            <a:schemeClr val="lt1"/>
+          </a:fontRef>
+        </p:style>
+        <p:txBody>
+          <a:bodyPr rtlCol="0" anchor="ctr"/>
+          <a:lstStyle/>
+          <a:p>
+            <a:pPr algn="ctr"/>
+            <a:r>
+              <a:rPr lang="en-US" sz="1000" dirty="0" smtClean="0">
+                <a:solidFill>
+                  <a:schemeClr val="tx1"/>
+                </a:solidFill>
+              </a:rPr>
+              <a:t>d = b - a</a:t>
+            </a:r>
+            <a:endParaRPr lang="en-US" sz="1000" dirty="0">
+              <a:solidFill>
+                <a:schemeClr val="tx1"/>
+              </a:solidFill>
+            </a:endParaRPr>
+          </a:p>
+        </p:txBody>
+      </p:sp>
+      <p:sp>
+        <p:nvSpPr>
+          <p:cNvPr id="51" name="Flowchart: Decision 50"/>
+          <p:cNvSpPr/>
+          <p:nvPr/>
+        </p:nvSpPr>
+        <p:spPr>
+          <a:xfrm>
+            <a:off x="10272584" y="3028684"/>
+            <a:ext cx="1713470" cy="641887"/>
+          </a:xfrm>
+          <a:prstGeom prst="flowChartDecision">
+            <a:avLst/>
+          </a:prstGeom>
+          <a:solidFill>
+            <a:schemeClr val="bg1"/>
+          </a:solidFill>
+        </p:spPr>
+        <p:style>
+          <a:lnRef idx="2">
+            <a:schemeClr val="accent1">
+              <a:shade val="50000"/>
+            </a:schemeClr>
+          </a:lnRef>
+          <a:fillRef idx="1">
+            <a:schemeClr val="accent1"/>
+          </a:fillRef>
+          <a:effectRef idx="0">
+            <a:schemeClr val="accent1"/>
+          </a:effectRef>
+          <a:fontRef idx="minor">
+            <a:schemeClr val="lt1"/>
+          </a:fontRef>
+        </p:style>
+        <p:txBody>
+          <a:bodyPr rtlCol="0" anchor="ctr"/>
+          <a:lstStyle/>
+          <a:p>
+            <a:pPr algn="ctr"/>
+            <a:r>
+              <a:rPr lang="en-US" sz="900" dirty="0" smtClean="0">
+                <a:solidFill>
+                  <a:schemeClr val="tx1"/>
+                </a:solidFill>
+              </a:rPr>
+              <a:t>If (a mod d) and (b mod d) = 0</a:t>
+            </a:r>
+            <a:endParaRPr lang="en-US" sz="900" dirty="0">
+              <a:solidFill>
+                <a:schemeClr val="tx1"/>
+              </a:solidFill>
+            </a:endParaRPr>
+          </a:p>
+        </p:txBody>
+      </p:sp>
+      <p:cxnSp>
+        <p:nvCxnSpPr>
+          <p:cNvPr id="52" name="Straight Arrow Connector 51"/>
+          <p:cNvCxnSpPr>
+            <a:stCxn id="51" idx="1"/>
+            <a:endCxn id="109" idx="3"/>
+          </p:cNvCxnSpPr>
+          <p:nvPr/>
+        </p:nvCxnSpPr>
+        <p:spPr>
+          <a:xfrm flipH="1">
+            <a:off x="10031629" y="3349628"/>
+            <a:ext cx="240955" cy="2711"/>
+          </a:xfrm>
+          <a:prstGeom prst="straightConnector1">
+            <a:avLst/>
+          </a:prstGeom>
+          <a:ln>
+            <a:tailEnd type="triangle"/>
+          </a:ln>
+        </p:spPr>
+        <p:style>
+          <a:lnRef idx="1">
+            <a:schemeClr val="accent1"/>
+          </a:lnRef>
+          <a:fillRef idx="0">
+            <a:schemeClr val="accent1"/>
+          </a:fillRef>
+          <a:effectRef idx="0">
+            <a:schemeClr val="accent1"/>
+          </a:effectRef>
+          <a:fontRef idx="minor">
+            <a:schemeClr val="tx1"/>
+          </a:fontRef>
+        </p:style>
+      </p:cxnSp>
+      <p:sp>
+        <p:nvSpPr>
+          <p:cNvPr id="53" name="Flowchart: Data 52"/>
+          <p:cNvSpPr/>
+          <p:nvPr/>
+        </p:nvSpPr>
+        <p:spPr>
+          <a:xfrm>
+            <a:off x="7724002" y="3212937"/>
+            <a:ext cx="1388091" cy="280086"/>
+          </a:xfrm>
+          <a:prstGeom prst="flowChartInputOutput">
+            <a:avLst/>
+          </a:prstGeom>
+          <a:solidFill>
+            <a:schemeClr val="bg1"/>
+          </a:solidFill>
+        </p:spPr>
+        <p:style>
+          <a:lnRef idx="2">
+            <a:schemeClr val="accent1">
+              <a:shade val="50000"/>
+            </a:schemeClr>
+          </a:lnRef>
+          <a:fillRef idx="1">
+            <a:schemeClr val="accent1"/>
+          </a:fillRef>
+          <a:effectRef idx="0">
+            <a:schemeClr val="accent1"/>
+          </a:effectRef>
+          <a:fontRef idx="minor">
+            <a:schemeClr val="lt1"/>
+          </a:fontRef>
+        </p:style>
+        <p:txBody>
+          <a:bodyPr rtlCol="0" anchor="ctr"/>
+          <a:lstStyle/>
+          <a:p>
+            <a:pPr algn="ctr"/>
+            <a:r>
+              <a:rPr lang="en-US" sz="1000" dirty="0" smtClean="0">
+                <a:solidFill>
+                  <a:schemeClr val="tx1"/>
+                </a:solidFill>
+              </a:rPr>
+              <a:t>Display “d is the HCF”</a:t>
+            </a:r>
+            <a:endParaRPr lang="en-US" sz="1000" dirty="0">
+              <a:solidFill>
+                <a:schemeClr val="tx1"/>
+              </a:solidFill>
+            </a:endParaRPr>
+          </a:p>
+        </p:txBody>
+      </p:sp>
+      <p:sp>
+        <p:nvSpPr>
+          <p:cNvPr id="54" name="Oval 53"/>
+          <p:cNvSpPr/>
+          <p:nvPr/>
+        </p:nvSpPr>
+        <p:spPr>
+          <a:xfrm>
+            <a:off x="8105010" y="3617933"/>
+            <a:ext cx="626074" cy="222422"/>
+          </a:xfrm>
+          <a:prstGeom prst="ellipse">
+            <a:avLst/>
+          </a:prstGeom>
+          <a:solidFill>
+            <a:schemeClr val="bg1"/>
+          </a:solidFill>
+        </p:spPr>
+        <p:style>
+          <a:lnRef idx="2">
+            <a:schemeClr val="accent1">
+              <a:shade val="50000"/>
+            </a:schemeClr>
+          </a:lnRef>
+          <a:fillRef idx="1">
+            <a:schemeClr val="accent1"/>
+          </a:fillRef>
+          <a:effectRef idx="0">
+            <a:schemeClr val="accent1"/>
+          </a:effectRef>
+          <a:fontRef idx="minor">
+            <a:schemeClr val="lt1"/>
+          </a:fontRef>
+        </p:style>
+        <p:txBody>
+          <a:bodyPr rtlCol="0" anchor="ctr"/>
+          <a:lstStyle/>
+          <a:p>
+            <a:pPr algn="ctr"/>
+            <a:r>
+              <a:rPr lang="en-US" sz="1000" dirty="0" smtClean="0">
+                <a:solidFill>
+                  <a:schemeClr val="tx1"/>
+                </a:solidFill>
+              </a:rPr>
+              <a:t>End</a:t>
+            </a:r>
+            <a:endParaRPr lang="en-US" sz="1000" dirty="0">
+              <a:solidFill>
+                <a:schemeClr val="tx1"/>
+              </a:solidFill>
+            </a:endParaRPr>
+          </a:p>
+        </p:txBody>
+      </p:sp>
+      <p:cxnSp>
+        <p:nvCxnSpPr>
+          <p:cNvPr id="55" name="Straight Arrow Connector 54"/>
+          <p:cNvCxnSpPr>
+            <a:stCxn id="53" idx="4"/>
+            <a:endCxn id="54" idx="0"/>
+          </p:cNvCxnSpPr>
+          <p:nvPr/>
+        </p:nvCxnSpPr>
+        <p:spPr>
+          <a:xfrm flipH="1">
+            <a:off x="8418047" y="3493023"/>
+            <a:ext cx="1" cy="124910"/>
+          </a:xfrm>
+          <a:prstGeom prst="straightConnector1">
+            <a:avLst/>
+          </a:prstGeom>
+          <a:ln>
+            <a:tailEnd type="triangle"/>
+          </a:ln>
+        </p:spPr>
+        <p:style>
+          <a:lnRef idx="1">
+            <a:schemeClr val="accent1"/>
+          </a:lnRef>
+          <a:fillRef idx="0">
+            <a:schemeClr val="accent1"/>
+          </a:fillRef>
+          <a:effectRef idx="0">
+            <a:schemeClr val="accent1"/>
+          </a:effectRef>
+          <a:fontRef idx="minor">
+            <a:schemeClr val="tx1"/>
+          </a:fontRef>
+        </p:style>
+      </p:cxnSp>
+      <p:cxnSp>
+        <p:nvCxnSpPr>
+          <p:cNvPr id="56" name="Straight Arrow Connector 55"/>
+          <p:cNvCxnSpPr>
+            <a:stCxn id="51" idx="2"/>
+            <a:endCxn id="57" idx="0"/>
+          </p:cNvCxnSpPr>
+          <p:nvPr/>
+        </p:nvCxnSpPr>
+        <p:spPr>
+          <a:xfrm>
+            <a:off x="11129319" y="3670571"/>
+            <a:ext cx="6179" cy="173875"/>
+          </a:xfrm>
+          <a:prstGeom prst="straightConnector1">
+            <a:avLst/>
+          </a:prstGeom>
+          <a:ln>
+            <a:tailEnd type="triangle"/>
+          </a:ln>
+        </p:spPr>
+        <p:style>
+          <a:lnRef idx="1">
+            <a:schemeClr val="accent1"/>
+          </a:lnRef>
+          <a:fillRef idx="0">
+            <a:schemeClr val="accent1"/>
+          </a:fillRef>
+          <a:effectRef idx="0">
+            <a:schemeClr val="accent1"/>
+          </a:effectRef>
+          <a:fontRef idx="minor">
+            <a:schemeClr val="tx1"/>
+          </a:fontRef>
+        </p:style>
+      </p:cxnSp>
+      <p:sp>
+        <p:nvSpPr>
+          <p:cNvPr id="57" name="Rectangle 56"/>
+          <p:cNvSpPr/>
+          <p:nvPr/>
+        </p:nvSpPr>
+        <p:spPr>
+          <a:xfrm>
+            <a:off x="10725669" y="3844446"/>
+            <a:ext cx="819658" cy="196458"/>
+          </a:xfrm>
+          <a:prstGeom prst="rect">
+            <a:avLst/>
+          </a:prstGeom>
+          <a:solidFill>
+            <a:schemeClr val="bg1"/>
+          </a:solidFill>
+        </p:spPr>
+        <p:style>
+          <a:lnRef idx="2">
+            <a:schemeClr val="accent1">
+              <a:shade val="50000"/>
+            </a:schemeClr>
+          </a:lnRef>
+          <a:fillRef idx="1">
+            <a:schemeClr val="accent1"/>
+          </a:fillRef>
+          <a:effectRef idx="0">
+            <a:schemeClr val="accent1"/>
+          </a:effectRef>
+          <a:fontRef idx="minor">
+            <a:schemeClr val="lt1"/>
+          </a:fontRef>
+        </p:style>
+        <p:txBody>
+          <a:bodyPr rtlCol="0" anchor="ctr"/>
+          <a:lstStyle/>
+          <a:p>
+            <a:pPr algn="ctr"/>
+            <a:r>
+              <a:rPr lang="en-US" sz="1000" dirty="0" smtClean="0">
+                <a:solidFill>
+                  <a:schemeClr val="tx1"/>
+                </a:solidFill>
+              </a:rPr>
+              <a:t>c = d</a:t>
+            </a:r>
+            <a:endParaRPr lang="en-US" sz="1000" dirty="0">
+              <a:solidFill>
+                <a:schemeClr val="tx1"/>
+              </a:solidFill>
+            </a:endParaRPr>
+          </a:p>
+        </p:txBody>
+      </p:sp>
+      <p:sp>
+        <p:nvSpPr>
+          <p:cNvPr id="58" name="Flowchart: Decision 57"/>
+          <p:cNvSpPr/>
+          <p:nvPr/>
+        </p:nvSpPr>
+        <p:spPr>
+          <a:xfrm>
+            <a:off x="10624746" y="4212402"/>
+            <a:ext cx="1042083" cy="617838"/>
+          </a:xfrm>
+          <a:prstGeom prst="flowChartDecision">
+            <a:avLst/>
+          </a:prstGeom>
+          <a:solidFill>
+            <a:schemeClr val="bg1"/>
+          </a:solidFill>
+        </p:spPr>
+        <p:style>
+          <a:lnRef idx="2">
+            <a:schemeClr val="accent1">
+              <a:shade val="50000"/>
+            </a:schemeClr>
+          </a:lnRef>
+          <a:fillRef idx="1">
+            <a:schemeClr val="accent1"/>
+          </a:fillRef>
+          <a:effectRef idx="0">
+            <a:schemeClr val="accent1"/>
+          </a:effectRef>
+          <a:fontRef idx="minor">
+            <a:schemeClr val="lt1"/>
+          </a:fontRef>
+        </p:style>
+        <p:txBody>
+          <a:bodyPr rtlCol="0" anchor="ctr"/>
+          <a:lstStyle/>
+          <a:p>
+            <a:pPr algn="ctr"/>
+            <a:r>
+              <a:rPr lang="en-US" sz="1000" dirty="0" smtClean="0">
+                <a:solidFill>
+                  <a:schemeClr val="tx1"/>
+                </a:solidFill>
+              </a:rPr>
+              <a:t>While c !=0</a:t>
+            </a:r>
+            <a:endParaRPr lang="en-US" sz="1000" dirty="0">
+              <a:solidFill>
+                <a:schemeClr val="tx1"/>
+              </a:solidFill>
+            </a:endParaRPr>
+          </a:p>
+        </p:txBody>
+      </p:sp>
+      <p:cxnSp>
+        <p:nvCxnSpPr>
+          <p:cNvPr id="59" name="Straight Arrow Connector 58"/>
+          <p:cNvCxnSpPr>
+            <a:stCxn id="57" idx="2"/>
+            <a:endCxn id="58" idx="0"/>
+          </p:cNvCxnSpPr>
+          <p:nvPr/>
+        </p:nvCxnSpPr>
+        <p:spPr>
+          <a:xfrm>
+            <a:off x="11135498" y="4040904"/>
+            <a:ext cx="10290" cy="171498"/>
+          </a:xfrm>
+          <a:prstGeom prst="straightConnector1">
+            <a:avLst/>
+          </a:prstGeom>
+          <a:ln>
+            <a:tailEnd type="triangle"/>
+          </a:ln>
+        </p:spPr>
+        <p:style>
+          <a:lnRef idx="1">
+            <a:schemeClr val="accent1"/>
+          </a:lnRef>
+          <a:fillRef idx="0">
+            <a:schemeClr val="accent1"/>
+          </a:fillRef>
+          <a:effectRef idx="0">
+            <a:schemeClr val="accent1"/>
+          </a:effectRef>
+          <a:fontRef idx="minor">
+            <a:schemeClr val="tx1"/>
+          </a:fontRef>
+        </p:style>
+      </p:cxnSp>
+      <p:sp>
+        <p:nvSpPr>
+          <p:cNvPr id="60" name="Flowchart: Decision 59"/>
+          <p:cNvSpPr/>
+          <p:nvPr/>
+        </p:nvSpPr>
+        <p:spPr>
+          <a:xfrm>
+            <a:off x="10289054" y="5038920"/>
+            <a:ext cx="1713470" cy="641887"/>
+          </a:xfrm>
+          <a:prstGeom prst="flowChartDecision">
+            <a:avLst/>
+          </a:prstGeom>
+          <a:solidFill>
+            <a:schemeClr val="bg1"/>
+          </a:solidFill>
+        </p:spPr>
+        <p:style>
+          <a:lnRef idx="2">
+            <a:schemeClr val="accent1">
+              <a:shade val="50000"/>
+            </a:schemeClr>
+          </a:lnRef>
+          <a:fillRef idx="1">
+            <a:schemeClr val="accent1"/>
+          </a:fillRef>
+          <a:effectRef idx="0">
+            <a:schemeClr val="accent1"/>
+          </a:effectRef>
+          <a:fontRef idx="minor">
+            <a:schemeClr val="lt1"/>
+          </a:fontRef>
+        </p:style>
+        <p:txBody>
+          <a:bodyPr rtlCol="0" anchor="ctr"/>
+          <a:lstStyle/>
+          <a:p>
+            <a:pPr algn="ctr"/>
+            <a:r>
+              <a:rPr lang="en-US" sz="900" dirty="0" smtClean="0">
+                <a:solidFill>
+                  <a:schemeClr val="tx1"/>
+                </a:solidFill>
+              </a:rPr>
+              <a:t>If (a mod d) and (b mod d) = 0</a:t>
+            </a:r>
+            <a:endParaRPr lang="en-US" sz="900" dirty="0">
+              <a:solidFill>
+                <a:schemeClr val="tx1"/>
+              </a:solidFill>
+            </a:endParaRPr>
+          </a:p>
+        </p:txBody>
+      </p:sp>
+      <p:sp>
+        <p:nvSpPr>
+          <p:cNvPr id="61" name="Flowchart: Data 60"/>
+          <p:cNvSpPr/>
+          <p:nvPr/>
+        </p:nvSpPr>
+        <p:spPr>
+          <a:xfrm>
+            <a:off x="7881529" y="5219820"/>
+            <a:ext cx="1266578" cy="280086"/>
+          </a:xfrm>
+          <a:prstGeom prst="flowChartInputOutput">
+            <a:avLst/>
+          </a:prstGeom>
+          <a:solidFill>
+            <a:schemeClr val="bg1"/>
+          </a:solidFill>
+        </p:spPr>
+        <p:style>
+          <a:lnRef idx="2">
+            <a:schemeClr val="accent1">
+              <a:shade val="50000"/>
+            </a:schemeClr>
+          </a:lnRef>
+          <a:fillRef idx="1">
+            <a:schemeClr val="accent1"/>
+          </a:fillRef>
+          <a:effectRef idx="0">
+            <a:schemeClr val="accent1"/>
+          </a:effectRef>
+          <a:fontRef idx="minor">
+            <a:schemeClr val="lt1"/>
+          </a:fontRef>
+        </p:style>
+        <p:txBody>
+          <a:bodyPr rtlCol="0" anchor="ctr"/>
+          <a:lstStyle/>
+          <a:p>
+            <a:pPr algn="ctr"/>
+            <a:r>
+              <a:rPr lang="en-US" sz="1000" dirty="0" smtClean="0">
+                <a:solidFill>
+                  <a:schemeClr val="tx1"/>
+                </a:solidFill>
+              </a:rPr>
+              <a:t>Display “d is the HCF”</a:t>
+            </a:r>
+            <a:endParaRPr lang="en-US" sz="1000" dirty="0">
+              <a:solidFill>
+                <a:schemeClr val="tx1"/>
+              </a:solidFill>
+            </a:endParaRPr>
+          </a:p>
+        </p:txBody>
+      </p:sp>
+      <p:cxnSp>
+        <p:nvCxnSpPr>
+          <p:cNvPr id="62" name="Straight Arrow Connector 61"/>
+          <p:cNvCxnSpPr>
+            <a:stCxn id="60" idx="1"/>
+            <a:endCxn id="155" idx="3"/>
+          </p:cNvCxnSpPr>
+          <p:nvPr/>
+        </p:nvCxnSpPr>
+        <p:spPr>
+          <a:xfrm flipH="1">
+            <a:off x="10100600" y="5359864"/>
+            <a:ext cx="188454" cy="1002"/>
+          </a:xfrm>
+          <a:prstGeom prst="straightConnector1">
+            <a:avLst/>
+          </a:prstGeom>
+          <a:ln>
+            <a:tailEnd type="triangle"/>
+          </a:ln>
+        </p:spPr>
+        <p:style>
+          <a:lnRef idx="1">
+            <a:schemeClr val="accent1"/>
+          </a:lnRef>
+          <a:fillRef idx="0">
+            <a:schemeClr val="accent1"/>
+          </a:fillRef>
+          <a:effectRef idx="0">
+            <a:schemeClr val="accent1"/>
+          </a:effectRef>
+          <a:fontRef idx="minor">
+            <a:schemeClr val="tx1"/>
+          </a:fontRef>
+        </p:style>
+      </p:cxnSp>
+      <p:sp>
+        <p:nvSpPr>
+          <p:cNvPr id="63" name="Oval 62"/>
+          <p:cNvSpPr/>
+          <p:nvPr/>
+        </p:nvSpPr>
+        <p:spPr>
+          <a:xfrm>
+            <a:off x="8116260" y="5670894"/>
+            <a:ext cx="537514" cy="222422"/>
+          </a:xfrm>
+          <a:prstGeom prst="ellipse">
+            <a:avLst/>
+          </a:prstGeom>
+          <a:solidFill>
+            <a:schemeClr val="bg1"/>
+          </a:solidFill>
+        </p:spPr>
+        <p:style>
+          <a:lnRef idx="2">
+            <a:schemeClr val="accent1">
+              <a:shade val="50000"/>
+            </a:schemeClr>
+          </a:lnRef>
+          <a:fillRef idx="1">
+            <a:schemeClr val="accent1"/>
+          </a:fillRef>
+          <a:effectRef idx="0">
+            <a:schemeClr val="accent1"/>
+          </a:effectRef>
+          <a:fontRef idx="minor">
+            <a:schemeClr val="lt1"/>
+          </a:fontRef>
+        </p:style>
+        <p:txBody>
+          <a:bodyPr rtlCol="0" anchor="ctr"/>
+          <a:lstStyle/>
+          <a:p>
+            <a:pPr algn="ctr"/>
+            <a:r>
+              <a:rPr lang="en-US" sz="1000" dirty="0" smtClean="0">
+                <a:solidFill>
+                  <a:schemeClr val="tx1"/>
+                </a:solidFill>
+              </a:rPr>
+              <a:t>End</a:t>
+            </a:r>
+            <a:endParaRPr lang="en-US" sz="1000" dirty="0">
+              <a:solidFill>
+                <a:schemeClr val="tx1"/>
+              </a:solidFill>
+            </a:endParaRPr>
+          </a:p>
+        </p:txBody>
+      </p:sp>
+      <p:cxnSp>
+        <p:nvCxnSpPr>
+          <p:cNvPr id="64" name="Straight Arrow Connector 63"/>
+          <p:cNvCxnSpPr>
+            <a:stCxn id="61" idx="3"/>
+            <a:endCxn id="63" idx="0"/>
+          </p:cNvCxnSpPr>
+          <p:nvPr/>
+        </p:nvCxnSpPr>
+        <p:spPr>
+          <a:xfrm flipH="1">
+            <a:off x="8385017" y="5499906"/>
+            <a:ext cx="3143" cy="170988"/>
+          </a:xfrm>
+          <a:prstGeom prst="straightConnector1">
+            <a:avLst/>
+          </a:prstGeom>
+          <a:ln>
+            <a:tailEnd type="triangle"/>
+          </a:ln>
+        </p:spPr>
+        <p:style>
+          <a:lnRef idx="1">
+            <a:schemeClr val="accent1"/>
+          </a:lnRef>
+          <a:fillRef idx="0">
+            <a:schemeClr val="accent1"/>
+          </a:fillRef>
+          <a:effectRef idx="0">
+            <a:schemeClr val="accent1"/>
+          </a:effectRef>
+          <a:fontRef idx="minor">
+            <a:schemeClr val="tx1"/>
+          </a:fontRef>
+        </p:style>
+      </p:cxnSp>
+      <p:cxnSp>
+        <p:nvCxnSpPr>
+          <p:cNvPr id="65" name="Straight Arrow Connector 64"/>
+          <p:cNvCxnSpPr>
+            <a:stCxn id="58" idx="2"/>
+            <a:endCxn id="60" idx="0"/>
+          </p:cNvCxnSpPr>
+          <p:nvPr/>
+        </p:nvCxnSpPr>
+        <p:spPr>
+          <a:xfrm>
+            <a:off x="11145788" y="4830240"/>
+            <a:ext cx="1" cy="208680"/>
+          </a:xfrm>
+          <a:prstGeom prst="straightConnector1">
+            <a:avLst/>
+          </a:prstGeom>
+          <a:ln>
+            <a:tailEnd type="triangle"/>
+          </a:ln>
+        </p:spPr>
+        <p:style>
+          <a:lnRef idx="1">
+            <a:schemeClr val="accent1"/>
+          </a:lnRef>
+          <a:fillRef idx="0">
+            <a:schemeClr val="accent1"/>
+          </a:fillRef>
+          <a:effectRef idx="0">
+            <a:schemeClr val="accent1"/>
+          </a:effectRef>
+          <a:fontRef idx="minor">
+            <a:schemeClr val="tx1"/>
+          </a:fontRef>
+        </p:style>
+      </p:cxnSp>
+      <p:cxnSp>
+        <p:nvCxnSpPr>
+          <p:cNvPr id="66" name="Straight Arrow Connector 65"/>
+          <p:cNvCxnSpPr>
+            <a:stCxn id="60" idx="2"/>
+            <a:endCxn id="67" idx="0"/>
+          </p:cNvCxnSpPr>
+          <p:nvPr/>
+        </p:nvCxnSpPr>
+        <p:spPr>
+          <a:xfrm>
+            <a:off x="11145789" y="5680807"/>
+            <a:ext cx="8240" cy="233394"/>
+          </a:xfrm>
+          <a:prstGeom prst="straightConnector1">
+            <a:avLst/>
+          </a:prstGeom>
+          <a:ln>
+            <a:tailEnd type="triangle"/>
+          </a:ln>
+        </p:spPr>
+        <p:style>
+          <a:lnRef idx="1">
+            <a:schemeClr val="accent1"/>
+          </a:lnRef>
+          <a:fillRef idx="0">
+            <a:schemeClr val="accent1"/>
+          </a:fillRef>
+          <a:effectRef idx="0">
+            <a:schemeClr val="accent1"/>
+          </a:effectRef>
+          <a:fontRef idx="minor">
+            <a:schemeClr val="tx1"/>
+          </a:fontRef>
+        </p:style>
+      </p:cxnSp>
+      <p:sp>
+        <p:nvSpPr>
+          <p:cNvPr id="67" name="Rectangle 66"/>
+          <p:cNvSpPr/>
+          <p:nvPr/>
+        </p:nvSpPr>
+        <p:spPr>
+          <a:xfrm>
+            <a:off x="10532072" y="5914201"/>
+            <a:ext cx="1243914" cy="171498"/>
+          </a:xfrm>
+          <a:prstGeom prst="rect">
+            <a:avLst/>
+          </a:prstGeom>
+          <a:solidFill>
+            <a:schemeClr val="bg1"/>
+          </a:solidFill>
+        </p:spPr>
+        <p:style>
+          <a:lnRef idx="2">
+            <a:schemeClr val="accent1">
+              <a:shade val="50000"/>
+            </a:schemeClr>
+          </a:lnRef>
+          <a:fillRef idx="1">
+            <a:schemeClr val="accent1"/>
+          </a:fillRef>
+          <a:effectRef idx="0">
+            <a:schemeClr val="accent1"/>
+          </a:effectRef>
+          <a:fontRef idx="minor">
+            <a:schemeClr val="lt1"/>
+          </a:fontRef>
+        </p:style>
+        <p:txBody>
+          <a:bodyPr rtlCol="0" anchor="ctr"/>
+          <a:lstStyle/>
+          <a:p>
+            <a:pPr algn="ctr"/>
+            <a:r>
+              <a:rPr lang="en-US" sz="1000" dirty="0" smtClean="0">
+                <a:solidFill>
+                  <a:schemeClr val="tx1"/>
+                </a:solidFill>
+              </a:rPr>
+              <a:t>Decrement c by 1</a:t>
+            </a:r>
+            <a:endParaRPr lang="en-US" sz="1000" dirty="0">
+              <a:solidFill>
+                <a:schemeClr val="tx1"/>
+              </a:solidFill>
+            </a:endParaRPr>
+          </a:p>
+        </p:txBody>
+      </p:sp>
+      <p:cxnSp>
+        <p:nvCxnSpPr>
+          <p:cNvPr id="68" name="Elbow Connector 67"/>
+          <p:cNvCxnSpPr>
+            <a:stCxn id="67" idx="3"/>
+            <a:endCxn id="58" idx="3"/>
+          </p:cNvCxnSpPr>
+          <p:nvPr/>
+        </p:nvCxnSpPr>
+        <p:spPr>
+          <a:xfrm flipH="1" flipV="1">
+            <a:off x="11666829" y="4521321"/>
+            <a:ext cx="109157" cy="1478629"/>
+          </a:xfrm>
+          <a:prstGeom prst="bentConnector3">
+            <a:avLst>
+              <a:gd name="adj1" fmla="val -284891"/>
+            </a:avLst>
+          </a:prstGeom>
+          <a:ln>
+            <a:tailEnd type="triangle"/>
+          </a:ln>
+        </p:spPr>
+        <p:style>
+          <a:lnRef idx="1">
+            <a:schemeClr val="accent1"/>
+          </a:lnRef>
+          <a:fillRef idx="0">
+            <a:schemeClr val="accent1"/>
+          </a:fillRef>
+          <a:effectRef idx="0">
+            <a:schemeClr val="accent1"/>
+          </a:effectRef>
+          <a:fontRef idx="minor">
+            <a:schemeClr val="tx1"/>
+          </a:fontRef>
+        </p:style>
+      </p:cxnSp>
+      <p:sp>
+        <p:nvSpPr>
+          <p:cNvPr id="69" name="TextBox 68"/>
+          <p:cNvSpPr txBox="1"/>
+          <p:nvPr/>
+        </p:nvSpPr>
+        <p:spPr>
+          <a:xfrm>
+            <a:off x="10538252" y="4800039"/>
+            <a:ext cx="473671" cy="246221"/>
+          </a:xfrm>
+          <a:prstGeom prst="rect">
+            <a:avLst/>
+          </a:prstGeom>
+          <a:noFill/>
+        </p:spPr>
+        <p:txBody>
+          <a:bodyPr wrap="square" rtlCol="0">
+            <a:spAutoFit/>
+          </a:bodyPr>
+          <a:lstStyle/>
+          <a:p>
+            <a:r>
+              <a:rPr lang="en-US" sz="1000" dirty="0" smtClean="0"/>
+              <a:t>True</a:t>
+            </a:r>
+            <a:endParaRPr lang="en-US" sz="1000" dirty="0"/>
+          </a:p>
+        </p:txBody>
+      </p:sp>
+      <p:sp>
+        <p:nvSpPr>
+          <p:cNvPr id="70" name="TextBox 69"/>
+          <p:cNvSpPr txBox="1"/>
+          <p:nvPr/>
+        </p:nvSpPr>
+        <p:spPr>
+          <a:xfrm>
+            <a:off x="9186726" y="3828967"/>
+            <a:ext cx="473671" cy="246221"/>
+          </a:xfrm>
+          <a:prstGeom prst="rect">
+            <a:avLst/>
+          </a:prstGeom>
+          <a:noFill/>
+        </p:spPr>
+        <p:txBody>
+          <a:bodyPr wrap="square" rtlCol="0">
+            <a:spAutoFit/>
+          </a:bodyPr>
+          <a:lstStyle/>
+          <a:p>
+            <a:r>
+              <a:rPr lang="en-US" sz="1000" dirty="0" smtClean="0"/>
+              <a:t>False</a:t>
+            </a:r>
+            <a:endParaRPr lang="en-US" sz="1000" dirty="0"/>
+          </a:p>
+        </p:txBody>
+      </p:sp>
+      <p:cxnSp>
+        <p:nvCxnSpPr>
+          <p:cNvPr id="71" name="Straight Arrow Connector 70"/>
+          <p:cNvCxnSpPr>
+            <a:stCxn id="58" idx="1"/>
+            <a:endCxn id="72" idx="6"/>
+          </p:cNvCxnSpPr>
+          <p:nvPr/>
+        </p:nvCxnSpPr>
+        <p:spPr>
+          <a:xfrm flipH="1">
+            <a:off x="9636204" y="4521321"/>
+            <a:ext cx="988542" cy="0"/>
+          </a:xfrm>
+          <a:prstGeom prst="straightConnector1">
+            <a:avLst/>
+          </a:prstGeom>
+          <a:ln>
+            <a:tailEnd type="triangle"/>
+          </a:ln>
+        </p:spPr>
+        <p:style>
+          <a:lnRef idx="1">
+            <a:schemeClr val="accent1"/>
+          </a:lnRef>
+          <a:fillRef idx="0">
+            <a:schemeClr val="accent1"/>
+          </a:fillRef>
+          <a:effectRef idx="0">
+            <a:schemeClr val="accent1"/>
+          </a:effectRef>
+          <a:fontRef idx="minor">
+            <a:schemeClr val="tx1"/>
+          </a:fontRef>
+        </p:style>
+      </p:cxnSp>
+      <p:sp>
+        <p:nvSpPr>
+          <p:cNvPr id="72" name="Oval 71"/>
+          <p:cNvSpPr/>
+          <p:nvPr/>
+        </p:nvSpPr>
+        <p:spPr>
+          <a:xfrm>
+            <a:off x="9069854" y="4410110"/>
+            <a:ext cx="566350" cy="222422"/>
+          </a:xfrm>
+          <a:prstGeom prst="ellipse">
+            <a:avLst/>
+          </a:prstGeom>
+          <a:solidFill>
+            <a:schemeClr val="bg1"/>
+          </a:solidFill>
+        </p:spPr>
+        <p:style>
+          <a:lnRef idx="2">
+            <a:schemeClr val="accent1">
+              <a:shade val="50000"/>
+            </a:schemeClr>
+          </a:lnRef>
+          <a:fillRef idx="1">
+            <a:schemeClr val="accent1"/>
+          </a:fillRef>
+          <a:effectRef idx="0">
+            <a:schemeClr val="accent1"/>
+          </a:effectRef>
+          <a:fontRef idx="minor">
+            <a:schemeClr val="lt1"/>
+          </a:fontRef>
+        </p:style>
+        <p:txBody>
+          <a:bodyPr rtlCol="0" anchor="ctr"/>
+          <a:lstStyle/>
+          <a:p>
+            <a:pPr algn="ctr"/>
+            <a:r>
+              <a:rPr lang="en-US" sz="1000" dirty="0" smtClean="0">
+                <a:solidFill>
+                  <a:schemeClr val="tx1"/>
+                </a:solidFill>
+              </a:rPr>
+              <a:t>End</a:t>
+            </a:r>
+            <a:endParaRPr lang="en-US" sz="1000" dirty="0">
+              <a:solidFill>
+                <a:schemeClr val="tx1"/>
+              </a:solidFill>
+            </a:endParaRPr>
+          </a:p>
+        </p:txBody>
+      </p:sp>
+      <p:sp>
+        <p:nvSpPr>
+          <p:cNvPr id="73" name="TextBox 72"/>
+          <p:cNvSpPr txBox="1"/>
+          <p:nvPr/>
+        </p:nvSpPr>
+        <p:spPr>
+          <a:xfrm>
+            <a:off x="9668127" y="4339366"/>
+            <a:ext cx="473671" cy="246221"/>
+          </a:xfrm>
+          <a:prstGeom prst="rect">
+            <a:avLst/>
+          </a:prstGeom>
+          <a:noFill/>
+        </p:spPr>
+        <p:txBody>
+          <a:bodyPr wrap="square" rtlCol="0">
+            <a:spAutoFit/>
+          </a:bodyPr>
+          <a:lstStyle/>
+          <a:p>
+            <a:r>
+              <a:rPr lang="en-US" sz="1000" dirty="0" smtClean="0"/>
+              <a:t>False</a:t>
+            </a:r>
+            <a:endParaRPr lang="en-US" sz="1000" dirty="0"/>
+          </a:p>
+        </p:txBody>
+      </p:sp>
+      <p:sp>
+        <p:nvSpPr>
+          <p:cNvPr id="74" name="TextBox 73"/>
+          <p:cNvSpPr txBox="1"/>
+          <p:nvPr/>
+        </p:nvSpPr>
+        <p:spPr>
+          <a:xfrm>
+            <a:off x="9543539" y="4797398"/>
+            <a:ext cx="473671" cy="246221"/>
+          </a:xfrm>
+          <a:prstGeom prst="rect">
+            <a:avLst/>
+          </a:prstGeom>
+          <a:noFill/>
+        </p:spPr>
+        <p:txBody>
+          <a:bodyPr wrap="square" rtlCol="0">
+            <a:spAutoFit/>
+          </a:bodyPr>
+          <a:lstStyle/>
+          <a:p>
+            <a:r>
+              <a:rPr lang="en-US" sz="1000" dirty="0" smtClean="0"/>
+              <a:t>True</a:t>
+            </a:r>
+            <a:endParaRPr lang="en-US" sz="1000" dirty="0"/>
+          </a:p>
+        </p:txBody>
+      </p:sp>
+      <p:sp>
+        <p:nvSpPr>
+          <p:cNvPr id="75" name="TextBox 74"/>
+          <p:cNvSpPr txBox="1"/>
+          <p:nvPr/>
+        </p:nvSpPr>
+        <p:spPr>
+          <a:xfrm>
+            <a:off x="10663879" y="5647095"/>
+            <a:ext cx="473671" cy="246221"/>
+          </a:xfrm>
+          <a:prstGeom prst="rect">
+            <a:avLst/>
+          </a:prstGeom>
+          <a:noFill/>
+        </p:spPr>
+        <p:txBody>
+          <a:bodyPr wrap="square" rtlCol="0">
+            <a:spAutoFit/>
+          </a:bodyPr>
+          <a:lstStyle/>
+          <a:p>
+            <a:r>
+              <a:rPr lang="en-US" sz="1000" dirty="0" smtClean="0"/>
+              <a:t>False</a:t>
+            </a:r>
+            <a:endParaRPr lang="en-US" sz="1000" dirty="0"/>
+          </a:p>
+        </p:txBody>
+      </p:sp>
+      <p:cxnSp>
+        <p:nvCxnSpPr>
+          <p:cNvPr id="76" name="Elbow Connector 75"/>
+          <p:cNvCxnSpPr>
+            <a:stCxn id="50" idx="3"/>
+            <a:endCxn id="51" idx="0"/>
+          </p:cNvCxnSpPr>
+          <p:nvPr/>
+        </p:nvCxnSpPr>
+        <p:spPr>
+          <a:xfrm>
+            <a:off x="8891710" y="2738104"/>
+            <a:ext cx="2237609" cy="290580"/>
+          </a:xfrm>
+          <a:prstGeom prst="bentConnector2">
+            <a:avLst/>
+          </a:prstGeom>
+          <a:ln>
+            <a:tailEnd type="triangle"/>
+          </a:ln>
+        </p:spPr>
+        <p:style>
+          <a:lnRef idx="1">
+            <a:schemeClr val="accent1"/>
+          </a:lnRef>
+          <a:fillRef idx="0">
+            <a:schemeClr val="accent1"/>
+          </a:fillRef>
+          <a:effectRef idx="0">
+            <a:schemeClr val="accent1"/>
+          </a:effectRef>
+          <a:fontRef idx="minor">
+            <a:schemeClr val="tx1"/>
+          </a:fontRef>
+        </p:style>
+      </p:cxnSp>
+      <p:sp>
+        <p:nvSpPr>
+          <p:cNvPr id="80" name="Rectangle 79"/>
+          <p:cNvSpPr/>
+          <p:nvPr/>
+        </p:nvSpPr>
+        <p:spPr>
+          <a:xfrm>
+            <a:off x="3995342" y="3264805"/>
+            <a:ext cx="803194" cy="200370"/>
+          </a:xfrm>
+          <a:prstGeom prst="rect">
+            <a:avLst/>
+          </a:prstGeom>
+          <a:solidFill>
+            <a:schemeClr val="bg1"/>
+          </a:solidFill>
+        </p:spPr>
+        <p:style>
+          <a:lnRef idx="2">
+            <a:schemeClr val="accent1">
+              <a:shade val="50000"/>
+            </a:schemeClr>
+          </a:lnRef>
+          <a:fillRef idx="1">
+            <a:schemeClr val="accent1"/>
+          </a:fillRef>
+          <a:effectRef idx="0">
+            <a:schemeClr val="accent1"/>
+          </a:effectRef>
+          <a:fontRef idx="minor">
+            <a:schemeClr val="lt1"/>
+          </a:fontRef>
+        </p:style>
+        <p:txBody>
+          <a:bodyPr rtlCol="0" anchor="ctr"/>
+          <a:lstStyle/>
+          <a:p>
+            <a:pPr algn="ctr"/>
+            <a:r>
+              <a:rPr lang="en-US" sz="1000" dirty="0" smtClean="0">
+                <a:solidFill>
+                  <a:schemeClr val="tx1"/>
+                </a:solidFill>
+              </a:rPr>
+              <a:t>e = (a * b)/c</a:t>
+            </a:r>
+            <a:endParaRPr lang="en-US" sz="1000" dirty="0">
+              <a:solidFill>
+                <a:schemeClr val="tx1"/>
+              </a:solidFill>
+            </a:endParaRPr>
+          </a:p>
+        </p:txBody>
+      </p:sp>
+      <p:cxnSp>
+        <p:nvCxnSpPr>
+          <p:cNvPr id="84" name="Straight Arrow Connector 83"/>
+          <p:cNvCxnSpPr>
+            <a:stCxn id="80" idx="1"/>
+            <a:endCxn id="27" idx="5"/>
+          </p:cNvCxnSpPr>
+          <p:nvPr/>
+        </p:nvCxnSpPr>
+        <p:spPr>
+          <a:xfrm flipH="1" flipV="1">
+            <a:off x="3743271" y="3362930"/>
+            <a:ext cx="252071" cy="2060"/>
+          </a:xfrm>
+          <a:prstGeom prst="straightConnector1">
+            <a:avLst/>
+          </a:prstGeom>
+          <a:ln>
+            <a:tailEnd type="triangle"/>
+          </a:ln>
+        </p:spPr>
+        <p:style>
+          <a:lnRef idx="1">
+            <a:schemeClr val="accent1"/>
+          </a:lnRef>
+          <a:fillRef idx="0">
+            <a:schemeClr val="accent1"/>
+          </a:fillRef>
+          <a:effectRef idx="0">
+            <a:schemeClr val="accent1"/>
+          </a:effectRef>
+          <a:fontRef idx="minor">
+            <a:schemeClr val="tx1"/>
+          </a:fontRef>
+        </p:style>
+      </p:cxnSp>
+      <p:sp>
+        <p:nvSpPr>
+          <p:cNvPr id="109" name="Rectangle 108"/>
+          <p:cNvSpPr/>
+          <p:nvPr/>
+        </p:nvSpPr>
+        <p:spPr>
+          <a:xfrm>
+            <a:off x="9228435" y="3252154"/>
+            <a:ext cx="803194" cy="200370"/>
+          </a:xfrm>
+          <a:prstGeom prst="rect">
+            <a:avLst/>
+          </a:prstGeom>
+          <a:solidFill>
+            <a:schemeClr val="bg1"/>
+          </a:solidFill>
+        </p:spPr>
+        <p:style>
+          <a:lnRef idx="2">
+            <a:schemeClr val="accent1">
+              <a:shade val="50000"/>
+            </a:schemeClr>
+          </a:lnRef>
+          <a:fillRef idx="1">
+            <a:schemeClr val="accent1"/>
+          </a:fillRef>
+          <a:effectRef idx="0">
+            <a:schemeClr val="accent1"/>
+          </a:effectRef>
+          <a:fontRef idx="minor">
+            <a:schemeClr val="lt1"/>
+          </a:fontRef>
+        </p:style>
+        <p:txBody>
+          <a:bodyPr rtlCol="0" anchor="ctr"/>
+          <a:lstStyle/>
+          <a:p>
+            <a:pPr algn="ctr"/>
+            <a:r>
+              <a:rPr lang="en-US" sz="1000" dirty="0" smtClean="0">
+                <a:solidFill>
+                  <a:schemeClr val="tx1"/>
+                </a:solidFill>
+              </a:rPr>
+              <a:t>e = (a * b)/c</a:t>
+            </a:r>
+            <a:endParaRPr lang="en-US" sz="1000" dirty="0">
+              <a:solidFill>
+                <a:schemeClr val="tx1"/>
+              </a:solidFill>
+            </a:endParaRPr>
+          </a:p>
+        </p:txBody>
+      </p:sp>
+      <p:cxnSp>
+        <p:nvCxnSpPr>
+          <p:cNvPr id="115" name="Straight Arrow Connector 114"/>
+          <p:cNvCxnSpPr>
+            <a:stCxn id="109" idx="1"/>
+            <a:endCxn id="53" idx="5"/>
+          </p:cNvCxnSpPr>
+          <p:nvPr/>
+        </p:nvCxnSpPr>
+        <p:spPr>
+          <a:xfrm flipH="1">
+            <a:off x="8973284" y="3352339"/>
+            <a:ext cx="255151" cy="641"/>
+          </a:xfrm>
+          <a:prstGeom prst="straightConnector1">
+            <a:avLst/>
+          </a:prstGeom>
+          <a:ln>
+            <a:tailEnd type="triangle"/>
+          </a:ln>
+        </p:spPr>
+        <p:style>
+          <a:lnRef idx="1">
+            <a:schemeClr val="accent1"/>
+          </a:lnRef>
+          <a:fillRef idx="0">
+            <a:schemeClr val="accent1"/>
+          </a:fillRef>
+          <a:effectRef idx="0">
+            <a:schemeClr val="accent1"/>
+          </a:effectRef>
+          <a:fontRef idx="minor">
+            <a:schemeClr val="tx1"/>
+          </a:fontRef>
+        </p:style>
+      </p:cxnSp>
+      <p:sp>
+        <p:nvSpPr>
+          <p:cNvPr id="129" name="Rectangle 128"/>
+          <p:cNvSpPr/>
+          <p:nvPr/>
+        </p:nvSpPr>
+        <p:spPr>
+          <a:xfrm>
+            <a:off x="4268186" y="5284204"/>
+            <a:ext cx="803194" cy="200370"/>
+          </a:xfrm>
+          <a:prstGeom prst="rect">
+            <a:avLst/>
+          </a:prstGeom>
+          <a:solidFill>
+            <a:schemeClr val="bg1"/>
+          </a:solidFill>
+        </p:spPr>
+        <p:style>
+          <a:lnRef idx="2">
+            <a:schemeClr val="accent1">
+              <a:shade val="50000"/>
+            </a:schemeClr>
+          </a:lnRef>
+          <a:fillRef idx="1">
+            <a:schemeClr val="accent1"/>
+          </a:fillRef>
+          <a:effectRef idx="0">
+            <a:schemeClr val="accent1"/>
+          </a:effectRef>
+          <a:fontRef idx="minor">
+            <a:schemeClr val="lt1"/>
+          </a:fontRef>
+        </p:style>
+        <p:txBody>
+          <a:bodyPr rtlCol="0" anchor="ctr"/>
+          <a:lstStyle/>
+          <a:p>
+            <a:pPr algn="ctr"/>
+            <a:r>
+              <a:rPr lang="en-US" sz="1000" dirty="0" smtClean="0">
+                <a:solidFill>
+                  <a:schemeClr val="tx1"/>
+                </a:solidFill>
+              </a:rPr>
+              <a:t>e = (a * b)/c</a:t>
+            </a:r>
+            <a:endParaRPr lang="en-US" sz="1000" dirty="0">
+              <a:solidFill>
+                <a:schemeClr val="tx1"/>
+              </a:solidFill>
+            </a:endParaRPr>
+          </a:p>
+        </p:txBody>
+      </p:sp>
+      <p:cxnSp>
+        <p:nvCxnSpPr>
+          <p:cNvPr id="139" name="Straight Arrow Connector 138"/>
+          <p:cNvCxnSpPr>
+            <a:stCxn id="129" idx="1"/>
+            <a:endCxn id="35" idx="5"/>
+          </p:cNvCxnSpPr>
+          <p:nvPr/>
+        </p:nvCxnSpPr>
+        <p:spPr>
+          <a:xfrm flipH="1" flipV="1">
+            <a:off x="3979847" y="5379433"/>
+            <a:ext cx="288339" cy="4956"/>
+          </a:xfrm>
+          <a:prstGeom prst="straightConnector1">
+            <a:avLst/>
+          </a:prstGeom>
+          <a:ln>
+            <a:tailEnd type="triangle"/>
+          </a:ln>
+        </p:spPr>
+        <p:style>
+          <a:lnRef idx="1">
+            <a:schemeClr val="accent1"/>
+          </a:lnRef>
+          <a:fillRef idx="0">
+            <a:schemeClr val="accent1"/>
+          </a:fillRef>
+          <a:effectRef idx="0">
+            <a:schemeClr val="accent1"/>
+          </a:effectRef>
+          <a:fontRef idx="minor">
+            <a:schemeClr val="tx1"/>
+          </a:fontRef>
+        </p:style>
+      </p:cxnSp>
+      <p:sp>
+        <p:nvSpPr>
+          <p:cNvPr id="154" name="TextBox 153"/>
+          <p:cNvSpPr txBox="1"/>
+          <p:nvPr/>
+        </p:nvSpPr>
+        <p:spPr>
+          <a:xfrm>
+            <a:off x="5804584" y="3646377"/>
+            <a:ext cx="473671" cy="246221"/>
+          </a:xfrm>
+          <a:prstGeom prst="rect">
+            <a:avLst/>
+          </a:prstGeom>
+          <a:noFill/>
+        </p:spPr>
+        <p:txBody>
+          <a:bodyPr wrap="square" rtlCol="0">
+            <a:spAutoFit/>
+          </a:bodyPr>
+          <a:lstStyle/>
+          <a:p>
+            <a:r>
+              <a:rPr lang="en-US" sz="1000" dirty="0" smtClean="0"/>
+              <a:t>False</a:t>
+            </a:r>
+            <a:endParaRPr lang="en-US" sz="1000" dirty="0"/>
+          </a:p>
+        </p:txBody>
+      </p:sp>
+      <p:sp>
+        <p:nvSpPr>
+          <p:cNvPr id="155" name="Rectangle 154"/>
+          <p:cNvSpPr/>
+          <p:nvPr/>
+        </p:nvSpPr>
+        <p:spPr>
+          <a:xfrm>
+            <a:off x="9297406" y="5260681"/>
+            <a:ext cx="803194" cy="200370"/>
+          </a:xfrm>
+          <a:prstGeom prst="rect">
+            <a:avLst/>
+          </a:prstGeom>
+          <a:solidFill>
+            <a:schemeClr val="bg1"/>
+          </a:solidFill>
+        </p:spPr>
+        <p:style>
+          <a:lnRef idx="2">
+            <a:schemeClr val="accent1">
+              <a:shade val="50000"/>
+            </a:schemeClr>
+          </a:lnRef>
+          <a:fillRef idx="1">
+            <a:schemeClr val="accent1"/>
+          </a:fillRef>
+          <a:effectRef idx="0">
+            <a:schemeClr val="accent1"/>
+          </a:effectRef>
+          <a:fontRef idx="minor">
+            <a:schemeClr val="lt1"/>
+          </a:fontRef>
+        </p:style>
+        <p:txBody>
+          <a:bodyPr rtlCol="0" anchor="ctr"/>
+          <a:lstStyle/>
+          <a:p>
+            <a:pPr algn="ctr"/>
+            <a:r>
+              <a:rPr lang="en-US" sz="1000" dirty="0" smtClean="0">
+                <a:solidFill>
+                  <a:schemeClr val="tx1"/>
+                </a:solidFill>
+              </a:rPr>
+              <a:t>e = (a * b)/c</a:t>
+            </a:r>
+            <a:endParaRPr lang="en-US" sz="1000" dirty="0">
+              <a:solidFill>
+                <a:schemeClr val="tx1"/>
+              </a:solidFill>
+            </a:endParaRPr>
+          </a:p>
+        </p:txBody>
+      </p:sp>
+      <p:cxnSp>
+        <p:nvCxnSpPr>
+          <p:cNvPr id="163" name="Straight Arrow Connector 162"/>
+          <p:cNvCxnSpPr>
+            <a:stCxn id="155" idx="1"/>
+            <a:endCxn id="61" idx="5"/>
+          </p:cNvCxnSpPr>
+          <p:nvPr/>
+        </p:nvCxnSpPr>
+        <p:spPr>
+          <a:xfrm flipH="1" flipV="1">
+            <a:off x="9021449" y="5359863"/>
+            <a:ext cx="275957" cy="1003"/>
+          </a:xfrm>
+          <a:prstGeom prst="straightConnector1">
+            <a:avLst/>
+          </a:prstGeom>
+          <a:ln>
+            <a:tailEnd type="triangle"/>
+          </a:ln>
+        </p:spPr>
+        <p:style>
+          <a:lnRef idx="1">
+            <a:schemeClr val="accent1"/>
+          </a:lnRef>
+          <a:fillRef idx="0">
+            <a:schemeClr val="accent1"/>
+          </a:fillRef>
+          <a:effectRef idx="0">
+            <a:schemeClr val="accent1"/>
+          </a:effectRef>
+          <a:fontRef idx="minor">
+            <a:schemeClr val="tx1"/>
+          </a:fontRef>
+        </p:style>
+      </p:cxnSp>
+    </p:spTree>
+    <p:extLst>
+      <p:ext uri="{BB962C8B-B14F-4D97-AF65-F5344CB8AC3E}">
+        <p14:creationId xmlns:p14="http://schemas.microsoft.com/office/powerpoint/2010/main" val="3009432895"/>
+      </p:ext>
+    </p:extLst>
+  </p:cSld>
+  <p:clrMapOvr>
+    <a:masterClrMapping/>
+  </p:clrMapOvr>
+  <p:timing>
+    <p:tnLst>
+      <p:par>
+        <p:cTn id="1" dur="indefinite" restart="never" nodeType="tmRoot"/>
+      </p:par>
+    </p:tnLst>
+  </p:timing>
 </p:sld>
 </file>
 

</xml_diff>

<commit_message>
Final update for AA1
</commit_message>
<xml_diff>
--- a/George_UwagbaleAA1.pptx
+++ b/George_UwagbaleAA1.pptx
@@ -3402,8 +3402,8 @@
         </p:nvSpPr>
         <p:spPr>
           <a:xfrm>
-            <a:off x="3919450" y="2202718"/>
-            <a:ext cx="1936866" cy="440575"/>
+            <a:off x="3919450" y="2186242"/>
+            <a:ext cx="1936866" cy="241773"/>
           </a:xfrm>
           <a:prstGeom prst="flowChartInputOutput">
             <a:avLst/>
@@ -3461,7 +3461,7 @@
         <p:spPr>
           <a:xfrm>
             <a:off x="4887883" y="2039468"/>
-            <a:ext cx="0" cy="163250"/>
+            <a:ext cx="0" cy="146774"/>
           </a:xfrm>
           <a:prstGeom prst="straightConnector1">
             <a:avLst/>
@@ -3493,8 +3493,8 @@
         </p:nvSpPr>
         <p:spPr>
           <a:xfrm>
-            <a:off x="3919450" y="2806543"/>
-            <a:ext cx="1936866" cy="440575"/>
+            <a:off x="3919450" y="2608832"/>
+            <a:ext cx="1936866" cy="384028"/>
           </a:xfrm>
           <a:prstGeom prst="flowChartInputOutput">
             <a:avLst/>
@@ -3551,8 +3551,8 @@
         </p:nvCxnSpPr>
         <p:spPr>
           <a:xfrm>
-            <a:off x="4887883" y="2643293"/>
-            <a:ext cx="0" cy="163250"/>
+            <a:off x="4887883" y="2428015"/>
+            <a:ext cx="0" cy="180817"/>
           </a:xfrm>
           <a:prstGeom prst="straightConnector1">
             <a:avLst/>
@@ -3584,8 +3584,8 @@
         </p:nvSpPr>
         <p:spPr>
           <a:xfrm>
-            <a:off x="3919450" y="3410368"/>
-            <a:ext cx="1936866" cy="440575"/>
+            <a:off x="3919450" y="3171467"/>
+            <a:ext cx="1936866" cy="215278"/>
           </a:xfrm>
           <a:prstGeom prst="flowChartInputOutput">
             <a:avLst/>
@@ -3642,8 +3642,8 @@
         </p:nvCxnSpPr>
         <p:spPr>
           <a:xfrm>
-            <a:off x="4887883" y="3247118"/>
-            <a:ext cx="0" cy="163250"/>
+            <a:off x="4887883" y="2992860"/>
+            <a:ext cx="0" cy="178607"/>
           </a:xfrm>
           <a:prstGeom prst="straightConnector1">
             <a:avLst/>
@@ -3675,7 +3675,7 @@
         </p:nvSpPr>
         <p:spPr>
           <a:xfrm>
-            <a:off x="3919450" y="4014193"/>
+            <a:off x="3919450" y="3528157"/>
             <a:ext cx="1936866" cy="440575"/>
           </a:xfrm>
           <a:prstGeom prst="flowChartInputOutput">
@@ -3733,8 +3733,8 @@
         </p:nvCxnSpPr>
         <p:spPr>
           <a:xfrm>
-            <a:off x="4887883" y="3850943"/>
-            <a:ext cx="0" cy="163250"/>
+            <a:off x="4887883" y="3386745"/>
+            <a:ext cx="0" cy="141412"/>
           </a:xfrm>
           <a:prstGeom prst="straightConnector1">
             <a:avLst/>
@@ -3766,7 +3766,7 @@
         </p:nvSpPr>
         <p:spPr>
           <a:xfrm>
-            <a:off x="3832166" y="4680065"/>
+            <a:off x="3832166" y="4638875"/>
             <a:ext cx="2111433" cy="290946"/>
           </a:xfrm>
           <a:prstGeom prst="rect">
@@ -3818,14 +3818,14 @@
           <p:cNvPr id="57" name="Straight Arrow Connector 56"/>
           <p:cNvCxnSpPr>
             <a:stCxn id="51" idx="4"/>
-            <a:endCxn id="56" idx="0"/>
+            <a:endCxn id="39" idx="1"/>
           </p:cNvCxnSpPr>
           <p:nvPr/>
         </p:nvCxnSpPr>
         <p:spPr>
-          <a:xfrm>
-            <a:off x="4887883" y="4454768"/>
-            <a:ext cx="0" cy="225297"/>
+          <a:xfrm flipH="1">
+            <a:off x="4887882" y="3968732"/>
+            <a:ext cx="1" cy="221566"/>
           </a:xfrm>
           <a:prstGeom prst="straightConnector1">
             <a:avLst/>
@@ -3915,8 +3915,8 @@
         </p:nvCxnSpPr>
         <p:spPr>
           <a:xfrm>
-            <a:off x="4887883" y="4971011"/>
-            <a:ext cx="0" cy="185183"/>
+            <a:off x="4887883" y="4929821"/>
+            <a:ext cx="0" cy="226373"/>
           </a:xfrm>
           <a:prstGeom prst="straightConnector1">
             <a:avLst/>
@@ -4190,6 +4190,105 @@
           <a:xfrm>
             <a:off x="4887882" y="6403959"/>
             <a:ext cx="0" cy="212972"/>
+          </a:xfrm>
+          <a:prstGeom prst="straightConnector1">
+            <a:avLst/>
+          </a:prstGeom>
+          <a:ln>
+            <a:tailEnd type="triangle"/>
+          </a:ln>
+        </p:spPr>
+        <p:style>
+          <a:lnRef idx="1">
+            <a:schemeClr val="accent1"/>
+          </a:lnRef>
+          <a:fillRef idx="0">
+            <a:schemeClr val="accent1"/>
+          </a:fillRef>
+          <a:effectRef idx="0">
+            <a:schemeClr val="accent1"/>
+          </a:effectRef>
+          <a:fontRef idx="minor">
+            <a:schemeClr val="tx1"/>
+          </a:fontRef>
+        </p:style>
+      </p:cxnSp>
+      <p:sp>
+        <p:nvSpPr>
+          <p:cNvPr id="39" name="Flowchart: Data 38"/>
+          <p:cNvSpPr/>
+          <p:nvPr/>
+        </p:nvSpPr>
+        <p:spPr>
+          <a:xfrm>
+            <a:off x="3919449" y="4190298"/>
+            <a:ext cx="1936866" cy="215278"/>
+          </a:xfrm>
+          <a:prstGeom prst="flowChartInputOutput">
+            <a:avLst/>
+          </a:prstGeom>
+          <a:solidFill>
+            <a:schemeClr val="bg1"/>
+          </a:solidFill>
+        </p:spPr>
+        <p:style>
+          <a:lnRef idx="2">
+            <a:schemeClr val="accent1">
+              <a:shade val="50000"/>
+            </a:schemeClr>
+          </a:lnRef>
+          <a:fillRef idx="1">
+            <a:schemeClr val="accent1"/>
+          </a:fillRef>
+          <a:effectRef idx="0">
+            <a:schemeClr val="accent1"/>
+          </a:effectRef>
+          <a:fontRef idx="minor">
+            <a:schemeClr val="lt1"/>
+          </a:fontRef>
+        </p:style>
+        <p:txBody>
+          <a:bodyPr rtlCol="0" anchor="ctr"/>
+          <a:lstStyle/>
+          <a:p>
+            <a:pPr algn="ctr"/>
+            <a:r>
+              <a:rPr lang="en-GB" sz="1200" dirty="0" smtClean="0">
+                <a:solidFill>
+                  <a:schemeClr val="tx1"/>
+                </a:solidFill>
+              </a:rPr>
+              <a:t>Input </a:t>
+            </a:r>
+            <a:r>
+              <a:rPr lang="en-GB" sz="1200" dirty="0" smtClean="0">
+                <a:solidFill>
+                  <a:schemeClr val="tx1"/>
+                </a:solidFill>
+              </a:rPr>
+              <a:t>c</a:t>
+            </a:r>
+            <a:endParaRPr lang="en-GB" sz="1200" dirty="0">
+              <a:solidFill>
+                <a:schemeClr val="tx1"/>
+              </a:solidFill>
+            </a:endParaRPr>
+          </a:p>
+        </p:txBody>
+      </p:sp>
+      <p:cxnSp>
+        <p:nvCxnSpPr>
+          <p:cNvPr id="42" name="Straight Arrow Connector 41"/>
+          <p:cNvCxnSpPr>
+            <a:stCxn id="39" idx="4"/>
+            <a:endCxn id="56" idx="0"/>
+          </p:cNvCxnSpPr>
+          <p:nvPr/>
+        </p:nvCxnSpPr>
+        <p:spPr>
+          <a:xfrm>
+            <a:off x="4887882" y="4405576"/>
+            <a:ext cx="1" cy="233299"/>
           </a:xfrm>
           <a:prstGeom prst="straightConnector1">
             <a:avLst/>
@@ -4254,7 +4353,7 @@
             <p:spPr>
               <a:xfrm>
                 <a:off x="324196" y="648393"/>
-                <a:ext cx="2543696" cy="4354077"/>
+                <a:ext cx="2732042" cy="4675960"/>
               </a:xfrm>
               <a:prstGeom prst="rect">
                 <a:avLst/>
@@ -4274,30 +4373,12 @@
               </a:p>
               <a:p>
                 <a:r>
-                  <a:rPr lang="en-GB" sz="1000" dirty="0"/>
-                  <a:t> </a:t>
+                  <a:rPr lang="en-GB" sz="1000" dirty="0" smtClean="0"/>
+                  <a:t>    DISPLAY </a:t>
                 </a:r>
                 <a:r>
                   <a:rPr lang="en-GB" sz="1000" dirty="0" smtClean="0"/>
-                  <a:t>   DECLARE </a:t>
-                </a:r>
-                <a:r>
-                  <a:rPr lang="en-GB" sz="1000" dirty="0" err="1" smtClean="0"/>
-                  <a:t>a,b,c</a:t>
-                </a:r>
-                <a:r>
-                  <a:rPr lang="en-GB" sz="1000" dirty="0" smtClean="0"/>
-                  <a:t>: INTEGER</a:t>
-                </a:r>
-              </a:p>
-              <a:p>
-                <a:r>
-                  <a:rPr lang="en-GB" sz="1000" dirty="0"/>
-                  <a:t> </a:t>
-                </a:r>
-                <a:r>
-                  <a:rPr lang="en-GB" sz="1000" dirty="0" smtClean="0"/>
-                  <a:t>   DISPLAY “Enter the value for </a:t>
+                  <a:t>“Enter the value for </a:t>
                 </a:r>
                 <a:r>
                   <a:rPr lang="en-GB" sz="1000" dirty="0" smtClean="0"/>
@@ -4955,7 +5036,7 @@
                 </a:r>
                 <a:r>
                   <a:rPr lang="en-GB" sz="1000" dirty="0" smtClean="0"/>
-                  <a:t>   COMPUTE x1 = S + T -</a:t>
+                  <a:t>   COMPUTE x1 = S + T - </a:t>
                 </a:r>
                 <a14:m>
                   <m:oMath xmlns:m="http://schemas.openxmlformats.org/officeDocument/2006/math">
@@ -5020,13 +5101,249 @@
                 </a:r>
                 <a:r>
                   <a:rPr lang="en-GB" sz="1000" dirty="0" smtClean="0"/>
-                  <a:t>   x1 = (-b + (b^2 – 4ac)^1/2)/ 2a</a:t>
+                  <a:t>   COMPUTE x2 = -( S + T) - </a:t>
+                </a:r>
+                <a14:m>
+                  <m:oMath xmlns:m="http://schemas.openxmlformats.org/officeDocument/2006/math">
+                    <m:f>
+                      <m:fPr>
+                        <m:ctrlPr>
+                          <a:rPr lang="en-GB" sz="1000" i="1" smtClean="0">
+                            <a:latin typeface="Cambria Math" panose="02040503050406030204" pitchFamily="18" charset="0"/>
+                          </a:rPr>
+                        </m:ctrlPr>
+                      </m:fPr>
+                      <m:num>
+                        <m:r>
+                          <a:rPr lang="en-US" sz="1000" b="0" i="1" smtClean="0">
+                            <a:latin typeface="Cambria Math" panose="02040503050406030204" pitchFamily="18" charset="0"/>
+                          </a:rPr>
+                          <m:t>1</m:t>
+                        </m:r>
+                      </m:num>
+                      <m:den>
+                        <m:r>
+                          <a:rPr lang="en-US" sz="1000" b="0" i="1" smtClean="0">
+                            <a:latin typeface="Cambria Math" panose="02040503050406030204" pitchFamily="18" charset="0"/>
+                          </a:rPr>
+                          <m:t>3</m:t>
+                        </m:r>
+                      </m:den>
+                    </m:f>
+                    <m:sSub>
+                      <m:sSubPr>
+                        <m:ctrlPr>
+                          <a:rPr lang="en-GB" sz="1000" i="1" smtClean="0">
+                            <a:latin typeface="Cambria Math" panose="02040503050406030204" pitchFamily="18" charset="0"/>
+                          </a:rPr>
+                        </m:ctrlPr>
+                      </m:sSubPr>
+                      <m:e>
+                        <m:r>
+                          <a:rPr lang="en-US" sz="1000" b="0" i="1" smtClean="0">
+                            <a:latin typeface="Cambria Math" panose="02040503050406030204" pitchFamily="18" charset="0"/>
+                          </a:rPr>
+                          <m:t>𝑎</m:t>
+                        </m:r>
+                      </m:e>
+                      <m:sub>
+                        <m:r>
+                          <a:rPr lang="en-US" sz="1000" b="0" i="1" smtClean="0">
+                            <a:latin typeface="Cambria Math" panose="02040503050406030204" pitchFamily="18" charset="0"/>
+                          </a:rPr>
+                          <m:t>1</m:t>
+                        </m:r>
+                      </m:sub>
+                    </m:sSub>
+                  </m:oMath>
+                </a14:m>
+                <a:r>
+                  <a:rPr lang="en-GB" sz="1000" dirty="0" smtClean="0"/>
+                  <a:t>+ (</a:t>
+                </a:r>
+                <a14:m>
+                  <m:oMath xmlns:m="http://schemas.openxmlformats.org/officeDocument/2006/math">
+                    <m:f>
+                      <m:fPr>
+                        <m:ctrlPr>
+                          <a:rPr lang="en-GB" sz="1000" i="1" smtClean="0">
+                            <a:latin typeface="Cambria Math" panose="02040503050406030204" pitchFamily="18" charset="0"/>
+                          </a:rPr>
+                        </m:ctrlPr>
+                      </m:fPr>
+                      <m:num>
+                        <m:rad>
+                          <m:radPr>
+                            <m:degHide m:val="on"/>
+                            <m:ctrlPr>
+                              <a:rPr lang="en-GB" sz="1000" i="1" smtClean="0">
+                                <a:latin typeface="Cambria Math" panose="02040503050406030204" pitchFamily="18" charset="0"/>
+                              </a:rPr>
+                            </m:ctrlPr>
+                          </m:radPr>
+                          <m:deg/>
+                          <m:e>
+                            <m:r>
+                              <a:rPr lang="en-US" sz="1000" b="0" i="1" smtClean="0">
+                                <a:latin typeface="Cambria Math" panose="02040503050406030204" pitchFamily="18" charset="0"/>
+                              </a:rPr>
+                              <m:t>3</m:t>
+                            </m:r>
+                          </m:e>
+                        </m:rad>
+                      </m:num>
+                      <m:den>
+                        <m:r>
+                          <a:rPr lang="en-US" sz="1000" b="0" i="1" smtClean="0">
+                            <a:latin typeface="Cambria Math" panose="02040503050406030204" pitchFamily="18" charset="0"/>
+                          </a:rPr>
+                          <m:t>2</m:t>
+                        </m:r>
+                      </m:den>
+                    </m:f>
+                    <m:r>
+                      <a:rPr lang="en-US" sz="1000" b="0" i="1" smtClean="0">
+                        <a:latin typeface="Cambria Math" panose="02040503050406030204" pitchFamily="18" charset="0"/>
+                      </a:rPr>
+                      <m:t>𝑖</m:t>
+                    </m:r>
+                  </m:oMath>
+                </a14:m>
+                <a:r>
+                  <a:rPr lang="en-GB" sz="1000" dirty="0" smtClean="0"/>
+                  <a:t> * (S – T))</a:t>
+                </a:r>
+              </a:p>
+              <a:p>
+                <a:r>
+                  <a:rPr lang="en-GB" sz="1000" dirty="0"/>
+                  <a:t>    COMPUTE x3 = -( S + T) - </a:t>
+                </a:r>
+                <a14:m>
+                  <m:oMath xmlns:m="http://schemas.openxmlformats.org/officeDocument/2006/math">
+                    <m:f>
+                      <m:fPr>
+                        <m:ctrlPr>
+                          <a:rPr lang="en-GB" sz="1000" i="1">
+                            <a:latin typeface="Cambria Math" panose="02040503050406030204" pitchFamily="18" charset="0"/>
+                          </a:rPr>
+                        </m:ctrlPr>
+                      </m:fPr>
+                      <m:num>
+                        <m:r>
+                          <a:rPr lang="en-US" sz="1000" i="1">
+                            <a:latin typeface="Cambria Math" panose="02040503050406030204" pitchFamily="18" charset="0"/>
+                          </a:rPr>
+                          <m:t>1</m:t>
+                        </m:r>
+                      </m:num>
+                      <m:den>
+                        <m:r>
+                          <a:rPr lang="en-US" sz="1000" i="1">
+                            <a:latin typeface="Cambria Math" panose="02040503050406030204" pitchFamily="18" charset="0"/>
+                          </a:rPr>
+                          <m:t>3</m:t>
+                        </m:r>
+                      </m:den>
+                    </m:f>
+                    <m:sSub>
+                      <m:sSubPr>
+                        <m:ctrlPr>
+                          <a:rPr lang="en-GB" sz="1000" i="1">
+                            <a:latin typeface="Cambria Math" panose="02040503050406030204" pitchFamily="18" charset="0"/>
+                          </a:rPr>
+                        </m:ctrlPr>
+                      </m:sSubPr>
+                      <m:e>
+                        <m:r>
+                          <a:rPr lang="en-US" sz="1000" i="1">
+                            <a:latin typeface="Cambria Math" panose="02040503050406030204" pitchFamily="18" charset="0"/>
+                          </a:rPr>
+                          <m:t>𝑎</m:t>
+                        </m:r>
+                      </m:e>
+                      <m:sub>
+                        <m:r>
+                          <a:rPr lang="en-US" sz="1000" i="1">
+                            <a:latin typeface="Cambria Math" panose="02040503050406030204" pitchFamily="18" charset="0"/>
+                          </a:rPr>
+                          <m:t>1</m:t>
+                        </m:r>
+                      </m:sub>
+                    </m:sSub>
+                    <m:r>
+                      <a:rPr lang="en-US" sz="1000" b="0" i="0" smtClean="0">
+                        <a:latin typeface="Cambria Math" panose="02040503050406030204" pitchFamily="18" charset="0"/>
+                      </a:rPr>
+                      <m:t>−</m:t>
+                    </m:r>
+                  </m:oMath>
+                </a14:m>
+                <a:r>
+                  <a:rPr lang="en-GB" sz="1000" dirty="0"/>
+                  <a:t> (</a:t>
+                </a:r>
+                <a14:m>
+                  <m:oMath xmlns:m="http://schemas.openxmlformats.org/officeDocument/2006/math">
+                    <m:f>
+                      <m:fPr>
+                        <m:ctrlPr>
+                          <a:rPr lang="en-GB" sz="1000" i="1">
+                            <a:latin typeface="Cambria Math" panose="02040503050406030204" pitchFamily="18" charset="0"/>
+                          </a:rPr>
+                        </m:ctrlPr>
+                      </m:fPr>
+                      <m:num>
+                        <m:rad>
+                          <m:radPr>
+                            <m:degHide m:val="on"/>
+                            <m:ctrlPr>
+                              <a:rPr lang="en-GB" sz="1000" i="1">
+                                <a:latin typeface="Cambria Math" panose="02040503050406030204" pitchFamily="18" charset="0"/>
+                              </a:rPr>
+                            </m:ctrlPr>
+                          </m:radPr>
+                          <m:deg/>
+                          <m:e>
+                            <m:r>
+                              <a:rPr lang="en-US" sz="1000" i="1">
+                                <a:latin typeface="Cambria Math" panose="02040503050406030204" pitchFamily="18" charset="0"/>
+                              </a:rPr>
+                              <m:t>3</m:t>
+                            </m:r>
+                          </m:e>
+                        </m:rad>
+                      </m:num>
+                      <m:den>
+                        <m:r>
+                          <a:rPr lang="en-US" sz="1000" i="1">
+                            <a:latin typeface="Cambria Math" panose="02040503050406030204" pitchFamily="18" charset="0"/>
+                          </a:rPr>
+                          <m:t>2</m:t>
+                        </m:r>
+                      </m:den>
+                    </m:f>
+                    <m:r>
+                      <a:rPr lang="en-US" sz="1000" i="1">
+                        <a:latin typeface="Cambria Math" panose="02040503050406030204" pitchFamily="18" charset="0"/>
+                      </a:rPr>
+                      <m:t>𝑖</m:t>
+                    </m:r>
+                  </m:oMath>
+                </a14:m>
+                <a:r>
+                  <a:rPr lang="en-GB" sz="1000" dirty="0"/>
+                  <a:t> * (S – T))</a:t>
                 </a:r>
               </a:p>
               <a:p>
                 <a:r>
                   <a:rPr lang="en-GB" sz="1000" dirty="0" smtClean="0"/>
-                  <a:t>    x2 =  (-b - (b^2 – 4ac)^1/2)/ 2a</a:t>
+                  <a:t>    DISPLAY </a:t>
+                </a:r>
+                <a:r>
+                  <a:rPr lang="en-GB" sz="1000" dirty="0" smtClean="0"/>
+                  <a:t>x1</a:t>
                 </a:r>
               </a:p>
               <a:p>
@@ -5036,7 +5353,11 @@
                 </a:r>
                 <a:r>
                   <a:rPr lang="en-GB" sz="1000" dirty="0" smtClean="0"/>
-                  <a:t>   DISPLAY x1</a:t>
+                  <a:t>   DISPLAY </a:t>
+                </a:r>
+                <a:r>
+                  <a:rPr lang="en-GB" sz="1000" dirty="0" smtClean="0"/>
+                  <a:t>x2</a:t>
                 </a:r>
               </a:p>
               <a:p>
@@ -5046,8 +5367,9 @@
                 </a:r>
                 <a:r>
                   <a:rPr lang="en-GB" sz="1000" dirty="0" smtClean="0"/>
-                  <a:t>   DISPLAY x2</a:t>
+                  <a:t>   DISPLAY x3</a:t>
                 </a:r>
+                <a:endParaRPr lang="en-GB" sz="1000" dirty="0" smtClean="0"/>
               </a:p>
               <a:p>
                 <a:r>
@@ -5070,7 +5392,7 @@
             <p:spPr>
               <a:xfrm>
                 <a:off x="324196" y="648393"/>
-                <a:ext cx="2543696" cy="4354077"/>
+                <a:ext cx="2732042" cy="4675960"/>
               </a:xfrm>
               <a:prstGeom prst="rect">
                 <a:avLst/>
@@ -5079,6 +5401,3335 @@
                 <a:blip r:embed="rId2"/>
                 <a:stretch>
                   <a:fillRect/>
+                </a:stretch>
+              </a:blipFill>
+            </p:spPr>
+            <p:txBody>
+              <a:bodyPr/>
+              <a:lstStyle/>
+              <a:p>
+                <a:r>
+                  <a:rPr lang="en-US">
+                    <a:noFill/>
+                  </a:rPr>
+                  <a:t> </a:t>
+                </a:r>
+              </a:p>
+            </p:txBody>
+          </p:sp>
+        </mc:Fallback>
+      </mc:AlternateContent>
+      <p:sp>
+        <p:nvSpPr>
+          <p:cNvPr id="26" name="Oval 25"/>
+          <p:cNvSpPr/>
+          <p:nvPr/>
+        </p:nvSpPr>
+        <p:spPr>
+          <a:xfrm>
+            <a:off x="5864654" y="40574"/>
+            <a:ext cx="979136" cy="241069"/>
+          </a:xfrm>
+          <a:prstGeom prst="ellipse">
+            <a:avLst/>
+          </a:prstGeom>
+          <a:solidFill>
+            <a:schemeClr val="bg1"/>
+          </a:solidFill>
+        </p:spPr>
+        <p:style>
+          <a:lnRef idx="2">
+            <a:schemeClr val="accent1">
+              <a:shade val="50000"/>
+            </a:schemeClr>
+          </a:lnRef>
+          <a:fillRef idx="1">
+            <a:schemeClr val="accent1"/>
+          </a:fillRef>
+          <a:effectRef idx="0">
+            <a:schemeClr val="accent1"/>
+          </a:effectRef>
+          <a:fontRef idx="minor">
+            <a:schemeClr val="lt1"/>
+          </a:fontRef>
+        </p:style>
+        <p:txBody>
+          <a:bodyPr rtlCol="0" anchor="ctr"/>
+          <a:lstStyle/>
+          <a:p>
+            <a:pPr algn="ctr"/>
+            <a:r>
+              <a:rPr lang="en-GB" sz="1000" dirty="0" smtClean="0">
+                <a:solidFill>
+                  <a:schemeClr val="tx1"/>
+                </a:solidFill>
+              </a:rPr>
+              <a:t>Start</a:t>
+            </a:r>
+            <a:endParaRPr lang="en-GB" sz="1000" dirty="0">
+              <a:solidFill>
+                <a:schemeClr val="tx1"/>
+              </a:solidFill>
+            </a:endParaRPr>
+          </a:p>
+        </p:txBody>
+      </p:sp>
+      <p:cxnSp>
+        <p:nvCxnSpPr>
+          <p:cNvPr id="28" name="Straight Arrow Connector 27"/>
+          <p:cNvCxnSpPr>
+            <a:stCxn id="26" idx="4"/>
+            <a:endCxn id="29" idx="1"/>
+          </p:cNvCxnSpPr>
+          <p:nvPr/>
+        </p:nvCxnSpPr>
+        <p:spPr>
+          <a:xfrm>
+            <a:off x="6354222" y="281643"/>
+            <a:ext cx="4514" cy="190564"/>
+          </a:xfrm>
+          <a:prstGeom prst="straightConnector1">
+            <a:avLst/>
+          </a:prstGeom>
+          <a:ln>
+            <a:tailEnd type="triangle"/>
+          </a:ln>
+        </p:spPr>
+        <p:style>
+          <a:lnRef idx="1">
+            <a:schemeClr val="accent1"/>
+          </a:lnRef>
+          <a:fillRef idx="0">
+            <a:schemeClr val="accent1"/>
+          </a:fillRef>
+          <a:effectRef idx="0">
+            <a:schemeClr val="accent1"/>
+          </a:effectRef>
+          <a:fontRef idx="minor">
+            <a:schemeClr val="tx1"/>
+          </a:fontRef>
+        </p:style>
+      </p:cxnSp>
+      <p:sp>
+        <p:nvSpPr>
+          <p:cNvPr id="29" name="Flowchart: Data 28"/>
+          <p:cNvSpPr/>
+          <p:nvPr/>
+        </p:nvSpPr>
+        <p:spPr>
+          <a:xfrm>
+            <a:off x="5509360" y="472207"/>
+            <a:ext cx="1698751" cy="285673"/>
+          </a:xfrm>
+          <a:prstGeom prst="flowChartInputOutput">
+            <a:avLst/>
+          </a:prstGeom>
+          <a:solidFill>
+            <a:schemeClr val="bg1"/>
+          </a:solidFill>
+        </p:spPr>
+        <p:style>
+          <a:lnRef idx="2">
+            <a:schemeClr val="accent1">
+              <a:shade val="50000"/>
+            </a:schemeClr>
+          </a:lnRef>
+          <a:fillRef idx="1">
+            <a:schemeClr val="accent1"/>
+          </a:fillRef>
+          <a:effectRef idx="0">
+            <a:schemeClr val="accent1"/>
+          </a:effectRef>
+          <a:fontRef idx="minor">
+            <a:schemeClr val="lt1"/>
+          </a:fontRef>
+        </p:style>
+        <p:txBody>
+          <a:bodyPr rtlCol="0" anchor="ctr"/>
+          <a:lstStyle/>
+          <a:p>
+            <a:pPr algn="ctr"/>
+            <a:r>
+              <a:rPr lang="en-GB" sz="1000" dirty="0" smtClean="0">
+                <a:solidFill>
+                  <a:schemeClr val="tx1"/>
+                </a:solidFill>
+              </a:rPr>
+              <a:t>Display “Enter the value for a”</a:t>
+            </a:r>
+            <a:endParaRPr lang="en-GB" sz="1000" dirty="0">
+              <a:solidFill>
+                <a:schemeClr val="tx1"/>
+              </a:solidFill>
+            </a:endParaRPr>
+          </a:p>
+        </p:txBody>
+      </p:sp>
+      <p:sp>
+        <p:nvSpPr>
+          <p:cNvPr id="31" name="Flowchart: Data 30"/>
+          <p:cNvSpPr/>
+          <p:nvPr/>
+        </p:nvSpPr>
+        <p:spPr>
+          <a:xfrm>
+            <a:off x="5699893" y="884661"/>
+            <a:ext cx="1326981" cy="163072"/>
+          </a:xfrm>
+          <a:prstGeom prst="flowChartInputOutput">
+            <a:avLst/>
+          </a:prstGeom>
+          <a:solidFill>
+            <a:schemeClr val="bg1"/>
+          </a:solidFill>
+        </p:spPr>
+        <p:style>
+          <a:lnRef idx="2">
+            <a:schemeClr val="accent1">
+              <a:shade val="50000"/>
+            </a:schemeClr>
+          </a:lnRef>
+          <a:fillRef idx="1">
+            <a:schemeClr val="accent1"/>
+          </a:fillRef>
+          <a:effectRef idx="0">
+            <a:schemeClr val="accent1"/>
+          </a:effectRef>
+          <a:fontRef idx="minor">
+            <a:schemeClr val="lt1"/>
+          </a:fontRef>
+        </p:style>
+        <p:txBody>
+          <a:bodyPr rtlCol="0" anchor="ctr"/>
+          <a:lstStyle/>
+          <a:p>
+            <a:pPr algn="ctr"/>
+            <a:r>
+              <a:rPr lang="en-GB" sz="1000" dirty="0" smtClean="0">
+                <a:solidFill>
+                  <a:schemeClr val="tx1"/>
+                </a:solidFill>
+              </a:rPr>
+              <a:t>Input a</a:t>
+            </a:r>
+            <a:endParaRPr lang="en-GB" sz="1000" dirty="0">
+              <a:solidFill>
+                <a:schemeClr val="tx1"/>
+              </a:solidFill>
+            </a:endParaRPr>
+          </a:p>
+        </p:txBody>
+      </p:sp>
+      <p:cxnSp>
+        <p:nvCxnSpPr>
+          <p:cNvPr id="32" name="Straight Arrow Connector 31"/>
+          <p:cNvCxnSpPr>
+            <a:stCxn id="29" idx="4"/>
+            <a:endCxn id="31" idx="1"/>
+          </p:cNvCxnSpPr>
+          <p:nvPr/>
+        </p:nvCxnSpPr>
+        <p:spPr>
+          <a:xfrm>
+            <a:off x="6358736" y="757880"/>
+            <a:ext cx="4648" cy="126781"/>
+          </a:xfrm>
+          <a:prstGeom prst="straightConnector1">
+            <a:avLst/>
+          </a:prstGeom>
+          <a:ln>
+            <a:tailEnd type="triangle"/>
+          </a:ln>
+        </p:spPr>
+        <p:style>
+          <a:lnRef idx="1">
+            <a:schemeClr val="accent1"/>
+          </a:lnRef>
+          <a:fillRef idx="0">
+            <a:schemeClr val="accent1"/>
+          </a:fillRef>
+          <a:effectRef idx="0">
+            <a:schemeClr val="accent1"/>
+          </a:effectRef>
+          <a:fontRef idx="minor">
+            <a:schemeClr val="tx1"/>
+          </a:fontRef>
+        </p:style>
+      </p:cxnSp>
+      <p:sp>
+        <p:nvSpPr>
+          <p:cNvPr id="33" name="Flowchart: Data 32"/>
+          <p:cNvSpPr/>
+          <p:nvPr/>
+        </p:nvSpPr>
+        <p:spPr>
+          <a:xfrm>
+            <a:off x="5511111" y="1175447"/>
+            <a:ext cx="1712689" cy="307061"/>
+          </a:xfrm>
+          <a:prstGeom prst="flowChartInputOutput">
+            <a:avLst/>
+          </a:prstGeom>
+          <a:solidFill>
+            <a:schemeClr val="bg1"/>
+          </a:solidFill>
+        </p:spPr>
+        <p:style>
+          <a:lnRef idx="2">
+            <a:schemeClr val="accent1">
+              <a:shade val="50000"/>
+            </a:schemeClr>
+          </a:lnRef>
+          <a:fillRef idx="1">
+            <a:schemeClr val="accent1"/>
+          </a:fillRef>
+          <a:effectRef idx="0">
+            <a:schemeClr val="accent1"/>
+          </a:effectRef>
+          <a:fontRef idx="minor">
+            <a:schemeClr val="lt1"/>
+          </a:fontRef>
+        </p:style>
+        <p:txBody>
+          <a:bodyPr rtlCol="0" anchor="ctr"/>
+          <a:lstStyle/>
+          <a:p>
+            <a:pPr algn="ctr"/>
+            <a:r>
+              <a:rPr lang="en-GB" sz="1000" dirty="0" smtClean="0">
+                <a:solidFill>
+                  <a:schemeClr val="tx1"/>
+                </a:solidFill>
+              </a:rPr>
+              <a:t>Display “Enter the value for b”</a:t>
+            </a:r>
+            <a:endParaRPr lang="en-GB" sz="1000" dirty="0">
+              <a:solidFill>
+                <a:schemeClr val="tx1"/>
+              </a:solidFill>
+            </a:endParaRPr>
+          </a:p>
+        </p:txBody>
+      </p:sp>
+      <p:cxnSp>
+        <p:nvCxnSpPr>
+          <p:cNvPr id="34" name="Straight Arrow Connector 33"/>
+          <p:cNvCxnSpPr>
+            <a:stCxn id="31" idx="4"/>
+            <a:endCxn id="33" idx="1"/>
+          </p:cNvCxnSpPr>
+          <p:nvPr/>
+        </p:nvCxnSpPr>
+        <p:spPr>
+          <a:xfrm>
+            <a:off x="6363384" y="1047733"/>
+            <a:ext cx="4072" cy="127714"/>
+          </a:xfrm>
+          <a:prstGeom prst="straightConnector1">
+            <a:avLst/>
+          </a:prstGeom>
+          <a:ln>
+            <a:tailEnd type="triangle"/>
+          </a:ln>
+        </p:spPr>
+        <p:style>
+          <a:lnRef idx="1">
+            <a:schemeClr val="accent1"/>
+          </a:lnRef>
+          <a:fillRef idx="0">
+            <a:schemeClr val="accent1"/>
+          </a:fillRef>
+          <a:effectRef idx="0">
+            <a:schemeClr val="accent1"/>
+          </a:effectRef>
+          <a:fontRef idx="minor">
+            <a:schemeClr val="tx1"/>
+          </a:fontRef>
+        </p:style>
+      </p:cxnSp>
+      <p:sp>
+        <p:nvSpPr>
+          <p:cNvPr id="35" name="Flowchart: Data 34"/>
+          <p:cNvSpPr/>
+          <p:nvPr/>
+        </p:nvSpPr>
+        <p:spPr>
+          <a:xfrm>
+            <a:off x="5649404" y="1639228"/>
+            <a:ext cx="1449761" cy="126008"/>
+          </a:xfrm>
+          <a:prstGeom prst="flowChartInputOutput">
+            <a:avLst/>
+          </a:prstGeom>
+          <a:solidFill>
+            <a:schemeClr val="bg1"/>
+          </a:solidFill>
+        </p:spPr>
+        <p:style>
+          <a:lnRef idx="2">
+            <a:schemeClr val="accent1">
+              <a:shade val="50000"/>
+            </a:schemeClr>
+          </a:lnRef>
+          <a:fillRef idx="1">
+            <a:schemeClr val="accent1"/>
+          </a:fillRef>
+          <a:effectRef idx="0">
+            <a:schemeClr val="accent1"/>
+          </a:effectRef>
+          <a:fontRef idx="minor">
+            <a:schemeClr val="lt1"/>
+          </a:fontRef>
+        </p:style>
+        <p:txBody>
+          <a:bodyPr rtlCol="0" anchor="ctr"/>
+          <a:lstStyle/>
+          <a:p>
+            <a:pPr algn="ctr"/>
+            <a:r>
+              <a:rPr lang="en-GB" sz="1000" dirty="0" smtClean="0">
+                <a:solidFill>
+                  <a:schemeClr val="tx1"/>
+                </a:solidFill>
+              </a:rPr>
+              <a:t>Input b</a:t>
+            </a:r>
+            <a:endParaRPr lang="en-GB" sz="1000" dirty="0">
+              <a:solidFill>
+                <a:schemeClr val="tx1"/>
+              </a:solidFill>
+            </a:endParaRPr>
+          </a:p>
+        </p:txBody>
+      </p:sp>
+      <p:cxnSp>
+        <p:nvCxnSpPr>
+          <p:cNvPr id="36" name="Straight Arrow Connector 35"/>
+          <p:cNvCxnSpPr>
+            <a:stCxn id="33" idx="4"/>
+            <a:endCxn id="35" idx="1"/>
+          </p:cNvCxnSpPr>
+          <p:nvPr/>
+        </p:nvCxnSpPr>
+        <p:spPr>
+          <a:xfrm>
+            <a:off x="6367456" y="1482508"/>
+            <a:ext cx="6829" cy="156720"/>
+          </a:xfrm>
+          <a:prstGeom prst="straightConnector1">
+            <a:avLst/>
+          </a:prstGeom>
+          <a:ln>
+            <a:tailEnd type="triangle"/>
+          </a:ln>
+        </p:spPr>
+        <p:style>
+          <a:lnRef idx="1">
+            <a:schemeClr val="accent1"/>
+          </a:lnRef>
+          <a:fillRef idx="0">
+            <a:schemeClr val="accent1"/>
+          </a:fillRef>
+          <a:effectRef idx="0">
+            <a:schemeClr val="accent1"/>
+          </a:effectRef>
+          <a:fontRef idx="minor">
+            <a:schemeClr val="tx1"/>
+          </a:fontRef>
+        </p:style>
+      </p:cxnSp>
+      <p:sp>
+        <p:nvSpPr>
+          <p:cNvPr id="37" name="Flowchart: Data 36"/>
+          <p:cNvSpPr/>
+          <p:nvPr/>
+        </p:nvSpPr>
+        <p:spPr>
+          <a:xfrm>
+            <a:off x="5534075" y="1921770"/>
+            <a:ext cx="1688660" cy="302441"/>
+          </a:xfrm>
+          <a:prstGeom prst="flowChartInputOutput">
+            <a:avLst/>
+          </a:prstGeom>
+          <a:solidFill>
+            <a:schemeClr val="bg1"/>
+          </a:solidFill>
+        </p:spPr>
+        <p:style>
+          <a:lnRef idx="2">
+            <a:schemeClr val="accent1">
+              <a:shade val="50000"/>
+            </a:schemeClr>
+          </a:lnRef>
+          <a:fillRef idx="1">
+            <a:schemeClr val="accent1"/>
+          </a:fillRef>
+          <a:effectRef idx="0">
+            <a:schemeClr val="accent1"/>
+          </a:effectRef>
+          <a:fontRef idx="minor">
+            <a:schemeClr val="lt1"/>
+          </a:fontRef>
+        </p:style>
+        <p:txBody>
+          <a:bodyPr rtlCol="0" anchor="ctr"/>
+          <a:lstStyle/>
+          <a:p>
+            <a:pPr algn="ctr"/>
+            <a:r>
+              <a:rPr lang="en-GB" sz="1000" dirty="0" smtClean="0">
+                <a:solidFill>
+                  <a:schemeClr val="tx1"/>
+                </a:solidFill>
+              </a:rPr>
+              <a:t>Display “Enter the value for c”</a:t>
+            </a:r>
+            <a:endParaRPr lang="en-GB" sz="1000" dirty="0">
+              <a:solidFill>
+                <a:schemeClr val="tx1"/>
+              </a:solidFill>
+            </a:endParaRPr>
+          </a:p>
+        </p:txBody>
+      </p:sp>
+      <p:cxnSp>
+        <p:nvCxnSpPr>
+          <p:cNvPr id="38" name="Straight Arrow Connector 37"/>
+          <p:cNvCxnSpPr>
+            <a:stCxn id="35" idx="4"/>
+            <a:endCxn id="37" idx="1"/>
+          </p:cNvCxnSpPr>
+          <p:nvPr/>
+        </p:nvCxnSpPr>
+        <p:spPr>
+          <a:xfrm>
+            <a:off x="6374285" y="1765236"/>
+            <a:ext cx="4120" cy="156534"/>
+          </a:xfrm>
+          <a:prstGeom prst="straightConnector1">
+            <a:avLst/>
+          </a:prstGeom>
+          <a:ln>
+            <a:tailEnd type="triangle"/>
+          </a:ln>
+        </p:spPr>
+        <p:style>
+          <a:lnRef idx="1">
+            <a:schemeClr val="accent1"/>
+          </a:lnRef>
+          <a:fillRef idx="0">
+            <a:schemeClr val="accent1"/>
+          </a:fillRef>
+          <a:effectRef idx="0">
+            <a:schemeClr val="accent1"/>
+          </a:effectRef>
+          <a:fontRef idx="minor">
+            <a:schemeClr val="tx1"/>
+          </a:fontRef>
+        </p:style>
+      </p:cxnSp>
+      <mc:AlternateContent xmlns:mc="http://schemas.openxmlformats.org/markup-compatibility/2006">
+        <mc:Choice xmlns:a14="http://schemas.microsoft.com/office/drawing/2010/main" Requires="a14">
+          <p:sp>
+            <p:nvSpPr>
+              <p:cNvPr id="39" name="Rectangle 38"/>
+              <p:cNvSpPr/>
+              <p:nvPr/>
+            </p:nvSpPr>
+            <p:spPr>
+              <a:xfrm>
+                <a:off x="5744672" y="3320151"/>
+                <a:ext cx="979136" cy="290946"/>
+              </a:xfrm>
+              <a:prstGeom prst="rect">
+                <a:avLst/>
+              </a:prstGeom>
+              <a:solidFill>
+                <a:schemeClr val="bg1"/>
+              </a:solidFill>
+            </p:spPr>
+            <p:style>
+              <a:lnRef idx="2">
+                <a:schemeClr val="accent1">
+                  <a:shade val="50000"/>
+                </a:schemeClr>
+              </a:lnRef>
+              <a:fillRef idx="1">
+                <a:schemeClr val="accent1"/>
+              </a:fillRef>
+              <a:effectRef idx="0">
+                <a:schemeClr val="accent1"/>
+              </a:effectRef>
+              <a:fontRef idx="minor">
+                <a:schemeClr val="lt1"/>
+              </a:fontRef>
+            </p:style>
+            <p:txBody>
+              <a:bodyPr rtlCol="0" anchor="ctr"/>
+              <a:lstStyle/>
+              <a:p>
+                <a:pPr algn="ctr"/>
+                <a:r>
+                  <a:rPr lang="en-GB" sz="1100" dirty="0" smtClean="0">
+                    <a:solidFill>
+                      <a:schemeClr val="tx1"/>
+                    </a:solidFill>
+                  </a:rPr>
+                  <a:t>Q </a:t>
+                </a:r>
+                <a:r>
+                  <a:rPr lang="en-GB" sz="1100" dirty="0">
+                    <a:solidFill>
+                      <a:schemeClr val="tx1"/>
+                    </a:solidFill>
+                  </a:rPr>
+                  <a:t>=  </a:t>
+                </a:r>
+                <a14:m>
+                  <m:oMath xmlns:m="http://schemas.openxmlformats.org/officeDocument/2006/math">
+                    <m:f>
+                      <m:fPr>
+                        <m:ctrlPr>
+                          <a:rPr lang="en-GB" sz="1100" i="1">
+                            <a:solidFill>
+                              <a:schemeClr val="tx1"/>
+                            </a:solidFill>
+                            <a:latin typeface="Cambria Math" panose="02040503050406030204" pitchFamily="18" charset="0"/>
+                          </a:rPr>
+                        </m:ctrlPr>
+                      </m:fPr>
+                      <m:num>
+                        <m:sSub>
+                          <m:sSubPr>
+                            <m:ctrlPr>
+                              <a:rPr lang="en-GB" sz="1100" i="1">
+                                <a:solidFill>
+                                  <a:schemeClr val="tx1"/>
+                                </a:solidFill>
+                                <a:latin typeface="Cambria Math" panose="02040503050406030204" pitchFamily="18" charset="0"/>
+                              </a:rPr>
+                            </m:ctrlPr>
+                          </m:sSubPr>
+                          <m:e>
+                            <m:r>
+                              <a:rPr lang="en-US" sz="1100" i="1">
+                                <a:solidFill>
+                                  <a:schemeClr val="tx1"/>
+                                </a:solidFill>
+                                <a:latin typeface="Cambria Math" panose="02040503050406030204" pitchFamily="18" charset="0"/>
+                              </a:rPr>
+                              <m:t>3</m:t>
+                            </m:r>
+                            <m:r>
+                              <a:rPr lang="en-US" sz="1100" i="1">
+                                <a:solidFill>
+                                  <a:schemeClr val="tx1"/>
+                                </a:solidFill>
+                                <a:latin typeface="Cambria Math" panose="02040503050406030204" pitchFamily="18" charset="0"/>
+                              </a:rPr>
+                              <m:t>𝑎</m:t>
+                            </m:r>
+                          </m:e>
+                          <m:sub>
+                            <m:r>
+                              <a:rPr lang="en-US" sz="1100" i="1">
+                                <a:solidFill>
+                                  <a:schemeClr val="tx1"/>
+                                </a:solidFill>
+                                <a:latin typeface="Cambria Math" panose="02040503050406030204" pitchFamily="18" charset="0"/>
+                              </a:rPr>
+                              <m:t>2</m:t>
+                            </m:r>
+                          </m:sub>
+                        </m:sSub>
+                        <m:r>
+                          <a:rPr lang="en-US" sz="1100" i="1">
+                            <a:solidFill>
+                              <a:schemeClr val="tx1"/>
+                            </a:solidFill>
+                            <a:latin typeface="Cambria Math" panose="02040503050406030204" pitchFamily="18" charset="0"/>
+                          </a:rPr>
+                          <m:t> − </m:t>
+                        </m:r>
+                        <m:sSup>
+                          <m:sSupPr>
+                            <m:ctrlPr>
+                              <a:rPr lang="en-US" sz="1100" i="1">
+                                <a:solidFill>
+                                  <a:schemeClr val="tx1"/>
+                                </a:solidFill>
+                                <a:latin typeface="Cambria Math" panose="02040503050406030204" pitchFamily="18" charset="0"/>
+                              </a:rPr>
+                            </m:ctrlPr>
+                          </m:sSupPr>
+                          <m:e>
+                            <m:sSub>
+                              <m:sSubPr>
+                                <m:ctrlPr>
+                                  <a:rPr lang="en-US" sz="1100" i="1">
+                                    <a:solidFill>
+                                      <a:schemeClr val="tx1"/>
+                                    </a:solidFill>
+                                    <a:latin typeface="Cambria Math" panose="02040503050406030204" pitchFamily="18" charset="0"/>
+                                  </a:rPr>
+                                </m:ctrlPr>
+                              </m:sSubPr>
+                              <m:e>
+                                <m:r>
+                                  <a:rPr lang="en-US" sz="1100" i="1">
+                                    <a:solidFill>
+                                      <a:schemeClr val="tx1"/>
+                                    </a:solidFill>
+                                    <a:latin typeface="Cambria Math" panose="02040503050406030204" pitchFamily="18" charset="0"/>
+                                  </a:rPr>
+                                  <m:t>𝑎</m:t>
+                                </m:r>
+                              </m:e>
+                              <m:sub>
+                                <m:r>
+                                  <a:rPr lang="en-US" sz="1100" i="1">
+                                    <a:solidFill>
+                                      <a:schemeClr val="tx1"/>
+                                    </a:solidFill>
+                                    <a:latin typeface="Cambria Math" panose="02040503050406030204" pitchFamily="18" charset="0"/>
+                                  </a:rPr>
+                                  <m:t>1</m:t>
+                                </m:r>
+                              </m:sub>
+                            </m:sSub>
+                          </m:e>
+                          <m:sup>
+                            <m:r>
+                              <a:rPr lang="en-US" sz="1100" i="1">
+                                <a:solidFill>
+                                  <a:schemeClr val="tx1"/>
+                                </a:solidFill>
+                                <a:latin typeface="Cambria Math" panose="02040503050406030204" pitchFamily="18" charset="0"/>
+                              </a:rPr>
+                              <m:t>2</m:t>
+                            </m:r>
+                          </m:sup>
+                        </m:sSup>
+                        <m:r>
+                          <a:rPr lang="en-US" sz="1100" i="1">
+                            <a:solidFill>
+                              <a:schemeClr val="tx1"/>
+                            </a:solidFill>
+                            <a:latin typeface="Cambria Math" panose="02040503050406030204" pitchFamily="18" charset="0"/>
+                          </a:rPr>
+                          <m:t> </m:t>
+                        </m:r>
+                      </m:num>
+                      <m:den>
+                        <m:r>
+                          <a:rPr lang="en-US" sz="1100" i="1">
+                            <a:solidFill>
+                              <a:schemeClr val="tx1"/>
+                            </a:solidFill>
+                            <a:latin typeface="Cambria Math" panose="02040503050406030204" pitchFamily="18" charset="0"/>
+                          </a:rPr>
+                          <m:t>9</m:t>
+                        </m:r>
+                      </m:den>
+                    </m:f>
+                  </m:oMath>
+                </a14:m>
+                <a:r>
+                  <a:rPr lang="en-GB" sz="1100" dirty="0" smtClean="0">
+                    <a:solidFill>
+                      <a:schemeClr val="tx1"/>
+                    </a:solidFill>
+                  </a:rPr>
+                  <a:t> </a:t>
+                </a:r>
+                <a:endParaRPr lang="en-GB" sz="1100" dirty="0">
+                  <a:solidFill>
+                    <a:schemeClr val="tx1"/>
+                  </a:solidFill>
+                </a:endParaRPr>
+              </a:p>
+            </p:txBody>
+          </p:sp>
+        </mc:Choice>
+        <mc:Fallback>
+          <p:sp>
+            <p:nvSpPr>
+              <p:cNvPr id="39" name="Rectangle 38"/>
+              <p:cNvSpPr>
+                <a:spLocks noRot="1" noChangeAspect="1" noMove="1" noResize="1" noEditPoints="1" noAdjustHandles="1" noChangeArrowheads="1" noChangeShapeType="1" noTextEdit="1"/>
+              </p:cNvSpPr>
+              <p:nvPr/>
+            </p:nvSpPr>
+            <p:spPr>
+              <a:xfrm>
+                <a:off x="5744672" y="3320151"/>
+                <a:ext cx="979136" cy="290946"/>
+              </a:xfrm>
+              <a:prstGeom prst="rect">
+                <a:avLst/>
+              </a:prstGeom>
+              <a:blipFill>
+                <a:blip r:embed="rId3"/>
+                <a:stretch>
+                  <a:fillRect b="-12245"/>
+                </a:stretch>
+              </a:blipFill>
+            </p:spPr>
+            <p:txBody>
+              <a:bodyPr/>
+              <a:lstStyle/>
+              <a:p>
+                <a:r>
+                  <a:rPr lang="en-US">
+                    <a:noFill/>
+                  </a:rPr>
+                  <a:t> </a:t>
+                </a:r>
+              </a:p>
+            </p:txBody>
+          </p:sp>
+        </mc:Fallback>
+      </mc:AlternateContent>
+      <p:cxnSp>
+        <p:nvCxnSpPr>
+          <p:cNvPr id="40" name="Straight Arrow Connector 39"/>
+          <p:cNvCxnSpPr>
+            <a:stCxn id="37" idx="4"/>
+            <a:endCxn id="82" idx="1"/>
+          </p:cNvCxnSpPr>
+          <p:nvPr/>
+        </p:nvCxnSpPr>
+        <p:spPr>
+          <a:xfrm>
+            <a:off x="6378405" y="2224211"/>
+            <a:ext cx="5526" cy="157860"/>
+          </a:xfrm>
+          <a:prstGeom prst="straightConnector1">
+            <a:avLst/>
+          </a:prstGeom>
+          <a:ln>
+            <a:tailEnd type="triangle"/>
+          </a:ln>
+        </p:spPr>
+        <p:style>
+          <a:lnRef idx="1">
+            <a:schemeClr val="accent1"/>
+          </a:lnRef>
+          <a:fillRef idx="0">
+            <a:schemeClr val="accent1"/>
+          </a:fillRef>
+          <a:effectRef idx="0">
+            <a:schemeClr val="accent1"/>
+          </a:effectRef>
+          <a:fontRef idx="minor">
+            <a:schemeClr val="tx1"/>
+          </a:fontRef>
+        </p:style>
+      </p:cxnSp>
+      <p:cxnSp>
+        <p:nvCxnSpPr>
+          <p:cNvPr id="42" name="Straight Arrow Connector 41"/>
+          <p:cNvCxnSpPr>
+            <a:stCxn id="114" idx="3"/>
+            <a:endCxn id="120" idx="1"/>
+          </p:cNvCxnSpPr>
+          <p:nvPr/>
+        </p:nvCxnSpPr>
+        <p:spPr>
+          <a:xfrm>
+            <a:off x="8726103" y="3912071"/>
+            <a:ext cx="290181" cy="4762"/>
+          </a:xfrm>
+          <a:prstGeom prst="straightConnector1">
+            <a:avLst/>
+          </a:prstGeom>
+          <a:ln>
+            <a:tailEnd type="triangle"/>
+          </a:ln>
+        </p:spPr>
+        <p:style>
+          <a:lnRef idx="1">
+            <a:schemeClr val="accent1"/>
+          </a:lnRef>
+          <a:fillRef idx="0">
+            <a:schemeClr val="accent1"/>
+          </a:fillRef>
+          <a:effectRef idx="0">
+            <a:schemeClr val="accent1"/>
+          </a:effectRef>
+          <a:fontRef idx="minor">
+            <a:schemeClr val="tx1"/>
+          </a:fontRef>
+        </p:style>
+      </p:cxnSp>
+      <p:sp>
+        <p:nvSpPr>
+          <p:cNvPr id="43" name="Flowchart: Data 42"/>
+          <p:cNvSpPr/>
+          <p:nvPr/>
+        </p:nvSpPr>
+        <p:spPr>
+          <a:xfrm>
+            <a:off x="6005383" y="4255000"/>
+            <a:ext cx="1317271" cy="259515"/>
+          </a:xfrm>
+          <a:prstGeom prst="flowChartInputOutput">
+            <a:avLst/>
+          </a:prstGeom>
+          <a:solidFill>
+            <a:schemeClr val="bg1"/>
+          </a:solidFill>
+        </p:spPr>
+        <p:style>
+          <a:lnRef idx="2">
+            <a:schemeClr val="accent1">
+              <a:shade val="50000"/>
+            </a:schemeClr>
+          </a:lnRef>
+          <a:fillRef idx="1">
+            <a:schemeClr val="accent1"/>
+          </a:fillRef>
+          <a:effectRef idx="0">
+            <a:schemeClr val="accent1"/>
+          </a:effectRef>
+          <a:fontRef idx="minor">
+            <a:schemeClr val="lt1"/>
+          </a:fontRef>
+        </p:style>
+        <p:txBody>
+          <a:bodyPr rtlCol="0" anchor="ctr"/>
+          <a:lstStyle/>
+          <a:p>
+            <a:pPr algn="ctr"/>
+            <a:r>
+              <a:rPr lang="en-GB" sz="1000" dirty="0" smtClean="0">
+                <a:solidFill>
+                  <a:schemeClr val="tx1"/>
+                </a:solidFill>
+              </a:rPr>
+              <a:t>Display x1</a:t>
+            </a:r>
+            <a:endParaRPr lang="en-GB" sz="1000" dirty="0">
+              <a:solidFill>
+                <a:schemeClr val="tx1"/>
+              </a:solidFill>
+            </a:endParaRPr>
+          </a:p>
+        </p:txBody>
+      </p:sp>
+      <p:sp>
+        <p:nvSpPr>
+          <p:cNvPr id="45" name="Flowchart: Data 44"/>
+          <p:cNvSpPr/>
+          <p:nvPr/>
+        </p:nvSpPr>
+        <p:spPr>
+          <a:xfrm>
+            <a:off x="5955271" y="4658155"/>
+            <a:ext cx="1416307" cy="228632"/>
+          </a:xfrm>
+          <a:prstGeom prst="flowChartInputOutput">
+            <a:avLst/>
+          </a:prstGeom>
+          <a:solidFill>
+            <a:schemeClr val="bg1"/>
+          </a:solidFill>
+        </p:spPr>
+        <p:style>
+          <a:lnRef idx="2">
+            <a:schemeClr val="accent1">
+              <a:shade val="50000"/>
+            </a:schemeClr>
+          </a:lnRef>
+          <a:fillRef idx="1">
+            <a:schemeClr val="accent1"/>
+          </a:fillRef>
+          <a:effectRef idx="0">
+            <a:schemeClr val="accent1"/>
+          </a:effectRef>
+          <a:fontRef idx="minor">
+            <a:schemeClr val="lt1"/>
+          </a:fontRef>
+        </p:style>
+        <p:txBody>
+          <a:bodyPr rtlCol="0" anchor="ctr"/>
+          <a:lstStyle/>
+          <a:p>
+            <a:pPr algn="ctr"/>
+            <a:r>
+              <a:rPr lang="en-GB" sz="1000" dirty="0" smtClean="0">
+                <a:solidFill>
+                  <a:schemeClr val="tx1"/>
+                </a:solidFill>
+              </a:rPr>
+              <a:t>Display x2</a:t>
+            </a:r>
+            <a:endParaRPr lang="en-GB" sz="1000" dirty="0">
+              <a:solidFill>
+                <a:schemeClr val="tx1"/>
+              </a:solidFill>
+            </a:endParaRPr>
+          </a:p>
+        </p:txBody>
+      </p:sp>
+      <p:cxnSp>
+        <p:nvCxnSpPr>
+          <p:cNvPr id="46" name="Straight Arrow Connector 45"/>
+          <p:cNvCxnSpPr>
+            <a:stCxn id="43" idx="4"/>
+            <a:endCxn id="45" idx="1"/>
+          </p:cNvCxnSpPr>
+          <p:nvPr/>
+        </p:nvCxnSpPr>
+        <p:spPr>
+          <a:xfrm flipH="1">
+            <a:off x="6663425" y="4514515"/>
+            <a:ext cx="594" cy="143640"/>
+          </a:xfrm>
+          <a:prstGeom prst="straightConnector1">
+            <a:avLst/>
+          </a:prstGeom>
+          <a:ln>
+            <a:tailEnd type="triangle"/>
+          </a:ln>
+        </p:spPr>
+        <p:style>
+          <a:lnRef idx="1">
+            <a:schemeClr val="accent1"/>
+          </a:lnRef>
+          <a:fillRef idx="0">
+            <a:schemeClr val="accent1"/>
+          </a:fillRef>
+          <a:effectRef idx="0">
+            <a:schemeClr val="accent1"/>
+          </a:effectRef>
+          <a:fontRef idx="minor">
+            <a:schemeClr val="tx1"/>
+          </a:fontRef>
+        </p:style>
+      </p:cxnSp>
+      <p:sp>
+        <p:nvSpPr>
+          <p:cNvPr id="47" name="Oval 46"/>
+          <p:cNvSpPr/>
+          <p:nvPr/>
+        </p:nvSpPr>
+        <p:spPr>
+          <a:xfrm>
+            <a:off x="5870344" y="5463895"/>
+            <a:ext cx="1288473" cy="241069"/>
+          </a:xfrm>
+          <a:prstGeom prst="ellipse">
+            <a:avLst/>
+          </a:prstGeom>
+          <a:solidFill>
+            <a:schemeClr val="bg1"/>
+          </a:solidFill>
+        </p:spPr>
+        <p:style>
+          <a:lnRef idx="2">
+            <a:schemeClr val="accent1">
+              <a:shade val="50000"/>
+            </a:schemeClr>
+          </a:lnRef>
+          <a:fillRef idx="1">
+            <a:schemeClr val="accent1"/>
+          </a:fillRef>
+          <a:effectRef idx="0">
+            <a:schemeClr val="accent1"/>
+          </a:effectRef>
+          <a:fontRef idx="minor">
+            <a:schemeClr val="lt1"/>
+          </a:fontRef>
+        </p:style>
+        <p:txBody>
+          <a:bodyPr rtlCol="0" anchor="ctr"/>
+          <a:lstStyle/>
+          <a:p>
+            <a:pPr algn="ctr"/>
+            <a:r>
+              <a:rPr lang="en-GB" sz="1200" dirty="0" smtClean="0">
+                <a:solidFill>
+                  <a:schemeClr val="tx1"/>
+                </a:solidFill>
+              </a:rPr>
+              <a:t>End</a:t>
+            </a:r>
+            <a:endParaRPr lang="en-GB" sz="1200" dirty="0">
+              <a:solidFill>
+                <a:schemeClr val="tx1"/>
+              </a:solidFill>
+            </a:endParaRPr>
+          </a:p>
+        </p:txBody>
+      </p:sp>
+      <p:cxnSp>
+        <p:nvCxnSpPr>
+          <p:cNvPr id="48" name="Straight Arrow Connector 47"/>
+          <p:cNvCxnSpPr>
+            <a:stCxn id="164" idx="4"/>
+            <a:endCxn id="47" idx="0"/>
+          </p:cNvCxnSpPr>
+          <p:nvPr/>
+        </p:nvCxnSpPr>
+        <p:spPr>
+          <a:xfrm flipH="1">
+            <a:off x="6514581" y="5283514"/>
+            <a:ext cx="1" cy="180381"/>
+          </a:xfrm>
+          <a:prstGeom prst="straightConnector1">
+            <a:avLst/>
+          </a:prstGeom>
+          <a:ln>
+            <a:tailEnd type="triangle"/>
+          </a:ln>
+        </p:spPr>
+        <p:style>
+          <a:lnRef idx="1">
+            <a:schemeClr val="accent1"/>
+          </a:lnRef>
+          <a:fillRef idx="0">
+            <a:schemeClr val="accent1"/>
+          </a:fillRef>
+          <a:effectRef idx="0">
+            <a:schemeClr val="accent1"/>
+          </a:effectRef>
+          <a:fontRef idx="minor">
+            <a:schemeClr val="tx1"/>
+          </a:fontRef>
+        </p:style>
+      </p:cxnSp>
+      <p:sp>
+        <p:nvSpPr>
+          <p:cNvPr id="82" name="Flowchart: Data 81"/>
+          <p:cNvSpPr/>
+          <p:nvPr/>
+        </p:nvSpPr>
+        <p:spPr>
+          <a:xfrm>
+            <a:off x="5659050" y="2382071"/>
+            <a:ext cx="1449761" cy="112703"/>
+          </a:xfrm>
+          <a:prstGeom prst="flowChartInputOutput">
+            <a:avLst/>
+          </a:prstGeom>
+          <a:solidFill>
+            <a:schemeClr val="bg1"/>
+          </a:solidFill>
+        </p:spPr>
+        <p:style>
+          <a:lnRef idx="2">
+            <a:schemeClr val="accent1">
+              <a:shade val="50000"/>
+            </a:schemeClr>
+          </a:lnRef>
+          <a:fillRef idx="1">
+            <a:schemeClr val="accent1"/>
+          </a:fillRef>
+          <a:effectRef idx="0">
+            <a:schemeClr val="accent1"/>
+          </a:effectRef>
+          <a:fontRef idx="minor">
+            <a:schemeClr val="lt1"/>
+          </a:fontRef>
+        </p:style>
+        <p:txBody>
+          <a:bodyPr rtlCol="0" anchor="ctr"/>
+          <a:lstStyle/>
+          <a:p>
+            <a:pPr algn="ctr"/>
+            <a:r>
+              <a:rPr lang="en-GB" sz="1000" dirty="0" smtClean="0">
+                <a:solidFill>
+                  <a:schemeClr val="tx1"/>
+                </a:solidFill>
+              </a:rPr>
+              <a:t>Input </a:t>
+            </a:r>
+            <a:r>
+              <a:rPr lang="en-GB" sz="1000" dirty="0" smtClean="0">
+                <a:solidFill>
+                  <a:schemeClr val="tx1"/>
+                </a:solidFill>
+              </a:rPr>
+              <a:t>c</a:t>
+            </a:r>
+            <a:endParaRPr lang="en-GB" sz="1000" dirty="0">
+              <a:solidFill>
+                <a:schemeClr val="tx1"/>
+              </a:solidFill>
+            </a:endParaRPr>
+          </a:p>
+        </p:txBody>
+      </p:sp>
+      <p:sp>
+        <p:nvSpPr>
+          <p:cNvPr id="90" name="Flowchart: Data 89"/>
+          <p:cNvSpPr/>
+          <p:nvPr/>
+        </p:nvSpPr>
+        <p:spPr>
+          <a:xfrm>
+            <a:off x="5536838" y="2625886"/>
+            <a:ext cx="1688660" cy="302441"/>
+          </a:xfrm>
+          <a:prstGeom prst="flowChartInputOutput">
+            <a:avLst/>
+          </a:prstGeom>
+          <a:solidFill>
+            <a:schemeClr val="bg1"/>
+          </a:solidFill>
+        </p:spPr>
+        <p:style>
+          <a:lnRef idx="2">
+            <a:schemeClr val="accent1">
+              <a:shade val="50000"/>
+            </a:schemeClr>
+          </a:lnRef>
+          <a:fillRef idx="1">
+            <a:schemeClr val="accent1"/>
+          </a:fillRef>
+          <a:effectRef idx="0">
+            <a:schemeClr val="accent1"/>
+          </a:effectRef>
+          <a:fontRef idx="minor">
+            <a:schemeClr val="lt1"/>
+          </a:fontRef>
+        </p:style>
+        <p:txBody>
+          <a:bodyPr rtlCol="0" anchor="ctr"/>
+          <a:lstStyle/>
+          <a:p>
+            <a:pPr algn="ctr"/>
+            <a:r>
+              <a:rPr lang="en-GB" sz="1000" dirty="0" smtClean="0">
+                <a:solidFill>
+                  <a:schemeClr val="tx1"/>
+                </a:solidFill>
+              </a:rPr>
+              <a:t>Display “Enter the value for </a:t>
+            </a:r>
+            <a:r>
+              <a:rPr lang="en-GB" sz="1000" dirty="0" smtClean="0">
+                <a:solidFill>
+                  <a:schemeClr val="tx1"/>
+                </a:solidFill>
+              </a:rPr>
+              <a:t>d”</a:t>
+            </a:r>
+            <a:endParaRPr lang="en-GB" sz="1000" dirty="0">
+              <a:solidFill>
+                <a:schemeClr val="tx1"/>
+              </a:solidFill>
+            </a:endParaRPr>
+          </a:p>
+        </p:txBody>
+      </p:sp>
+      <p:cxnSp>
+        <p:nvCxnSpPr>
+          <p:cNvPr id="91" name="Straight Arrow Connector 90"/>
+          <p:cNvCxnSpPr>
+            <a:stCxn id="82" idx="4"/>
+            <a:endCxn id="90" idx="1"/>
+          </p:cNvCxnSpPr>
+          <p:nvPr/>
+        </p:nvCxnSpPr>
+        <p:spPr>
+          <a:xfrm flipH="1">
+            <a:off x="6381168" y="2494774"/>
+            <a:ext cx="2763" cy="131112"/>
+          </a:xfrm>
+          <a:prstGeom prst="straightConnector1">
+            <a:avLst/>
+          </a:prstGeom>
+          <a:ln>
+            <a:tailEnd type="triangle"/>
+          </a:ln>
+        </p:spPr>
+        <p:style>
+          <a:lnRef idx="1">
+            <a:schemeClr val="accent1"/>
+          </a:lnRef>
+          <a:fillRef idx="0">
+            <a:schemeClr val="accent1"/>
+          </a:fillRef>
+          <a:effectRef idx="0">
+            <a:schemeClr val="accent1"/>
+          </a:effectRef>
+          <a:fontRef idx="minor">
+            <a:schemeClr val="tx1"/>
+          </a:fontRef>
+        </p:style>
+      </p:cxnSp>
+      <p:sp>
+        <p:nvSpPr>
+          <p:cNvPr id="95" name="Flowchart: Data 94"/>
+          <p:cNvSpPr/>
+          <p:nvPr/>
+        </p:nvSpPr>
+        <p:spPr>
+          <a:xfrm>
+            <a:off x="5509360" y="3054536"/>
+            <a:ext cx="1449761" cy="112703"/>
+          </a:xfrm>
+          <a:prstGeom prst="flowChartInputOutput">
+            <a:avLst/>
+          </a:prstGeom>
+          <a:solidFill>
+            <a:schemeClr val="bg1"/>
+          </a:solidFill>
+        </p:spPr>
+        <p:style>
+          <a:lnRef idx="2">
+            <a:schemeClr val="accent1">
+              <a:shade val="50000"/>
+            </a:schemeClr>
+          </a:lnRef>
+          <a:fillRef idx="1">
+            <a:schemeClr val="accent1"/>
+          </a:fillRef>
+          <a:effectRef idx="0">
+            <a:schemeClr val="accent1"/>
+          </a:effectRef>
+          <a:fontRef idx="minor">
+            <a:schemeClr val="lt1"/>
+          </a:fontRef>
+        </p:style>
+        <p:txBody>
+          <a:bodyPr rtlCol="0" anchor="ctr"/>
+          <a:lstStyle/>
+          <a:p>
+            <a:pPr algn="ctr"/>
+            <a:r>
+              <a:rPr lang="en-GB" sz="1000" dirty="0" smtClean="0">
+                <a:solidFill>
+                  <a:schemeClr val="tx1"/>
+                </a:solidFill>
+              </a:rPr>
+              <a:t>Input </a:t>
+            </a:r>
+            <a:r>
+              <a:rPr lang="en-GB" sz="1000" dirty="0">
+                <a:solidFill>
+                  <a:schemeClr val="tx1"/>
+                </a:solidFill>
+              </a:rPr>
+              <a:t>d</a:t>
+            </a:r>
+            <a:endParaRPr lang="en-GB" sz="1000" dirty="0">
+              <a:solidFill>
+                <a:schemeClr val="tx1"/>
+              </a:solidFill>
+            </a:endParaRPr>
+          </a:p>
+        </p:txBody>
+      </p:sp>
+      <p:cxnSp>
+        <p:nvCxnSpPr>
+          <p:cNvPr id="96" name="Straight Arrow Connector 95"/>
+          <p:cNvCxnSpPr>
+            <a:stCxn id="90" idx="4"/>
+            <a:endCxn id="95" idx="0"/>
+          </p:cNvCxnSpPr>
+          <p:nvPr/>
+        </p:nvCxnSpPr>
+        <p:spPr>
+          <a:xfrm flipH="1">
+            <a:off x="6379217" y="2928327"/>
+            <a:ext cx="1951" cy="126209"/>
+          </a:xfrm>
+          <a:prstGeom prst="straightConnector1">
+            <a:avLst/>
+          </a:prstGeom>
+          <a:ln>
+            <a:tailEnd type="triangle"/>
+          </a:ln>
+        </p:spPr>
+        <p:style>
+          <a:lnRef idx="1">
+            <a:schemeClr val="accent1"/>
+          </a:lnRef>
+          <a:fillRef idx="0">
+            <a:schemeClr val="accent1"/>
+          </a:fillRef>
+          <a:effectRef idx="0">
+            <a:schemeClr val="accent1"/>
+          </a:effectRef>
+          <a:fontRef idx="minor">
+            <a:schemeClr val="tx1"/>
+          </a:fontRef>
+        </p:style>
+      </p:cxnSp>
+      <p:cxnSp>
+        <p:nvCxnSpPr>
+          <p:cNvPr id="103" name="Straight Arrow Connector 102"/>
+          <p:cNvCxnSpPr>
+            <a:stCxn id="95" idx="4"/>
+            <a:endCxn id="39" idx="0"/>
+          </p:cNvCxnSpPr>
+          <p:nvPr/>
+        </p:nvCxnSpPr>
+        <p:spPr>
+          <a:xfrm flipH="1">
+            <a:off x="6234240" y="3167239"/>
+            <a:ext cx="1" cy="152912"/>
+          </a:xfrm>
+          <a:prstGeom prst="straightConnector1">
+            <a:avLst/>
+          </a:prstGeom>
+          <a:ln>
+            <a:tailEnd type="triangle"/>
+          </a:ln>
+        </p:spPr>
+        <p:style>
+          <a:lnRef idx="1">
+            <a:schemeClr val="accent1"/>
+          </a:lnRef>
+          <a:fillRef idx="0">
+            <a:schemeClr val="accent1"/>
+          </a:fillRef>
+          <a:effectRef idx="0">
+            <a:schemeClr val="accent1"/>
+          </a:effectRef>
+          <a:fontRef idx="minor">
+            <a:schemeClr val="tx1"/>
+          </a:fontRef>
+        </p:style>
+      </p:cxnSp>
+      <mc:AlternateContent xmlns:mc="http://schemas.openxmlformats.org/markup-compatibility/2006">
+        <mc:Choice xmlns:a14="http://schemas.microsoft.com/office/drawing/2010/main" Requires="a14">
+          <p:sp>
+            <p:nvSpPr>
+              <p:cNvPr id="109" name="Rectangle 108"/>
+              <p:cNvSpPr/>
+              <p:nvPr/>
+            </p:nvSpPr>
+            <p:spPr>
+              <a:xfrm>
+                <a:off x="5529107" y="3741850"/>
+                <a:ext cx="1403447" cy="290946"/>
+              </a:xfrm>
+              <a:prstGeom prst="rect">
+                <a:avLst/>
+              </a:prstGeom>
+              <a:solidFill>
+                <a:schemeClr val="bg1"/>
+              </a:solidFill>
+            </p:spPr>
+            <p:style>
+              <a:lnRef idx="2">
+                <a:schemeClr val="accent1">
+                  <a:shade val="50000"/>
+                </a:schemeClr>
+              </a:lnRef>
+              <a:fillRef idx="1">
+                <a:schemeClr val="accent1"/>
+              </a:fillRef>
+              <a:effectRef idx="0">
+                <a:schemeClr val="accent1"/>
+              </a:effectRef>
+              <a:fontRef idx="minor">
+                <a:schemeClr val="lt1"/>
+              </a:fontRef>
+            </p:style>
+            <p:txBody>
+              <a:bodyPr rtlCol="0" anchor="ctr"/>
+              <a:lstStyle/>
+              <a:p>
+                <a:pPr algn="ctr"/>
+                <a:r>
+                  <a:rPr lang="en-GB" sz="1100" dirty="0" smtClean="0">
+                    <a:solidFill>
+                      <a:schemeClr val="tx1"/>
+                    </a:solidFill>
+                  </a:rPr>
+                  <a:t>R =</a:t>
+                </a:r>
+                <a14:m>
+                  <m:oMath xmlns:m="http://schemas.openxmlformats.org/officeDocument/2006/math">
+                    <m:f>
+                      <m:fPr>
+                        <m:ctrlPr>
+                          <a:rPr lang="en-GB" sz="1100" i="1">
+                            <a:solidFill>
+                              <a:schemeClr val="tx1"/>
+                            </a:solidFill>
+                            <a:latin typeface="Cambria Math" panose="02040503050406030204" pitchFamily="18" charset="0"/>
+                          </a:rPr>
+                        </m:ctrlPr>
+                      </m:fPr>
+                      <m:num>
+                        <m:sSub>
+                          <m:sSubPr>
+                            <m:ctrlPr>
+                              <a:rPr lang="en-GB" sz="1100" i="1">
+                                <a:solidFill>
+                                  <a:schemeClr val="tx1"/>
+                                </a:solidFill>
+                                <a:latin typeface="Cambria Math" panose="02040503050406030204" pitchFamily="18" charset="0"/>
+                              </a:rPr>
+                            </m:ctrlPr>
+                          </m:sSubPr>
+                          <m:e>
+                            <m:r>
+                              <a:rPr lang="en-US" sz="1100" i="1">
+                                <a:solidFill>
+                                  <a:schemeClr val="tx1"/>
+                                </a:solidFill>
+                                <a:latin typeface="Cambria Math" panose="02040503050406030204" pitchFamily="18" charset="0"/>
+                              </a:rPr>
+                              <m:t>9</m:t>
+                            </m:r>
+                            <m:r>
+                              <a:rPr lang="en-US" sz="1100" i="1">
+                                <a:solidFill>
+                                  <a:schemeClr val="tx1"/>
+                                </a:solidFill>
+                                <a:latin typeface="Cambria Math" panose="02040503050406030204" pitchFamily="18" charset="0"/>
+                              </a:rPr>
+                              <m:t>𝑎</m:t>
+                            </m:r>
+                          </m:e>
+                          <m:sub>
+                            <m:r>
+                              <a:rPr lang="en-US" sz="1100" i="1">
+                                <a:solidFill>
+                                  <a:schemeClr val="tx1"/>
+                                </a:solidFill>
+                                <a:latin typeface="Cambria Math" panose="02040503050406030204" pitchFamily="18" charset="0"/>
+                              </a:rPr>
+                              <m:t>1</m:t>
+                            </m:r>
+                          </m:sub>
+                        </m:sSub>
+                        <m:sSub>
+                          <m:sSubPr>
+                            <m:ctrlPr>
+                              <a:rPr lang="en-US" sz="1100" i="1">
+                                <a:solidFill>
+                                  <a:schemeClr val="tx1"/>
+                                </a:solidFill>
+                                <a:latin typeface="Cambria Math" panose="02040503050406030204" pitchFamily="18" charset="0"/>
+                              </a:rPr>
+                            </m:ctrlPr>
+                          </m:sSubPr>
+                          <m:e>
+                            <m:r>
+                              <a:rPr lang="en-US" sz="1100" i="1">
+                                <a:solidFill>
+                                  <a:schemeClr val="tx1"/>
+                                </a:solidFill>
+                                <a:latin typeface="Cambria Math" panose="02040503050406030204" pitchFamily="18" charset="0"/>
+                              </a:rPr>
+                              <m:t>𝑎</m:t>
+                            </m:r>
+                          </m:e>
+                          <m:sub>
+                            <m:r>
+                              <a:rPr lang="en-US" sz="1100" i="1">
+                                <a:solidFill>
+                                  <a:schemeClr val="tx1"/>
+                                </a:solidFill>
+                                <a:latin typeface="Cambria Math" panose="02040503050406030204" pitchFamily="18" charset="0"/>
+                              </a:rPr>
+                              <m:t>2 </m:t>
+                            </m:r>
+                          </m:sub>
+                        </m:sSub>
+                        <m:r>
+                          <a:rPr lang="en-US" sz="1100" i="1">
+                            <a:solidFill>
+                              <a:schemeClr val="tx1"/>
+                            </a:solidFill>
+                            <a:latin typeface="Cambria Math" panose="02040503050406030204" pitchFamily="18" charset="0"/>
+                          </a:rPr>
+                          <m:t>−27</m:t>
+                        </m:r>
+                        <m:sSub>
+                          <m:sSubPr>
+                            <m:ctrlPr>
+                              <a:rPr lang="en-US" sz="1100" i="1">
+                                <a:solidFill>
+                                  <a:schemeClr val="tx1"/>
+                                </a:solidFill>
+                                <a:latin typeface="Cambria Math" panose="02040503050406030204" pitchFamily="18" charset="0"/>
+                              </a:rPr>
+                            </m:ctrlPr>
+                          </m:sSubPr>
+                          <m:e>
+                            <m:r>
+                              <a:rPr lang="en-US" sz="1100" i="1">
+                                <a:solidFill>
+                                  <a:schemeClr val="tx1"/>
+                                </a:solidFill>
+                                <a:latin typeface="Cambria Math" panose="02040503050406030204" pitchFamily="18" charset="0"/>
+                              </a:rPr>
+                              <m:t>𝑎</m:t>
+                            </m:r>
+                          </m:e>
+                          <m:sub>
+                            <m:r>
+                              <a:rPr lang="en-US" sz="1100" i="1">
+                                <a:solidFill>
+                                  <a:schemeClr val="tx1"/>
+                                </a:solidFill>
+                                <a:latin typeface="Cambria Math" panose="02040503050406030204" pitchFamily="18" charset="0"/>
+                              </a:rPr>
+                              <m:t>3</m:t>
+                            </m:r>
+                          </m:sub>
+                        </m:sSub>
+                        <m:r>
+                          <a:rPr lang="en-US" sz="1100" i="1">
+                            <a:solidFill>
+                              <a:schemeClr val="tx1"/>
+                            </a:solidFill>
+                            <a:latin typeface="Cambria Math" panose="02040503050406030204" pitchFamily="18" charset="0"/>
+                          </a:rPr>
+                          <m:t> −2</m:t>
+                        </m:r>
+                        <m:sSup>
+                          <m:sSupPr>
+                            <m:ctrlPr>
+                              <a:rPr lang="en-US" sz="1100" i="1">
+                                <a:solidFill>
+                                  <a:schemeClr val="tx1"/>
+                                </a:solidFill>
+                                <a:latin typeface="Cambria Math" panose="02040503050406030204" pitchFamily="18" charset="0"/>
+                              </a:rPr>
+                            </m:ctrlPr>
+                          </m:sSupPr>
+                          <m:e>
+                            <m:sSub>
+                              <m:sSubPr>
+                                <m:ctrlPr>
+                                  <a:rPr lang="en-US" sz="1100" i="1">
+                                    <a:solidFill>
+                                      <a:schemeClr val="tx1"/>
+                                    </a:solidFill>
+                                    <a:latin typeface="Cambria Math" panose="02040503050406030204" pitchFamily="18" charset="0"/>
+                                  </a:rPr>
+                                </m:ctrlPr>
+                              </m:sSubPr>
+                              <m:e>
+                                <m:r>
+                                  <a:rPr lang="en-US" sz="1100" i="1">
+                                    <a:solidFill>
+                                      <a:schemeClr val="tx1"/>
+                                    </a:solidFill>
+                                    <a:latin typeface="Cambria Math" panose="02040503050406030204" pitchFamily="18" charset="0"/>
+                                  </a:rPr>
+                                  <m:t>𝑎</m:t>
+                                </m:r>
+                              </m:e>
+                              <m:sub>
+                                <m:r>
+                                  <a:rPr lang="en-US" sz="1100" i="1">
+                                    <a:solidFill>
+                                      <a:schemeClr val="tx1"/>
+                                    </a:solidFill>
+                                    <a:latin typeface="Cambria Math" panose="02040503050406030204" pitchFamily="18" charset="0"/>
+                                  </a:rPr>
+                                  <m:t>1</m:t>
+                                </m:r>
+                              </m:sub>
+                            </m:sSub>
+                          </m:e>
+                          <m:sup>
+                            <m:r>
+                              <a:rPr lang="en-US" sz="1100" i="1">
+                                <a:solidFill>
+                                  <a:schemeClr val="tx1"/>
+                                </a:solidFill>
+                                <a:latin typeface="Cambria Math" panose="02040503050406030204" pitchFamily="18" charset="0"/>
+                              </a:rPr>
+                              <m:t>3</m:t>
+                            </m:r>
+                          </m:sup>
+                        </m:sSup>
+                      </m:num>
+                      <m:den>
+                        <m:r>
+                          <a:rPr lang="en-US" sz="1100" i="1">
+                            <a:solidFill>
+                              <a:schemeClr val="tx1"/>
+                            </a:solidFill>
+                            <a:latin typeface="Cambria Math" panose="02040503050406030204" pitchFamily="18" charset="0"/>
+                          </a:rPr>
+                          <m:t>54</m:t>
+                        </m:r>
+                      </m:den>
+                    </m:f>
+                  </m:oMath>
+                </a14:m>
+                <a:endParaRPr lang="en-GB" sz="1100" dirty="0">
+                  <a:solidFill>
+                    <a:schemeClr val="tx1"/>
+                  </a:solidFill>
+                </a:endParaRPr>
+              </a:p>
+            </p:txBody>
+          </p:sp>
+        </mc:Choice>
+        <mc:Fallback>
+          <p:sp>
+            <p:nvSpPr>
+              <p:cNvPr id="109" name="Rectangle 108"/>
+              <p:cNvSpPr>
+                <a:spLocks noRot="1" noChangeAspect="1" noMove="1" noResize="1" noEditPoints="1" noAdjustHandles="1" noChangeArrowheads="1" noChangeShapeType="1" noTextEdit="1"/>
+              </p:cNvSpPr>
+              <p:nvPr/>
+            </p:nvSpPr>
+            <p:spPr>
+              <a:xfrm>
+                <a:off x="5529107" y="3741850"/>
+                <a:ext cx="1403447" cy="290946"/>
+              </a:xfrm>
+              <a:prstGeom prst="rect">
+                <a:avLst/>
+              </a:prstGeom>
+              <a:blipFill>
+                <a:blip r:embed="rId4"/>
+                <a:stretch>
+                  <a:fillRect b="-10000"/>
+                </a:stretch>
+              </a:blipFill>
+            </p:spPr>
+            <p:txBody>
+              <a:bodyPr/>
+              <a:lstStyle/>
+              <a:p>
+                <a:r>
+                  <a:rPr lang="en-US">
+                    <a:noFill/>
+                  </a:rPr>
+                  <a:t> </a:t>
+                </a:r>
+              </a:p>
+            </p:txBody>
+          </p:sp>
+        </mc:Fallback>
+      </mc:AlternateContent>
+      <p:cxnSp>
+        <p:nvCxnSpPr>
+          <p:cNvPr id="110" name="Straight Arrow Connector 109"/>
+          <p:cNvCxnSpPr>
+            <a:stCxn id="39" idx="2"/>
+            <a:endCxn id="109" idx="0"/>
+          </p:cNvCxnSpPr>
+          <p:nvPr/>
+        </p:nvCxnSpPr>
+        <p:spPr>
+          <a:xfrm flipH="1">
+            <a:off x="6230831" y="3611097"/>
+            <a:ext cx="3409" cy="130753"/>
+          </a:xfrm>
+          <a:prstGeom prst="straightConnector1">
+            <a:avLst/>
+          </a:prstGeom>
+          <a:ln>
+            <a:tailEnd type="triangle"/>
+          </a:ln>
+        </p:spPr>
+        <p:style>
+          <a:lnRef idx="1">
+            <a:schemeClr val="accent1"/>
+          </a:lnRef>
+          <a:fillRef idx="0">
+            <a:schemeClr val="accent1"/>
+          </a:fillRef>
+          <a:effectRef idx="0">
+            <a:schemeClr val="accent1"/>
+          </a:effectRef>
+          <a:fontRef idx="minor">
+            <a:schemeClr val="tx1"/>
+          </a:fontRef>
+        </p:style>
+      </p:cxnSp>
+      <mc:AlternateContent xmlns:mc="http://schemas.openxmlformats.org/markup-compatibility/2006">
+        <mc:Choice xmlns:a14="http://schemas.microsoft.com/office/drawing/2010/main" Requires="a14">
+          <p:sp>
+            <p:nvSpPr>
+              <p:cNvPr id="114" name="Rectangle 113"/>
+              <p:cNvSpPr/>
+              <p:nvPr/>
+            </p:nvSpPr>
+            <p:spPr>
+              <a:xfrm>
+                <a:off x="7222735" y="3735700"/>
+                <a:ext cx="1503368" cy="352741"/>
+              </a:xfrm>
+              <a:prstGeom prst="rect">
+                <a:avLst/>
+              </a:prstGeom>
+              <a:solidFill>
+                <a:schemeClr val="bg1"/>
+              </a:solidFill>
+            </p:spPr>
+            <p:style>
+              <a:lnRef idx="2">
+                <a:schemeClr val="accent1">
+                  <a:shade val="50000"/>
+                </a:schemeClr>
+              </a:lnRef>
+              <a:fillRef idx="1">
+                <a:schemeClr val="accent1"/>
+              </a:fillRef>
+              <a:effectRef idx="0">
+                <a:schemeClr val="accent1"/>
+              </a:effectRef>
+              <a:fontRef idx="minor">
+                <a:schemeClr val="lt1"/>
+              </a:fontRef>
+            </p:style>
+            <p:txBody>
+              <a:bodyPr rtlCol="0" anchor="ctr"/>
+              <a:lstStyle/>
+              <a:p>
+                <a:pPr algn="ctr"/>
+                <a:r>
+                  <a:rPr lang="en-GB" sz="1100" dirty="0" smtClean="0">
+                    <a:solidFill>
+                      <a:schemeClr val="tx1"/>
+                    </a:solidFill>
+                  </a:rPr>
+                  <a:t>S = </a:t>
+                </a:r>
+                <a14:m>
+                  <m:oMath xmlns:m="http://schemas.openxmlformats.org/officeDocument/2006/math">
+                    <m:rad>
+                      <m:radPr>
+                        <m:ctrlPr>
+                          <a:rPr lang="en-GB" sz="1100" i="1">
+                            <a:solidFill>
+                              <a:schemeClr val="tx1"/>
+                            </a:solidFill>
+                            <a:latin typeface="Cambria Math" panose="02040503050406030204" pitchFamily="18" charset="0"/>
+                          </a:rPr>
+                        </m:ctrlPr>
+                      </m:radPr>
+                      <m:deg>
+                        <m:r>
+                          <m:rPr>
+                            <m:brk m:alnAt="7"/>
+                          </m:rPr>
+                          <a:rPr lang="en-US" sz="1100" i="1">
+                            <a:solidFill>
+                              <a:schemeClr val="tx1"/>
+                            </a:solidFill>
+                            <a:latin typeface="Cambria Math" panose="02040503050406030204" pitchFamily="18" charset="0"/>
+                          </a:rPr>
+                          <m:t>3</m:t>
+                        </m:r>
+                      </m:deg>
+                      <m:e>
+                        <m:r>
+                          <a:rPr lang="en-US" sz="1100" i="1">
+                            <a:solidFill>
+                              <a:schemeClr val="tx1"/>
+                            </a:solidFill>
+                            <a:latin typeface="Cambria Math" panose="02040503050406030204" pitchFamily="18" charset="0"/>
+                          </a:rPr>
+                          <m:t>𝑅</m:t>
+                        </m:r>
+                        <m:r>
+                          <a:rPr lang="en-US" sz="1100" i="1">
+                            <a:solidFill>
+                              <a:schemeClr val="tx1"/>
+                            </a:solidFill>
+                            <a:latin typeface="Cambria Math" panose="02040503050406030204" pitchFamily="18" charset="0"/>
+                          </a:rPr>
+                          <m:t>+ </m:t>
+                        </m:r>
+                        <m:rad>
+                          <m:radPr>
+                            <m:degHide m:val="on"/>
+                            <m:ctrlPr>
+                              <a:rPr lang="en-US" sz="1100" i="1">
+                                <a:solidFill>
+                                  <a:schemeClr val="tx1"/>
+                                </a:solidFill>
+                                <a:latin typeface="Cambria Math" panose="02040503050406030204" pitchFamily="18" charset="0"/>
+                              </a:rPr>
+                            </m:ctrlPr>
+                          </m:radPr>
+                          <m:deg/>
+                          <m:e>
+                            <m:sSup>
+                              <m:sSupPr>
+                                <m:ctrlPr>
+                                  <a:rPr lang="en-US" sz="1100" i="1">
+                                    <a:solidFill>
+                                      <a:schemeClr val="tx1"/>
+                                    </a:solidFill>
+                                    <a:latin typeface="Cambria Math" panose="02040503050406030204" pitchFamily="18" charset="0"/>
+                                  </a:rPr>
+                                </m:ctrlPr>
+                              </m:sSupPr>
+                              <m:e>
+                                <m:r>
+                                  <a:rPr lang="en-US" sz="1100" i="1">
+                                    <a:solidFill>
+                                      <a:schemeClr val="tx1"/>
+                                    </a:solidFill>
+                                    <a:latin typeface="Cambria Math" panose="02040503050406030204" pitchFamily="18" charset="0"/>
+                                  </a:rPr>
+                                  <m:t>𝑄</m:t>
+                                </m:r>
+                              </m:e>
+                              <m:sup>
+                                <m:r>
+                                  <a:rPr lang="en-US" sz="1100" i="1">
+                                    <a:solidFill>
+                                      <a:schemeClr val="tx1"/>
+                                    </a:solidFill>
+                                    <a:latin typeface="Cambria Math" panose="02040503050406030204" pitchFamily="18" charset="0"/>
+                                  </a:rPr>
+                                  <m:t>3</m:t>
+                                </m:r>
+                              </m:sup>
+                            </m:sSup>
+                            <m:r>
+                              <a:rPr lang="en-US" sz="1100" i="1">
+                                <a:solidFill>
+                                  <a:schemeClr val="tx1"/>
+                                </a:solidFill>
+                                <a:latin typeface="Cambria Math" panose="02040503050406030204" pitchFamily="18" charset="0"/>
+                              </a:rPr>
+                              <m:t> − </m:t>
+                            </m:r>
+                            <m:sSup>
+                              <m:sSupPr>
+                                <m:ctrlPr>
+                                  <a:rPr lang="en-US" sz="1100" i="1">
+                                    <a:solidFill>
+                                      <a:schemeClr val="tx1"/>
+                                    </a:solidFill>
+                                    <a:latin typeface="Cambria Math" panose="02040503050406030204" pitchFamily="18" charset="0"/>
+                                  </a:rPr>
+                                </m:ctrlPr>
+                              </m:sSupPr>
+                              <m:e>
+                                <m:r>
+                                  <a:rPr lang="en-US" sz="1100" i="1">
+                                    <a:solidFill>
+                                      <a:schemeClr val="tx1"/>
+                                    </a:solidFill>
+                                    <a:latin typeface="Cambria Math" panose="02040503050406030204" pitchFamily="18" charset="0"/>
+                                  </a:rPr>
+                                  <m:t>𝑅</m:t>
+                                </m:r>
+                              </m:e>
+                              <m:sup>
+                                <m:r>
+                                  <a:rPr lang="en-US" sz="1100" i="1">
+                                    <a:solidFill>
+                                      <a:schemeClr val="tx1"/>
+                                    </a:solidFill>
+                                    <a:latin typeface="Cambria Math" panose="02040503050406030204" pitchFamily="18" charset="0"/>
+                                  </a:rPr>
+                                  <m:t>2</m:t>
+                                </m:r>
+                              </m:sup>
+                            </m:sSup>
+                          </m:e>
+                        </m:rad>
+                      </m:e>
+                    </m:rad>
+                  </m:oMath>
+                </a14:m>
+                <a:endParaRPr lang="en-GB" sz="1100" dirty="0">
+                  <a:solidFill>
+                    <a:schemeClr val="tx1"/>
+                  </a:solidFill>
+                </a:endParaRPr>
+              </a:p>
+            </p:txBody>
+          </p:sp>
+        </mc:Choice>
+        <mc:Fallback>
+          <p:sp>
+            <p:nvSpPr>
+              <p:cNvPr id="114" name="Rectangle 113"/>
+              <p:cNvSpPr>
+                <a:spLocks noRot="1" noChangeAspect="1" noMove="1" noResize="1" noEditPoints="1" noAdjustHandles="1" noChangeArrowheads="1" noChangeShapeType="1" noTextEdit="1"/>
+              </p:cNvSpPr>
+              <p:nvPr/>
+            </p:nvSpPr>
+            <p:spPr>
+              <a:xfrm>
+                <a:off x="7222735" y="3735700"/>
+                <a:ext cx="1503368" cy="352741"/>
+              </a:xfrm>
+              <a:prstGeom prst="rect">
+                <a:avLst/>
+              </a:prstGeom>
+              <a:blipFill>
+                <a:blip r:embed="rId5"/>
+                <a:stretch>
+                  <a:fillRect b="-5000"/>
+                </a:stretch>
+              </a:blipFill>
+            </p:spPr>
+            <p:txBody>
+              <a:bodyPr/>
+              <a:lstStyle/>
+              <a:p>
+                <a:r>
+                  <a:rPr lang="en-US">
+                    <a:noFill/>
+                  </a:rPr>
+                  <a:t> </a:t>
+                </a:r>
+              </a:p>
+            </p:txBody>
+          </p:sp>
+        </mc:Fallback>
+      </mc:AlternateContent>
+      <p:cxnSp>
+        <p:nvCxnSpPr>
+          <p:cNvPr id="116" name="Straight Arrow Connector 115"/>
+          <p:cNvCxnSpPr>
+            <a:stCxn id="109" idx="3"/>
+          </p:cNvCxnSpPr>
+          <p:nvPr/>
+        </p:nvCxnSpPr>
+        <p:spPr>
+          <a:xfrm flipV="1">
+            <a:off x="6932554" y="3881174"/>
+            <a:ext cx="275557" cy="6149"/>
+          </a:xfrm>
+          <a:prstGeom prst="straightConnector1">
+            <a:avLst/>
+          </a:prstGeom>
+          <a:ln>
+            <a:tailEnd type="triangle"/>
+          </a:ln>
+        </p:spPr>
+        <p:style>
+          <a:lnRef idx="1">
+            <a:schemeClr val="accent1"/>
+          </a:lnRef>
+          <a:fillRef idx="0">
+            <a:schemeClr val="accent1"/>
+          </a:fillRef>
+          <a:effectRef idx="0">
+            <a:schemeClr val="accent1"/>
+          </a:effectRef>
+          <a:fontRef idx="minor">
+            <a:schemeClr val="tx1"/>
+          </a:fontRef>
+        </p:style>
+      </p:cxnSp>
+      <mc:AlternateContent xmlns:mc="http://schemas.openxmlformats.org/markup-compatibility/2006">
+        <mc:Choice xmlns:a14="http://schemas.microsoft.com/office/drawing/2010/main" Requires="a14">
+          <p:sp>
+            <p:nvSpPr>
+              <p:cNvPr id="120" name="Rectangle 119"/>
+              <p:cNvSpPr/>
+              <p:nvPr/>
+            </p:nvSpPr>
+            <p:spPr>
+              <a:xfrm>
+                <a:off x="9016284" y="3735700"/>
+                <a:ext cx="1622763" cy="362265"/>
+              </a:xfrm>
+              <a:prstGeom prst="rect">
+                <a:avLst/>
+              </a:prstGeom>
+              <a:solidFill>
+                <a:schemeClr val="bg1"/>
+              </a:solidFill>
+            </p:spPr>
+            <p:style>
+              <a:lnRef idx="2">
+                <a:schemeClr val="accent1">
+                  <a:shade val="50000"/>
+                </a:schemeClr>
+              </a:lnRef>
+              <a:fillRef idx="1">
+                <a:schemeClr val="accent1"/>
+              </a:fillRef>
+              <a:effectRef idx="0">
+                <a:schemeClr val="accent1"/>
+              </a:effectRef>
+              <a:fontRef idx="minor">
+                <a:schemeClr val="lt1"/>
+              </a:fontRef>
+            </p:style>
+            <p:txBody>
+              <a:bodyPr rtlCol="0" anchor="ctr"/>
+              <a:lstStyle/>
+              <a:p>
+                <a:pPr algn="ctr"/>
+                <a:r>
+                  <a:rPr lang="en-GB" sz="1100" dirty="0" smtClean="0">
+                    <a:solidFill>
+                      <a:schemeClr val="tx1"/>
+                    </a:solidFill>
+                  </a:rPr>
+                  <a:t>T =  </a:t>
+                </a:r>
+                <a14:m>
+                  <m:oMath xmlns:m="http://schemas.openxmlformats.org/officeDocument/2006/math">
+                    <m:rad>
+                      <m:radPr>
+                        <m:ctrlPr>
+                          <a:rPr lang="en-GB" sz="1100" i="1">
+                            <a:solidFill>
+                              <a:schemeClr val="tx1"/>
+                            </a:solidFill>
+                            <a:latin typeface="Cambria Math" panose="02040503050406030204" pitchFamily="18" charset="0"/>
+                          </a:rPr>
+                        </m:ctrlPr>
+                      </m:radPr>
+                      <m:deg>
+                        <m:r>
+                          <m:rPr>
+                            <m:brk m:alnAt="7"/>
+                          </m:rPr>
+                          <a:rPr lang="en-US" sz="1100" i="1">
+                            <a:solidFill>
+                              <a:schemeClr val="tx1"/>
+                            </a:solidFill>
+                            <a:latin typeface="Cambria Math" panose="02040503050406030204" pitchFamily="18" charset="0"/>
+                          </a:rPr>
+                          <m:t>3</m:t>
+                        </m:r>
+                      </m:deg>
+                      <m:e>
+                        <m:r>
+                          <a:rPr lang="en-US" sz="1100" i="1">
+                            <a:solidFill>
+                              <a:schemeClr val="tx1"/>
+                            </a:solidFill>
+                            <a:latin typeface="Cambria Math" panose="02040503050406030204" pitchFamily="18" charset="0"/>
+                          </a:rPr>
+                          <m:t>𝑅</m:t>
+                        </m:r>
+                        <m:r>
+                          <a:rPr lang="en-US" sz="1100" i="1">
+                            <a:solidFill>
+                              <a:schemeClr val="tx1"/>
+                            </a:solidFill>
+                            <a:latin typeface="Cambria Math" panose="02040503050406030204" pitchFamily="18" charset="0"/>
+                          </a:rPr>
+                          <m:t>−</m:t>
+                        </m:r>
+                        <m:r>
+                          <a:rPr lang="en-US" sz="1100" i="1">
+                            <a:solidFill>
+                              <a:schemeClr val="tx1"/>
+                            </a:solidFill>
+                            <a:latin typeface="Cambria Math" panose="02040503050406030204" pitchFamily="18" charset="0"/>
+                          </a:rPr>
+                          <m:t> </m:t>
+                        </m:r>
+                        <m:rad>
+                          <m:radPr>
+                            <m:degHide m:val="on"/>
+                            <m:ctrlPr>
+                              <a:rPr lang="en-US" sz="1100" i="1">
+                                <a:solidFill>
+                                  <a:schemeClr val="tx1"/>
+                                </a:solidFill>
+                                <a:latin typeface="Cambria Math" panose="02040503050406030204" pitchFamily="18" charset="0"/>
+                              </a:rPr>
+                            </m:ctrlPr>
+                          </m:radPr>
+                          <m:deg/>
+                          <m:e>
+                            <m:sSup>
+                              <m:sSupPr>
+                                <m:ctrlPr>
+                                  <a:rPr lang="en-US" sz="1100" i="1">
+                                    <a:solidFill>
+                                      <a:schemeClr val="tx1"/>
+                                    </a:solidFill>
+                                    <a:latin typeface="Cambria Math" panose="02040503050406030204" pitchFamily="18" charset="0"/>
+                                  </a:rPr>
+                                </m:ctrlPr>
+                              </m:sSupPr>
+                              <m:e>
+                                <m:r>
+                                  <a:rPr lang="en-US" sz="1100" i="1">
+                                    <a:solidFill>
+                                      <a:schemeClr val="tx1"/>
+                                    </a:solidFill>
+                                    <a:latin typeface="Cambria Math" panose="02040503050406030204" pitchFamily="18" charset="0"/>
+                                  </a:rPr>
+                                  <m:t>𝑄</m:t>
+                                </m:r>
+                              </m:e>
+                              <m:sup>
+                                <m:r>
+                                  <a:rPr lang="en-US" sz="1100" i="1">
+                                    <a:solidFill>
+                                      <a:schemeClr val="tx1"/>
+                                    </a:solidFill>
+                                    <a:latin typeface="Cambria Math" panose="02040503050406030204" pitchFamily="18" charset="0"/>
+                                  </a:rPr>
+                                  <m:t>3</m:t>
+                                </m:r>
+                              </m:sup>
+                            </m:sSup>
+                            <m:r>
+                              <a:rPr lang="en-US" sz="1100" i="1">
+                                <a:solidFill>
+                                  <a:schemeClr val="tx1"/>
+                                </a:solidFill>
+                                <a:latin typeface="Cambria Math" panose="02040503050406030204" pitchFamily="18" charset="0"/>
+                              </a:rPr>
+                              <m:t> − </m:t>
+                            </m:r>
+                            <m:sSup>
+                              <m:sSupPr>
+                                <m:ctrlPr>
+                                  <a:rPr lang="en-US" sz="1100" i="1">
+                                    <a:solidFill>
+                                      <a:schemeClr val="tx1"/>
+                                    </a:solidFill>
+                                    <a:latin typeface="Cambria Math" panose="02040503050406030204" pitchFamily="18" charset="0"/>
+                                  </a:rPr>
+                                </m:ctrlPr>
+                              </m:sSupPr>
+                              <m:e>
+                                <m:r>
+                                  <a:rPr lang="en-US" sz="1100" i="1">
+                                    <a:solidFill>
+                                      <a:schemeClr val="tx1"/>
+                                    </a:solidFill>
+                                    <a:latin typeface="Cambria Math" panose="02040503050406030204" pitchFamily="18" charset="0"/>
+                                  </a:rPr>
+                                  <m:t>𝑅</m:t>
+                                </m:r>
+                              </m:e>
+                              <m:sup>
+                                <m:r>
+                                  <a:rPr lang="en-US" sz="1100" i="1">
+                                    <a:solidFill>
+                                      <a:schemeClr val="tx1"/>
+                                    </a:solidFill>
+                                    <a:latin typeface="Cambria Math" panose="02040503050406030204" pitchFamily="18" charset="0"/>
+                                  </a:rPr>
+                                  <m:t>2</m:t>
+                                </m:r>
+                              </m:sup>
+                            </m:sSup>
+                          </m:e>
+                        </m:rad>
+                      </m:e>
+                    </m:rad>
+                  </m:oMath>
+                </a14:m>
+                <a:endParaRPr lang="en-GB" sz="1100" dirty="0">
+                  <a:solidFill>
+                    <a:schemeClr val="tx1"/>
+                  </a:solidFill>
+                </a:endParaRPr>
+              </a:p>
+            </p:txBody>
+          </p:sp>
+        </mc:Choice>
+        <mc:Fallback>
+          <p:sp>
+            <p:nvSpPr>
+              <p:cNvPr id="120" name="Rectangle 119"/>
+              <p:cNvSpPr>
+                <a:spLocks noRot="1" noChangeAspect="1" noMove="1" noResize="1" noEditPoints="1" noAdjustHandles="1" noChangeArrowheads="1" noChangeShapeType="1" noTextEdit="1"/>
+              </p:cNvSpPr>
+              <p:nvPr/>
+            </p:nvSpPr>
+            <p:spPr>
+              <a:xfrm>
+                <a:off x="9016284" y="3735700"/>
+                <a:ext cx="1622763" cy="362265"/>
+              </a:xfrm>
+              <a:prstGeom prst="rect">
+                <a:avLst/>
+              </a:prstGeom>
+              <a:blipFill>
+                <a:blip r:embed="rId6"/>
+                <a:stretch>
+                  <a:fillRect b="-4918"/>
+                </a:stretch>
+              </a:blipFill>
+            </p:spPr>
+            <p:txBody>
+              <a:bodyPr/>
+              <a:lstStyle/>
+              <a:p>
+                <a:r>
+                  <a:rPr lang="en-US">
+                    <a:noFill/>
+                  </a:rPr>
+                  <a:t> </a:t>
+                </a:r>
+              </a:p>
+            </p:txBody>
+          </p:sp>
+        </mc:Fallback>
+      </mc:AlternateContent>
+      <mc:AlternateContent xmlns:mc="http://schemas.openxmlformats.org/markup-compatibility/2006">
+        <mc:Choice xmlns:a14="http://schemas.microsoft.com/office/drawing/2010/main" Requires="a14">
+          <p:sp>
+            <p:nvSpPr>
+              <p:cNvPr id="123" name="Rectangle 122"/>
+              <p:cNvSpPr/>
+              <p:nvPr/>
+            </p:nvSpPr>
+            <p:spPr>
+              <a:xfrm>
+                <a:off x="10801751" y="3766597"/>
+                <a:ext cx="1145714" cy="290946"/>
+              </a:xfrm>
+              <a:prstGeom prst="rect">
+                <a:avLst/>
+              </a:prstGeom>
+              <a:solidFill>
+                <a:schemeClr val="bg1"/>
+              </a:solidFill>
+            </p:spPr>
+            <p:style>
+              <a:lnRef idx="2">
+                <a:schemeClr val="accent1">
+                  <a:shade val="50000"/>
+                </a:schemeClr>
+              </a:lnRef>
+              <a:fillRef idx="1">
+                <a:schemeClr val="accent1"/>
+              </a:fillRef>
+              <a:effectRef idx="0">
+                <a:schemeClr val="accent1"/>
+              </a:effectRef>
+              <a:fontRef idx="minor">
+                <a:schemeClr val="lt1"/>
+              </a:fontRef>
+            </p:style>
+            <p:txBody>
+              <a:bodyPr rtlCol="0" anchor="ctr"/>
+              <a:lstStyle/>
+              <a:p>
+                <a:pPr algn="ctr"/>
+                <a:r>
+                  <a:rPr lang="en-GB" sz="1100" dirty="0" smtClean="0">
+                    <a:solidFill>
+                      <a:schemeClr val="tx1"/>
+                    </a:solidFill>
+                  </a:rPr>
+                  <a:t>x1 = S + </a:t>
+                </a:r>
+                <a:r>
+                  <a:rPr lang="en-GB" sz="1100" dirty="0">
+                    <a:solidFill>
+                      <a:schemeClr val="tx1"/>
+                    </a:solidFill>
+                  </a:rPr>
+                  <a:t>T - </a:t>
+                </a:r>
+                <a14:m>
+                  <m:oMath xmlns:m="http://schemas.openxmlformats.org/officeDocument/2006/math">
+                    <m:f>
+                      <m:fPr>
+                        <m:ctrlPr>
+                          <a:rPr lang="en-GB" sz="1100" i="1">
+                            <a:solidFill>
+                              <a:schemeClr val="tx1"/>
+                            </a:solidFill>
+                            <a:latin typeface="Cambria Math" panose="02040503050406030204" pitchFamily="18" charset="0"/>
+                          </a:rPr>
+                        </m:ctrlPr>
+                      </m:fPr>
+                      <m:num>
+                        <m:r>
+                          <a:rPr lang="en-US" sz="1100" i="1">
+                            <a:solidFill>
+                              <a:schemeClr val="tx1"/>
+                            </a:solidFill>
+                            <a:latin typeface="Cambria Math" panose="02040503050406030204" pitchFamily="18" charset="0"/>
+                          </a:rPr>
+                          <m:t>1</m:t>
+                        </m:r>
+                      </m:num>
+                      <m:den>
+                        <m:r>
+                          <a:rPr lang="en-US" sz="1100" i="1">
+                            <a:solidFill>
+                              <a:schemeClr val="tx1"/>
+                            </a:solidFill>
+                            <a:latin typeface="Cambria Math" panose="02040503050406030204" pitchFamily="18" charset="0"/>
+                          </a:rPr>
+                          <m:t>2</m:t>
+                        </m:r>
+                      </m:den>
+                    </m:f>
+                    <m:sSub>
+                      <m:sSubPr>
+                        <m:ctrlPr>
+                          <a:rPr lang="en-GB" sz="1100" i="1">
+                            <a:solidFill>
+                              <a:schemeClr val="tx1"/>
+                            </a:solidFill>
+                            <a:latin typeface="Cambria Math" panose="02040503050406030204" pitchFamily="18" charset="0"/>
+                          </a:rPr>
+                        </m:ctrlPr>
+                      </m:sSubPr>
+                      <m:e>
+                        <m:r>
+                          <a:rPr lang="en-US" sz="1100" i="1">
+                            <a:solidFill>
+                              <a:schemeClr val="tx1"/>
+                            </a:solidFill>
+                            <a:latin typeface="Cambria Math" panose="02040503050406030204" pitchFamily="18" charset="0"/>
+                          </a:rPr>
+                          <m:t>𝑎</m:t>
+                        </m:r>
+                      </m:e>
+                      <m:sub>
+                        <m:r>
+                          <a:rPr lang="en-US" sz="1100" i="1">
+                            <a:solidFill>
+                              <a:schemeClr val="tx1"/>
+                            </a:solidFill>
+                            <a:latin typeface="Cambria Math" panose="02040503050406030204" pitchFamily="18" charset="0"/>
+                          </a:rPr>
+                          <m:t>1</m:t>
+                        </m:r>
+                      </m:sub>
+                    </m:sSub>
+                  </m:oMath>
+                </a14:m>
+                <a:endParaRPr lang="en-GB" sz="1100" dirty="0">
+                  <a:solidFill>
+                    <a:schemeClr val="tx1"/>
+                  </a:solidFill>
+                </a:endParaRPr>
+              </a:p>
+            </p:txBody>
+          </p:sp>
+        </mc:Choice>
+        <mc:Fallback>
+          <p:sp>
+            <p:nvSpPr>
+              <p:cNvPr id="123" name="Rectangle 122"/>
+              <p:cNvSpPr>
+                <a:spLocks noRot="1" noChangeAspect="1" noMove="1" noResize="1" noEditPoints="1" noAdjustHandles="1" noChangeArrowheads="1" noChangeShapeType="1" noTextEdit="1"/>
+              </p:cNvSpPr>
+              <p:nvPr/>
+            </p:nvSpPr>
+            <p:spPr>
+              <a:xfrm>
+                <a:off x="10801751" y="3766597"/>
+                <a:ext cx="1145714" cy="290946"/>
+              </a:xfrm>
+              <a:prstGeom prst="rect">
+                <a:avLst/>
+              </a:prstGeom>
+              <a:blipFill>
+                <a:blip r:embed="rId7"/>
+                <a:stretch>
+                  <a:fillRect b="-6000"/>
+                </a:stretch>
+              </a:blipFill>
+            </p:spPr>
+            <p:txBody>
+              <a:bodyPr/>
+              <a:lstStyle/>
+              <a:p>
+                <a:r>
+                  <a:rPr lang="en-US">
+                    <a:noFill/>
+                  </a:rPr>
+                  <a:t> </a:t>
+                </a:r>
+              </a:p>
+            </p:txBody>
+          </p:sp>
+        </mc:Fallback>
+      </mc:AlternateContent>
+      <p:cxnSp>
+        <p:nvCxnSpPr>
+          <p:cNvPr id="124" name="Straight Arrow Connector 123"/>
+          <p:cNvCxnSpPr>
+            <a:stCxn id="120" idx="3"/>
+            <a:endCxn id="123" idx="1"/>
+          </p:cNvCxnSpPr>
+          <p:nvPr/>
+        </p:nvCxnSpPr>
+        <p:spPr>
+          <a:xfrm flipV="1">
+            <a:off x="10639047" y="3912070"/>
+            <a:ext cx="162704" cy="4763"/>
+          </a:xfrm>
+          <a:prstGeom prst="straightConnector1">
+            <a:avLst/>
+          </a:prstGeom>
+          <a:ln>
+            <a:tailEnd type="triangle"/>
+          </a:ln>
+        </p:spPr>
+        <p:style>
+          <a:lnRef idx="1">
+            <a:schemeClr val="accent1"/>
+          </a:lnRef>
+          <a:fillRef idx="0">
+            <a:schemeClr val="accent1"/>
+          </a:fillRef>
+          <a:effectRef idx="0">
+            <a:schemeClr val="accent1"/>
+          </a:effectRef>
+          <a:fontRef idx="minor">
+            <a:schemeClr val="tx1"/>
+          </a:fontRef>
+        </p:style>
+      </p:cxnSp>
+      <mc:AlternateContent xmlns:mc="http://schemas.openxmlformats.org/markup-compatibility/2006">
+        <mc:Choice xmlns:a14="http://schemas.microsoft.com/office/drawing/2010/main" Requires="a14">
+          <p:sp>
+            <p:nvSpPr>
+              <p:cNvPr id="128" name="Rectangle 127"/>
+              <p:cNvSpPr/>
+              <p:nvPr/>
+            </p:nvSpPr>
+            <p:spPr>
+              <a:xfrm>
+                <a:off x="9827665" y="4240237"/>
+                <a:ext cx="2125776" cy="290946"/>
+              </a:xfrm>
+              <a:prstGeom prst="rect">
+                <a:avLst/>
+              </a:prstGeom>
+              <a:solidFill>
+                <a:schemeClr val="bg1"/>
+              </a:solidFill>
+            </p:spPr>
+            <p:style>
+              <a:lnRef idx="2">
+                <a:schemeClr val="accent1">
+                  <a:shade val="50000"/>
+                </a:schemeClr>
+              </a:lnRef>
+              <a:fillRef idx="1">
+                <a:schemeClr val="accent1"/>
+              </a:fillRef>
+              <a:effectRef idx="0">
+                <a:schemeClr val="accent1"/>
+              </a:effectRef>
+              <a:fontRef idx="minor">
+                <a:schemeClr val="lt1"/>
+              </a:fontRef>
+            </p:style>
+            <p:txBody>
+              <a:bodyPr rtlCol="0" anchor="ctr"/>
+              <a:lstStyle/>
+              <a:p>
+                <a:pPr algn="ctr"/>
+                <a:r>
+                  <a:rPr lang="en-GB" sz="1100" dirty="0" smtClean="0">
+                    <a:solidFill>
+                      <a:schemeClr val="tx1"/>
+                    </a:solidFill>
+                  </a:rPr>
+                  <a:t>x2 = -( S + T) - </a:t>
+                </a:r>
+                <a14:m>
+                  <m:oMath xmlns:m="http://schemas.openxmlformats.org/officeDocument/2006/math">
+                    <m:f>
+                      <m:fPr>
+                        <m:ctrlPr>
+                          <a:rPr lang="en-GB" sz="1100" i="1">
+                            <a:solidFill>
+                              <a:schemeClr val="tx1"/>
+                            </a:solidFill>
+                            <a:latin typeface="Cambria Math" panose="02040503050406030204" pitchFamily="18" charset="0"/>
+                          </a:rPr>
+                        </m:ctrlPr>
+                      </m:fPr>
+                      <m:num>
+                        <m:r>
+                          <a:rPr lang="en-US" sz="1100" i="1">
+                            <a:solidFill>
+                              <a:schemeClr val="tx1"/>
+                            </a:solidFill>
+                            <a:latin typeface="Cambria Math" panose="02040503050406030204" pitchFamily="18" charset="0"/>
+                          </a:rPr>
+                          <m:t>1</m:t>
+                        </m:r>
+                      </m:num>
+                      <m:den>
+                        <m:r>
+                          <a:rPr lang="en-US" sz="1100" i="1">
+                            <a:solidFill>
+                              <a:schemeClr val="tx1"/>
+                            </a:solidFill>
+                            <a:latin typeface="Cambria Math" panose="02040503050406030204" pitchFamily="18" charset="0"/>
+                          </a:rPr>
+                          <m:t>3</m:t>
+                        </m:r>
+                      </m:den>
+                    </m:f>
+                    <m:sSub>
+                      <m:sSubPr>
+                        <m:ctrlPr>
+                          <a:rPr lang="en-GB" sz="1100" i="1">
+                            <a:solidFill>
+                              <a:schemeClr val="tx1"/>
+                            </a:solidFill>
+                            <a:latin typeface="Cambria Math" panose="02040503050406030204" pitchFamily="18" charset="0"/>
+                          </a:rPr>
+                        </m:ctrlPr>
+                      </m:sSubPr>
+                      <m:e>
+                        <m:r>
+                          <a:rPr lang="en-US" sz="1100" i="1">
+                            <a:solidFill>
+                              <a:schemeClr val="tx1"/>
+                            </a:solidFill>
+                            <a:latin typeface="Cambria Math" panose="02040503050406030204" pitchFamily="18" charset="0"/>
+                          </a:rPr>
+                          <m:t>𝑎</m:t>
+                        </m:r>
+                      </m:e>
+                      <m:sub>
+                        <m:r>
+                          <a:rPr lang="en-US" sz="1100" i="1">
+                            <a:solidFill>
+                              <a:schemeClr val="tx1"/>
+                            </a:solidFill>
+                            <a:latin typeface="Cambria Math" panose="02040503050406030204" pitchFamily="18" charset="0"/>
+                          </a:rPr>
+                          <m:t>1</m:t>
+                        </m:r>
+                      </m:sub>
+                    </m:sSub>
+                  </m:oMath>
+                </a14:m>
+                <a:r>
+                  <a:rPr lang="en-GB" sz="1100" dirty="0">
+                    <a:solidFill>
+                      <a:schemeClr val="tx1"/>
+                    </a:solidFill>
+                  </a:rPr>
+                  <a:t>+ (</a:t>
+                </a:r>
+                <a14:m>
+                  <m:oMath xmlns:m="http://schemas.openxmlformats.org/officeDocument/2006/math">
+                    <m:f>
+                      <m:fPr>
+                        <m:ctrlPr>
+                          <a:rPr lang="en-GB" sz="1100" i="1">
+                            <a:solidFill>
+                              <a:schemeClr val="tx1"/>
+                            </a:solidFill>
+                            <a:latin typeface="Cambria Math" panose="02040503050406030204" pitchFamily="18" charset="0"/>
+                          </a:rPr>
+                        </m:ctrlPr>
+                      </m:fPr>
+                      <m:num>
+                        <m:rad>
+                          <m:radPr>
+                            <m:degHide m:val="on"/>
+                            <m:ctrlPr>
+                              <a:rPr lang="en-GB" sz="1100" i="1">
+                                <a:solidFill>
+                                  <a:schemeClr val="tx1"/>
+                                </a:solidFill>
+                                <a:latin typeface="Cambria Math" panose="02040503050406030204" pitchFamily="18" charset="0"/>
+                              </a:rPr>
+                            </m:ctrlPr>
+                          </m:radPr>
+                          <m:deg/>
+                          <m:e>
+                            <m:r>
+                              <a:rPr lang="en-US" sz="1100" i="1">
+                                <a:solidFill>
+                                  <a:schemeClr val="tx1"/>
+                                </a:solidFill>
+                                <a:latin typeface="Cambria Math" panose="02040503050406030204" pitchFamily="18" charset="0"/>
+                              </a:rPr>
+                              <m:t>3</m:t>
+                            </m:r>
+                          </m:e>
+                        </m:rad>
+                      </m:num>
+                      <m:den>
+                        <m:r>
+                          <a:rPr lang="en-US" sz="1100" i="1">
+                            <a:solidFill>
+                              <a:schemeClr val="tx1"/>
+                            </a:solidFill>
+                            <a:latin typeface="Cambria Math" panose="02040503050406030204" pitchFamily="18" charset="0"/>
+                          </a:rPr>
+                          <m:t>2</m:t>
+                        </m:r>
+                      </m:den>
+                    </m:f>
+                    <m:r>
+                      <a:rPr lang="en-US" sz="1100" i="1">
+                        <a:solidFill>
+                          <a:schemeClr val="tx1"/>
+                        </a:solidFill>
+                        <a:latin typeface="Cambria Math" panose="02040503050406030204" pitchFamily="18" charset="0"/>
+                      </a:rPr>
+                      <m:t>𝑖</m:t>
+                    </m:r>
+                  </m:oMath>
+                </a14:m>
+                <a:r>
+                  <a:rPr lang="en-GB" sz="1100" dirty="0">
+                    <a:solidFill>
+                      <a:schemeClr val="tx1"/>
+                    </a:solidFill>
+                  </a:rPr>
+                  <a:t> * (S – T))</a:t>
+                </a:r>
+                <a:endParaRPr lang="en-GB" sz="1100" dirty="0">
+                  <a:solidFill>
+                    <a:schemeClr val="tx1"/>
+                  </a:solidFill>
+                </a:endParaRPr>
+              </a:p>
+            </p:txBody>
+          </p:sp>
+        </mc:Choice>
+        <mc:Fallback>
+          <p:sp>
+            <p:nvSpPr>
+              <p:cNvPr id="128" name="Rectangle 127"/>
+              <p:cNvSpPr>
+                <a:spLocks noRot="1" noChangeAspect="1" noMove="1" noResize="1" noEditPoints="1" noAdjustHandles="1" noChangeArrowheads="1" noChangeShapeType="1" noTextEdit="1"/>
+              </p:cNvSpPr>
+              <p:nvPr/>
+            </p:nvSpPr>
+            <p:spPr>
+              <a:xfrm>
+                <a:off x="9827665" y="4240237"/>
+                <a:ext cx="2125776" cy="290946"/>
+              </a:xfrm>
+              <a:prstGeom prst="rect">
+                <a:avLst/>
+              </a:prstGeom>
+              <a:blipFill>
+                <a:blip r:embed="rId8"/>
+                <a:stretch>
+                  <a:fillRect b="-12245"/>
+                </a:stretch>
+              </a:blipFill>
+            </p:spPr>
+            <p:txBody>
+              <a:bodyPr/>
+              <a:lstStyle/>
+              <a:p>
+                <a:r>
+                  <a:rPr lang="en-US">
+                    <a:noFill/>
+                  </a:rPr>
+                  <a:t> </a:t>
+                </a:r>
+              </a:p>
+            </p:txBody>
+          </p:sp>
+        </mc:Fallback>
+      </mc:AlternateContent>
+      <p:cxnSp>
+        <p:nvCxnSpPr>
+          <p:cNvPr id="130" name="Elbow Connector 129"/>
+          <p:cNvCxnSpPr>
+            <a:stCxn id="123" idx="3"/>
+            <a:endCxn id="128" idx="3"/>
+          </p:cNvCxnSpPr>
+          <p:nvPr/>
+        </p:nvCxnSpPr>
+        <p:spPr>
+          <a:xfrm>
+            <a:off x="11947465" y="3912070"/>
+            <a:ext cx="5976" cy="473640"/>
+          </a:xfrm>
+          <a:prstGeom prst="bentConnector3">
+            <a:avLst>
+              <a:gd name="adj1" fmla="val 2271118"/>
+            </a:avLst>
+          </a:prstGeom>
+          <a:ln>
+            <a:tailEnd type="triangle"/>
+          </a:ln>
+        </p:spPr>
+        <p:style>
+          <a:lnRef idx="1">
+            <a:schemeClr val="accent1"/>
+          </a:lnRef>
+          <a:fillRef idx="0">
+            <a:schemeClr val="accent1"/>
+          </a:fillRef>
+          <a:effectRef idx="0">
+            <a:schemeClr val="accent1"/>
+          </a:effectRef>
+          <a:fontRef idx="minor">
+            <a:schemeClr val="tx1"/>
+          </a:fontRef>
+        </p:style>
+      </p:cxnSp>
+      <mc:AlternateContent xmlns:mc="http://schemas.openxmlformats.org/markup-compatibility/2006">
+        <mc:Choice xmlns:a14="http://schemas.microsoft.com/office/drawing/2010/main" Requires="a14">
+          <p:sp>
+            <p:nvSpPr>
+              <p:cNvPr id="136" name="Rectangle 135"/>
+              <p:cNvSpPr/>
+              <p:nvPr/>
+            </p:nvSpPr>
+            <p:spPr>
+              <a:xfrm>
+                <a:off x="7469871" y="4240237"/>
+                <a:ext cx="2143687" cy="290946"/>
+              </a:xfrm>
+              <a:prstGeom prst="rect">
+                <a:avLst/>
+              </a:prstGeom>
+              <a:solidFill>
+                <a:schemeClr val="bg1"/>
+              </a:solidFill>
+            </p:spPr>
+            <p:style>
+              <a:lnRef idx="2">
+                <a:schemeClr val="accent1">
+                  <a:shade val="50000"/>
+                </a:schemeClr>
+              </a:lnRef>
+              <a:fillRef idx="1">
+                <a:schemeClr val="accent1"/>
+              </a:fillRef>
+              <a:effectRef idx="0">
+                <a:schemeClr val="accent1"/>
+              </a:effectRef>
+              <a:fontRef idx="minor">
+                <a:schemeClr val="lt1"/>
+              </a:fontRef>
+            </p:style>
+            <p:txBody>
+              <a:bodyPr rtlCol="0" anchor="ctr"/>
+              <a:lstStyle/>
+              <a:p>
+                <a:pPr algn="ctr"/>
+                <a:r>
+                  <a:rPr lang="en-GB" sz="1100" dirty="0" smtClean="0">
+                    <a:solidFill>
+                      <a:schemeClr val="tx1"/>
+                    </a:solidFill>
+                  </a:rPr>
+                  <a:t>x2 = -( S + T) - </a:t>
+                </a:r>
+                <a14:m>
+                  <m:oMath xmlns:m="http://schemas.openxmlformats.org/officeDocument/2006/math">
+                    <m:f>
+                      <m:fPr>
+                        <m:ctrlPr>
+                          <a:rPr lang="en-GB" sz="1100" i="1">
+                            <a:solidFill>
+                              <a:schemeClr val="tx1"/>
+                            </a:solidFill>
+                            <a:latin typeface="Cambria Math" panose="02040503050406030204" pitchFamily="18" charset="0"/>
+                          </a:rPr>
+                        </m:ctrlPr>
+                      </m:fPr>
+                      <m:num>
+                        <m:r>
+                          <a:rPr lang="en-US" sz="1100" i="1">
+                            <a:solidFill>
+                              <a:schemeClr val="tx1"/>
+                            </a:solidFill>
+                            <a:latin typeface="Cambria Math" panose="02040503050406030204" pitchFamily="18" charset="0"/>
+                          </a:rPr>
+                          <m:t>1</m:t>
+                        </m:r>
+                      </m:num>
+                      <m:den>
+                        <m:r>
+                          <a:rPr lang="en-US" sz="1100" i="1">
+                            <a:solidFill>
+                              <a:schemeClr val="tx1"/>
+                            </a:solidFill>
+                            <a:latin typeface="Cambria Math" panose="02040503050406030204" pitchFamily="18" charset="0"/>
+                          </a:rPr>
+                          <m:t>3</m:t>
+                        </m:r>
+                      </m:den>
+                    </m:f>
+                    <m:sSub>
+                      <m:sSubPr>
+                        <m:ctrlPr>
+                          <a:rPr lang="en-GB" sz="1100" i="1">
+                            <a:solidFill>
+                              <a:schemeClr val="tx1"/>
+                            </a:solidFill>
+                            <a:latin typeface="Cambria Math" panose="02040503050406030204" pitchFamily="18" charset="0"/>
+                          </a:rPr>
+                        </m:ctrlPr>
+                      </m:sSubPr>
+                      <m:e>
+                        <m:r>
+                          <a:rPr lang="en-US" sz="1100" i="1">
+                            <a:solidFill>
+                              <a:schemeClr val="tx1"/>
+                            </a:solidFill>
+                            <a:latin typeface="Cambria Math" panose="02040503050406030204" pitchFamily="18" charset="0"/>
+                          </a:rPr>
+                          <m:t>𝑎</m:t>
+                        </m:r>
+                      </m:e>
+                      <m:sub>
+                        <m:r>
+                          <a:rPr lang="en-US" sz="1100" i="1">
+                            <a:solidFill>
+                              <a:schemeClr val="tx1"/>
+                            </a:solidFill>
+                            <a:latin typeface="Cambria Math" panose="02040503050406030204" pitchFamily="18" charset="0"/>
+                          </a:rPr>
+                          <m:t>1</m:t>
+                        </m:r>
+                      </m:sub>
+                    </m:sSub>
+                    <m:r>
+                      <a:rPr lang="en-US" sz="1100" b="0" i="0" smtClean="0">
+                        <a:solidFill>
+                          <a:schemeClr val="tx1"/>
+                        </a:solidFill>
+                        <a:latin typeface="Cambria Math" panose="02040503050406030204" pitchFamily="18" charset="0"/>
+                      </a:rPr>
+                      <m:t>−</m:t>
+                    </m:r>
+                  </m:oMath>
+                </a14:m>
+                <a:r>
+                  <a:rPr lang="en-GB" sz="1100" dirty="0">
+                    <a:solidFill>
+                      <a:schemeClr val="tx1"/>
+                    </a:solidFill>
+                  </a:rPr>
+                  <a:t> (</a:t>
+                </a:r>
+                <a14:m>
+                  <m:oMath xmlns:m="http://schemas.openxmlformats.org/officeDocument/2006/math">
+                    <m:f>
+                      <m:fPr>
+                        <m:ctrlPr>
+                          <a:rPr lang="en-GB" sz="1100" i="1">
+                            <a:solidFill>
+                              <a:schemeClr val="tx1"/>
+                            </a:solidFill>
+                            <a:latin typeface="Cambria Math" panose="02040503050406030204" pitchFamily="18" charset="0"/>
+                          </a:rPr>
+                        </m:ctrlPr>
+                      </m:fPr>
+                      <m:num>
+                        <m:rad>
+                          <m:radPr>
+                            <m:degHide m:val="on"/>
+                            <m:ctrlPr>
+                              <a:rPr lang="en-GB" sz="1100" i="1">
+                                <a:solidFill>
+                                  <a:schemeClr val="tx1"/>
+                                </a:solidFill>
+                                <a:latin typeface="Cambria Math" panose="02040503050406030204" pitchFamily="18" charset="0"/>
+                              </a:rPr>
+                            </m:ctrlPr>
+                          </m:radPr>
+                          <m:deg/>
+                          <m:e>
+                            <m:r>
+                              <a:rPr lang="en-US" sz="1100" i="1">
+                                <a:solidFill>
+                                  <a:schemeClr val="tx1"/>
+                                </a:solidFill>
+                                <a:latin typeface="Cambria Math" panose="02040503050406030204" pitchFamily="18" charset="0"/>
+                              </a:rPr>
+                              <m:t>3</m:t>
+                            </m:r>
+                          </m:e>
+                        </m:rad>
+                      </m:num>
+                      <m:den>
+                        <m:r>
+                          <a:rPr lang="en-US" sz="1100" i="1">
+                            <a:solidFill>
+                              <a:schemeClr val="tx1"/>
+                            </a:solidFill>
+                            <a:latin typeface="Cambria Math" panose="02040503050406030204" pitchFamily="18" charset="0"/>
+                          </a:rPr>
+                          <m:t>2</m:t>
+                        </m:r>
+                      </m:den>
+                    </m:f>
+                    <m:r>
+                      <a:rPr lang="en-US" sz="1100" i="1">
+                        <a:solidFill>
+                          <a:schemeClr val="tx1"/>
+                        </a:solidFill>
+                        <a:latin typeface="Cambria Math" panose="02040503050406030204" pitchFamily="18" charset="0"/>
+                      </a:rPr>
+                      <m:t>𝑖</m:t>
+                    </m:r>
+                  </m:oMath>
+                </a14:m>
+                <a:r>
+                  <a:rPr lang="en-GB" sz="1100" dirty="0">
+                    <a:solidFill>
+                      <a:schemeClr val="tx1"/>
+                    </a:solidFill>
+                  </a:rPr>
+                  <a:t> * (S – T))</a:t>
+                </a:r>
+                <a:endParaRPr lang="en-GB" sz="1100" dirty="0">
+                  <a:solidFill>
+                    <a:schemeClr val="tx1"/>
+                  </a:solidFill>
+                </a:endParaRPr>
+              </a:p>
+            </p:txBody>
+          </p:sp>
+        </mc:Choice>
+        <mc:Fallback>
+          <p:sp>
+            <p:nvSpPr>
+              <p:cNvPr id="136" name="Rectangle 135"/>
+              <p:cNvSpPr>
+                <a:spLocks noRot="1" noChangeAspect="1" noMove="1" noResize="1" noEditPoints="1" noAdjustHandles="1" noChangeArrowheads="1" noChangeShapeType="1" noTextEdit="1"/>
+              </p:cNvSpPr>
+              <p:nvPr/>
+            </p:nvSpPr>
+            <p:spPr>
+              <a:xfrm>
+                <a:off x="7469871" y="4240237"/>
+                <a:ext cx="2143687" cy="290946"/>
+              </a:xfrm>
+              <a:prstGeom prst="rect">
+                <a:avLst/>
+              </a:prstGeom>
+              <a:blipFill>
+                <a:blip r:embed="rId9"/>
+                <a:stretch>
+                  <a:fillRect b="-12245"/>
+                </a:stretch>
+              </a:blipFill>
+            </p:spPr>
+            <p:txBody>
+              <a:bodyPr/>
+              <a:lstStyle/>
+              <a:p>
+                <a:r>
+                  <a:rPr lang="en-US">
+                    <a:noFill/>
+                  </a:rPr>
+                  <a:t> </a:t>
+                </a:r>
+              </a:p>
+            </p:txBody>
+          </p:sp>
+        </mc:Fallback>
+      </mc:AlternateContent>
+      <p:cxnSp>
+        <p:nvCxnSpPr>
+          <p:cNvPr id="137" name="Straight Arrow Connector 136"/>
+          <p:cNvCxnSpPr>
+            <a:stCxn id="128" idx="1"/>
+            <a:endCxn id="136" idx="3"/>
+          </p:cNvCxnSpPr>
+          <p:nvPr/>
+        </p:nvCxnSpPr>
+        <p:spPr>
+          <a:xfrm flipH="1">
+            <a:off x="9613558" y="4385710"/>
+            <a:ext cx="214107" cy="0"/>
+          </a:xfrm>
+          <a:prstGeom prst="straightConnector1">
+            <a:avLst/>
+          </a:prstGeom>
+          <a:ln>
+            <a:tailEnd type="triangle"/>
+          </a:ln>
+        </p:spPr>
+        <p:style>
+          <a:lnRef idx="1">
+            <a:schemeClr val="accent1"/>
+          </a:lnRef>
+          <a:fillRef idx="0">
+            <a:schemeClr val="accent1"/>
+          </a:fillRef>
+          <a:effectRef idx="0">
+            <a:schemeClr val="accent1"/>
+          </a:effectRef>
+          <a:fontRef idx="minor">
+            <a:schemeClr val="tx1"/>
+          </a:fontRef>
+        </p:style>
+      </p:cxnSp>
+      <p:cxnSp>
+        <p:nvCxnSpPr>
+          <p:cNvPr id="148" name="Straight Arrow Connector 147"/>
+          <p:cNvCxnSpPr>
+            <a:stCxn id="136" idx="1"/>
+            <a:endCxn id="43" idx="5"/>
+          </p:cNvCxnSpPr>
+          <p:nvPr/>
+        </p:nvCxnSpPr>
+        <p:spPr>
+          <a:xfrm flipH="1" flipV="1">
+            <a:off x="7190927" y="4384758"/>
+            <a:ext cx="278944" cy="952"/>
+          </a:xfrm>
+          <a:prstGeom prst="straightConnector1">
+            <a:avLst/>
+          </a:prstGeom>
+          <a:ln>
+            <a:tailEnd type="triangle"/>
+          </a:ln>
+        </p:spPr>
+        <p:style>
+          <a:lnRef idx="1">
+            <a:schemeClr val="accent1"/>
+          </a:lnRef>
+          <a:fillRef idx="0">
+            <a:schemeClr val="accent1"/>
+          </a:fillRef>
+          <a:effectRef idx="0">
+            <a:schemeClr val="accent1"/>
+          </a:effectRef>
+          <a:fontRef idx="minor">
+            <a:schemeClr val="tx1"/>
+          </a:fontRef>
+        </p:style>
+      </p:cxnSp>
+      <p:sp>
+        <p:nvSpPr>
+          <p:cNvPr id="164" name="Flowchart: Data 163"/>
+          <p:cNvSpPr/>
+          <p:nvPr/>
+        </p:nvSpPr>
+        <p:spPr>
+          <a:xfrm>
+            <a:off x="5806428" y="5054882"/>
+            <a:ext cx="1416307" cy="228632"/>
+          </a:xfrm>
+          <a:prstGeom prst="flowChartInputOutput">
+            <a:avLst/>
+          </a:prstGeom>
+          <a:solidFill>
+            <a:schemeClr val="bg1"/>
+          </a:solidFill>
+        </p:spPr>
+        <p:style>
+          <a:lnRef idx="2">
+            <a:schemeClr val="accent1">
+              <a:shade val="50000"/>
+            </a:schemeClr>
+          </a:lnRef>
+          <a:fillRef idx="1">
+            <a:schemeClr val="accent1"/>
+          </a:fillRef>
+          <a:effectRef idx="0">
+            <a:schemeClr val="accent1"/>
+          </a:effectRef>
+          <a:fontRef idx="minor">
+            <a:schemeClr val="lt1"/>
+          </a:fontRef>
+        </p:style>
+        <p:txBody>
+          <a:bodyPr rtlCol="0" anchor="ctr"/>
+          <a:lstStyle/>
+          <a:p>
+            <a:pPr algn="ctr"/>
+            <a:r>
+              <a:rPr lang="en-GB" sz="1000" dirty="0" smtClean="0">
+                <a:solidFill>
+                  <a:schemeClr val="tx1"/>
+                </a:solidFill>
+              </a:rPr>
+              <a:t>Display </a:t>
+            </a:r>
+            <a:r>
+              <a:rPr lang="en-GB" sz="1000" dirty="0" smtClean="0">
+                <a:solidFill>
+                  <a:schemeClr val="tx1"/>
+                </a:solidFill>
+              </a:rPr>
+              <a:t>x3</a:t>
+            </a:r>
+            <a:endParaRPr lang="en-GB" sz="1000" dirty="0">
+              <a:solidFill>
+                <a:schemeClr val="tx1"/>
+              </a:solidFill>
+            </a:endParaRPr>
+          </a:p>
+        </p:txBody>
+      </p:sp>
+      <p:cxnSp>
+        <p:nvCxnSpPr>
+          <p:cNvPr id="166" name="Straight Arrow Connector 165"/>
+          <p:cNvCxnSpPr>
+            <a:stCxn id="45" idx="4"/>
+            <a:endCxn id="164" idx="0"/>
+          </p:cNvCxnSpPr>
+          <p:nvPr/>
+        </p:nvCxnSpPr>
+        <p:spPr>
+          <a:xfrm flipH="1">
+            <a:off x="6656212" y="4886787"/>
+            <a:ext cx="7213" cy="168095"/>
+          </a:xfrm>
+          <a:prstGeom prst="straightConnector1">
+            <a:avLst/>
+          </a:prstGeom>
+          <a:ln>
+            <a:tailEnd type="triangle"/>
+          </a:ln>
+        </p:spPr>
+        <p:style>
+          <a:lnRef idx="1">
+            <a:schemeClr val="accent1"/>
+          </a:lnRef>
+          <a:fillRef idx="0">
+            <a:schemeClr val="accent1"/>
+          </a:fillRef>
+          <a:effectRef idx="0">
+            <a:schemeClr val="accent1"/>
+          </a:effectRef>
+          <a:fontRef idx="minor">
+            <a:schemeClr val="tx1"/>
+          </a:fontRef>
+        </p:style>
+      </p:cxnSp>
+      <mc:AlternateContent xmlns:mc="http://schemas.openxmlformats.org/markup-compatibility/2006">
+        <mc:Choice xmlns:a14="http://schemas.microsoft.com/office/drawing/2010/main" Requires="a14">
+          <p:sp>
+            <p:nvSpPr>
+              <p:cNvPr id="176" name="TextBox 175"/>
+              <p:cNvSpPr txBox="1"/>
+              <p:nvPr/>
+            </p:nvSpPr>
+            <p:spPr>
+              <a:xfrm>
+                <a:off x="164757" y="161108"/>
+                <a:ext cx="3534032" cy="253916"/>
+              </a:xfrm>
+              <a:prstGeom prst="rect">
+                <a:avLst/>
+              </a:prstGeom>
+              <a:noFill/>
+            </p:spPr>
+            <p:txBody>
+              <a:bodyPr wrap="square" rtlCol="0">
+                <a:spAutoFit/>
+              </a:bodyPr>
+              <a:lstStyle/>
+              <a:p>
+                <a:r>
+                  <a:rPr lang="en-US" sz="1050" dirty="0" smtClean="0"/>
+                  <a:t>2. Find the root of a Cubic equation A</a:t>
+                </a:r>
+                <a14:m>
+                  <m:oMath xmlns:m="http://schemas.openxmlformats.org/officeDocument/2006/math">
+                    <m:sSup>
+                      <m:sSupPr>
+                        <m:ctrlPr>
+                          <a:rPr lang="en-US" sz="1050" i="1" smtClean="0">
+                            <a:latin typeface="Cambria Math" panose="02040503050406030204" pitchFamily="18" charset="0"/>
+                          </a:rPr>
+                        </m:ctrlPr>
+                      </m:sSupPr>
+                      <m:e>
+                        <m:r>
+                          <a:rPr lang="en-US" sz="1050" b="0" i="1" smtClean="0">
+                            <a:latin typeface="Cambria Math" panose="02040503050406030204" pitchFamily="18" charset="0"/>
+                          </a:rPr>
+                          <m:t>𝑥</m:t>
+                        </m:r>
+                      </m:e>
+                      <m:sup>
+                        <m:r>
+                          <a:rPr lang="en-US" sz="1050" b="0" i="1" smtClean="0">
+                            <a:latin typeface="Cambria Math" panose="02040503050406030204" pitchFamily="18" charset="0"/>
+                          </a:rPr>
+                          <m:t>3</m:t>
+                        </m:r>
+                      </m:sup>
+                    </m:sSup>
+                  </m:oMath>
+                </a14:m>
+                <a:r>
+                  <a:rPr lang="en-US" sz="1050" dirty="0" smtClean="0"/>
+                  <a:t> + </a:t>
+                </a:r>
+                <a:r>
+                  <a:rPr lang="en-US" sz="1050" dirty="0" err="1" smtClean="0"/>
+                  <a:t>B</a:t>
+                </a:r>
+                <a14:m>
+                  <m:oMath xmlns:m="http://schemas.openxmlformats.org/officeDocument/2006/math">
+                    <m:sSup>
+                      <m:sSupPr>
+                        <m:ctrlPr>
+                          <a:rPr lang="en-US" sz="1050" i="1" smtClean="0">
+                            <a:latin typeface="Cambria Math" panose="02040503050406030204" pitchFamily="18" charset="0"/>
+                          </a:rPr>
+                        </m:ctrlPr>
+                      </m:sSupPr>
+                      <m:e>
+                        <m:r>
+                          <a:rPr lang="en-US" sz="1050" b="0" i="1" smtClean="0">
+                            <a:latin typeface="Cambria Math" panose="02040503050406030204" pitchFamily="18" charset="0"/>
+                          </a:rPr>
+                          <m:t>𝑥</m:t>
+                        </m:r>
+                      </m:e>
+                      <m:sup>
+                        <m:r>
+                          <a:rPr lang="en-US" sz="1050" b="0" i="1" smtClean="0">
+                            <a:latin typeface="Cambria Math" panose="02040503050406030204" pitchFamily="18" charset="0"/>
+                          </a:rPr>
+                          <m:t>2</m:t>
+                        </m:r>
+                      </m:sup>
+                    </m:sSup>
+                  </m:oMath>
+                </a14:m>
+                <a:r>
+                  <a:rPr lang="en-US" sz="1050" dirty="0" smtClean="0"/>
+                  <a:t> + </a:t>
+                </a:r>
+                <a:r>
+                  <a:rPr lang="en-US" sz="1050" dirty="0" err="1" smtClean="0"/>
+                  <a:t>Cx</a:t>
+                </a:r>
+                <a:r>
+                  <a:rPr lang="en-US" sz="1050" dirty="0" smtClean="0"/>
+                  <a:t> + D = 0</a:t>
+                </a:r>
+                <a:endParaRPr lang="en-US" sz="1050" dirty="0"/>
+              </a:p>
+            </p:txBody>
+          </p:sp>
+        </mc:Choice>
+        <mc:Fallback>
+          <p:sp>
+            <p:nvSpPr>
+              <p:cNvPr id="176" name="TextBox 175"/>
+              <p:cNvSpPr txBox="1">
+                <a:spLocks noRot="1" noChangeAspect="1" noMove="1" noResize="1" noEditPoints="1" noAdjustHandles="1" noChangeArrowheads="1" noChangeShapeType="1" noTextEdit="1"/>
+              </p:cNvSpPr>
+              <p:nvPr/>
+            </p:nvSpPr>
+            <p:spPr>
+              <a:xfrm>
+                <a:off x="164757" y="161108"/>
+                <a:ext cx="3534032" cy="253916"/>
+              </a:xfrm>
+              <a:prstGeom prst="rect">
+                <a:avLst/>
+              </a:prstGeom>
+              <a:blipFill>
+                <a:blip r:embed="rId10"/>
+                <a:stretch>
+                  <a:fillRect b="-14286"/>
                 </a:stretch>
               </a:blipFill>
             </p:spPr>

</xml_diff>